<commit_message>
fix examples in slides
</commit_message>
<xml_diff>
--- a/presentations/2019-02_Hamburg_RUG/1902 Hamburg RUG easystats.pptx
+++ b/presentations/2019-02_Hamburg_RUG/1902 Hamburg RUG easystats.pptx
@@ -5,10 +5,10 @@
     <p:sldMasterId id="2147483663" r:id="rId1"/>
   </p:sldMasterIdLst>
   <p:notesMasterIdLst>
-    <p:notesMasterId r:id="rId21"/>
+    <p:notesMasterId r:id="rId22"/>
   </p:notesMasterIdLst>
   <p:handoutMasterIdLst>
-    <p:handoutMasterId r:id="rId22"/>
+    <p:handoutMasterId r:id="rId23"/>
   </p:handoutMasterIdLst>
   <p:sldIdLst>
     <p:sldId id="622" r:id="rId2"/>
@@ -29,7 +29,8 @@
     <p:sldId id="624" r:id="rId17"/>
     <p:sldId id="642" r:id="rId18"/>
     <p:sldId id="643" r:id="rId19"/>
-    <p:sldId id="635" r:id="rId20"/>
+    <p:sldId id="646" r:id="rId20"/>
+    <p:sldId id="635" r:id="rId21"/>
   </p:sldIdLst>
   <p:sldSz cx="9144000" cy="6858000" type="screen4x3"/>
   <p:notesSz cx="6858000" cy="9144000"/>
@@ -212,7 +213,7 @@
           <a:p>
             <a:fld id="{64CA4326-4DC0-4DE5-99BF-3FA9D988CBE6}" type="datetimeFigureOut">
               <a:rPr lang="de-DE" smtClean="0"/>
-              <a:t>31.01.2019</a:t>
+              <a:t>02.02.2019</a:t>
             </a:fld>
             <a:endParaRPr lang="de-DE"/>
           </a:p>
@@ -345,7 +346,7 @@
           <a:p>
             <a:fld id="{0E08E2FD-2E15-419A-B356-6759EA05D2AD}" type="datetimeFigureOut">
               <a:rPr lang="de-DE" smtClean="0"/>
-              <a:t>31.01.2019</a:t>
+              <a:t>02.02.2019</a:t>
             </a:fld>
             <a:endParaRPr lang="de-DE"/>
           </a:p>
@@ -1074,7 +1075,7 @@
           <a:noFill/>
           <a:extLst>
             <a:ext uri="{909E8E84-426E-40dd-AFC4-6F175D3DCCD1}">
-              <a14:hiddenFill xmlns="" xmlns:a14="http://schemas.microsoft.com/office/drawing/2010/main">
+              <a14:hiddenFill xmlns:a14="http://schemas.microsoft.com/office/drawing/2010/main" xmlns="">
                 <a:solidFill>
                   <a:srgbClr val="FFFFFF"/>
                 </a:solidFill>
@@ -1115,7 +1116,7 @@
           <a:noFill/>
           <a:extLst>
             <a:ext uri="{909E8E84-426E-40dd-AFC4-6F175D3DCCD1}">
-              <a14:hiddenFill xmlns="" xmlns:a14="http://schemas.microsoft.com/office/drawing/2010/main">
+              <a14:hiddenFill xmlns:a14="http://schemas.microsoft.com/office/drawing/2010/main" xmlns="">
                 <a:solidFill>
                   <a:srgbClr val="FFFFFF"/>
                 </a:solidFill>
@@ -1764,7 +1765,7 @@
           <a:noFill/>
           <a:extLst>
             <a:ext uri="{909E8E84-426E-40dd-AFC4-6F175D3DCCD1}">
-              <a14:hiddenFill xmlns="" xmlns:a14="http://schemas.microsoft.com/office/drawing/2010/main">
+              <a14:hiddenFill xmlns:a14="http://schemas.microsoft.com/office/drawing/2010/main" xmlns="">
                 <a:solidFill>
                   <a:srgbClr val="FFFFFF"/>
                 </a:solidFill>
@@ -1805,7 +1806,7 @@
           <a:noFill/>
           <a:extLst>
             <a:ext uri="{909E8E84-426E-40dd-AFC4-6F175D3DCCD1}">
-              <a14:hiddenFill xmlns="" xmlns:a14="http://schemas.microsoft.com/office/drawing/2010/main">
+              <a14:hiddenFill xmlns:a14="http://schemas.microsoft.com/office/drawing/2010/main" xmlns="">
                 <a:solidFill>
                   <a:srgbClr val="FFFFFF"/>
                 </a:solidFill>
@@ -8303,7 +8304,7 @@
         <p:spPr>
           <a:xfrm>
             <a:off x="0" y="2421603"/>
-            <a:ext cx="5580112" cy="3665207"/>
+            <a:ext cx="5580112" cy="4157649"/>
           </a:xfrm>
           <a:prstGeom prst="rect">
             <a:avLst/>
@@ -8351,30 +8352,30 @@
                 <a:latin typeface="Liberation Mono" panose="02070409020205020404" pitchFamily="49" charset="0"/>
                 <a:cs typeface="Liberation Mono" panose="02070409020205020404" pitchFamily="49" charset="0"/>
               </a:rPr>
-              <a:t>library(insight)</a:t>
-            </a:r>
-          </a:p>
-          <a:p>
-            <a:r>
-              <a:rPr lang="en-US" sz="1600" dirty="0">
+              <a:t>library(</a:t>
+            </a:r>
+            <a:r>
+              <a:rPr lang="en-US" sz="1600" dirty="0" err="1">
                 <a:solidFill>
                   <a:schemeClr val="tx2"/>
                 </a:solidFill>
                 <a:latin typeface="Liberation Mono" panose="02070409020205020404" pitchFamily="49" charset="0"/>
                 <a:cs typeface="Liberation Mono" panose="02070409020205020404" pitchFamily="49" charset="0"/>
               </a:rPr>
-              <a:t>library(</a:t>
-            </a:r>
-            <a:r>
-              <a:rPr lang="en-US" sz="1600" dirty="0" err="1">
+              <a:t>MCMCglmm</a:t>
+            </a:r>
+            <a:r>
+              <a:rPr lang="en-US" sz="1600" dirty="0">
                 <a:solidFill>
                   <a:schemeClr val="tx2"/>
                 </a:solidFill>
                 <a:latin typeface="Liberation Mono" panose="02070409020205020404" pitchFamily="49" charset="0"/>
                 <a:cs typeface="Liberation Mono" panose="02070409020205020404" pitchFamily="49" charset="0"/>
               </a:rPr>
-              <a:t>MCMCglmm</a:t>
-            </a:r>
+              <a:t>)</a:t>
+            </a:r>
+          </a:p>
+          <a:p>
             <a:r>
               <a:rPr lang="en-US" sz="1600" dirty="0">
                 <a:solidFill>
@@ -8383,30 +8384,178 @@
                 <a:latin typeface="Liberation Mono" panose="02070409020205020404" pitchFamily="49" charset="0"/>
                 <a:cs typeface="Liberation Mono" panose="02070409020205020404" pitchFamily="49" charset="0"/>
               </a:rPr>
-              <a:t>)</a:t>
-            </a:r>
-          </a:p>
-          <a:p>
-            <a:r>
-              <a:rPr lang="en-US" sz="1600" dirty="0">
+              <a:t>data(</a:t>
+            </a:r>
+            <a:r>
+              <a:rPr lang="en-US" sz="1600" dirty="0" err="1">
                 <a:solidFill>
                   <a:schemeClr val="tx2"/>
                 </a:solidFill>
                 <a:latin typeface="Liberation Mono" panose="02070409020205020404" pitchFamily="49" charset="0"/>
                 <a:cs typeface="Liberation Mono" panose="02070409020205020404" pitchFamily="49" charset="0"/>
               </a:rPr>
-              <a:t>data(</a:t>
-            </a:r>
-            <a:r>
-              <a:rPr lang="en-US" sz="1600" dirty="0" err="1">
+              <a:t>PlodiaPO</a:t>
+            </a:r>
+            <a:r>
+              <a:rPr lang="en-US" sz="1600" dirty="0">
                 <a:solidFill>
                   <a:schemeClr val="tx2"/>
                 </a:solidFill>
                 <a:latin typeface="Liberation Mono" panose="02070409020205020404" pitchFamily="49" charset="0"/>
                 <a:cs typeface="Liberation Mono" panose="02070409020205020404" pitchFamily="49" charset="0"/>
               </a:rPr>
+              <a:t>)</a:t>
+            </a:r>
+          </a:p>
+          <a:p>
+            <a:r>
+              <a:rPr lang="en-US" sz="1600" dirty="0">
+                <a:solidFill>
+                  <a:schemeClr val="tx2"/>
+                </a:solidFill>
+                <a:latin typeface="Liberation Mono" panose="02070409020205020404" pitchFamily="49" charset="0"/>
+                <a:cs typeface="Liberation Mono" panose="02070409020205020404" pitchFamily="49" charset="0"/>
+              </a:rPr>
+              <a:t>m &lt;- </a:t>
+            </a:r>
+            <a:r>
+              <a:rPr lang="en-US" sz="1600" dirty="0" err="1">
+                <a:solidFill>
+                  <a:schemeClr val="tx2"/>
+                </a:solidFill>
+                <a:latin typeface="Liberation Mono" panose="02070409020205020404" pitchFamily="49" charset="0"/>
+                <a:cs typeface="Liberation Mono" panose="02070409020205020404" pitchFamily="49" charset="0"/>
+              </a:rPr>
+              <a:t>MCMCglmm</a:t>
+            </a:r>
+            <a:r>
+              <a:rPr lang="en-US" sz="1600" dirty="0">
+                <a:solidFill>
+                  <a:schemeClr val="tx2"/>
+                </a:solidFill>
+                <a:latin typeface="Liberation Mono" panose="02070409020205020404" pitchFamily="49" charset="0"/>
+                <a:cs typeface="Liberation Mono" panose="02070409020205020404" pitchFamily="49" charset="0"/>
+              </a:rPr>
+              <a:t>(</a:t>
+            </a:r>
+          </a:p>
+          <a:p>
+            <a:r>
+              <a:rPr lang="en-US" sz="1600" dirty="0">
+                <a:solidFill>
+                  <a:schemeClr val="tx2"/>
+                </a:solidFill>
+                <a:latin typeface="Liberation Mono" panose="02070409020205020404" pitchFamily="49" charset="0"/>
+                <a:cs typeface="Liberation Mono" panose="02070409020205020404" pitchFamily="49" charset="0"/>
+              </a:rPr>
+              <a:t>  PO~1, random=~</a:t>
+            </a:r>
+            <a:r>
+              <a:rPr lang="en-US" sz="1600" dirty="0" err="1">
+                <a:solidFill>
+                  <a:schemeClr val="tx2"/>
+                </a:solidFill>
+                <a:latin typeface="Liberation Mono" panose="02070409020205020404" pitchFamily="49" charset="0"/>
+                <a:cs typeface="Liberation Mono" panose="02070409020205020404" pitchFamily="49" charset="0"/>
+              </a:rPr>
+              <a:t>FSfamily</a:t>
+            </a:r>
+            <a:r>
+              <a:rPr lang="en-US" sz="1600" dirty="0">
+                <a:solidFill>
+                  <a:schemeClr val="tx2"/>
+                </a:solidFill>
+                <a:latin typeface="Liberation Mono" panose="02070409020205020404" pitchFamily="49" charset="0"/>
+                <a:cs typeface="Liberation Mono" panose="02070409020205020404" pitchFamily="49" charset="0"/>
+              </a:rPr>
+              <a:t>, data=</a:t>
+            </a:r>
+            <a:r>
+              <a:rPr lang="en-US" sz="1600" dirty="0" err="1">
+                <a:solidFill>
+                  <a:schemeClr val="tx2"/>
+                </a:solidFill>
+                <a:latin typeface="Liberation Mono" panose="02070409020205020404" pitchFamily="49" charset="0"/>
+                <a:cs typeface="Liberation Mono" panose="02070409020205020404" pitchFamily="49" charset="0"/>
+              </a:rPr>
               <a:t>PlodiaPO</a:t>
             </a:r>
+            <a:r>
+              <a:rPr lang="en-US" sz="1600" dirty="0">
+                <a:solidFill>
+                  <a:schemeClr val="tx2"/>
+                </a:solidFill>
+                <a:latin typeface="Liberation Mono" panose="02070409020205020404" pitchFamily="49" charset="0"/>
+                <a:cs typeface="Liberation Mono" panose="02070409020205020404" pitchFamily="49" charset="0"/>
+              </a:rPr>
+              <a:t>,</a:t>
+            </a:r>
+          </a:p>
+          <a:p>
+            <a:r>
+              <a:rPr lang="en-US" sz="1600" dirty="0">
+                <a:solidFill>
+                  <a:schemeClr val="tx2"/>
+                </a:solidFill>
+                <a:latin typeface="Liberation Mono" panose="02070409020205020404" pitchFamily="49" charset="0"/>
+                <a:cs typeface="Liberation Mono" panose="02070409020205020404" pitchFamily="49" charset="0"/>
+              </a:rPr>
+              <a:t>  verbose=FALSE, </a:t>
+            </a:r>
+            <a:r>
+              <a:rPr lang="en-US" sz="1600" dirty="0" err="1">
+                <a:solidFill>
+                  <a:schemeClr val="tx2"/>
+                </a:solidFill>
+                <a:latin typeface="Liberation Mono" panose="02070409020205020404" pitchFamily="49" charset="0"/>
+                <a:cs typeface="Liberation Mono" panose="02070409020205020404" pitchFamily="49" charset="0"/>
+              </a:rPr>
+              <a:t>nitt</a:t>
+            </a:r>
+            <a:r>
+              <a:rPr lang="en-US" sz="1600" dirty="0">
+                <a:solidFill>
+                  <a:schemeClr val="tx2"/>
+                </a:solidFill>
+                <a:latin typeface="Liberation Mono" panose="02070409020205020404" pitchFamily="49" charset="0"/>
+                <a:cs typeface="Liberation Mono" panose="02070409020205020404" pitchFamily="49" charset="0"/>
+              </a:rPr>
+              <a:t>=1300, </a:t>
+            </a:r>
+            <a:r>
+              <a:rPr lang="en-US" sz="1600" dirty="0" err="1">
+                <a:solidFill>
+                  <a:schemeClr val="tx2"/>
+                </a:solidFill>
+                <a:latin typeface="Liberation Mono" panose="02070409020205020404" pitchFamily="49" charset="0"/>
+                <a:cs typeface="Liberation Mono" panose="02070409020205020404" pitchFamily="49" charset="0"/>
+              </a:rPr>
+              <a:t>burnin</a:t>
+            </a:r>
+            <a:r>
+              <a:rPr lang="en-US" sz="1600" dirty="0">
+                <a:solidFill>
+                  <a:schemeClr val="tx2"/>
+                </a:solidFill>
+                <a:latin typeface="Liberation Mono" panose="02070409020205020404" pitchFamily="49" charset="0"/>
+                <a:cs typeface="Liberation Mono" panose="02070409020205020404" pitchFamily="49" charset="0"/>
+              </a:rPr>
+              <a:t>=300,</a:t>
+            </a:r>
+          </a:p>
+          <a:p>
+            <a:r>
+              <a:rPr lang="en-US" sz="1600" dirty="0">
+                <a:solidFill>
+                  <a:schemeClr val="tx2"/>
+                </a:solidFill>
+                <a:latin typeface="Liberation Mono" panose="02070409020205020404" pitchFamily="49" charset="0"/>
+                <a:cs typeface="Liberation Mono" panose="02070409020205020404" pitchFamily="49" charset="0"/>
+              </a:rPr>
+              <a:t>  thin=1</a:t>
+            </a:r>
+          </a:p>
+          <a:p>
             <a:r>
               <a:rPr lang="en-US" sz="1600" dirty="0">
                 <a:solidFill>
@@ -8429,168 +8578,68 @@
           </a:p>
           <a:p>
             <a:r>
-              <a:rPr lang="en-US" sz="1600" dirty="0">
+              <a:rPr lang="en-US" sz="1600" dirty="0" err="1">
                 <a:solidFill>
                   <a:schemeClr val="tx2"/>
                 </a:solidFill>
                 <a:latin typeface="Liberation Mono" panose="02070409020205020404" pitchFamily="49" charset="0"/>
                 <a:cs typeface="Liberation Mono" panose="02070409020205020404" pitchFamily="49" charset="0"/>
               </a:rPr>
-              <a:t>m &lt;- </a:t>
-            </a:r>
-            <a:r>
-              <a:rPr lang="en-US" sz="1600" dirty="0" err="1">
+              <a:t>find_terms</a:t>
+            </a:r>
+            <a:r>
+              <a:rPr lang="en-US" sz="1600" dirty="0">
                 <a:solidFill>
                   <a:schemeClr val="tx2"/>
                 </a:solidFill>
                 <a:latin typeface="Liberation Mono" panose="02070409020205020404" pitchFamily="49" charset="0"/>
                 <a:cs typeface="Liberation Mono" panose="02070409020205020404" pitchFamily="49" charset="0"/>
               </a:rPr>
-              <a:t>MCMCglmm</a:t>
-            </a:r>
+              <a:t>(m)</a:t>
+            </a:r>
+          </a:p>
+          <a:p>
             <a:r>
               <a:rPr lang="en-US" sz="1600" dirty="0">
                 <a:solidFill>
-                  <a:schemeClr val="tx2"/>
+                  <a:schemeClr val="bg1">
+                    <a:lumMod val="50000"/>
+                  </a:schemeClr>
                 </a:solidFill>
                 <a:latin typeface="Liberation Mono" panose="02070409020205020404" pitchFamily="49" charset="0"/>
                 <a:cs typeface="Liberation Mono" panose="02070409020205020404" pitchFamily="49" charset="0"/>
               </a:rPr>
-              <a:t>(</a:t>
-            </a:r>
-          </a:p>
-          <a:p>
-            <a:r>
-              <a:rPr lang="en-US" sz="1600" dirty="0">
-                <a:solidFill>
-                  <a:schemeClr val="tx2"/>
+              <a:t>#&gt; </a:t>
+            </a:r>
+            <a:r>
+              <a:rPr lang="it-IT" sz="1600" dirty="0">
+                <a:solidFill>
+                  <a:schemeClr val="bg1">
+                    <a:lumMod val="50000"/>
+                  </a:schemeClr>
                 </a:solidFill>
                 <a:latin typeface="Liberation Mono" panose="02070409020205020404" pitchFamily="49" charset="0"/>
                 <a:cs typeface="Liberation Mono" panose="02070409020205020404" pitchFamily="49" charset="0"/>
               </a:rPr>
-              <a:t>  PO~1, random=~</a:t>
-            </a:r>
-            <a:r>
-              <a:rPr lang="en-US" sz="1600" dirty="0" err="1">
-                <a:solidFill>
-                  <a:schemeClr val="tx2"/>
+              <a:t>$</a:t>
+            </a:r>
+            <a:r>
+              <a:rPr lang="it-IT" sz="1600" dirty="0" err="1">
+                <a:solidFill>
+                  <a:schemeClr val="bg1">
+                    <a:lumMod val="50000"/>
+                  </a:schemeClr>
                 </a:solidFill>
                 <a:latin typeface="Liberation Mono" panose="02070409020205020404" pitchFamily="49" charset="0"/>
                 <a:cs typeface="Liberation Mono" panose="02070409020205020404" pitchFamily="49" charset="0"/>
               </a:rPr>
-              <a:t>FSfamily</a:t>
-            </a:r>
-            <a:r>
-              <a:rPr lang="en-US" sz="1600" dirty="0">
-                <a:solidFill>
-                  <a:schemeClr val="tx2"/>
-                </a:solidFill>
-                <a:latin typeface="Liberation Mono" panose="02070409020205020404" pitchFamily="49" charset="0"/>
-                <a:cs typeface="Liberation Mono" panose="02070409020205020404" pitchFamily="49" charset="0"/>
-              </a:rPr>
-              <a:t>, data=</a:t>
-            </a:r>
-            <a:r>
-              <a:rPr lang="en-US" sz="1600" dirty="0" err="1">
-                <a:solidFill>
-                  <a:schemeClr val="tx2"/>
-                </a:solidFill>
-                <a:latin typeface="Liberation Mono" panose="02070409020205020404" pitchFamily="49" charset="0"/>
-                <a:cs typeface="Liberation Mono" panose="02070409020205020404" pitchFamily="49" charset="0"/>
-              </a:rPr>
-              <a:t>PlodiaPO</a:t>
-            </a:r>
-            <a:r>
-              <a:rPr lang="en-US" sz="1600" dirty="0">
-                <a:solidFill>
-                  <a:schemeClr val="tx2"/>
-                </a:solidFill>
-                <a:latin typeface="Liberation Mono" panose="02070409020205020404" pitchFamily="49" charset="0"/>
-                <a:cs typeface="Liberation Mono" panose="02070409020205020404" pitchFamily="49" charset="0"/>
-              </a:rPr>
-              <a:t>,</a:t>
-            </a:r>
-          </a:p>
-          <a:p>
-            <a:r>
-              <a:rPr lang="en-US" sz="1600" dirty="0">
-                <a:solidFill>
-                  <a:schemeClr val="tx2"/>
-                </a:solidFill>
-                <a:latin typeface="Liberation Mono" panose="02070409020205020404" pitchFamily="49" charset="0"/>
-                <a:cs typeface="Liberation Mono" panose="02070409020205020404" pitchFamily="49" charset="0"/>
-              </a:rPr>
-              <a:t>  verbose=FALSE, </a:t>
-            </a:r>
-            <a:r>
-              <a:rPr lang="en-US" sz="1600" dirty="0" err="1">
-                <a:solidFill>
-                  <a:schemeClr val="tx2"/>
-                </a:solidFill>
-                <a:latin typeface="Liberation Mono" panose="02070409020205020404" pitchFamily="49" charset="0"/>
-                <a:cs typeface="Liberation Mono" panose="02070409020205020404" pitchFamily="49" charset="0"/>
-              </a:rPr>
-              <a:t>nitt</a:t>
-            </a:r>
-            <a:r>
-              <a:rPr lang="en-US" sz="1600" dirty="0">
-                <a:solidFill>
-                  <a:schemeClr val="tx2"/>
-                </a:solidFill>
-                <a:latin typeface="Liberation Mono" panose="02070409020205020404" pitchFamily="49" charset="0"/>
-                <a:cs typeface="Liberation Mono" panose="02070409020205020404" pitchFamily="49" charset="0"/>
-              </a:rPr>
-              <a:t>=1300, </a:t>
-            </a:r>
-            <a:r>
-              <a:rPr lang="en-US" sz="1600" dirty="0" err="1">
-                <a:solidFill>
-                  <a:schemeClr val="tx2"/>
-                </a:solidFill>
-                <a:latin typeface="Liberation Mono" panose="02070409020205020404" pitchFamily="49" charset="0"/>
-                <a:cs typeface="Liberation Mono" panose="02070409020205020404" pitchFamily="49" charset="0"/>
-              </a:rPr>
-              <a:t>burnin</a:t>
-            </a:r>
-            <a:r>
-              <a:rPr lang="en-US" sz="1600" dirty="0">
-                <a:solidFill>
-                  <a:schemeClr val="tx2"/>
-                </a:solidFill>
-                <a:latin typeface="Liberation Mono" panose="02070409020205020404" pitchFamily="49" charset="0"/>
-                <a:cs typeface="Liberation Mono" panose="02070409020205020404" pitchFamily="49" charset="0"/>
-              </a:rPr>
-              <a:t>=300,</a:t>
-            </a:r>
-          </a:p>
-          <a:p>
-            <a:r>
-              <a:rPr lang="en-US" sz="1600" dirty="0">
-                <a:solidFill>
-                  <a:schemeClr val="tx2"/>
-                </a:solidFill>
-                <a:latin typeface="Liberation Mono" panose="02070409020205020404" pitchFamily="49" charset="0"/>
-                <a:cs typeface="Liberation Mono" panose="02070409020205020404" pitchFamily="49" charset="0"/>
-              </a:rPr>
-              <a:t>  thin=1</a:t>
-            </a:r>
-          </a:p>
-          <a:p>
-            <a:r>
-              <a:rPr lang="en-US" sz="1600" dirty="0">
-                <a:solidFill>
-                  <a:schemeClr val="tx2"/>
-                </a:solidFill>
-                <a:latin typeface="Liberation Mono" panose="02070409020205020404" pitchFamily="49" charset="0"/>
-                <a:cs typeface="Liberation Mono" panose="02070409020205020404" pitchFamily="49" charset="0"/>
-              </a:rPr>
-              <a:t>)</a:t>
-            </a:r>
-          </a:p>
-          <a:p>
-            <a:endParaRPr lang="en-US" sz="1600" dirty="0">
+              <a:t>response</a:t>
+            </a:r>
+            <a:endParaRPr lang="it-IT" sz="1600" dirty="0">
               <a:solidFill>
-                <a:schemeClr val="tx2"/>
+                <a:schemeClr val="bg1">
+                  <a:lumMod val="50000"/>
+                </a:schemeClr>
               </a:solidFill>
               <a:latin typeface="Liberation Mono" panose="02070409020205020404" pitchFamily="49" charset="0"/>
               <a:cs typeface="Liberation Mono" panose="02070409020205020404" pitchFamily="49" charset="0"/>
@@ -8598,29 +8647,46 @@
           </a:p>
           <a:p>
             <a:r>
-              <a:rPr lang="en-US" sz="1600" dirty="0" err="1">
-                <a:solidFill>
-                  <a:schemeClr val="tx2"/>
+              <a:rPr lang="it-IT" sz="1600" dirty="0">
+                <a:solidFill>
+                  <a:schemeClr val="bg1">
+                    <a:lumMod val="50000"/>
+                  </a:schemeClr>
                 </a:solidFill>
                 <a:latin typeface="Liberation Mono" panose="02070409020205020404" pitchFamily="49" charset="0"/>
                 <a:cs typeface="Liberation Mono" panose="02070409020205020404" pitchFamily="49" charset="0"/>
               </a:rPr>
-              <a:t>find_terms</a:t>
-            </a:r>
-            <a:r>
-              <a:rPr lang="en-US" sz="1600" dirty="0">
-                <a:solidFill>
-                  <a:schemeClr val="tx2"/>
+              <a:t>[1] "PO"</a:t>
+            </a:r>
+          </a:p>
+          <a:p>
+            <a:endParaRPr lang="it-IT" sz="1600" dirty="0">
+              <a:solidFill>
+                <a:schemeClr val="bg1">
+                  <a:lumMod val="50000"/>
+                </a:schemeClr>
+              </a:solidFill>
+              <a:latin typeface="Liberation Mono" panose="02070409020205020404" pitchFamily="49" charset="0"/>
+              <a:cs typeface="Liberation Mono" panose="02070409020205020404" pitchFamily="49" charset="0"/>
+            </a:endParaRPr>
+          </a:p>
+          <a:p>
+            <a:r>
+              <a:rPr lang="it-IT" sz="1600" dirty="0">
+                <a:solidFill>
+                  <a:schemeClr val="bg1">
+                    <a:lumMod val="50000"/>
+                  </a:schemeClr>
                 </a:solidFill>
                 <a:latin typeface="Liberation Mono" panose="02070409020205020404" pitchFamily="49" charset="0"/>
                 <a:cs typeface="Liberation Mono" panose="02070409020205020404" pitchFamily="49" charset="0"/>
               </a:rPr>
-              <a:t>(m)</a:t>
-            </a:r>
-          </a:p>
-          <a:p>
-            <a:r>
-              <a:rPr lang="en-US" sz="1600" dirty="0">
+              <a:t>$random</a:t>
+            </a:r>
+          </a:p>
+          <a:p>
+            <a:r>
+              <a:rPr lang="it-IT" sz="1600" dirty="0">
                 <a:solidFill>
                   <a:schemeClr val="bg1">
                     <a:lumMod val="50000"/>
@@ -8629,10 +8695,10 @@
                 <a:latin typeface="Liberation Mono" panose="02070409020205020404" pitchFamily="49" charset="0"/>
                 <a:cs typeface="Liberation Mono" panose="02070409020205020404" pitchFamily="49" charset="0"/>
               </a:rPr>
-              <a:t>#&gt; [1] "PO"       "</a:t>
-            </a:r>
-            <a:r>
-              <a:rPr lang="en-US" sz="1600" dirty="0" err="1">
+              <a:t>[1] "</a:t>
+            </a:r>
+            <a:r>
+              <a:rPr lang="it-IT" sz="1600" dirty="0" err="1">
                 <a:solidFill>
                   <a:schemeClr val="bg1">
                     <a:lumMod val="50000"/>
@@ -8644,7 +8710,7 @@
               <a:t>FSfamily</a:t>
             </a:r>
             <a:r>
-              <a:rPr lang="en-US" sz="1600" dirty="0">
+              <a:rPr lang="it-IT" sz="1600" dirty="0">
                 <a:solidFill>
                   <a:schemeClr val="bg1">
                     <a:lumMod val="50000"/>
@@ -8655,6 +8721,15 @@
               </a:rPr>
               <a:t>"</a:t>
             </a:r>
+            <a:endParaRPr lang="en-US" sz="1600" dirty="0">
+              <a:solidFill>
+                <a:schemeClr val="bg1">
+                  <a:lumMod val="50000"/>
+                </a:schemeClr>
+              </a:solidFill>
+              <a:latin typeface="Liberation Mono" panose="02070409020205020404" pitchFamily="49" charset="0"/>
+              <a:cs typeface="Liberation Mono" panose="02070409020205020404" pitchFamily="49" charset="0"/>
+            </a:endParaRPr>
           </a:p>
         </p:txBody>
       </p:sp>
@@ -8751,10 +8826,10 @@
       </p:grpSpPr>
       <p:sp>
         <p:nvSpPr>
-          <p:cNvPr id="2" name="Inhaltsplatzhalter 1">
+          <p:cNvPr id="4" name="Fußzeilenplatzhalter 3">
             <a:extLst>
               <a:ext uri="{FF2B5EF4-FFF2-40B4-BE49-F238E27FC236}">
-                <a16:creationId xmlns:a16="http://schemas.microsoft.com/office/drawing/2014/main" id="{FA35B9DB-F60D-4066-B8D9-2AEEC4F64DCC}"/>
+                <a16:creationId xmlns:a16="http://schemas.microsoft.com/office/drawing/2014/main" id="{0FC0C19D-1682-4679-8E1E-D2E399E12164}"/>
               </a:ext>
             </a:extLst>
           </p:cNvPr>
@@ -8762,61 +8837,478 @@
             <a:spLocks noGrp="1"/>
           </p:cNvSpPr>
           <p:nvPr>
-            <p:ph idx="1"/>
+            <p:ph type="ftr" sz="quarter" idx="11"/>
           </p:nvPr>
+        </p:nvSpPr>
+        <p:spPr/>
+        <p:txBody>
+          <a:bodyPr/>
+          <a:lstStyle/>
+          <a:p>
+            <a:pPr>
+              <a:spcBef>
+                <a:spcPct val="0"/>
+              </a:spcBef>
+            </a:pPr>
+            <a:r>
+              <a:rPr lang="en-US"/>
+              <a:t>Project "easystats"</a:t>
+            </a:r>
+            <a:endParaRPr lang="en-US" dirty="0"/>
+          </a:p>
+        </p:txBody>
+      </p:sp>
+      <p:sp>
+        <p:nvSpPr>
+          <p:cNvPr id="6" name="Titel 5">
+            <a:extLst>
+              <a:ext uri="{FF2B5EF4-FFF2-40B4-BE49-F238E27FC236}">
+                <a16:creationId xmlns:a16="http://schemas.microsoft.com/office/drawing/2014/main" id="{F945D4CE-7FAD-45BF-A641-06AE09C0EF93}"/>
+              </a:ext>
+            </a:extLst>
+          </p:cNvPr>
+          <p:cNvSpPr>
+            <a:spLocks noGrp="1"/>
+          </p:cNvSpPr>
+          <p:nvPr>
+            <p:ph type="title"/>
+          </p:nvPr>
+        </p:nvSpPr>
+        <p:spPr/>
+        <p:txBody>
+          <a:bodyPr/>
+          <a:lstStyle/>
+          <a:p>
+            <a:r>
+              <a:rPr lang="de-DE" dirty="0" err="1"/>
+              <a:t>I‘m</a:t>
+            </a:r>
+            <a:r>
+              <a:rPr lang="de-DE" dirty="0"/>
+              <a:t> </a:t>
+            </a:r>
+            <a:r>
+              <a:rPr lang="de-DE" dirty="0" err="1"/>
+              <a:t>afraid</a:t>
+            </a:r>
+            <a:r>
+              <a:rPr lang="de-DE" dirty="0"/>
+              <a:t> </a:t>
+            </a:r>
+            <a:r>
+              <a:rPr lang="de-DE" dirty="0" err="1"/>
+              <a:t>of</a:t>
+            </a:r>
+            <a:r>
+              <a:rPr lang="de-DE" dirty="0"/>
+              <a:t> </a:t>
+            </a:r>
+            <a:r>
+              <a:rPr lang="de-DE" dirty="0" err="1"/>
+              <a:t>no</a:t>
+            </a:r>
+            <a:r>
+              <a:rPr lang="de-DE" dirty="0"/>
+              <a:t> </a:t>
+            </a:r>
+            <a:r>
+              <a:rPr lang="de-DE" dirty="0" err="1"/>
+              <a:t>model</a:t>
+            </a:r>
+            <a:endParaRPr lang="de-DE" dirty="0"/>
+          </a:p>
+        </p:txBody>
+      </p:sp>
+      <p:sp>
+        <p:nvSpPr>
+          <p:cNvPr id="9" name="Textfeld 8">
+            <a:extLst>
+              <a:ext uri="{FF2B5EF4-FFF2-40B4-BE49-F238E27FC236}">
+                <a16:creationId xmlns:a16="http://schemas.microsoft.com/office/drawing/2014/main" id="{5BB6C03E-B970-4FA5-83BD-DA2E462C35A1}"/>
+              </a:ext>
+            </a:extLst>
+          </p:cNvPr>
+          <p:cNvSpPr txBox="1"/>
+          <p:nvPr/>
         </p:nvSpPr>
         <p:spPr>
           <a:xfrm>
-            <a:off x="107504" y="4518408"/>
-            <a:ext cx="4320480" cy="2438984"/>
+            <a:off x="0" y="2421603"/>
+            <a:ext cx="5580112" cy="3418986"/>
           </a:xfrm>
+          <a:prstGeom prst="rect">
+            <a:avLst/>
+          </a:prstGeom>
+          <a:solidFill>
+            <a:schemeClr val="bg1">
+              <a:lumMod val="95000"/>
+            </a:schemeClr>
+          </a:solidFill>
         </p:spPr>
         <p:txBody>
-          <a:bodyPr>
-            <a:normAutofit/>
+          <a:bodyPr wrap="square" lIns="180000" tIns="108000" rIns="180000" bIns="108000" rtlCol="0">
+            <a:spAutoFit/>
           </a:bodyPr>
           <a:lstStyle/>
           <a:p>
             <a:r>
-              <a:rPr lang="de-DE" sz="2600" dirty="0">
-                <a:latin typeface="Source Sans Pro Light" panose="020B0403030403020204" pitchFamily="34" charset="0"/>
-              </a:rPr>
-              <a:t>Dominique &amp; Daniel</a:t>
-            </a:r>
-          </a:p>
-          <a:p>
-            <a:endParaRPr lang="de-DE" sz="2600" dirty="0">
-              <a:latin typeface="Source Sans Pro Light" panose="020B0403030403020204" pitchFamily="34" charset="0"/>
+              <a:rPr lang="en-US" sz="1600" dirty="0">
+                <a:solidFill>
+                  <a:schemeClr val="tx2"/>
+                </a:solidFill>
+                <a:latin typeface="Liberation Mono" panose="02070409020205020404" pitchFamily="49" charset="0"/>
+                <a:cs typeface="Liberation Mono" panose="02070409020205020404" pitchFamily="49" charset="0"/>
+              </a:rPr>
+              <a:t>library(</a:t>
+            </a:r>
+            <a:r>
+              <a:rPr lang="en-US" sz="1600" dirty="0" err="1">
+                <a:solidFill>
+                  <a:schemeClr val="tx2"/>
+                </a:solidFill>
+                <a:latin typeface="Liberation Mono" panose="02070409020205020404" pitchFamily="49" charset="0"/>
+                <a:cs typeface="Liberation Mono" panose="02070409020205020404" pitchFamily="49" charset="0"/>
+              </a:rPr>
+              <a:t>GLMMadaptive</a:t>
+            </a:r>
+            <a:r>
+              <a:rPr lang="en-US" sz="1600" dirty="0">
+                <a:solidFill>
+                  <a:schemeClr val="tx2"/>
+                </a:solidFill>
+                <a:latin typeface="Liberation Mono" panose="02070409020205020404" pitchFamily="49" charset="0"/>
+                <a:cs typeface="Liberation Mono" panose="02070409020205020404" pitchFamily="49" charset="0"/>
+              </a:rPr>
+              <a:t>)</a:t>
+            </a:r>
+          </a:p>
+          <a:p>
+            <a:endParaRPr lang="en-US" sz="1600" dirty="0">
+              <a:solidFill>
+                <a:schemeClr val="tx2"/>
+              </a:solidFill>
+              <a:latin typeface="Liberation Mono" panose="02070409020205020404" pitchFamily="49" charset="0"/>
+              <a:cs typeface="Liberation Mono" panose="02070409020205020404" pitchFamily="49" charset="0"/>
             </a:endParaRPr>
           </a:p>
           <a:p>
-            <a:endParaRPr lang="de-DE" sz="2600" dirty="0">
-              <a:latin typeface="Source Sans Pro Light" panose="020B0403030403020204" pitchFamily="34" charset="0"/>
+            <a:r>
+              <a:rPr lang="en-US" sz="1600" dirty="0">
+                <a:solidFill>
+                  <a:schemeClr val="tx2"/>
+                </a:solidFill>
+                <a:latin typeface="Liberation Mono" panose="02070409020205020404" pitchFamily="49" charset="0"/>
+                <a:cs typeface="Liberation Mono" panose="02070409020205020404" pitchFamily="49" charset="0"/>
+              </a:rPr>
+              <a:t>m &lt;- </a:t>
+            </a:r>
+            <a:r>
+              <a:rPr lang="en-US" sz="1600" dirty="0" err="1">
+                <a:solidFill>
+                  <a:schemeClr val="tx2"/>
+                </a:solidFill>
+                <a:latin typeface="Liberation Mono" panose="02070409020205020404" pitchFamily="49" charset="0"/>
+                <a:cs typeface="Liberation Mono" panose="02070409020205020404" pitchFamily="49" charset="0"/>
+              </a:rPr>
+              <a:t>mixed_model</a:t>
+            </a:r>
+            <a:r>
+              <a:rPr lang="en-US" sz="1600" dirty="0">
+                <a:solidFill>
+                  <a:schemeClr val="tx2"/>
+                </a:solidFill>
+                <a:latin typeface="Liberation Mono" panose="02070409020205020404" pitchFamily="49" charset="0"/>
+                <a:cs typeface="Liberation Mono" panose="02070409020205020404" pitchFamily="49" charset="0"/>
+              </a:rPr>
+              <a:t>(</a:t>
+            </a:r>
+          </a:p>
+          <a:p>
+            <a:r>
+              <a:rPr lang="en-US" sz="1600" dirty="0">
+                <a:solidFill>
+                  <a:schemeClr val="tx2"/>
+                </a:solidFill>
+                <a:latin typeface="Liberation Mono" panose="02070409020205020404" pitchFamily="49" charset="0"/>
+                <a:cs typeface="Liberation Mono" panose="02070409020205020404" pitchFamily="49" charset="0"/>
+              </a:rPr>
+              <a:t>  count ~ child + camper,</a:t>
+            </a:r>
+          </a:p>
+          <a:p>
+            <a:r>
+              <a:rPr lang="en-US" sz="1600" dirty="0">
+                <a:solidFill>
+                  <a:schemeClr val="tx2"/>
+                </a:solidFill>
+                <a:latin typeface="Liberation Mono" panose="02070409020205020404" pitchFamily="49" charset="0"/>
+                <a:cs typeface="Liberation Mono" panose="02070409020205020404" pitchFamily="49" charset="0"/>
+              </a:rPr>
+              <a:t>  random = ~ 1 | persons,</a:t>
+            </a:r>
+          </a:p>
+          <a:p>
+            <a:r>
+              <a:rPr lang="en-US" sz="1600" dirty="0">
+                <a:solidFill>
+                  <a:schemeClr val="tx2"/>
+                </a:solidFill>
+                <a:latin typeface="Liberation Mono" panose="02070409020205020404" pitchFamily="49" charset="0"/>
+                <a:cs typeface="Liberation Mono" panose="02070409020205020404" pitchFamily="49" charset="0"/>
+              </a:rPr>
+              <a:t>  </a:t>
+            </a:r>
+            <a:r>
+              <a:rPr lang="en-US" sz="1600" dirty="0" err="1">
+                <a:solidFill>
+                  <a:schemeClr val="tx2"/>
+                </a:solidFill>
+                <a:latin typeface="Liberation Mono" panose="02070409020205020404" pitchFamily="49" charset="0"/>
+                <a:cs typeface="Liberation Mono" panose="02070409020205020404" pitchFamily="49" charset="0"/>
+              </a:rPr>
+              <a:t>zi_fixed</a:t>
+            </a:r>
+            <a:r>
+              <a:rPr lang="en-US" sz="1600" dirty="0">
+                <a:solidFill>
+                  <a:schemeClr val="tx2"/>
+                </a:solidFill>
+                <a:latin typeface="Liberation Mono" panose="02070409020205020404" pitchFamily="49" charset="0"/>
+                <a:cs typeface="Liberation Mono" panose="02070409020205020404" pitchFamily="49" charset="0"/>
+              </a:rPr>
+              <a:t> = ~ child + </a:t>
+            </a:r>
+            <a:r>
+              <a:rPr lang="en-US" sz="1600" dirty="0" err="1">
+                <a:solidFill>
+                  <a:schemeClr val="tx2"/>
+                </a:solidFill>
+                <a:latin typeface="Liberation Mono" panose="02070409020205020404" pitchFamily="49" charset="0"/>
+                <a:cs typeface="Liberation Mono" panose="02070409020205020404" pitchFamily="49" charset="0"/>
+              </a:rPr>
+              <a:t>livebait</a:t>
+            </a:r>
+            <a:r>
+              <a:rPr lang="en-US" sz="1600" dirty="0">
+                <a:solidFill>
+                  <a:schemeClr val="tx2"/>
+                </a:solidFill>
+                <a:latin typeface="Liberation Mono" panose="02070409020205020404" pitchFamily="49" charset="0"/>
+                <a:cs typeface="Liberation Mono" panose="02070409020205020404" pitchFamily="49" charset="0"/>
+              </a:rPr>
+              <a:t>,</a:t>
+            </a:r>
+          </a:p>
+          <a:p>
+            <a:r>
+              <a:rPr lang="en-US" sz="1600" dirty="0">
+                <a:solidFill>
+                  <a:schemeClr val="tx2"/>
+                </a:solidFill>
+                <a:latin typeface="Liberation Mono" panose="02070409020205020404" pitchFamily="49" charset="0"/>
+                <a:cs typeface="Liberation Mono" panose="02070409020205020404" pitchFamily="49" charset="0"/>
+              </a:rPr>
+              <a:t>  </a:t>
+            </a:r>
+            <a:r>
+              <a:rPr lang="en-US" sz="1600" dirty="0" err="1">
+                <a:solidFill>
+                  <a:schemeClr val="tx2"/>
+                </a:solidFill>
+                <a:latin typeface="Liberation Mono" panose="02070409020205020404" pitchFamily="49" charset="0"/>
+                <a:cs typeface="Liberation Mono" panose="02070409020205020404" pitchFamily="49" charset="0"/>
+              </a:rPr>
+              <a:t>zi_random</a:t>
+            </a:r>
+            <a:r>
+              <a:rPr lang="en-US" sz="1600" dirty="0">
+                <a:solidFill>
+                  <a:schemeClr val="tx2"/>
+                </a:solidFill>
+                <a:latin typeface="Liberation Mono" panose="02070409020205020404" pitchFamily="49" charset="0"/>
+                <a:cs typeface="Liberation Mono" panose="02070409020205020404" pitchFamily="49" charset="0"/>
+              </a:rPr>
+              <a:t> = ~ 1 | persons,</a:t>
+            </a:r>
+          </a:p>
+          <a:p>
+            <a:r>
+              <a:rPr lang="en-US" sz="1600" dirty="0">
+                <a:solidFill>
+                  <a:schemeClr val="tx2"/>
+                </a:solidFill>
+                <a:latin typeface="Liberation Mono" panose="02070409020205020404" pitchFamily="49" charset="0"/>
+                <a:cs typeface="Liberation Mono" panose="02070409020205020404" pitchFamily="49" charset="0"/>
+              </a:rPr>
+              <a:t>  data = fish,</a:t>
+            </a:r>
+          </a:p>
+          <a:p>
+            <a:r>
+              <a:rPr lang="en-US" sz="1600" dirty="0">
+                <a:solidFill>
+                  <a:schemeClr val="tx2"/>
+                </a:solidFill>
+                <a:latin typeface="Liberation Mono" panose="02070409020205020404" pitchFamily="49" charset="0"/>
+                <a:cs typeface="Liberation Mono" panose="02070409020205020404" pitchFamily="49" charset="0"/>
+              </a:rPr>
+              <a:t>  family = </a:t>
+            </a:r>
+            <a:r>
+              <a:rPr lang="en-US" sz="1600" dirty="0" err="1">
+                <a:solidFill>
+                  <a:schemeClr val="tx2"/>
+                </a:solidFill>
+                <a:latin typeface="Liberation Mono" panose="02070409020205020404" pitchFamily="49" charset="0"/>
+                <a:cs typeface="Liberation Mono" panose="02070409020205020404" pitchFamily="49" charset="0"/>
+              </a:rPr>
+              <a:t>zi.poisson</a:t>
+            </a:r>
+            <a:r>
+              <a:rPr lang="en-US" sz="1600" dirty="0">
+                <a:solidFill>
+                  <a:schemeClr val="tx2"/>
+                </a:solidFill>
+                <a:latin typeface="Liberation Mono" panose="02070409020205020404" pitchFamily="49" charset="0"/>
+                <a:cs typeface="Liberation Mono" panose="02070409020205020404" pitchFamily="49" charset="0"/>
+              </a:rPr>
+              <a:t>()</a:t>
+            </a:r>
+          </a:p>
+          <a:p>
+            <a:r>
+              <a:rPr lang="en-US" sz="1600" dirty="0">
+                <a:solidFill>
+                  <a:schemeClr val="tx2"/>
+                </a:solidFill>
+                <a:latin typeface="Liberation Mono" panose="02070409020205020404" pitchFamily="49" charset="0"/>
+                <a:cs typeface="Liberation Mono" panose="02070409020205020404" pitchFamily="49" charset="0"/>
+              </a:rPr>
+              <a:t>)</a:t>
+            </a:r>
+          </a:p>
+          <a:p>
+            <a:endParaRPr lang="en-US" sz="1600" dirty="0">
+              <a:solidFill>
+                <a:schemeClr val="tx2"/>
+              </a:solidFill>
+              <a:latin typeface="Liberation Mono" panose="02070409020205020404" pitchFamily="49" charset="0"/>
+              <a:cs typeface="Liberation Mono" panose="02070409020205020404" pitchFamily="49" charset="0"/>
             </a:endParaRPr>
           </a:p>
           <a:p>
-            <a:endParaRPr lang="de-DE" sz="2600" dirty="0">
-              <a:latin typeface="Source Sans Pro Light" panose="020B0403030403020204" pitchFamily="34" charset="0"/>
-            </a:endParaRPr>
-          </a:p>
-          <a:p>
-            <a:endParaRPr lang="de-DE" sz="2600" dirty="0">
-              <a:latin typeface="Source Sans Pro Light" panose="020B0403030403020204" pitchFamily="34" charset="0"/>
-            </a:endParaRPr>
-          </a:p>
-          <a:p>
-            <a:endParaRPr lang="de-DE" sz="2600" dirty="0">
-              <a:latin typeface="Source Sans Pro Light" panose="020B0403030403020204" pitchFamily="34" charset="0"/>
-            </a:endParaRPr>
+            <a:r>
+              <a:rPr lang="en-US" sz="1600" dirty="0" err="1">
+                <a:solidFill>
+                  <a:schemeClr val="tx2"/>
+                </a:solidFill>
+                <a:latin typeface="Liberation Mono" panose="02070409020205020404" pitchFamily="49" charset="0"/>
+                <a:cs typeface="Liberation Mono" panose="02070409020205020404" pitchFamily="49" charset="0"/>
+              </a:rPr>
+              <a:t>find_predictors</a:t>
+            </a:r>
+            <a:r>
+              <a:rPr lang="en-US" sz="1600" dirty="0">
+                <a:solidFill>
+                  <a:schemeClr val="tx2"/>
+                </a:solidFill>
+                <a:latin typeface="Liberation Mono" panose="02070409020205020404" pitchFamily="49" charset="0"/>
+                <a:cs typeface="Liberation Mono" panose="02070409020205020404" pitchFamily="49" charset="0"/>
+              </a:rPr>
+              <a:t>(m, component = "</a:t>
+            </a:r>
+            <a:r>
+              <a:rPr lang="en-US" sz="1600" dirty="0" err="1">
+                <a:solidFill>
+                  <a:schemeClr val="tx2"/>
+                </a:solidFill>
+                <a:latin typeface="Liberation Mono" panose="02070409020205020404" pitchFamily="49" charset="0"/>
+                <a:cs typeface="Liberation Mono" panose="02070409020205020404" pitchFamily="49" charset="0"/>
+              </a:rPr>
+              <a:t>zi</a:t>
+            </a:r>
+            <a:r>
+              <a:rPr lang="en-US" sz="1600" dirty="0">
+                <a:solidFill>
+                  <a:schemeClr val="tx2"/>
+                </a:solidFill>
+                <a:latin typeface="Liberation Mono" panose="02070409020205020404" pitchFamily="49" charset="0"/>
+                <a:cs typeface="Liberation Mono" panose="02070409020205020404" pitchFamily="49" charset="0"/>
+              </a:rPr>
+              <a:t>")</a:t>
+            </a:r>
+          </a:p>
+          <a:p>
+            <a:r>
+              <a:rPr lang="en-US" sz="1600" dirty="0">
+                <a:solidFill>
+                  <a:schemeClr val="bg1">
+                    <a:lumMod val="50000"/>
+                  </a:schemeClr>
+                </a:solidFill>
+                <a:latin typeface="Liberation Mono" panose="02070409020205020404" pitchFamily="49" charset="0"/>
+                <a:cs typeface="Liberation Mono" panose="02070409020205020404" pitchFamily="49" charset="0"/>
+              </a:rPr>
+              <a:t>#&gt; [1] "child"    "</a:t>
+            </a:r>
+            <a:r>
+              <a:rPr lang="en-US" sz="1600" dirty="0" err="1">
+                <a:solidFill>
+                  <a:schemeClr val="bg1">
+                    <a:lumMod val="50000"/>
+                  </a:schemeClr>
+                </a:solidFill>
+                <a:latin typeface="Liberation Mono" panose="02070409020205020404" pitchFamily="49" charset="0"/>
+                <a:cs typeface="Liberation Mono" panose="02070409020205020404" pitchFamily="49" charset="0"/>
+              </a:rPr>
+              <a:t>livebait</a:t>
+            </a:r>
+            <a:r>
+              <a:rPr lang="en-US" sz="1600" dirty="0">
+                <a:solidFill>
+                  <a:schemeClr val="bg1">
+                    <a:lumMod val="50000"/>
+                  </a:schemeClr>
+                </a:solidFill>
+                <a:latin typeface="Liberation Mono" panose="02070409020205020404" pitchFamily="49" charset="0"/>
+                <a:cs typeface="Liberation Mono" panose="02070409020205020404" pitchFamily="49" charset="0"/>
+              </a:rPr>
+              <a:t>"</a:t>
+            </a:r>
+          </a:p>
+        </p:txBody>
+      </p:sp>
+      <p:sp>
+        <p:nvSpPr>
+          <p:cNvPr id="7" name="Inhaltsplatzhalter 6">
+            <a:extLst>
+              <a:ext uri="{FF2B5EF4-FFF2-40B4-BE49-F238E27FC236}">
+                <a16:creationId xmlns:a16="http://schemas.microsoft.com/office/drawing/2014/main" id="{02E73D04-5C87-4990-9FD5-28E200352959}"/>
+              </a:ext>
+            </a:extLst>
+          </p:cNvPr>
+          <p:cNvSpPr>
+            <a:spLocks noGrp="1"/>
+          </p:cNvSpPr>
+          <p:nvPr>
+            <p:ph sz="quarter" idx="13"/>
+          </p:nvPr>
+        </p:nvSpPr>
+        <p:spPr/>
+        <p:txBody>
+          <a:bodyPr/>
+          <a:lstStyle/>
+          <a:p>
+            <a:endParaRPr lang="de-DE"/>
           </a:p>
         </p:txBody>
       </p:sp>
       <p:pic>
         <p:nvPicPr>
-          <p:cNvPr id="6" name="Grafik 5">
+          <p:cNvPr id="10" name="Inhaltsplatzhalter 2">
             <a:extLst>
               <a:ext uri="{FF2B5EF4-FFF2-40B4-BE49-F238E27FC236}">
-                <a16:creationId xmlns:a16="http://schemas.microsoft.com/office/drawing/2014/main" id="{66E4B86A-06DF-42B6-8ACA-4C8C1D113A65}"/>
+                <a16:creationId xmlns:a16="http://schemas.microsoft.com/office/drawing/2014/main" id="{3D50B8CB-49CB-480F-8369-501E071177D8}"/>
               </a:ext>
             </a:extLst>
           </p:cNvPr>
@@ -8826,7 +9318,7 @@
           <p:nvPr/>
         </p:nvPicPr>
         <p:blipFill>
-          <a:blip r:embed="rId2" cstate="print">
+          <a:blip r:embed="rId2">
             <a:extLst>
               <a:ext uri="{28A0092B-C50C-407E-A947-70E740481C1C}">
                 <a14:useLocalDpi xmlns:a14="http://schemas.microsoft.com/office/drawing/2010/main" val="0"/>
@@ -8839,235 +9331,8 @@
         </p:blipFill>
         <p:spPr>
           <a:xfrm>
-            <a:off x="194040" y="5067664"/>
-            <a:ext cx="1620000" cy="1620000"/>
-          </a:xfrm>
-          <a:prstGeom prst="rect">
-            <a:avLst/>
-          </a:prstGeom>
-        </p:spPr>
-      </p:pic>
-      <p:pic>
-        <p:nvPicPr>
-          <p:cNvPr id="8" name="Grafik 7">
-            <a:extLst>
-              <a:ext uri="{FF2B5EF4-FFF2-40B4-BE49-F238E27FC236}">
-                <a16:creationId xmlns:a16="http://schemas.microsoft.com/office/drawing/2014/main" id="{E1EEF370-18C6-4E24-9585-5202B4DC6481}"/>
-              </a:ext>
-            </a:extLst>
-          </p:cNvPr>
-          <p:cNvPicPr>
-            <a:picLocks noChangeAspect="1"/>
-          </p:cNvPicPr>
-          <p:nvPr/>
-        </p:nvPicPr>
-        <p:blipFill>
-          <a:blip r:embed="rId3" cstate="print">
-            <a:extLst>
-              <a:ext uri="{28A0092B-C50C-407E-A947-70E740481C1C}">
-                <a14:useLocalDpi xmlns:a14="http://schemas.microsoft.com/office/drawing/2010/main" val="0"/>
-              </a:ext>
-            </a:extLst>
-          </a:blip>
-          <a:stretch>
-            <a:fillRect/>
-          </a:stretch>
-        </p:blipFill>
-        <p:spPr>
-          <a:xfrm>
-            <a:off x="1814040" y="5067664"/>
-            <a:ext cx="1620000" cy="1620000"/>
-          </a:xfrm>
-          <a:prstGeom prst="rect">
-            <a:avLst/>
-          </a:prstGeom>
-        </p:spPr>
-      </p:pic>
-      <p:sp>
-        <p:nvSpPr>
-          <p:cNvPr id="9" name="Rechteck 8">
-            <a:extLst>
-              <a:ext uri="{FF2B5EF4-FFF2-40B4-BE49-F238E27FC236}">
-                <a16:creationId xmlns:a16="http://schemas.microsoft.com/office/drawing/2014/main" id="{3870196D-44D4-4AA2-83CC-F16BFBF045C8}"/>
-              </a:ext>
-            </a:extLst>
-          </p:cNvPr>
-          <p:cNvSpPr/>
-          <p:nvPr/>
-        </p:nvSpPr>
-        <p:spPr>
-          <a:xfrm rot="1362160">
-            <a:off x="658941" y="3422041"/>
-            <a:ext cx="7826117" cy="1569660"/>
-          </a:xfrm>
-          <a:prstGeom prst="rect">
-            <a:avLst/>
-          </a:prstGeom>
-          <a:noFill/>
-        </p:spPr>
-        <p:txBody>
-          <a:bodyPr wrap="none" lIns="91440" tIns="45720" rIns="91440" bIns="45720">
-            <a:spAutoFit/>
-          </a:bodyPr>
-          <a:lstStyle/>
-          <a:p>
-            <a:pPr algn="ctr"/>
-            <a:r>
-              <a:rPr lang="de-DE" sz="4800" b="1" dirty="0">
-                <a:ln w="6600">
-                  <a:solidFill>
-                    <a:schemeClr val="accent2"/>
-                  </a:solidFill>
-                  <a:prstDash val="solid"/>
-                </a:ln>
-                <a:solidFill>
-                  <a:srgbClr val="FFFFFF"/>
-                </a:solidFill>
-                <a:effectLst>
-                  <a:outerShdw dist="38100" dir="2700000" algn="tl" rotWithShape="0">
-                    <a:schemeClr val="accent2"/>
-                  </a:outerShdw>
-                </a:effectLst>
-                <a:latin typeface="Source Sans Pro Light" panose="020B0403030403020204" pitchFamily="34" charset="0"/>
-              </a:rPr>
-              <a:t>Want </a:t>
-            </a:r>
-            <a:r>
-              <a:rPr lang="de-DE" sz="4800" b="1" dirty="0" err="1">
-                <a:ln w="6600">
-                  <a:solidFill>
-                    <a:schemeClr val="accent2"/>
-                  </a:solidFill>
-                  <a:prstDash val="solid"/>
-                </a:ln>
-                <a:solidFill>
-                  <a:srgbClr val="FFFFFF"/>
-                </a:solidFill>
-                <a:effectLst>
-                  <a:outerShdw dist="38100" dir="2700000" algn="tl" rotWithShape="0">
-                    <a:schemeClr val="accent2"/>
-                  </a:outerShdw>
-                </a:effectLst>
-                <a:latin typeface="Source Sans Pro Light" panose="020B0403030403020204" pitchFamily="34" charset="0"/>
-              </a:rPr>
-              <a:t>to</a:t>
-            </a:r>
-            <a:r>
-              <a:rPr lang="de-DE" sz="4800" b="1" dirty="0">
-                <a:ln w="6600">
-                  <a:solidFill>
-                    <a:schemeClr val="accent2"/>
-                  </a:solidFill>
-                  <a:prstDash val="solid"/>
-                </a:ln>
-                <a:solidFill>
-                  <a:srgbClr val="FFFFFF"/>
-                </a:solidFill>
-                <a:effectLst>
-                  <a:outerShdw dist="38100" dir="2700000" algn="tl" rotWithShape="0">
-                    <a:schemeClr val="accent2"/>
-                  </a:outerShdw>
-                </a:effectLst>
-                <a:latin typeface="Source Sans Pro Light" panose="020B0403030403020204" pitchFamily="34" charset="0"/>
-              </a:rPr>
-              <a:t> support </a:t>
-            </a:r>
-            <a:r>
-              <a:rPr lang="de-DE" sz="4800" b="1" dirty="0" err="1">
-                <a:ln w="6600">
-                  <a:solidFill>
-                    <a:schemeClr val="accent2"/>
-                  </a:solidFill>
-                  <a:prstDash val="solid"/>
-                </a:ln>
-                <a:solidFill>
-                  <a:srgbClr val="FFFFFF"/>
-                </a:solidFill>
-                <a:effectLst>
-                  <a:outerShdw dist="38100" dir="2700000" algn="tl" rotWithShape="0">
-                    <a:schemeClr val="accent2"/>
-                  </a:outerShdw>
-                </a:effectLst>
-                <a:latin typeface="Source Sans Pro Light" panose="020B0403030403020204" pitchFamily="34" charset="0"/>
-              </a:rPr>
-              <a:t>us</a:t>
-            </a:r>
-            <a:r>
-              <a:rPr lang="de-DE" sz="4800" b="1" dirty="0">
-                <a:ln w="6600">
-                  <a:solidFill>
-                    <a:schemeClr val="accent2"/>
-                  </a:solidFill>
-                  <a:prstDash val="solid"/>
-                </a:ln>
-                <a:solidFill>
-                  <a:srgbClr val="FFFFFF"/>
-                </a:solidFill>
-                <a:effectLst>
-                  <a:outerShdw dist="38100" dir="2700000" algn="tl" rotWithShape="0">
-                    <a:schemeClr val="accent2"/>
-                  </a:outerShdw>
-                </a:effectLst>
-                <a:latin typeface="Source Sans Pro Light" panose="020B0403030403020204" pitchFamily="34" charset="0"/>
-              </a:rPr>
-              <a:t>?</a:t>
-            </a:r>
-          </a:p>
-          <a:p>
-            <a:pPr algn="ctr"/>
-            <a:r>
-              <a:rPr lang="de-DE" sz="4800" b="1" dirty="0">
-                <a:ln w="6600">
-                  <a:solidFill>
-                    <a:schemeClr val="accent2"/>
-                  </a:solidFill>
-                  <a:prstDash val="solid"/>
-                </a:ln>
-                <a:solidFill>
-                  <a:srgbClr val="FFFFFF"/>
-                </a:solidFill>
-                <a:effectLst>
-                  <a:outerShdw dist="38100" dir="2700000" algn="tl" rotWithShape="0">
-                    <a:schemeClr val="accent2"/>
-                  </a:outerShdw>
-                </a:effectLst>
-                <a:latin typeface="Source Sans Pro Light" panose="020B0403030403020204" pitchFamily="34" charset="0"/>
-              </a:rPr>
-              <a:t>https://github.com/easystats</a:t>
-            </a:r>
-          </a:p>
-        </p:txBody>
-      </p:sp>
-      <p:pic>
-        <p:nvPicPr>
-          <p:cNvPr id="10" name="Grafik 9">
-            <a:extLst>
-              <a:ext uri="{FF2B5EF4-FFF2-40B4-BE49-F238E27FC236}">
-                <a16:creationId xmlns:a16="http://schemas.microsoft.com/office/drawing/2014/main" id="{177ADE5C-6E0C-41DF-B77F-3FAF6918653E}"/>
-              </a:ext>
-            </a:extLst>
-          </p:cNvPr>
-          <p:cNvPicPr>
-            <a:picLocks noChangeAspect="1"/>
-          </p:cNvPicPr>
-          <p:nvPr/>
-        </p:nvPicPr>
-        <p:blipFill>
-          <a:blip r:embed="rId4" cstate="print">
-            <a:extLst>
-              <a:ext uri="{28A0092B-C50C-407E-A947-70E740481C1C}">
-                <a14:useLocalDpi xmlns:a14="http://schemas.microsoft.com/office/drawing/2010/main" val="0"/>
-              </a:ext>
-            </a:extLst>
-          </a:blip>
-          <a:stretch>
-            <a:fillRect/>
-          </a:stretch>
-        </p:blipFill>
-        <p:spPr>
-          <a:xfrm>
-            <a:off x="5004048" y="146417"/>
-            <a:ext cx="3673778" cy="3652384"/>
+            <a:off x="5796136" y="2420887"/>
+            <a:ext cx="3118893" cy="3600000"/>
           </a:xfrm>
           <a:prstGeom prst="rect">
             <a:avLst/>
@@ -9077,7 +9342,7 @@
     </p:spTree>
     <p:extLst>
       <p:ext uri="{BB962C8B-B14F-4D97-AF65-F5344CB8AC3E}">
-        <p14:creationId xmlns:p14="http://schemas.microsoft.com/office/powerpoint/2010/main" val="1720043727"/>
+        <p14:creationId xmlns:p14="http://schemas.microsoft.com/office/powerpoint/2010/main" val="1558410903"/>
       </p:ext>
     </p:extLst>
   </p:cSld>
@@ -9193,6 +9458,361 @@
     <p:extLst>
       <p:ext uri="{BB962C8B-B14F-4D97-AF65-F5344CB8AC3E}">
         <p14:creationId xmlns:p14="http://schemas.microsoft.com/office/powerpoint/2010/main" val="2174276912"/>
+      </p:ext>
+    </p:extLst>
+  </p:cSld>
+  <p:clrMapOvr>
+    <a:masterClrMapping/>
+  </p:clrMapOvr>
+</p:sld>
+</file>
+
+<file path=ppt/slides/slide20.xml><?xml version="1.0" encoding="utf-8"?>
+<p:sld xmlns:a="http://schemas.openxmlformats.org/drawingml/2006/main" xmlns:r="http://schemas.openxmlformats.org/officeDocument/2006/relationships" xmlns:p="http://schemas.openxmlformats.org/presentationml/2006/main">
+  <p:cSld>
+    <p:spTree>
+      <p:nvGrpSpPr>
+        <p:cNvPr id="1" name=""/>
+        <p:cNvGrpSpPr/>
+        <p:nvPr/>
+      </p:nvGrpSpPr>
+      <p:grpSpPr>
+        <a:xfrm>
+          <a:off x="0" y="0"/>
+          <a:ext cx="0" cy="0"/>
+          <a:chOff x="0" y="0"/>
+          <a:chExt cx="0" cy="0"/>
+        </a:xfrm>
+      </p:grpSpPr>
+      <p:sp>
+        <p:nvSpPr>
+          <p:cNvPr id="2" name="Inhaltsplatzhalter 1">
+            <a:extLst>
+              <a:ext uri="{FF2B5EF4-FFF2-40B4-BE49-F238E27FC236}">
+                <a16:creationId xmlns:a16="http://schemas.microsoft.com/office/drawing/2014/main" id="{FA35B9DB-F60D-4066-B8D9-2AEEC4F64DCC}"/>
+              </a:ext>
+            </a:extLst>
+          </p:cNvPr>
+          <p:cNvSpPr>
+            <a:spLocks noGrp="1"/>
+          </p:cNvSpPr>
+          <p:nvPr>
+            <p:ph idx="1"/>
+          </p:nvPr>
+        </p:nvSpPr>
+        <p:spPr>
+          <a:xfrm>
+            <a:off x="107504" y="4518408"/>
+            <a:ext cx="4320480" cy="2438984"/>
+          </a:xfrm>
+        </p:spPr>
+        <p:txBody>
+          <a:bodyPr>
+            <a:normAutofit/>
+          </a:bodyPr>
+          <a:lstStyle/>
+          <a:p>
+            <a:r>
+              <a:rPr lang="de-DE" sz="2600" dirty="0">
+                <a:latin typeface="Source Sans Pro Light" panose="020B0403030403020204" pitchFamily="34" charset="0"/>
+              </a:rPr>
+              <a:t>Dominique &amp; Daniel</a:t>
+            </a:r>
+          </a:p>
+          <a:p>
+            <a:endParaRPr lang="de-DE" sz="2600" dirty="0">
+              <a:latin typeface="Source Sans Pro Light" panose="020B0403030403020204" pitchFamily="34" charset="0"/>
+            </a:endParaRPr>
+          </a:p>
+          <a:p>
+            <a:endParaRPr lang="de-DE" sz="2600" dirty="0">
+              <a:latin typeface="Source Sans Pro Light" panose="020B0403030403020204" pitchFamily="34" charset="0"/>
+            </a:endParaRPr>
+          </a:p>
+          <a:p>
+            <a:endParaRPr lang="de-DE" sz="2600" dirty="0">
+              <a:latin typeface="Source Sans Pro Light" panose="020B0403030403020204" pitchFamily="34" charset="0"/>
+            </a:endParaRPr>
+          </a:p>
+          <a:p>
+            <a:endParaRPr lang="de-DE" sz="2600" dirty="0">
+              <a:latin typeface="Source Sans Pro Light" panose="020B0403030403020204" pitchFamily="34" charset="0"/>
+            </a:endParaRPr>
+          </a:p>
+          <a:p>
+            <a:endParaRPr lang="de-DE" sz="2600" dirty="0">
+              <a:latin typeface="Source Sans Pro Light" panose="020B0403030403020204" pitchFamily="34" charset="0"/>
+            </a:endParaRPr>
+          </a:p>
+        </p:txBody>
+      </p:sp>
+      <p:pic>
+        <p:nvPicPr>
+          <p:cNvPr id="6" name="Grafik 5">
+            <a:extLst>
+              <a:ext uri="{FF2B5EF4-FFF2-40B4-BE49-F238E27FC236}">
+                <a16:creationId xmlns:a16="http://schemas.microsoft.com/office/drawing/2014/main" id="{66E4B86A-06DF-42B6-8ACA-4C8C1D113A65}"/>
+              </a:ext>
+            </a:extLst>
+          </p:cNvPr>
+          <p:cNvPicPr>
+            <a:picLocks noChangeAspect="1"/>
+          </p:cNvPicPr>
+          <p:nvPr/>
+        </p:nvPicPr>
+        <p:blipFill>
+          <a:blip r:embed="rId2" cstate="print">
+            <a:extLst>
+              <a:ext uri="{28A0092B-C50C-407E-A947-70E740481C1C}">
+                <a14:useLocalDpi xmlns:a14="http://schemas.microsoft.com/office/drawing/2010/main" val="0"/>
+              </a:ext>
+            </a:extLst>
+          </a:blip>
+          <a:stretch>
+            <a:fillRect/>
+          </a:stretch>
+        </p:blipFill>
+        <p:spPr>
+          <a:xfrm>
+            <a:off x="194040" y="5067664"/>
+            <a:ext cx="1620000" cy="1620000"/>
+          </a:xfrm>
+          <a:prstGeom prst="rect">
+            <a:avLst/>
+          </a:prstGeom>
+        </p:spPr>
+      </p:pic>
+      <p:pic>
+        <p:nvPicPr>
+          <p:cNvPr id="8" name="Grafik 7">
+            <a:extLst>
+              <a:ext uri="{FF2B5EF4-FFF2-40B4-BE49-F238E27FC236}">
+                <a16:creationId xmlns:a16="http://schemas.microsoft.com/office/drawing/2014/main" id="{E1EEF370-18C6-4E24-9585-5202B4DC6481}"/>
+              </a:ext>
+            </a:extLst>
+          </p:cNvPr>
+          <p:cNvPicPr>
+            <a:picLocks noChangeAspect="1"/>
+          </p:cNvPicPr>
+          <p:nvPr/>
+        </p:nvPicPr>
+        <p:blipFill>
+          <a:blip r:embed="rId3" cstate="print">
+            <a:extLst>
+              <a:ext uri="{28A0092B-C50C-407E-A947-70E740481C1C}">
+                <a14:useLocalDpi xmlns:a14="http://schemas.microsoft.com/office/drawing/2010/main" val="0"/>
+              </a:ext>
+            </a:extLst>
+          </a:blip>
+          <a:stretch>
+            <a:fillRect/>
+          </a:stretch>
+        </p:blipFill>
+        <p:spPr>
+          <a:xfrm>
+            <a:off x="1814040" y="5067664"/>
+            <a:ext cx="1620000" cy="1620000"/>
+          </a:xfrm>
+          <a:prstGeom prst="rect">
+            <a:avLst/>
+          </a:prstGeom>
+        </p:spPr>
+      </p:pic>
+      <p:sp>
+        <p:nvSpPr>
+          <p:cNvPr id="9" name="Rechteck 8">
+            <a:extLst>
+              <a:ext uri="{FF2B5EF4-FFF2-40B4-BE49-F238E27FC236}">
+                <a16:creationId xmlns:a16="http://schemas.microsoft.com/office/drawing/2014/main" id="{3870196D-44D4-4AA2-83CC-F16BFBF045C8}"/>
+              </a:ext>
+            </a:extLst>
+          </p:cNvPr>
+          <p:cNvSpPr/>
+          <p:nvPr/>
+        </p:nvSpPr>
+        <p:spPr>
+          <a:xfrm rot="1362160">
+            <a:off x="658941" y="3422041"/>
+            <a:ext cx="7826117" cy="1569660"/>
+          </a:xfrm>
+          <a:prstGeom prst="rect">
+            <a:avLst/>
+          </a:prstGeom>
+          <a:noFill/>
+        </p:spPr>
+        <p:txBody>
+          <a:bodyPr wrap="none" lIns="91440" tIns="45720" rIns="91440" bIns="45720">
+            <a:spAutoFit/>
+          </a:bodyPr>
+          <a:lstStyle/>
+          <a:p>
+            <a:pPr algn="ctr"/>
+            <a:r>
+              <a:rPr lang="de-DE" sz="4800" b="1" dirty="0">
+                <a:ln w="6600">
+                  <a:solidFill>
+                    <a:schemeClr val="accent2"/>
+                  </a:solidFill>
+                  <a:prstDash val="solid"/>
+                </a:ln>
+                <a:solidFill>
+                  <a:srgbClr val="FFFFFF"/>
+                </a:solidFill>
+                <a:effectLst>
+                  <a:outerShdw dist="38100" dir="2700000" algn="tl" rotWithShape="0">
+                    <a:schemeClr val="accent2"/>
+                  </a:outerShdw>
+                </a:effectLst>
+                <a:latin typeface="Source Sans Pro Light" panose="020B0403030403020204" pitchFamily="34" charset="0"/>
+              </a:rPr>
+              <a:t>Want </a:t>
+            </a:r>
+            <a:r>
+              <a:rPr lang="de-DE" sz="4800" b="1" dirty="0" err="1">
+                <a:ln w="6600">
+                  <a:solidFill>
+                    <a:schemeClr val="accent2"/>
+                  </a:solidFill>
+                  <a:prstDash val="solid"/>
+                </a:ln>
+                <a:solidFill>
+                  <a:srgbClr val="FFFFFF"/>
+                </a:solidFill>
+                <a:effectLst>
+                  <a:outerShdw dist="38100" dir="2700000" algn="tl" rotWithShape="0">
+                    <a:schemeClr val="accent2"/>
+                  </a:outerShdw>
+                </a:effectLst>
+                <a:latin typeface="Source Sans Pro Light" panose="020B0403030403020204" pitchFamily="34" charset="0"/>
+              </a:rPr>
+              <a:t>to</a:t>
+            </a:r>
+            <a:r>
+              <a:rPr lang="de-DE" sz="4800" b="1" dirty="0">
+                <a:ln w="6600">
+                  <a:solidFill>
+                    <a:schemeClr val="accent2"/>
+                  </a:solidFill>
+                  <a:prstDash val="solid"/>
+                </a:ln>
+                <a:solidFill>
+                  <a:srgbClr val="FFFFFF"/>
+                </a:solidFill>
+                <a:effectLst>
+                  <a:outerShdw dist="38100" dir="2700000" algn="tl" rotWithShape="0">
+                    <a:schemeClr val="accent2"/>
+                  </a:outerShdw>
+                </a:effectLst>
+                <a:latin typeface="Source Sans Pro Light" panose="020B0403030403020204" pitchFamily="34" charset="0"/>
+              </a:rPr>
+              <a:t> support </a:t>
+            </a:r>
+            <a:r>
+              <a:rPr lang="de-DE" sz="4800" b="1" dirty="0" err="1">
+                <a:ln w="6600">
+                  <a:solidFill>
+                    <a:schemeClr val="accent2"/>
+                  </a:solidFill>
+                  <a:prstDash val="solid"/>
+                </a:ln>
+                <a:solidFill>
+                  <a:srgbClr val="FFFFFF"/>
+                </a:solidFill>
+                <a:effectLst>
+                  <a:outerShdw dist="38100" dir="2700000" algn="tl" rotWithShape="0">
+                    <a:schemeClr val="accent2"/>
+                  </a:outerShdw>
+                </a:effectLst>
+                <a:latin typeface="Source Sans Pro Light" panose="020B0403030403020204" pitchFamily="34" charset="0"/>
+              </a:rPr>
+              <a:t>us</a:t>
+            </a:r>
+            <a:r>
+              <a:rPr lang="de-DE" sz="4800" b="1" dirty="0">
+                <a:ln w="6600">
+                  <a:solidFill>
+                    <a:schemeClr val="accent2"/>
+                  </a:solidFill>
+                  <a:prstDash val="solid"/>
+                </a:ln>
+                <a:solidFill>
+                  <a:srgbClr val="FFFFFF"/>
+                </a:solidFill>
+                <a:effectLst>
+                  <a:outerShdw dist="38100" dir="2700000" algn="tl" rotWithShape="0">
+                    <a:schemeClr val="accent2"/>
+                  </a:outerShdw>
+                </a:effectLst>
+                <a:latin typeface="Source Sans Pro Light" panose="020B0403030403020204" pitchFamily="34" charset="0"/>
+              </a:rPr>
+              <a:t>?</a:t>
+            </a:r>
+          </a:p>
+          <a:p>
+            <a:pPr algn="ctr"/>
+            <a:r>
+              <a:rPr lang="de-DE" sz="4800" b="1" dirty="0">
+                <a:ln w="6600">
+                  <a:solidFill>
+                    <a:schemeClr val="accent2"/>
+                  </a:solidFill>
+                  <a:prstDash val="solid"/>
+                </a:ln>
+                <a:solidFill>
+                  <a:srgbClr val="FFFFFF"/>
+                </a:solidFill>
+                <a:effectLst>
+                  <a:outerShdw dist="38100" dir="2700000" algn="tl" rotWithShape="0">
+                    <a:schemeClr val="accent2"/>
+                  </a:outerShdw>
+                </a:effectLst>
+                <a:latin typeface="Source Sans Pro Light" panose="020B0403030403020204" pitchFamily="34" charset="0"/>
+              </a:rPr>
+              <a:t>https://github.com/easystats</a:t>
+            </a:r>
+          </a:p>
+        </p:txBody>
+      </p:sp>
+      <p:pic>
+        <p:nvPicPr>
+          <p:cNvPr id="10" name="Grafik 9">
+            <a:extLst>
+              <a:ext uri="{FF2B5EF4-FFF2-40B4-BE49-F238E27FC236}">
+                <a16:creationId xmlns:a16="http://schemas.microsoft.com/office/drawing/2014/main" id="{177ADE5C-6E0C-41DF-B77F-3FAF6918653E}"/>
+              </a:ext>
+            </a:extLst>
+          </p:cNvPr>
+          <p:cNvPicPr>
+            <a:picLocks noChangeAspect="1"/>
+          </p:cNvPicPr>
+          <p:nvPr/>
+        </p:nvPicPr>
+        <p:blipFill>
+          <a:blip r:embed="rId4" cstate="print">
+            <a:extLst>
+              <a:ext uri="{28A0092B-C50C-407E-A947-70E740481C1C}">
+                <a14:useLocalDpi xmlns:a14="http://schemas.microsoft.com/office/drawing/2010/main" val="0"/>
+              </a:ext>
+            </a:extLst>
+          </a:blip>
+          <a:stretch>
+            <a:fillRect/>
+          </a:stretch>
+        </p:blipFill>
+        <p:spPr>
+          <a:xfrm>
+            <a:off x="5004048" y="146417"/>
+            <a:ext cx="3673778" cy="3652384"/>
+          </a:xfrm>
+          <a:prstGeom prst="rect">
+            <a:avLst/>
+          </a:prstGeom>
+        </p:spPr>
+      </p:pic>
+    </p:spTree>
+    <p:extLst>
+      <p:ext uri="{BB962C8B-B14F-4D97-AF65-F5344CB8AC3E}">
+        <p14:creationId xmlns:p14="http://schemas.microsoft.com/office/powerpoint/2010/main" val="1720043727"/>
       </p:ext>
     </p:extLst>
   </p:cSld>

</xml_diff>

<commit_message>
update examples on slides
</commit_message>
<xml_diff>
--- a/presentations/2019-02_Hamburg_RUG/1902 Hamburg RUG easystats.pptx
+++ b/presentations/2019-02_Hamburg_RUG/1902 Hamburg RUG easystats.pptx
@@ -213,7 +213,7 @@
           <a:p>
             <a:fld id="{64CA4326-4DC0-4DE5-99BF-3FA9D988CBE6}" type="datetimeFigureOut">
               <a:rPr lang="de-DE" smtClean="0"/>
-              <a:t>02.02.2019</a:t>
+              <a:t>03.02.2019</a:t>
             </a:fld>
             <a:endParaRPr lang="de-DE"/>
           </a:p>
@@ -346,7 +346,7 @@
           <a:p>
             <a:fld id="{0E08E2FD-2E15-419A-B356-6759EA05D2AD}" type="datetimeFigureOut">
               <a:rPr lang="de-DE" smtClean="0"/>
-              <a:t>02.02.2019</a:t>
+              <a:t>03.02.2019</a:t>
             </a:fld>
             <a:endParaRPr lang="de-DE"/>
           </a:p>
@@ -1075,7 +1075,7 @@
           <a:noFill/>
           <a:extLst>
             <a:ext uri="{909E8E84-426E-40dd-AFC4-6F175D3DCCD1}">
-              <a14:hiddenFill xmlns:a14="http://schemas.microsoft.com/office/drawing/2010/main" xmlns="">
+              <a14:hiddenFill xmlns="" xmlns:a14="http://schemas.microsoft.com/office/drawing/2010/main">
                 <a:solidFill>
                   <a:srgbClr val="FFFFFF"/>
                 </a:solidFill>
@@ -1116,7 +1116,7 @@
           <a:noFill/>
           <a:extLst>
             <a:ext uri="{909E8E84-426E-40dd-AFC4-6F175D3DCCD1}">
-              <a14:hiddenFill xmlns:a14="http://schemas.microsoft.com/office/drawing/2010/main" xmlns="">
+              <a14:hiddenFill xmlns="" xmlns:a14="http://schemas.microsoft.com/office/drawing/2010/main">
                 <a:solidFill>
                   <a:srgbClr val="FFFFFF"/>
                 </a:solidFill>
@@ -1765,7 +1765,7 @@
           <a:noFill/>
           <a:extLst>
             <a:ext uri="{909E8E84-426E-40dd-AFC4-6F175D3DCCD1}">
-              <a14:hiddenFill xmlns:a14="http://schemas.microsoft.com/office/drawing/2010/main" xmlns="">
+              <a14:hiddenFill xmlns="" xmlns:a14="http://schemas.microsoft.com/office/drawing/2010/main">
                 <a:solidFill>
                   <a:srgbClr val="FFFFFF"/>
                 </a:solidFill>
@@ -1806,7 +1806,7 @@
           <a:noFill/>
           <a:extLst>
             <a:ext uri="{909E8E84-426E-40dd-AFC4-6F175D3DCCD1}">
-              <a14:hiddenFill xmlns:a14="http://schemas.microsoft.com/office/drawing/2010/main" xmlns="">
+              <a14:hiddenFill xmlns="" xmlns:a14="http://schemas.microsoft.com/office/drawing/2010/main">
                 <a:solidFill>
                   <a:srgbClr val="FFFFFF"/>
                 </a:solidFill>
@@ -7883,7 +7883,7 @@
         <p:spPr>
           <a:xfrm>
             <a:off x="9918" y="2420887"/>
-            <a:ext cx="5570193" cy="4403871"/>
+            <a:ext cx="5570193" cy="3911428"/>
           </a:xfrm>
           <a:prstGeom prst="rect">
             <a:avLst/>
@@ -7899,29 +7899,6 @@
             <a:spAutoFit/>
           </a:bodyPr>
           <a:lstStyle/>
-          <a:p>
-            <a:r>
-              <a:rPr lang="nl-NL" sz="1600" dirty="0">
-                <a:solidFill>
-                  <a:schemeClr val="bg1">
-                    <a:lumMod val="50000"/>
-                  </a:schemeClr>
-                </a:solidFill>
-                <a:latin typeface="Liberation Mono" panose="02070409020205020404" pitchFamily="49" charset="0"/>
-                <a:cs typeface="Liberation Mono" panose="02070409020205020404" pitchFamily="49" charset="0"/>
-              </a:rPr>
-              <a:t># model frame?</a:t>
-            </a:r>
-          </a:p>
-          <a:p>
-            <a:endParaRPr lang="nl-NL" sz="1600" dirty="0">
-              <a:solidFill>
-                <a:schemeClr val="tx2"/>
-              </a:solidFill>
-              <a:latin typeface="Liberation Mono" panose="02070409020205020404" pitchFamily="49" charset="0"/>
-              <a:cs typeface="Liberation Mono" panose="02070409020205020404" pitchFamily="49" charset="0"/>
-            </a:endParaRPr>
-          </a:p>
           <a:p>
             <a:r>
               <a:rPr lang="nl-NL" sz="1600" dirty="0">
@@ -8304,7 +8281,7 @@
         <p:spPr>
           <a:xfrm>
             <a:off x="0" y="2421603"/>
-            <a:ext cx="5580112" cy="4157649"/>
+            <a:ext cx="5580112" cy="4403871"/>
           </a:xfrm>
           <a:prstGeom prst="rect">
             <a:avLst/>
@@ -8322,16 +8299,226 @@
           <a:lstStyle/>
           <a:p>
             <a:r>
-              <a:rPr lang="nl-NL" sz="1600" dirty="0">
-                <a:solidFill>
-                  <a:schemeClr val="bg1">
-                    <a:lumMod val="50000"/>
-                  </a:schemeClr>
+              <a:rPr lang="en-US" sz="1600" dirty="0">
+                <a:solidFill>
+                  <a:schemeClr val="tx2"/>
                 </a:solidFill>
                 <a:latin typeface="Liberation Mono" panose="02070409020205020404" pitchFamily="49" charset="0"/>
                 <a:cs typeface="Liberation Mono" panose="02070409020205020404" pitchFamily="49" charset="0"/>
               </a:rPr>
-              <a:t># model terms?</a:t>
+              <a:t>library(</a:t>
+            </a:r>
+            <a:r>
+              <a:rPr lang="en-US" sz="1600" dirty="0" err="1">
+                <a:solidFill>
+                  <a:schemeClr val="tx2"/>
+                </a:solidFill>
+                <a:latin typeface="Liberation Mono" panose="02070409020205020404" pitchFamily="49" charset="0"/>
+                <a:cs typeface="Liberation Mono" panose="02070409020205020404" pitchFamily="49" charset="0"/>
+              </a:rPr>
+              <a:t>MCMCglmm</a:t>
+            </a:r>
+            <a:r>
+              <a:rPr lang="en-US" sz="1600" dirty="0">
+                <a:solidFill>
+                  <a:schemeClr val="tx2"/>
+                </a:solidFill>
+                <a:latin typeface="Liberation Mono" panose="02070409020205020404" pitchFamily="49" charset="0"/>
+                <a:cs typeface="Liberation Mono" panose="02070409020205020404" pitchFamily="49" charset="0"/>
+              </a:rPr>
+              <a:t>)</a:t>
+            </a:r>
+          </a:p>
+          <a:p>
+            <a:r>
+              <a:rPr lang="en-US" sz="1600" dirty="0">
+                <a:solidFill>
+                  <a:schemeClr val="tx2"/>
+                </a:solidFill>
+                <a:latin typeface="Liberation Mono" panose="02070409020205020404" pitchFamily="49" charset="0"/>
+                <a:cs typeface="Liberation Mono" panose="02070409020205020404" pitchFamily="49" charset="0"/>
+              </a:rPr>
+              <a:t>data(</a:t>
+            </a:r>
+            <a:r>
+              <a:rPr lang="en-US" sz="1600" dirty="0" err="1">
+                <a:solidFill>
+                  <a:schemeClr val="tx2"/>
+                </a:solidFill>
+                <a:latin typeface="Liberation Mono" panose="02070409020205020404" pitchFamily="49" charset="0"/>
+                <a:cs typeface="Liberation Mono" panose="02070409020205020404" pitchFamily="49" charset="0"/>
+              </a:rPr>
+              <a:t>PlodiaPO</a:t>
+            </a:r>
+            <a:r>
+              <a:rPr lang="en-US" sz="1600" dirty="0">
+                <a:solidFill>
+                  <a:schemeClr val="tx2"/>
+                </a:solidFill>
+                <a:latin typeface="Liberation Mono" panose="02070409020205020404" pitchFamily="49" charset="0"/>
+                <a:cs typeface="Liberation Mono" panose="02070409020205020404" pitchFamily="49" charset="0"/>
+              </a:rPr>
+              <a:t>)</a:t>
+            </a:r>
+          </a:p>
+          <a:p>
+            <a:r>
+              <a:rPr lang="en-US" sz="1600" dirty="0">
+                <a:solidFill>
+                  <a:schemeClr val="tx2"/>
+                </a:solidFill>
+                <a:latin typeface="Liberation Mono" panose="02070409020205020404" pitchFamily="49" charset="0"/>
+                <a:cs typeface="Liberation Mono" panose="02070409020205020404" pitchFamily="49" charset="0"/>
+              </a:rPr>
+              <a:t>m &lt;- </a:t>
+            </a:r>
+            <a:r>
+              <a:rPr lang="en-US" sz="1600" dirty="0" err="1">
+                <a:solidFill>
+                  <a:schemeClr val="tx2"/>
+                </a:solidFill>
+                <a:latin typeface="Liberation Mono" panose="02070409020205020404" pitchFamily="49" charset="0"/>
+                <a:cs typeface="Liberation Mono" panose="02070409020205020404" pitchFamily="49" charset="0"/>
+              </a:rPr>
+              <a:t>MCMCglmm</a:t>
+            </a:r>
+            <a:r>
+              <a:rPr lang="en-US" sz="1600" dirty="0">
+                <a:solidFill>
+                  <a:schemeClr val="tx2"/>
+                </a:solidFill>
+                <a:latin typeface="Liberation Mono" panose="02070409020205020404" pitchFamily="49" charset="0"/>
+                <a:cs typeface="Liberation Mono" panose="02070409020205020404" pitchFamily="49" charset="0"/>
+              </a:rPr>
+              <a:t>(</a:t>
+            </a:r>
+          </a:p>
+          <a:p>
+            <a:r>
+              <a:rPr lang="en-US" sz="1600" dirty="0">
+                <a:solidFill>
+                  <a:schemeClr val="tx2"/>
+                </a:solidFill>
+                <a:latin typeface="Liberation Mono" panose="02070409020205020404" pitchFamily="49" charset="0"/>
+                <a:cs typeface="Liberation Mono" panose="02070409020205020404" pitchFamily="49" charset="0"/>
+              </a:rPr>
+              <a:t>  PO~1, random=~</a:t>
+            </a:r>
+            <a:r>
+              <a:rPr lang="en-US" sz="1600" dirty="0" err="1">
+                <a:solidFill>
+                  <a:schemeClr val="tx2"/>
+                </a:solidFill>
+                <a:latin typeface="Liberation Mono" panose="02070409020205020404" pitchFamily="49" charset="0"/>
+                <a:cs typeface="Liberation Mono" panose="02070409020205020404" pitchFamily="49" charset="0"/>
+              </a:rPr>
+              <a:t>FSfamily</a:t>
+            </a:r>
+            <a:r>
+              <a:rPr lang="en-US" sz="1600" dirty="0">
+                <a:solidFill>
+                  <a:schemeClr val="tx2"/>
+                </a:solidFill>
+                <a:latin typeface="Liberation Mono" panose="02070409020205020404" pitchFamily="49" charset="0"/>
+                <a:cs typeface="Liberation Mono" panose="02070409020205020404" pitchFamily="49" charset="0"/>
+              </a:rPr>
+              <a:t>, data=</a:t>
+            </a:r>
+            <a:r>
+              <a:rPr lang="en-US" sz="1600" dirty="0" err="1">
+                <a:solidFill>
+                  <a:schemeClr val="tx2"/>
+                </a:solidFill>
+                <a:latin typeface="Liberation Mono" panose="02070409020205020404" pitchFamily="49" charset="0"/>
+                <a:cs typeface="Liberation Mono" panose="02070409020205020404" pitchFamily="49" charset="0"/>
+              </a:rPr>
+              <a:t>PlodiaPO</a:t>
+            </a:r>
+            <a:r>
+              <a:rPr lang="en-US" sz="1600" dirty="0">
+                <a:solidFill>
+                  <a:schemeClr val="tx2"/>
+                </a:solidFill>
+                <a:latin typeface="Liberation Mono" panose="02070409020205020404" pitchFamily="49" charset="0"/>
+                <a:cs typeface="Liberation Mono" panose="02070409020205020404" pitchFamily="49" charset="0"/>
+              </a:rPr>
+              <a:t>,</a:t>
+            </a:r>
+          </a:p>
+          <a:p>
+            <a:r>
+              <a:rPr lang="en-US" sz="1600" dirty="0">
+                <a:solidFill>
+                  <a:schemeClr val="tx2"/>
+                </a:solidFill>
+                <a:latin typeface="Liberation Mono" panose="02070409020205020404" pitchFamily="49" charset="0"/>
+                <a:cs typeface="Liberation Mono" panose="02070409020205020404" pitchFamily="49" charset="0"/>
+              </a:rPr>
+              <a:t>  verbose=FALSE, </a:t>
+            </a:r>
+            <a:r>
+              <a:rPr lang="en-US" sz="1600" dirty="0" err="1">
+                <a:solidFill>
+                  <a:schemeClr val="tx2"/>
+                </a:solidFill>
+                <a:latin typeface="Liberation Mono" panose="02070409020205020404" pitchFamily="49" charset="0"/>
+                <a:cs typeface="Liberation Mono" panose="02070409020205020404" pitchFamily="49" charset="0"/>
+              </a:rPr>
+              <a:t>nitt</a:t>
+            </a:r>
+            <a:r>
+              <a:rPr lang="en-US" sz="1600" dirty="0">
+                <a:solidFill>
+                  <a:schemeClr val="tx2"/>
+                </a:solidFill>
+                <a:latin typeface="Liberation Mono" panose="02070409020205020404" pitchFamily="49" charset="0"/>
+                <a:cs typeface="Liberation Mono" panose="02070409020205020404" pitchFamily="49" charset="0"/>
+              </a:rPr>
+              <a:t>=1300, </a:t>
+            </a:r>
+            <a:r>
+              <a:rPr lang="en-US" sz="1600" dirty="0" err="1">
+                <a:solidFill>
+                  <a:schemeClr val="tx2"/>
+                </a:solidFill>
+                <a:latin typeface="Liberation Mono" panose="02070409020205020404" pitchFamily="49" charset="0"/>
+                <a:cs typeface="Liberation Mono" panose="02070409020205020404" pitchFamily="49" charset="0"/>
+              </a:rPr>
+              <a:t>burnin</a:t>
+            </a:r>
+            <a:r>
+              <a:rPr lang="en-US" sz="1600" dirty="0">
+                <a:solidFill>
+                  <a:schemeClr val="tx2"/>
+                </a:solidFill>
+                <a:latin typeface="Liberation Mono" panose="02070409020205020404" pitchFamily="49" charset="0"/>
+                <a:cs typeface="Liberation Mono" panose="02070409020205020404" pitchFamily="49" charset="0"/>
+              </a:rPr>
+              <a:t>=300,</a:t>
+            </a:r>
+          </a:p>
+          <a:p>
+            <a:r>
+              <a:rPr lang="en-US" sz="1600" dirty="0">
+                <a:solidFill>
+                  <a:schemeClr val="tx2"/>
+                </a:solidFill>
+                <a:latin typeface="Liberation Mono" panose="02070409020205020404" pitchFamily="49" charset="0"/>
+                <a:cs typeface="Liberation Mono" panose="02070409020205020404" pitchFamily="49" charset="0"/>
+              </a:rPr>
+              <a:t>  thin=1</a:t>
+            </a:r>
+          </a:p>
+          <a:p>
+            <a:r>
+              <a:rPr lang="en-US" sz="1600" dirty="0">
+                <a:solidFill>
+                  <a:schemeClr val="tx2"/>
+                </a:solidFill>
+                <a:latin typeface="Liberation Mono" panose="02070409020205020404" pitchFamily="49" charset="0"/>
+                <a:cs typeface="Liberation Mono" panose="02070409020205020404" pitchFamily="49" charset="0"/>
+              </a:rPr>
+              <a:t>)</a:t>
             </a:r>
           </a:p>
           <a:p>
@@ -8345,382 +8532,55 @@
           </a:p>
           <a:p>
             <a:r>
-              <a:rPr lang="en-US" sz="1600" dirty="0">
+              <a:rPr lang="en-US" sz="1600" dirty="0" err="1">
                 <a:solidFill>
                   <a:schemeClr val="tx2"/>
                 </a:solidFill>
                 <a:latin typeface="Liberation Mono" panose="02070409020205020404" pitchFamily="49" charset="0"/>
                 <a:cs typeface="Liberation Mono" panose="02070409020205020404" pitchFamily="49" charset="0"/>
               </a:rPr>
-              <a:t>library(</a:t>
-            </a:r>
-            <a:r>
-              <a:rPr lang="en-US" sz="1600" dirty="0" err="1">
+              <a:t>find_terms</a:t>
+            </a:r>
+            <a:r>
+              <a:rPr lang="en-US" sz="1600" dirty="0">
                 <a:solidFill>
                   <a:schemeClr val="tx2"/>
                 </a:solidFill>
                 <a:latin typeface="Liberation Mono" panose="02070409020205020404" pitchFamily="49" charset="0"/>
                 <a:cs typeface="Liberation Mono" panose="02070409020205020404" pitchFamily="49" charset="0"/>
               </a:rPr>
-              <a:t>MCMCglmm</a:t>
-            </a:r>
+              <a:t>(m)</a:t>
+            </a:r>
+          </a:p>
+          <a:p>
             <a:r>
               <a:rPr lang="en-US" sz="1600" dirty="0">
                 <a:solidFill>
-                  <a:schemeClr val="tx2"/>
+                  <a:schemeClr val="bg1">
+                    <a:lumMod val="50000"/>
+                  </a:schemeClr>
                 </a:solidFill>
                 <a:latin typeface="Liberation Mono" panose="02070409020205020404" pitchFamily="49" charset="0"/>
                 <a:cs typeface="Liberation Mono" panose="02070409020205020404" pitchFamily="49" charset="0"/>
               </a:rPr>
-              <a:t>)</a:t>
+              <a:t>$response</a:t>
             </a:r>
           </a:p>
           <a:p>
             <a:r>
               <a:rPr lang="en-US" sz="1600" dirty="0">
                 <a:solidFill>
-                  <a:schemeClr val="tx2"/>
+                  <a:schemeClr val="bg1">
+                    <a:lumMod val="50000"/>
+                  </a:schemeClr>
                 </a:solidFill>
                 <a:latin typeface="Liberation Mono" panose="02070409020205020404" pitchFamily="49" charset="0"/>
                 <a:cs typeface="Liberation Mono" panose="02070409020205020404" pitchFamily="49" charset="0"/>
               </a:rPr>
-              <a:t>data(</a:t>
-            </a:r>
-            <a:r>
-              <a:rPr lang="en-US" sz="1600" dirty="0" err="1">
-                <a:solidFill>
-                  <a:schemeClr val="tx2"/>
-                </a:solidFill>
-                <a:latin typeface="Liberation Mono" panose="02070409020205020404" pitchFamily="49" charset="0"/>
-                <a:cs typeface="Liberation Mono" panose="02070409020205020404" pitchFamily="49" charset="0"/>
-              </a:rPr>
-              <a:t>PlodiaPO</a:t>
-            </a:r>
-            <a:r>
-              <a:rPr lang="en-US" sz="1600" dirty="0">
-                <a:solidFill>
-                  <a:schemeClr val="tx2"/>
-                </a:solidFill>
-                <a:latin typeface="Liberation Mono" panose="02070409020205020404" pitchFamily="49" charset="0"/>
-                <a:cs typeface="Liberation Mono" panose="02070409020205020404" pitchFamily="49" charset="0"/>
-              </a:rPr>
-              <a:t>)</a:t>
-            </a:r>
-          </a:p>
-          <a:p>
-            <a:r>
-              <a:rPr lang="en-US" sz="1600" dirty="0">
-                <a:solidFill>
-                  <a:schemeClr val="tx2"/>
-                </a:solidFill>
-                <a:latin typeface="Liberation Mono" panose="02070409020205020404" pitchFamily="49" charset="0"/>
-                <a:cs typeface="Liberation Mono" panose="02070409020205020404" pitchFamily="49" charset="0"/>
-              </a:rPr>
-              <a:t>m &lt;- </a:t>
-            </a:r>
-            <a:r>
-              <a:rPr lang="en-US" sz="1600" dirty="0" err="1">
-                <a:solidFill>
-                  <a:schemeClr val="tx2"/>
-                </a:solidFill>
-                <a:latin typeface="Liberation Mono" panose="02070409020205020404" pitchFamily="49" charset="0"/>
-                <a:cs typeface="Liberation Mono" panose="02070409020205020404" pitchFamily="49" charset="0"/>
-              </a:rPr>
-              <a:t>MCMCglmm</a:t>
-            </a:r>
-            <a:r>
-              <a:rPr lang="en-US" sz="1600" dirty="0">
-                <a:solidFill>
-                  <a:schemeClr val="tx2"/>
-                </a:solidFill>
-                <a:latin typeface="Liberation Mono" panose="02070409020205020404" pitchFamily="49" charset="0"/>
-                <a:cs typeface="Liberation Mono" panose="02070409020205020404" pitchFamily="49" charset="0"/>
-              </a:rPr>
-              <a:t>(</a:t>
-            </a:r>
-          </a:p>
-          <a:p>
-            <a:r>
-              <a:rPr lang="en-US" sz="1600" dirty="0">
-                <a:solidFill>
-                  <a:schemeClr val="tx2"/>
-                </a:solidFill>
-                <a:latin typeface="Liberation Mono" panose="02070409020205020404" pitchFamily="49" charset="0"/>
-                <a:cs typeface="Liberation Mono" panose="02070409020205020404" pitchFamily="49" charset="0"/>
-              </a:rPr>
-              <a:t>  PO~1, random=~</a:t>
-            </a:r>
-            <a:r>
-              <a:rPr lang="en-US" sz="1600" dirty="0" err="1">
-                <a:solidFill>
-                  <a:schemeClr val="tx2"/>
-                </a:solidFill>
-                <a:latin typeface="Liberation Mono" panose="02070409020205020404" pitchFamily="49" charset="0"/>
-                <a:cs typeface="Liberation Mono" panose="02070409020205020404" pitchFamily="49" charset="0"/>
-              </a:rPr>
-              <a:t>FSfamily</a:t>
-            </a:r>
-            <a:r>
-              <a:rPr lang="en-US" sz="1600" dirty="0">
-                <a:solidFill>
-                  <a:schemeClr val="tx2"/>
-                </a:solidFill>
-                <a:latin typeface="Liberation Mono" panose="02070409020205020404" pitchFamily="49" charset="0"/>
-                <a:cs typeface="Liberation Mono" panose="02070409020205020404" pitchFamily="49" charset="0"/>
-              </a:rPr>
-              <a:t>, data=</a:t>
-            </a:r>
-            <a:r>
-              <a:rPr lang="en-US" sz="1600" dirty="0" err="1">
-                <a:solidFill>
-                  <a:schemeClr val="tx2"/>
-                </a:solidFill>
-                <a:latin typeface="Liberation Mono" panose="02070409020205020404" pitchFamily="49" charset="0"/>
-                <a:cs typeface="Liberation Mono" panose="02070409020205020404" pitchFamily="49" charset="0"/>
-              </a:rPr>
-              <a:t>PlodiaPO</a:t>
-            </a:r>
-            <a:r>
-              <a:rPr lang="en-US" sz="1600" dirty="0">
-                <a:solidFill>
-                  <a:schemeClr val="tx2"/>
-                </a:solidFill>
-                <a:latin typeface="Liberation Mono" panose="02070409020205020404" pitchFamily="49" charset="0"/>
-                <a:cs typeface="Liberation Mono" panose="02070409020205020404" pitchFamily="49" charset="0"/>
-              </a:rPr>
-              <a:t>,</a:t>
-            </a:r>
-          </a:p>
-          <a:p>
-            <a:r>
-              <a:rPr lang="en-US" sz="1600" dirty="0">
-                <a:solidFill>
-                  <a:schemeClr val="tx2"/>
-                </a:solidFill>
-                <a:latin typeface="Liberation Mono" panose="02070409020205020404" pitchFamily="49" charset="0"/>
-                <a:cs typeface="Liberation Mono" panose="02070409020205020404" pitchFamily="49" charset="0"/>
-              </a:rPr>
-              <a:t>  verbose=FALSE, </a:t>
-            </a:r>
-            <a:r>
-              <a:rPr lang="en-US" sz="1600" dirty="0" err="1">
-                <a:solidFill>
-                  <a:schemeClr val="tx2"/>
-                </a:solidFill>
-                <a:latin typeface="Liberation Mono" panose="02070409020205020404" pitchFamily="49" charset="0"/>
-                <a:cs typeface="Liberation Mono" panose="02070409020205020404" pitchFamily="49" charset="0"/>
-              </a:rPr>
-              <a:t>nitt</a:t>
-            </a:r>
-            <a:r>
-              <a:rPr lang="en-US" sz="1600" dirty="0">
-                <a:solidFill>
-                  <a:schemeClr val="tx2"/>
-                </a:solidFill>
-                <a:latin typeface="Liberation Mono" panose="02070409020205020404" pitchFamily="49" charset="0"/>
-                <a:cs typeface="Liberation Mono" panose="02070409020205020404" pitchFamily="49" charset="0"/>
-              </a:rPr>
-              <a:t>=1300, </a:t>
-            </a:r>
-            <a:r>
-              <a:rPr lang="en-US" sz="1600" dirty="0" err="1">
-                <a:solidFill>
-                  <a:schemeClr val="tx2"/>
-                </a:solidFill>
-                <a:latin typeface="Liberation Mono" panose="02070409020205020404" pitchFamily="49" charset="0"/>
-                <a:cs typeface="Liberation Mono" panose="02070409020205020404" pitchFamily="49" charset="0"/>
-              </a:rPr>
-              <a:t>burnin</a:t>
-            </a:r>
-            <a:r>
-              <a:rPr lang="en-US" sz="1600" dirty="0">
-                <a:solidFill>
-                  <a:schemeClr val="tx2"/>
-                </a:solidFill>
-                <a:latin typeface="Liberation Mono" panose="02070409020205020404" pitchFamily="49" charset="0"/>
-                <a:cs typeface="Liberation Mono" panose="02070409020205020404" pitchFamily="49" charset="0"/>
-              </a:rPr>
-              <a:t>=300,</a:t>
-            </a:r>
-          </a:p>
-          <a:p>
-            <a:r>
-              <a:rPr lang="en-US" sz="1600" dirty="0">
-                <a:solidFill>
-                  <a:schemeClr val="tx2"/>
-                </a:solidFill>
-                <a:latin typeface="Liberation Mono" panose="02070409020205020404" pitchFamily="49" charset="0"/>
-                <a:cs typeface="Liberation Mono" panose="02070409020205020404" pitchFamily="49" charset="0"/>
-              </a:rPr>
-              <a:t>  thin=1</a:t>
-            </a:r>
-          </a:p>
-          <a:p>
-            <a:r>
-              <a:rPr lang="en-US" sz="1600" dirty="0">
-                <a:solidFill>
-                  <a:schemeClr val="tx2"/>
-                </a:solidFill>
-                <a:latin typeface="Liberation Mono" panose="02070409020205020404" pitchFamily="49" charset="0"/>
-                <a:cs typeface="Liberation Mono" panose="02070409020205020404" pitchFamily="49" charset="0"/>
-              </a:rPr>
-              <a:t>)</a:t>
-            </a:r>
-          </a:p>
-          <a:p>
-            <a:endParaRPr lang="en-US" sz="1600" dirty="0">
-              <a:solidFill>
-                <a:schemeClr val="tx2"/>
-              </a:solidFill>
-              <a:latin typeface="Liberation Mono" panose="02070409020205020404" pitchFamily="49" charset="0"/>
-              <a:cs typeface="Liberation Mono" panose="02070409020205020404" pitchFamily="49" charset="0"/>
-            </a:endParaRPr>
-          </a:p>
-          <a:p>
-            <a:r>
-              <a:rPr lang="en-US" sz="1600" dirty="0" err="1">
-                <a:solidFill>
-                  <a:schemeClr val="tx2"/>
-                </a:solidFill>
-                <a:latin typeface="Liberation Mono" panose="02070409020205020404" pitchFamily="49" charset="0"/>
-                <a:cs typeface="Liberation Mono" panose="02070409020205020404" pitchFamily="49" charset="0"/>
-              </a:rPr>
-              <a:t>find_terms</a:t>
-            </a:r>
-            <a:r>
-              <a:rPr lang="en-US" sz="1600" dirty="0">
-                <a:solidFill>
-                  <a:schemeClr val="tx2"/>
-                </a:solidFill>
-                <a:latin typeface="Liberation Mono" panose="02070409020205020404" pitchFamily="49" charset="0"/>
-                <a:cs typeface="Liberation Mono" panose="02070409020205020404" pitchFamily="49" charset="0"/>
-              </a:rPr>
-              <a:t>(m)</a:t>
-            </a:r>
-          </a:p>
-          <a:p>
-            <a:r>
-              <a:rPr lang="en-US" sz="1600" dirty="0">
-                <a:solidFill>
-                  <a:schemeClr val="bg1">
-                    <a:lumMod val="50000"/>
-                  </a:schemeClr>
-                </a:solidFill>
-                <a:latin typeface="Liberation Mono" panose="02070409020205020404" pitchFamily="49" charset="0"/>
-                <a:cs typeface="Liberation Mono" panose="02070409020205020404" pitchFamily="49" charset="0"/>
-              </a:rPr>
-              <a:t>#&gt; </a:t>
-            </a:r>
-            <a:r>
-              <a:rPr lang="it-IT" sz="1600" dirty="0">
-                <a:solidFill>
-                  <a:schemeClr val="bg1">
-                    <a:lumMod val="50000"/>
-                  </a:schemeClr>
-                </a:solidFill>
-                <a:latin typeface="Liberation Mono" panose="02070409020205020404" pitchFamily="49" charset="0"/>
-                <a:cs typeface="Liberation Mono" panose="02070409020205020404" pitchFamily="49" charset="0"/>
-              </a:rPr>
-              <a:t>$</a:t>
-            </a:r>
-            <a:r>
-              <a:rPr lang="it-IT" sz="1600" dirty="0" err="1">
-                <a:solidFill>
-                  <a:schemeClr val="bg1">
-                    <a:lumMod val="50000"/>
-                  </a:schemeClr>
-                </a:solidFill>
-                <a:latin typeface="Liberation Mono" panose="02070409020205020404" pitchFamily="49" charset="0"/>
-                <a:cs typeface="Liberation Mono" panose="02070409020205020404" pitchFamily="49" charset="0"/>
-              </a:rPr>
-              <a:t>response</a:t>
-            </a:r>
-            <a:endParaRPr lang="it-IT" sz="1600" dirty="0">
-              <a:solidFill>
-                <a:schemeClr val="bg1">
-                  <a:lumMod val="50000"/>
-                </a:schemeClr>
-              </a:solidFill>
-              <a:latin typeface="Liberation Mono" panose="02070409020205020404" pitchFamily="49" charset="0"/>
-              <a:cs typeface="Liberation Mono" panose="02070409020205020404" pitchFamily="49" charset="0"/>
-            </a:endParaRPr>
-          </a:p>
-          <a:p>
-            <a:r>
-              <a:rPr lang="it-IT" sz="1600" dirty="0">
-                <a:solidFill>
-                  <a:schemeClr val="bg1">
-                    <a:lumMod val="50000"/>
-                  </a:schemeClr>
-                </a:solidFill>
-                <a:latin typeface="Liberation Mono" panose="02070409020205020404" pitchFamily="49" charset="0"/>
-                <a:cs typeface="Liberation Mono" panose="02070409020205020404" pitchFamily="49" charset="0"/>
-              </a:rPr>
               <a:t>[1] "PO"</a:t>
             </a:r>
           </a:p>
           <a:p>
-            <a:endParaRPr lang="it-IT" sz="1600" dirty="0">
-              <a:solidFill>
-                <a:schemeClr val="bg1">
-                  <a:lumMod val="50000"/>
-                </a:schemeClr>
-              </a:solidFill>
-              <a:latin typeface="Liberation Mono" panose="02070409020205020404" pitchFamily="49" charset="0"/>
-              <a:cs typeface="Liberation Mono" panose="02070409020205020404" pitchFamily="49" charset="0"/>
-            </a:endParaRPr>
-          </a:p>
-          <a:p>
-            <a:r>
-              <a:rPr lang="it-IT" sz="1600" dirty="0">
-                <a:solidFill>
-                  <a:schemeClr val="bg1">
-                    <a:lumMod val="50000"/>
-                  </a:schemeClr>
-                </a:solidFill>
-                <a:latin typeface="Liberation Mono" panose="02070409020205020404" pitchFamily="49" charset="0"/>
-                <a:cs typeface="Liberation Mono" panose="02070409020205020404" pitchFamily="49" charset="0"/>
-              </a:rPr>
-              <a:t>$random</a:t>
-            </a:r>
-          </a:p>
-          <a:p>
-            <a:r>
-              <a:rPr lang="it-IT" sz="1600" dirty="0">
-                <a:solidFill>
-                  <a:schemeClr val="bg1">
-                    <a:lumMod val="50000"/>
-                  </a:schemeClr>
-                </a:solidFill>
-                <a:latin typeface="Liberation Mono" panose="02070409020205020404" pitchFamily="49" charset="0"/>
-                <a:cs typeface="Liberation Mono" panose="02070409020205020404" pitchFamily="49" charset="0"/>
-              </a:rPr>
-              <a:t>[1] "</a:t>
-            </a:r>
-            <a:r>
-              <a:rPr lang="it-IT" sz="1600" dirty="0" err="1">
-                <a:solidFill>
-                  <a:schemeClr val="bg1">
-                    <a:lumMod val="50000"/>
-                  </a:schemeClr>
-                </a:solidFill>
-                <a:latin typeface="Liberation Mono" panose="02070409020205020404" pitchFamily="49" charset="0"/>
-                <a:cs typeface="Liberation Mono" panose="02070409020205020404" pitchFamily="49" charset="0"/>
-              </a:rPr>
-              <a:t>FSfamily</a:t>
-            </a:r>
-            <a:r>
-              <a:rPr lang="it-IT" sz="1600" dirty="0">
-                <a:solidFill>
-                  <a:schemeClr val="bg1">
-                    <a:lumMod val="50000"/>
-                  </a:schemeClr>
-                </a:solidFill>
-                <a:latin typeface="Liberation Mono" panose="02070409020205020404" pitchFamily="49" charset="0"/>
-                <a:cs typeface="Liberation Mono" panose="02070409020205020404" pitchFamily="49" charset="0"/>
-              </a:rPr>
-              <a:t>"</a:t>
-            </a:r>
             <a:endParaRPr lang="en-US" sz="1600" dirty="0">
               <a:solidFill>
                 <a:schemeClr val="bg1">
@@ -8730,6 +8590,97 @@
               <a:latin typeface="Liberation Mono" panose="02070409020205020404" pitchFamily="49" charset="0"/>
               <a:cs typeface="Liberation Mono" panose="02070409020205020404" pitchFamily="49" charset="0"/>
             </a:endParaRPr>
+          </a:p>
+          <a:p>
+            <a:r>
+              <a:rPr lang="en-US" sz="1600" dirty="0">
+                <a:solidFill>
+                  <a:schemeClr val="bg1">
+                    <a:lumMod val="50000"/>
+                  </a:schemeClr>
+                </a:solidFill>
+                <a:latin typeface="Liberation Mono" panose="02070409020205020404" pitchFamily="49" charset="0"/>
+                <a:cs typeface="Liberation Mono" panose="02070409020205020404" pitchFamily="49" charset="0"/>
+              </a:rPr>
+              <a:t>$conditional</a:t>
+            </a:r>
+          </a:p>
+          <a:p>
+            <a:r>
+              <a:rPr lang="en-US" sz="1600" dirty="0">
+                <a:solidFill>
+                  <a:schemeClr val="bg1">
+                    <a:lumMod val="50000"/>
+                  </a:schemeClr>
+                </a:solidFill>
+                <a:latin typeface="Liberation Mono" panose="02070409020205020404" pitchFamily="49" charset="0"/>
+                <a:cs typeface="Liberation Mono" panose="02070409020205020404" pitchFamily="49" charset="0"/>
+              </a:rPr>
+              <a:t>[1] 1</a:t>
+            </a:r>
+          </a:p>
+          <a:p>
+            <a:endParaRPr lang="en-US" sz="1600" dirty="0">
+              <a:solidFill>
+                <a:schemeClr val="bg1">
+                  <a:lumMod val="50000"/>
+                </a:schemeClr>
+              </a:solidFill>
+              <a:latin typeface="Liberation Mono" panose="02070409020205020404" pitchFamily="49" charset="0"/>
+              <a:cs typeface="Liberation Mono" panose="02070409020205020404" pitchFamily="49" charset="0"/>
+            </a:endParaRPr>
+          </a:p>
+          <a:p>
+            <a:r>
+              <a:rPr lang="en-US" sz="1600" dirty="0">
+                <a:solidFill>
+                  <a:schemeClr val="bg1">
+                    <a:lumMod val="50000"/>
+                  </a:schemeClr>
+                </a:solidFill>
+                <a:latin typeface="Liberation Mono" panose="02070409020205020404" pitchFamily="49" charset="0"/>
+                <a:cs typeface="Liberation Mono" panose="02070409020205020404" pitchFamily="49" charset="0"/>
+              </a:rPr>
+              <a:t>$random</a:t>
+            </a:r>
+          </a:p>
+          <a:p>
+            <a:r>
+              <a:rPr lang="en-US" sz="1600" dirty="0">
+                <a:solidFill>
+                  <a:schemeClr val="bg1">
+                    <a:lumMod val="50000"/>
+                  </a:schemeClr>
+                </a:solidFill>
+                <a:latin typeface="Liberation Mono" panose="02070409020205020404" pitchFamily="49" charset="0"/>
+                <a:cs typeface="Liberation Mono" panose="02070409020205020404" pitchFamily="49" charset="0"/>
+              </a:rPr>
+              <a:t>[1] "</a:t>
+            </a:r>
+            <a:r>
+              <a:rPr lang="en-US" sz="1600" dirty="0" err="1">
+                <a:solidFill>
+                  <a:schemeClr val="bg1">
+                    <a:lumMod val="50000"/>
+                  </a:schemeClr>
+                </a:solidFill>
+                <a:latin typeface="Liberation Mono" panose="02070409020205020404" pitchFamily="49" charset="0"/>
+                <a:cs typeface="Liberation Mono" panose="02070409020205020404" pitchFamily="49" charset="0"/>
+              </a:rPr>
+              <a:t>FSfamily</a:t>
+            </a:r>
+            <a:r>
+              <a:rPr lang="en-US" sz="1600" dirty="0">
+                <a:solidFill>
+                  <a:schemeClr val="bg1">
+                    <a:lumMod val="50000"/>
+                  </a:schemeClr>
+                </a:solidFill>
+                <a:latin typeface="Liberation Mono" panose="02070409020205020404" pitchFamily="49" charset="0"/>
+                <a:cs typeface="Liberation Mono" panose="02070409020205020404" pitchFamily="49" charset="0"/>
+              </a:rPr>
+              <a:t>"</a:t>
+            </a:r>
           </a:p>
         </p:txBody>
       </p:sp>
@@ -8934,7 +8885,7 @@
         <p:spPr>
           <a:xfrm>
             <a:off x="0" y="2421603"/>
-            <a:ext cx="5580112" cy="3418986"/>
+            <a:ext cx="5580112" cy="3665207"/>
           </a:xfrm>
           <a:prstGeom prst="rect">
             <a:avLst/>
@@ -9237,6 +9188,41 @@
               </a:rPr>
               <a:t>")</a:t>
             </a:r>
+          </a:p>
+          <a:p>
+            <a:r>
+              <a:rPr lang="en-US" sz="1600" dirty="0">
+                <a:solidFill>
+                  <a:schemeClr val="bg1">
+                    <a:lumMod val="50000"/>
+                  </a:schemeClr>
+                </a:solidFill>
+                <a:latin typeface="Liberation Mono" panose="02070409020205020404" pitchFamily="49" charset="0"/>
+                <a:cs typeface="Liberation Mono" panose="02070409020205020404" pitchFamily="49" charset="0"/>
+              </a:rPr>
+              <a:t>#&gt; $</a:t>
+            </a:r>
+            <a:r>
+              <a:rPr lang="en-US" sz="1600" dirty="0" err="1">
+                <a:solidFill>
+                  <a:schemeClr val="bg1">
+                    <a:lumMod val="50000"/>
+                  </a:schemeClr>
+                </a:solidFill>
+                <a:latin typeface="Liberation Mono" panose="02070409020205020404" pitchFamily="49" charset="0"/>
+                <a:cs typeface="Liberation Mono" panose="02070409020205020404" pitchFamily="49" charset="0"/>
+              </a:rPr>
+              <a:t>zero_inflated</a:t>
+            </a:r>
+            <a:endParaRPr lang="en-US" sz="1600" dirty="0">
+              <a:solidFill>
+                <a:schemeClr val="bg1">
+                  <a:lumMod val="50000"/>
+                </a:schemeClr>
+              </a:solidFill>
+              <a:latin typeface="Liberation Mono" panose="02070409020205020404" pitchFamily="49" charset="0"/>
+              <a:cs typeface="Liberation Mono" panose="02070409020205020404" pitchFamily="49" charset="0"/>
+            </a:endParaRPr>
           </a:p>
           <a:p>
             <a:r>

</xml_diff>

<commit_message>
Remastered the last slide
Emphasising the call for people :)
</commit_message>
<xml_diff>
--- a/presentations/2019-02_Hamburg_RUG/1902 Hamburg RUG easystats.pptx
+++ b/presentations/2019-02_Hamburg_RUG/1902 Hamburg RUG easystats.pptx
@@ -162,6 +162,32 @@
 </p:presentation>
 </file>
 
+<file path=ppt/commentAuthors.xml><?xml version="1.0" encoding="utf-8"?>
+<p:cmAuthorLst xmlns:a="http://schemas.openxmlformats.org/drawingml/2006/main" xmlns:r="http://schemas.openxmlformats.org/officeDocument/2006/relationships" xmlns:p="http://schemas.openxmlformats.org/presentationml/2006/main">
+  <p:cmAuthor id="1" name="Dominique Makowski" initials="DM" lastIdx="1" clrIdx="0">
+    <p:extLst>
+      <p:ext uri="{19B8F6BF-5375-455C-9EA6-DF929625EA0E}">
+        <p15:presenceInfo xmlns:p15="http://schemas.microsoft.com/office/powerpoint/2012/main" userId="Dominique Makowski" providerId="None"/>
+      </p:ext>
+    </p:extLst>
+  </p:cmAuthor>
+</p:cmAuthorLst>
+</file>
+
+<file path=ppt/comments/comment1.xml><?xml version="1.0" encoding="utf-8"?>
+<p:cmLst xmlns:a="http://schemas.openxmlformats.org/drawingml/2006/main" xmlns:r="http://schemas.openxmlformats.org/officeDocument/2006/relationships" xmlns:p="http://schemas.openxmlformats.org/presentationml/2006/main">
+  <p:cm authorId="1" dt="2019-02-05T11:23:20.247" idx="1">
+    <p:pos x="5749" y="3434"/>
+    <p:text>I love this ^^</p:text>
+    <p:extLst>
+      <p:ext uri="{C676402C-5697-4E1C-873F-D02D1690AC5C}">
+        <p15:threadingInfo xmlns:p15="http://schemas.microsoft.com/office/powerpoint/2012/main" timeZoneBias="-480"/>
+      </p:ext>
+    </p:extLst>
+  </p:cm>
+</p:cmLst>
+</file>
+
 <file path=ppt/handoutMasters/handoutMaster1.xml><?xml version="1.0" encoding="utf-8"?>
 <p:handoutMaster xmlns:a="http://schemas.openxmlformats.org/drawingml/2006/main" xmlns:r="http://schemas.openxmlformats.org/officeDocument/2006/relationships" xmlns:p="http://schemas.openxmlformats.org/presentationml/2006/main">
   <p:cSld>
@@ -213,7 +239,7 @@
           <a:p>
             <a:fld id="{64CA4326-4DC0-4DE5-99BF-3FA9D988CBE6}" type="datetimeFigureOut">
               <a:rPr lang="de-DE" smtClean="0"/>
-              <a:t>04.02.2019</a:t>
+              <a:t>05.02.2019</a:t>
             </a:fld>
             <a:endParaRPr lang="de-DE"/>
           </a:p>
@@ -248,7 +274,7 @@
           <a:p>
             <a:fld id="{25D4252A-4900-4D85-B593-53E6A0B88F95}" type="slidenum">
               <a:rPr lang="de-DE" smtClean="0"/>
-              <a:t>‹Nr.›</a:t>
+              <a:t>‹#›</a:t>
             </a:fld>
             <a:endParaRPr lang="de-DE"/>
           </a:p>
@@ -346,7 +372,7 @@
           <a:p>
             <a:fld id="{0E08E2FD-2E15-419A-B356-6759EA05D2AD}" type="datetimeFigureOut">
               <a:rPr lang="de-DE" smtClean="0"/>
-              <a:t>04.02.2019</a:t>
+              <a:t>05.02.2019</a:t>
             </a:fld>
             <a:endParaRPr lang="de-DE"/>
           </a:p>
@@ -381,7 +407,7 @@
           <a:p>
             <a:fld id="{1A462253-0743-4BED-963B-09485C413053}" type="slidenum">
               <a:rPr lang="de-DE" smtClean="0"/>
-              <a:t>‹Nr.›</a:t>
+              <a:t>‹#›</a:t>
             </a:fld>
             <a:endParaRPr lang="de-DE"/>
           </a:p>
@@ -1075,7 +1101,7 @@
           <a:noFill/>
           <a:extLst>
             <a:ext uri="{909E8E84-426E-40dd-AFC4-6F175D3DCCD1}">
-              <a14:hiddenFill xmlns:a14="http://schemas.microsoft.com/office/drawing/2010/main" xmlns="">
+              <a14:hiddenFill xmlns="" xmlns:a14="http://schemas.microsoft.com/office/drawing/2010/main">
                 <a:solidFill>
                   <a:srgbClr val="FFFFFF"/>
                 </a:solidFill>
@@ -1116,7 +1142,7 @@
           <a:noFill/>
           <a:extLst>
             <a:ext uri="{909E8E84-426E-40dd-AFC4-6F175D3DCCD1}">
-              <a14:hiddenFill xmlns:a14="http://schemas.microsoft.com/office/drawing/2010/main" xmlns="">
+              <a14:hiddenFill xmlns="" xmlns:a14="http://schemas.microsoft.com/office/drawing/2010/main">
                 <a:solidFill>
                   <a:srgbClr val="FFFFFF"/>
                 </a:solidFill>
@@ -1765,7 +1791,7 @@
           <a:noFill/>
           <a:extLst>
             <a:ext uri="{909E8E84-426E-40dd-AFC4-6F175D3DCCD1}">
-              <a14:hiddenFill xmlns:a14="http://schemas.microsoft.com/office/drawing/2010/main" xmlns="">
+              <a14:hiddenFill xmlns="" xmlns:a14="http://schemas.microsoft.com/office/drawing/2010/main">
                 <a:solidFill>
                   <a:srgbClr val="FFFFFF"/>
                 </a:solidFill>
@@ -1806,7 +1832,7 @@
           <a:noFill/>
           <a:extLst>
             <a:ext uri="{909E8E84-426E-40dd-AFC4-6F175D3DCCD1}">
-              <a14:hiddenFill xmlns:a14="http://schemas.microsoft.com/office/drawing/2010/main" xmlns="">
+              <a14:hiddenFill xmlns="" xmlns:a14="http://schemas.microsoft.com/office/drawing/2010/main">
                 <a:solidFill>
                   <a:srgbClr val="FFFFFF"/>
                 </a:solidFill>
@@ -3995,7 +4021,7 @@
             <a:fld id="{112C73B6-0EF5-4EF5-9AF7-6CC9A067761C}" type="slidenum">
               <a:rPr lang="de-DE" smtClean="0"/>
               <a:pPr/>
-              <a:t>‹Nr.›</a:t>
+              <a:t>‹#›</a:t>
             </a:fld>
             <a:endParaRPr lang="de-DE" dirty="0"/>
           </a:p>
@@ -4507,7 +4533,7 @@
             <a:fld id="{112C73B6-0EF5-4EF5-9AF7-6CC9A067761C}" type="slidenum">
               <a:rPr lang="de-DE" smtClean="0"/>
               <a:pPr/>
-              <a:t>‹Nr.›</a:t>
+              <a:t>‹#›</a:t>
             </a:fld>
             <a:endParaRPr lang="de-DE" dirty="0"/>
           </a:p>
@@ -5196,13 +5222,6 @@
   <p:clrMapOvr>
     <a:masterClrMapping/>
   </p:clrMapOvr>
-  <p:timing>
-    <p:tnLst>
-      <p:par>
-        <p:cTn id="1" dur="indefinite" restart="never" nodeType="tmRoot"/>
-      </p:par>
-    </p:tnLst>
-  </p:timing>
 </p:sld>
 </file>
 
@@ -5228,7 +5247,7 @@
           <p:cNvPr id="4" name="Fußzeilenplatzhalter 3">
             <a:extLst>
               <a:ext uri="{FF2B5EF4-FFF2-40B4-BE49-F238E27FC236}">
-                <a16:creationId xmlns:a16="http://schemas.microsoft.com/office/drawing/2014/main" xmlns="" id="{0FC0C19D-1682-4679-8E1E-D2E399E12164}"/>
+                <a16:creationId xmlns:a16="http://schemas.microsoft.com/office/drawing/2014/main" id="{0FC0C19D-1682-4679-8E1E-D2E399E12164}"/>
               </a:ext>
             </a:extLst>
           </p:cNvPr>
@@ -5269,7 +5288,7 @@
           <p:cNvPr id="6" name="Titel 5">
             <a:extLst>
               <a:ext uri="{FF2B5EF4-FFF2-40B4-BE49-F238E27FC236}">
-                <a16:creationId xmlns:a16="http://schemas.microsoft.com/office/drawing/2014/main" xmlns="" id="{F945D4CE-7FAD-45BF-A641-06AE09C0EF93}"/>
+                <a16:creationId xmlns:a16="http://schemas.microsoft.com/office/drawing/2014/main" id="{F945D4CE-7FAD-45BF-A641-06AE09C0EF93}"/>
               </a:ext>
             </a:extLst>
           </p:cNvPr>
@@ -5318,7 +5337,7 @@
           <p:cNvPr id="9" name="Textfeld 8">
             <a:extLst>
               <a:ext uri="{FF2B5EF4-FFF2-40B4-BE49-F238E27FC236}">
-                <a16:creationId xmlns:a16="http://schemas.microsoft.com/office/drawing/2014/main" xmlns="" id="{5BB6C03E-B970-4FA5-83BD-DA2E462C35A1}"/>
+                <a16:creationId xmlns:a16="http://schemas.microsoft.com/office/drawing/2014/main" id="{5BB6C03E-B970-4FA5-83BD-DA2E462C35A1}"/>
               </a:ext>
             </a:extLst>
           </p:cNvPr>
@@ -5504,7 +5523,7 @@
           <p:cNvPr id="3" name="Inhaltsplatzhalter 2">
             <a:extLst>
               <a:ext uri="{FF2B5EF4-FFF2-40B4-BE49-F238E27FC236}">
-                <a16:creationId xmlns:a16="http://schemas.microsoft.com/office/drawing/2014/main" xmlns="" id="{8AFA4034-B74C-496E-BC01-CDF31F1FC067}"/>
+                <a16:creationId xmlns:a16="http://schemas.microsoft.com/office/drawing/2014/main" id="{8AFA4034-B74C-496E-BC01-CDF31F1FC067}"/>
               </a:ext>
             </a:extLst>
           </p:cNvPr>
@@ -5569,7 +5588,7 @@
           <p:cNvPr id="4" name="Fußzeilenplatzhalter 3">
             <a:extLst>
               <a:ext uri="{FF2B5EF4-FFF2-40B4-BE49-F238E27FC236}">
-                <a16:creationId xmlns:a16="http://schemas.microsoft.com/office/drawing/2014/main" xmlns="" id="{0FC0C19D-1682-4679-8E1E-D2E399E12164}"/>
+                <a16:creationId xmlns:a16="http://schemas.microsoft.com/office/drawing/2014/main" id="{0FC0C19D-1682-4679-8E1E-D2E399E12164}"/>
               </a:ext>
             </a:extLst>
           </p:cNvPr>
@@ -5610,7 +5629,7 @@
           <p:cNvPr id="6" name="Titel 5">
             <a:extLst>
               <a:ext uri="{FF2B5EF4-FFF2-40B4-BE49-F238E27FC236}">
-                <a16:creationId xmlns:a16="http://schemas.microsoft.com/office/drawing/2014/main" xmlns="" id="{F945D4CE-7FAD-45BF-A641-06AE09C0EF93}"/>
+                <a16:creationId xmlns:a16="http://schemas.microsoft.com/office/drawing/2014/main" id="{F945D4CE-7FAD-45BF-A641-06AE09C0EF93}"/>
               </a:ext>
             </a:extLst>
           </p:cNvPr>
@@ -5659,7 +5678,7 @@
           <p:cNvPr id="9" name="Textfeld 8">
             <a:extLst>
               <a:ext uri="{FF2B5EF4-FFF2-40B4-BE49-F238E27FC236}">
-                <a16:creationId xmlns:a16="http://schemas.microsoft.com/office/drawing/2014/main" xmlns="" id="{5BB6C03E-B970-4FA5-83BD-DA2E462C35A1}"/>
+                <a16:creationId xmlns:a16="http://schemas.microsoft.com/office/drawing/2014/main" id="{5BB6C03E-B970-4FA5-83BD-DA2E462C35A1}"/>
               </a:ext>
             </a:extLst>
           </p:cNvPr>
@@ -5908,7 +5927,7 @@
           <p:cNvPr id="7" name="Inhaltsplatzhalter 6">
             <a:extLst>
               <a:ext uri="{FF2B5EF4-FFF2-40B4-BE49-F238E27FC236}">
-                <a16:creationId xmlns:a16="http://schemas.microsoft.com/office/drawing/2014/main" xmlns="" id="{ACC88CA9-43D9-4EC7-8353-01A2FA0A05D7}"/>
+                <a16:creationId xmlns:a16="http://schemas.microsoft.com/office/drawing/2014/main" id="{ACC88CA9-43D9-4EC7-8353-01A2FA0A05D7}"/>
               </a:ext>
             </a:extLst>
           </p:cNvPr>
@@ -5933,7 +5952,7 @@
           <p:cNvPr id="10" name="Inhaltsplatzhalter 2">
             <a:extLst>
               <a:ext uri="{FF2B5EF4-FFF2-40B4-BE49-F238E27FC236}">
-                <a16:creationId xmlns:a16="http://schemas.microsoft.com/office/drawing/2014/main" xmlns="" id="{7642EB22-60DE-4FC9-8D6E-8C945326D4BC}"/>
+                <a16:creationId xmlns:a16="http://schemas.microsoft.com/office/drawing/2014/main" id="{7642EB22-60DE-4FC9-8D6E-8C945326D4BC}"/>
               </a:ext>
             </a:extLst>
           </p:cNvPr>
@@ -5999,7 +6018,7 @@
           <p:cNvPr id="4" name="Fußzeilenplatzhalter 3">
             <a:extLst>
               <a:ext uri="{FF2B5EF4-FFF2-40B4-BE49-F238E27FC236}">
-                <a16:creationId xmlns:a16="http://schemas.microsoft.com/office/drawing/2014/main" xmlns="" id="{0FC0C19D-1682-4679-8E1E-D2E399E12164}"/>
+                <a16:creationId xmlns:a16="http://schemas.microsoft.com/office/drawing/2014/main" id="{0FC0C19D-1682-4679-8E1E-D2E399E12164}"/>
               </a:ext>
             </a:extLst>
           </p:cNvPr>
@@ -6033,7 +6052,7 @@
           <p:cNvPr id="6" name="Titel 5">
             <a:extLst>
               <a:ext uri="{FF2B5EF4-FFF2-40B4-BE49-F238E27FC236}">
-                <a16:creationId xmlns:a16="http://schemas.microsoft.com/office/drawing/2014/main" xmlns="" id="{F945D4CE-7FAD-45BF-A641-06AE09C0EF93}"/>
+                <a16:creationId xmlns:a16="http://schemas.microsoft.com/office/drawing/2014/main" id="{F945D4CE-7FAD-45BF-A641-06AE09C0EF93}"/>
               </a:ext>
             </a:extLst>
           </p:cNvPr>
@@ -6082,7 +6101,7 @@
           <p:cNvPr id="9" name="Textfeld 8">
             <a:extLst>
               <a:ext uri="{FF2B5EF4-FFF2-40B4-BE49-F238E27FC236}">
-                <a16:creationId xmlns:a16="http://schemas.microsoft.com/office/drawing/2014/main" xmlns="" id="{5BB6C03E-B970-4FA5-83BD-DA2E462C35A1}"/>
+                <a16:creationId xmlns:a16="http://schemas.microsoft.com/office/drawing/2014/main" id="{5BB6C03E-B970-4FA5-83BD-DA2E462C35A1}"/>
               </a:ext>
             </a:extLst>
           </p:cNvPr>
@@ -6454,7 +6473,7 @@
           <p:cNvPr id="7" name="Inhaltsplatzhalter 6">
             <a:extLst>
               <a:ext uri="{FF2B5EF4-FFF2-40B4-BE49-F238E27FC236}">
-                <a16:creationId xmlns:a16="http://schemas.microsoft.com/office/drawing/2014/main" xmlns="" id="{8A35C46B-6FA1-4FA7-8603-FE979BA7FE3E}"/>
+                <a16:creationId xmlns:a16="http://schemas.microsoft.com/office/drawing/2014/main" id="{8A35C46B-6FA1-4FA7-8603-FE979BA7FE3E}"/>
               </a:ext>
             </a:extLst>
           </p:cNvPr>
@@ -6479,7 +6498,7 @@
           <p:cNvPr id="10" name="Inhaltsplatzhalter 2">
             <a:extLst>
               <a:ext uri="{FF2B5EF4-FFF2-40B4-BE49-F238E27FC236}">
-                <a16:creationId xmlns:a16="http://schemas.microsoft.com/office/drawing/2014/main" xmlns="" id="{2AAA0C88-246A-47B1-8154-75B0D77D2311}"/>
+                <a16:creationId xmlns:a16="http://schemas.microsoft.com/office/drawing/2014/main" id="{2AAA0C88-246A-47B1-8154-75B0D77D2311}"/>
               </a:ext>
             </a:extLst>
           </p:cNvPr>
@@ -6545,7 +6564,7 @@
           <p:cNvPr id="5" name="Textplatzhalter 4">
             <a:extLst>
               <a:ext uri="{FF2B5EF4-FFF2-40B4-BE49-F238E27FC236}">
-                <a16:creationId xmlns:a16="http://schemas.microsoft.com/office/drawing/2014/main" xmlns="" id="{67DE0ECA-5E5C-43D9-A4C4-B3A31EB20E63}"/>
+                <a16:creationId xmlns:a16="http://schemas.microsoft.com/office/drawing/2014/main" id="{67DE0ECA-5E5C-43D9-A4C4-B3A31EB20E63}"/>
               </a:ext>
             </a:extLst>
           </p:cNvPr>
@@ -6580,7 +6599,7 @@
           <p:cNvPr id="3" name="Grafik 2">
             <a:extLst>
               <a:ext uri="{FF2B5EF4-FFF2-40B4-BE49-F238E27FC236}">
-                <a16:creationId xmlns:a16="http://schemas.microsoft.com/office/drawing/2014/main" xmlns="" id="{99510B2A-C3A7-4CD7-A56D-FB23433FFE9C}"/>
+                <a16:creationId xmlns:a16="http://schemas.microsoft.com/office/drawing/2014/main" id="{99510B2A-C3A7-4CD7-A56D-FB23433FFE9C}"/>
               </a:ext>
             </a:extLst>
           </p:cNvPr>
@@ -6646,7 +6665,7 @@
           <p:cNvPr id="13" name="Grafik 12">
             <a:extLst>
               <a:ext uri="{FF2B5EF4-FFF2-40B4-BE49-F238E27FC236}">
-                <a16:creationId xmlns:a16="http://schemas.microsoft.com/office/drawing/2014/main" xmlns="" id="{FF895708-38EE-4371-8B22-E82F604061DE}"/>
+                <a16:creationId xmlns:a16="http://schemas.microsoft.com/office/drawing/2014/main" id="{FF895708-38EE-4371-8B22-E82F604061DE}"/>
               </a:ext>
             </a:extLst>
           </p:cNvPr>
@@ -6682,7 +6701,7 @@
           <p:cNvPr id="2" name="Inhaltsplatzhalter 1">
             <a:extLst>
               <a:ext uri="{FF2B5EF4-FFF2-40B4-BE49-F238E27FC236}">
-                <a16:creationId xmlns:a16="http://schemas.microsoft.com/office/drawing/2014/main" xmlns="" id="{917F168F-F8CE-4DD4-BCEA-59877FE06ABD}"/>
+                <a16:creationId xmlns:a16="http://schemas.microsoft.com/office/drawing/2014/main" id="{917F168F-F8CE-4DD4-BCEA-59877FE06ABD}"/>
               </a:ext>
             </a:extLst>
           </p:cNvPr>
@@ -6734,7 +6753,7 @@
           <p:cNvPr id="4" name="Fußzeilenplatzhalter 3">
             <a:extLst>
               <a:ext uri="{FF2B5EF4-FFF2-40B4-BE49-F238E27FC236}">
-                <a16:creationId xmlns:a16="http://schemas.microsoft.com/office/drawing/2014/main" xmlns="" id="{252315B1-7337-4C45-8A5C-CBD6F1F21BA3}"/>
+                <a16:creationId xmlns:a16="http://schemas.microsoft.com/office/drawing/2014/main" id="{252315B1-7337-4C45-8A5C-CBD6F1F21BA3}"/>
               </a:ext>
             </a:extLst>
           </p:cNvPr>
@@ -6768,7 +6787,7 @@
           <p:cNvPr id="6" name="Titel 5">
             <a:extLst>
               <a:ext uri="{FF2B5EF4-FFF2-40B4-BE49-F238E27FC236}">
-                <a16:creationId xmlns:a16="http://schemas.microsoft.com/office/drawing/2014/main" xmlns="" id="{E88D0AAF-755E-438D-A419-21BAF2BB4EB7}"/>
+                <a16:creationId xmlns:a16="http://schemas.microsoft.com/office/drawing/2014/main" id="{E88D0AAF-755E-438D-A419-21BAF2BB4EB7}"/>
               </a:ext>
             </a:extLst>
           </p:cNvPr>
@@ -6799,7 +6818,7 @@
           <p:cNvPr id="5" name="Inhaltsplatzhalter 4">
             <a:extLst>
               <a:ext uri="{FF2B5EF4-FFF2-40B4-BE49-F238E27FC236}">
-                <a16:creationId xmlns:a16="http://schemas.microsoft.com/office/drawing/2014/main" xmlns="" id="{0D920E20-9C3B-45F7-B7DF-E0C531E13B05}"/>
+                <a16:creationId xmlns:a16="http://schemas.microsoft.com/office/drawing/2014/main" id="{0D920E20-9C3B-45F7-B7DF-E0C531E13B05}"/>
               </a:ext>
             </a:extLst>
           </p:cNvPr>
@@ -6834,7 +6853,7 @@
           <p:cNvPr id="10" name="Rechteck 9">
             <a:extLst>
               <a:ext uri="{FF2B5EF4-FFF2-40B4-BE49-F238E27FC236}">
-                <a16:creationId xmlns:a16="http://schemas.microsoft.com/office/drawing/2014/main" xmlns="" id="{EB7FEFC9-05FF-4A8D-B810-D4F75C09ADAD}"/>
+                <a16:creationId xmlns:a16="http://schemas.microsoft.com/office/drawing/2014/main" id="{EB7FEFC9-05FF-4A8D-B810-D4F75C09ADAD}"/>
               </a:ext>
             </a:extLst>
           </p:cNvPr>
@@ -6954,7 +6973,7 @@
           <p:cNvPr id="11" name="Rechteck 10">
             <a:extLst>
               <a:ext uri="{FF2B5EF4-FFF2-40B4-BE49-F238E27FC236}">
-                <a16:creationId xmlns:a16="http://schemas.microsoft.com/office/drawing/2014/main" xmlns="" id="{2AEA2081-5C64-4D74-A8A5-C8EE9250A2BE}"/>
+                <a16:creationId xmlns:a16="http://schemas.microsoft.com/office/drawing/2014/main" id="{2AEA2081-5C64-4D74-A8A5-C8EE9250A2BE}"/>
               </a:ext>
             </a:extLst>
           </p:cNvPr>
@@ -7104,7 +7123,7 @@
           <p:cNvPr id="13" name="Grafik 12">
             <a:extLst>
               <a:ext uri="{FF2B5EF4-FFF2-40B4-BE49-F238E27FC236}">
-                <a16:creationId xmlns:a16="http://schemas.microsoft.com/office/drawing/2014/main" xmlns="" id="{FF895708-38EE-4371-8B22-E82F604061DE}"/>
+                <a16:creationId xmlns:a16="http://schemas.microsoft.com/office/drawing/2014/main" id="{FF895708-38EE-4371-8B22-E82F604061DE}"/>
               </a:ext>
             </a:extLst>
           </p:cNvPr>
@@ -7140,7 +7159,7 @@
           <p:cNvPr id="2" name="Inhaltsplatzhalter 1">
             <a:extLst>
               <a:ext uri="{FF2B5EF4-FFF2-40B4-BE49-F238E27FC236}">
-                <a16:creationId xmlns:a16="http://schemas.microsoft.com/office/drawing/2014/main" xmlns="" id="{917F168F-F8CE-4DD4-BCEA-59877FE06ABD}"/>
+                <a16:creationId xmlns:a16="http://schemas.microsoft.com/office/drawing/2014/main" id="{917F168F-F8CE-4DD4-BCEA-59877FE06ABD}"/>
               </a:ext>
             </a:extLst>
           </p:cNvPr>
@@ -7197,7 +7216,7 @@
           <p:cNvPr id="4" name="Fußzeilenplatzhalter 3">
             <a:extLst>
               <a:ext uri="{FF2B5EF4-FFF2-40B4-BE49-F238E27FC236}">
-                <a16:creationId xmlns:a16="http://schemas.microsoft.com/office/drawing/2014/main" xmlns="" id="{252315B1-7337-4C45-8A5C-CBD6F1F21BA3}"/>
+                <a16:creationId xmlns:a16="http://schemas.microsoft.com/office/drawing/2014/main" id="{252315B1-7337-4C45-8A5C-CBD6F1F21BA3}"/>
               </a:ext>
             </a:extLst>
           </p:cNvPr>
@@ -7231,7 +7250,7 @@
           <p:cNvPr id="6" name="Titel 5">
             <a:extLst>
               <a:ext uri="{FF2B5EF4-FFF2-40B4-BE49-F238E27FC236}">
-                <a16:creationId xmlns:a16="http://schemas.microsoft.com/office/drawing/2014/main" xmlns="" id="{E88D0AAF-755E-438D-A419-21BAF2BB4EB7}"/>
+                <a16:creationId xmlns:a16="http://schemas.microsoft.com/office/drawing/2014/main" id="{E88D0AAF-755E-438D-A419-21BAF2BB4EB7}"/>
               </a:ext>
             </a:extLst>
           </p:cNvPr>
@@ -7262,7 +7281,7 @@
           <p:cNvPr id="5" name="Inhaltsplatzhalter 4">
             <a:extLst>
               <a:ext uri="{FF2B5EF4-FFF2-40B4-BE49-F238E27FC236}">
-                <a16:creationId xmlns:a16="http://schemas.microsoft.com/office/drawing/2014/main" xmlns="" id="{0D920E20-9C3B-45F7-B7DF-E0C531E13B05}"/>
+                <a16:creationId xmlns:a16="http://schemas.microsoft.com/office/drawing/2014/main" id="{0D920E20-9C3B-45F7-B7DF-E0C531E13B05}"/>
               </a:ext>
             </a:extLst>
           </p:cNvPr>
@@ -7297,7 +7316,7 @@
           <p:cNvPr id="10" name="Rechteck 9">
             <a:extLst>
               <a:ext uri="{FF2B5EF4-FFF2-40B4-BE49-F238E27FC236}">
-                <a16:creationId xmlns:a16="http://schemas.microsoft.com/office/drawing/2014/main" xmlns="" id="{EB7FEFC9-05FF-4A8D-B810-D4F75C09ADAD}"/>
+                <a16:creationId xmlns:a16="http://schemas.microsoft.com/office/drawing/2014/main" id="{EB7FEFC9-05FF-4A8D-B810-D4F75C09ADAD}"/>
               </a:ext>
             </a:extLst>
           </p:cNvPr>
@@ -7417,7 +7436,7 @@
           <p:cNvPr id="11" name="Rechteck 10">
             <a:extLst>
               <a:ext uri="{FF2B5EF4-FFF2-40B4-BE49-F238E27FC236}">
-                <a16:creationId xmlns:a16="http://schemas.microsoft.com/office/drawing/2014/main" xmlns="" id="{2AEA2081-5C64-4D74-A8A5-C8EE9250A2BE}"/>
+                <a16:creationId xmlns:a16="http://schemas.microsoft.com/office/drawing/2014/main" id="{2AEA2081-5C64-4D74-A8A5-C8EE9250A2BE}"/>
               </a:ext>
             </a:extLst>
           </p:cNvPr>
@@ -7567,7 +7586,7 @@
           <p:cNvPr id="2" name="Inhaltsplatzhalter 1">
             <a:extLst>
               <a:ext uri="{FF2B5EF4-FFF2-40B4-BE49-F238E27FC236}">
-                <a16:creationId xmlns:a16="http://schemas.microsoft.com/office/drawing/2014/main" xmlns="" id="{9EEF70E0-DC88-48AD-8EF7-031F96353D1D}"/>
+                <a16:creationId xmlns:a16="http://schemas.microsoft.com/office/drawing/2014/main" id="{9EEF70E0-DC88-48AD-8EF7-031F96353D1D}"/>
               </a:ext>
             </a:extLst>
           </p:cNvPr>
@@ -7618,15 +7637,7 @@
           <a:p>
             <a:r>
               <a:rPr lang="en-US" dirty="0"/>
-              <a:t>Although there are generic functions to get information and data from models, many modelling-functions from different packages do not provide </a:t>
-            </a:r>
-            <a:r>
-              <a:rPr lang="en-US" dirty="0" smtClean="0"/>
-              <a:t>such methods </a:t>
-            </a:r>
-            <a:r>
-              <a:rPr lang="en-US" dirty="0"/>
-              <a:t>to access these information.</a:t>
+              <a:t>Although there are generic functions to get information and data from models, many modelling-functions from different packages do not provide such methods to access these information.</a:t>
             </a:r>
           </a:p>
           <a:p>
@@ -7668,7 +7679,7 @@
           <p:cNvPr id="4" name="Fußzeilenplatzhalter 3">
             <a:extLst>
               <a:ext uri="{FF2B5EF4-FFF2-40B4-BE49-F238E27FC236}">
-                <a16:creationId xmlns:a16="http://schemas.microsoft.com/office/drawing/2014/main" xmlns="" id="{51B427D6-C78C-4800-A708-8DE04DA34FAA}"/>
+                <a16:creationId xmlns:a16="http://schemas.microsoft.com/office/drawing/2014/main" id="{51B427D6-C78C-4800-A708-8DE04DA34FAA}"/>
               </a:ext>
             </a:extLst>
           </p:cNvPr>
@@ -7709,7 +7720,7 @@
           <p:cNvPr id="6" name="Titel 5">
             <a:extLst>
               <a:ext uri="{FF2B5EF4-FFF2-40B4-BE49-F238E27FC236}">
-                <a16:creationId xmlns:a16="http://schemas.microsoft.com/office/drawing/2014/main" xmlns="" id="{4ACCE5D5-075E-481D-B9C5-A3074B841447}"/>
+                <a16:creationId xmlns:a16="http://schemas.microsoft.com/office/drawing/2014/main" id="{4ACCE5D5-075E-481D-B9C5-A3074B841447}"/>
               </a:ext>
             </a:extLst>
           </p:cNvPr>
@@ -7738,7 +7749,7 @@
           <p:cNvPr id="7" name="Inhaltsplatzhalter 6">
             <a:extLst>
               <a:ext uri="{FF2B5EF4-FFF2-40B4-BE49-F238E27FC236}">
-                <a16:creationId xmlns:a16="http://schemas.microsoft.com/office/drawing/2014/main" xmlns="" id="{91EE5F19-F06C-41B0-A917-E9959AFBDF9F}"/>
+                <a16:creationId xmlns:a16="http://schemas.microsoft.com/office/drawing/2014/main" id="{91EE5F19-F06C-41B0-A917-E9959AFBDF9F}"/>
               </a:ext>
             </a:extLst>
           </p:cNvPr>
@@ -7793,7 +7804,7 @@
           <p:cNvPr id="4" name="Fußzeilenplatzhalter 3">
             <a:extLst>
               <a:ext uri="{FF2B5EF4-FFF2-40B4-BE49-F238E27FC236}">
-                <a16:creationId xmlns:a16="http://schemas.microsoft.com/office/drawing/2014/main" xmlns="" id="{0FC0C19D-1682-4679-8E1E-D2E399E12164}"/>
+                <a16:creationId xmlns:a16="http://schemas.microsoft.com/office/drawing/2014/main" id="{0FC0C19D-1682-4679-8E1E-D2E399E12164}"/>
               </a:ext>
             </a:extLst>
           </p:cNvPr>
@@ -7827,7 +7838,7 @@
           <p:cNvPr id="6" name="Titel 5">
             <a:extLst>
               <a:ext uri="{FF2B5EF4-FFF2-40B4-BE49-F238E27FC236}">
-                <a16:creationId xmlns:a16="http://schemas.microsoft.com/office/drawing/2014/main" xmlns="" id="{F945D4CE-7FAD-45BF-A641-06AE09C0EF93}"/>
+                <a16:creationId xmlns:a16="http://schemas.microsoft.com/office/drawing/2014/main" id="{F945D4CE-7FAD-45BF-A641-06AE09C0EF93}"/>
               </a:ext>
             </a:extLst>
           </p:cNvPr>
@@ -7888,7 +7899,7 @@
           <p:cNvPr id="9" name="Textfeld 8">
             <a:extLst>
               <a:ext uri="{FF2B5EF4-FFF2-40B4-BE49-F238E27FC236}">
-                <a16:creationId xmlns:a16="http://schemas.microsoft.com/office/drawing/2014/main" xmlns="" id="{5BB6C03E-B970-4FA5-83BD-DA2E462C35A1}"/>
+                <a16:creationId xmlns:a16="http://schemas.microsoft.com/office/drawing/2014/main" id="{5BB6C03E-B970-4FA5-83BD-DA2E462C35A1}"/>
               </a:ext>
             </a:extLst>
           </p:cNvPr>
@@ -8126,7 +8137,7 @@
           <p:cNvPr id="3" name="Inhaltsplatzhalter 2">
             <a:extLst>
               <a:ext uri="{FF2B5EF4-FFF2-40B4-BE49-F238E27FC236}">
-                <a16:creationId xmlns:a16="http://schemas.microsoft.com/office/drawing/2014/main" xmlns="" id="{CEF85EFD-AB38-43A6-87C8-FCB2B77AE55F}"/>
+                <a16:creationId xmlns:a16="http://schemas.microsoft.com/office/drawing/2014/main" id="{CEF85EFD-AB38-43A6-87C8-FCB2B77AE55F}"/>
               </a:ext>
             </a:extLst>
           </p:cNvPr>
@@ -8191,7 +8202,7 @@
           <p:cNvPr id="4" name="Fußzeilenplatzhalter 3">
             <a:extLst>
               <a:ext uri="{FF2B5EF4-FFF2-40B4-BE49-F238E27FC236}">
-                <a16:creationId xmlns:a16="http://schemas.microsoft.com/office/drawing/2014/main" xmlns="" id="{0FC0C19D-1682-4679-8E1E-D2E399E12164}"/>
+                <a16:creationId xmlns:a16="http://schemas.microsoft.com/office/drawing/2014/main" id="{0FC0C19D-1682-4679-8E1E-D2E399E12164}"/>
               </a:ext>
             </a:extLst>
           </p:cNvPr>
@@ -8225,7 +8236,7 @@
           <p:cNvPr id="6" name="Titel 5">
             <a:extLst>
               <a:ext uri="{FF2B5EF4-FFF2-40B4-BE49-F238E27FC236}">
-                <a16:creationId xmlns:a16="http://schemas.microsoft.com/office/drawing/2014/main" xmlns="" id="{F945D4CE-7FAD-45BF-A641-06AE09C0EF93}"/>
+                <a16:creationId xmlns:a16="http://schemas.microsoft.com/office/drawing/2014/main" id="{F945D4CE-7FAD-45BF-A641-06AE09C0EF93}"/>
               </a:ext>
             </a:extLst>
           </p:cNvPr>
@@ -8286,7 +8297,7 @@
           <p:cNvPr id="9" name="Textfeld 8">
             <a:extLst>
               <a:ext uri="{FF2B5EF4-FFF2-40B4-BE49-F238E27FC236}">
-                <a16:creationId xmlns:a16="http://schemas.microsoft.com/office/drawing/2014/main" xmlns="" id="{5BB6C03E-B970-4FA5-83BD-DA2E462C35A1}"/>
+                <a16:creationId xmlns:a16="http://schemas.microsoft.com/office/drawing/2014/main" id="{5BB6C03E-B970-4FA5-83BD-DA2E462C35A1}"/>
               </a:ext>
             </a:extLst>
           </p:cNvPr>
@@ -8704,7 +8715,7 @@
           <p:cNvPr id="7" name="Inhaltsplatzhalter 6">
             <a:extLst>
               <a:ext uri="{FF2B5EF4-FFF2-40B4-BE49-F238E27FC236}">
-                <a16:creationId xmlns:a16="http://schemas.microsoft.com/office/drawing/2014/main" xmlns="" id="{02E73D04-5C87-4990-9FD5-28E200352959}"/>
+                <a16:creationId xmlns:a16="http://schemas.microsoft.com/office/drawing/2014/main" id="{02E73D04-5C87-4990-9FD5-28E200352959}"/>
               </a:ext>
             </a:extLst>
           </p:cNvPr>
@@ -8729,7 +8740,7 @@
           <p:cNvPr id="10" name="Inhaltsplatzhalter 2">
             <a:extLst>
               <a:ext uri="{FF2B5EF4-FFF2-40B4-BE49-F238E27FC236}">
-                <a16:creationId xmlns:a16="http://schemas.microsoft.com/office/drawing/2014/main" xmlns="" id="{3D50B8CB-49CB-480F-8369-501E071177D8}"/>
+                <a16:creationId xmlns:a16="http://schemas.microsoft.com/office/drawing/2014/main" id="{3D50B8CB-49CB-480F-8369-501E071177D8}"/>
               </a:ext>
             </a:extLst>
           </p:cNvPr>
@@ -8795,7 +8806,7 @@
           <p:cNvPr id="4" name="Fußzeilenplatzhalter 3">
             <a:extLst>
               <a:ext uri="{FF2B5EF4-FFF2-40B4-BE49-F238E27FC236}">
-                <a16:creationId xmlns:a16="http://schemas.microsoft.com/office/drawing/2014/main" xmlns="" id="{0FC0C19D-1682-4679-8E1E-D2E399E12164}"/>
+                <a16:creationId xmlns:a16="http://schemas.microsoft.com/office/drawing/2014/main" id="{0FC0C19D-1682-4679-8E1E-D2E399E12164}"/>
               </a:ext>
             </a:extLst>
           </p:cNvPr>
@@ -8829,7 +8840,7 @@
           <p:cNvPr id="6" name="Titel 5">
             <a:extLst>
               <a:ext uri="{FF2B5EF4-FFF2-40B4-BE49-F238E27FC236}">
-                <a16:creationId xmlns:a16="http://schemas.microsoft.com/office/drawing/2014/main" xmlns="" id="{F945D4CE-7FAD-45BF-A641-06AE09C0EF93}"/>
+                <a16:creationId xmlns:a16="http://schemas.microsoft.com/office/drawing/2014/main" id="{F945D4CE-7FAD-45BF-A641-06AE09C0EF93}"/>
               </a:ext>
             </a:extLst>
           </p:cNvPr>
@@ -8890,7 +8901,7 @@
           <p:cNvPr id="9" name="Textfeld 8">
             <a:extLst>
               <a:ext uri="{FF2B5EF4-FFF2-40B4-BE49-F238E27FC236}">
-                <a16:creationId xmlns:a16="http://schemas.microsoft.com/office/drawing/2014/main" xmlns="" id="{5BB6C03E-B970-4FA5-83BD-DA2E462C35A1}"/>
+                <a16:creationId xmlns:a16="http://schemas.microsoft.com/office/drawing/2014/main" id="{5BB6C03E-B970-4FA5-83BD-DA2E462C35A1}"/>
               </a:ext>
             </a:extLst>
           </p:cNvPr>
@@ -9284,7 +9295,7 @@
           <p:cNvPr id="7" name="Inhaltsplatzhalter 6">
             <a:extLst>
               <a:ext uri="{FF2B5EF4-FFF2-40B4-BE49-F238E27FC236}">
-                <a16:creationId xmlns:a16="http://schemas.microsoft.com/office/drawing/2014/main" xmlns="" id="{02E73D04-5C87-4990-9FD5-28E200352959}"/>
+                <a16:creationId xmlns:a16="http://schemas.microsoft.com/office/drawing/2014/main" id="{02E73D04-5C87-4990-9FD5-28E200352959}"/>
               </a:ext>
             </a:extLst>
           </p:cNvPr>
@@ -9309,7 +9320,7 @@
           <p:cNvPr id="10" name="Inhaltsplatzhalter 2">
             <a:extLst>
               <a:ext uri="{FF2B5EF4-FFF2-40B4-BE49-F238E27FC236}">
-                <a16:creationId xmlns:a16="http://schemas.microsoft.com/office/drawing/2014/main" xmlns="" id="{3D50B8CB-49CB-480F-8369-501E071177D8}"/>
+                <a16:creationId xmlns:a16="http://schemas.microsoft.com/office/drawing/2014/main" id="{3D50B8CB-49CB-480F-8369-501E071177D8}"/>
               </a:ext>
             </a:extLst>
           </p:cNvPr>
@@ -9394,7 +9405,7 @@
           <p:cNvPr id="5" name="Textplatzhalter 4">
             <a:extLst>
               <a:ext uri="{FF2B5EF4-FFF2-40B4-BE49-F238E27FC236}">
-                <a16:creationId xmlns:a16="http://schemas.microsoft.com/office/drawing/2014/main" xmlns="" id="{67DE0ECA-5E5C-43D9-A4C4-B3A31EB20E63}"/>
+                <a16:creationId xmlns:a16="http://schemas.microsoft.com/office/drawing/2014/main" id="{67DE0ECA-5E5C-43D9-A4C4-B3A31EB20E63}"/>
               </a:ext>
             </a:extLst>
           </p:cNvPr>
@@ -9424,7 +9435,7 @@
           <p:cNvPr id="7" name="Grafik 6">
             <a:extLst>
               <a:ext uri="{FF2B5EF4-FFF2-40B4-BE49-F238E27FC236}">
-                <a16:creationId xmlns:a16="http://schemas.microsoft.com/office/drawing/2014/main" xmlns="" id="{9662A82F-40D1-46D3-B342-3A7B12F5AF35}"/>
+                <a16:creationId xmlns:a16="http://schemas.microsoft.com/office/drawing/2014/main" id="{9662A82F-40D1-46D3-B342-3A7B12F5AF35}"/>
               </a:ext>
             </a:extLst>
           </p:cNvPr>
@@ -9465,13 +9476,6 @@
   <p:clrMapOvr>
     <a:masterClrMapping/>
   </p:clrMapOvr>
-  <p:timing>
-    <p:tnLst>
-      <p:par>
-        <p:cTn id="1" dur="indefinite" restart="never" nodeType="tmRoot"/>
-      </p:par>
-    </p:tnLst>
-  </p:timing>
 </p:sld>
 </file>
 
@@ -9497,7 +9501,7 @@
           <p:cNvPr id="2" name="Inhaltsplatzhalter 1">
             <a:extLst>
               <a:ext uri="{FF2B5EF4-FFF2-40B4-BE49-F238E27FC236}">
-                <a16:creationId xmlns:a16="http://schemas.microsoft.com/office/drawing/2014/main" xmlns="" id="{FA35B9DB-F60D-4066-B8D9-2AEEC4F64DCC}"/>
+                <a16:creationId xmlns:a16="http://schemas.microsoft.com/office/drawing/2014/main" id="{FA35B9DB-F60D-4066-B8D9-2AEEC4F64DCC}"/>
               </a:ext>
             </a:extLst>
           </p:cNvPr>
@@ -9510,8 +9514,8 @@
         </p:nvSpPr>
         <p:spPr>
           <a:xfrm>
-            <a:off x="107504" y="4518408"/>
-            <a:ext cx="4320480" cy="2438984"/>
+            <a:off x="6501688" y="4869160"/>
+            <a:ext cx="3744416" cy="2088232"/>
           </a:xfrm>
         </p:spPr>
         <p:txBody>
@@ -9521,8 +9525,8 @@
           <a:lstStyle/>
           <a:p>
             <a:r>
-              <a:rPr lang="de-DE" sz="2600" dirty="0">
-                <a:latin typeface="Source Sans Pro Light" panose="020B0403030403020204" pitchFamily="34" charset="0"/>
+              <a:rPr lang="de-DE" sz="2000" dirty="0">
+                <a:latin typeface="Source Sans Pro "/>
               </a:rPr>
               <a:t>Dominique &amp; Daniel</a:t>
             </a:r>
@@ -9559,7 +9563,7 @@
           <p:cNvPr id="6" name="Grafik 5">
             <a:extLst>
               <a:ext uri="{FF2B5EF4-FFF2-40B4-BE49-F238E27FC236}">
-                <a16:creationId xmlns:a16="http://schemas.microsoft.com/office/drawing/2014/main" xmlns="" id="{66E4B86A-06DF-42B6-8ACA-4C8C1D113A65}"/>
+                <a16:creationId xmlns:a16="http://schemas.microsoft.com/office/drawing/2014/main" id="{66E4B86A-06DF-42B6-8ACA-4C8C1D113A65}"/>
               </a:ext>
             </a:extLst>
           </p:cNvPr>
@@ -9582,8 +9586,8 @@
         </p:blipFill>
         <p:spPr>
           <a:xfrm>
-            <a:off x="194040" y="5067664"/>
-            <a:ext cx="1620000" cy="1620000"/>
+            <a:off x="6012160" y="5301208"/>
+            <a:ext cx="1386456" cy="1386456"/>
           </a:xfrm>
           <a:prstGeom prst="rect">
             <a:avLst/>
@@ -9595,7 +9599,7 @@
           <p:cNvPr id="8" name="Grafik 7">
             <a:extLst>
               <a:ext uri="{FF2B5EF4-FFF2-40B4-BE49-F238E27FC236}">
-                <a16:creationId xmlns:a16="http://schemas.microsoft.com/office/drawing/2014/main" xmlns="" id="{E1EEF370-18C6-4E24-9585-5202B4DC6481}"/>
+                <a16:creationId xmlns:a16="http://schemas.microsoft.com/office/drawing/2014/main" id="{E1EEF370-18C6-4E24-9585-5202B4DC6481}"/>
               </a:ext>
             </a:extLst>
           </p:cNvPr>
@@ -9618,8 +9622,8 @@
         </p:blipFill>
         <p:spPr>
           <a:xfrm>
-            <a:off x="1814040" y="5067664"/>
-            <a:ext cx="1620000" cy="1620000"/>
+            <a:off x="7398616" y="5301208"/>
+            <a:ext cx="1386456" cy="1386456"/>
           </a:xfrm>
           <a:prstGeom prst="rect">
             <a:avLst/>
@@ -9631,7 +9635,7 @@
           <p:cNvPr id="9" name="Rechteck 8">
             <a:extLst>
               <a:ext uri="{FF2B5EF4-FFF2-40B4-BE49-F238E27FC236}">
-                <a16:creationId xmlns:a16="http://schemas.microsoft.com/office/drawing/2014/main" xmlns="" id="{3870196D-44D4-4AA2-83CC-F16BFBF045C8}"/>
+                <a16:creationId xmlns:a16="http://schemas.microsoft.com/office/drawing/2014/main" id="{3870196D-44D4-4AA2-83CC-F16BFBF045C8}"/>
               </a:ext>
             </a:extLst>
           </p:cNvPr>
@@ -9639,9 +9643,9 @@
           <p:nvPr/>
         </p:nvSpPr>
         <p:spPr>
-          <a:xfrm rot="1362160">
-            <a:off x="658941" y="3422041"/>
-            <a:ext cx="7826117" cy="1569660"/>
+          <a:xfrm>
+            <a:off x="820782" y="1738215"/>
+            <a:ext cx="6129370" cy="4062651"/>
           </a:xfrm>
           <a:prstGeom prst="rect">
             <a:avLst/>
@@ -9654,130 +9658,111 @@
           </a:bodyPr>
           <a:lstStyle/>
           <a:p>
-            <a:pPr algn="ctr"/>
-            <a:r>
-              <a:rPr lang="de-DE" sz="4800" b="1" dirty="0">
-                <a:ln w="6600">
-                  <a:solidFill>
-                    <a:schemeClr val="accent2"/>
-                  </a:solidFill>
-                  <a:prstDash val="solid"/>
-                </a:ln>
-                <a:solidFill>
-                  <a:srgbClr val="FFFFFF"/>
-                </a:solidFill>
-                <a:effectLst>
-                  <a:outerShdw dist="38100" dir="2700000" algn="tl" rotWithShape="0">
-                    <a:schemeClr val="accent2"/>
-                  </a:outerShdw>
-                </a:effectLst>
-                <a:latin typeface="Source Sans Pro Light" panose="020B0403030403020204" pitchFamily="34" charset="0"/>
-              </a:rPr>
-              <a:t>Want </a:t>
-            </a:r>
-            <a:r>
-              <a:rPr lang="de-DE" sz="4800" b="1" dirty="0" err="1">
-                <a:ln w="6600">
-                  <a:solidFill>
-                    <a:schemeClr val="accent2"/>
-                  </a:solidFill>
-                  <a:prstDash val="solid"/>
-                </a:ln>
-                <a:solidFill>
-                  <a:srgbClr val="FFFFFF"/>
-                </a:solidFill>
-                <a:effectLst>
-                  <a:outerShdw dist="38100" dir="2700000" algn="tl" rotWithShape="0">
-                    <a:schemeClr val="accent2"/>
-                  </a:outerShdw>
-                </a:effectLst>
-                <a:latin typeface="Source Sans Pro Light" panose="020B0403030403020204" pitchFamily="34" charset="0"/>
-              </a:rPr>
-              <a:t>to</a:t>
-            </a:r>
-            <a:r>
-              <a:rPr lang="de-DE" sz="4800" b="1" dirty="0">
-                <a:ln w="6600">
-                  <a:solidFill>
-                    <a:schemeClr val="accent2"/>
-                  </a:solidFill>
-                  <a:prstDash val="solid"/>
-                </a:ln>
-                <a:solidFill>
-                  <a:srgbClr val="FFFFFF"/>
-                </a:solidFill>
-                <a:effectLst>
-                  <a:outerShdw dist="38100" dir="2700000" algn="tl" rotWithShape="0">
-                    <a:schemeClr val="accent2"/>
-                  </a:outerShdw>
-                </a:effectLst>
-                <a:latin typeface="Source Sans Pro Light" panose="020B0403030403020204" pitchFamily="34" charset="0"/>
-              </a:rPr>
-              <a:t> support </a:t>
-            </a:r>
-            <a:r>
-              <a:rPr lang="de-DE" sz="4800" b="1" dirty="0" err="1">
-                <a:ln w="6600">
-                  <a:solidFill>
-                    <a:schemeClr val="accent2"/>
-                  </a:solidFill>
-                  <a:prstDash val="solid"/>
-                </a:ln>
-                <a:solidFill>
-                  <a:srgbClr val="FFFFFF"/>
-                </a:solidFill>
-                <a:effectLst>
-                  <a:outerShdw dist="38100" dir="2700000" algn="tl" rotWithShape="0">
-                    <a:schemeClr val="accent2"/>
-                  </a:outerShdw>
-                </a:effectLst>
-                <a:latin typeface="Source Sans Pro Light" panose="020B0403030403020204" pitchFamily="34" charset="0"/>
-              </a:rPr>
-              <a:t>us</a:t>
-            </a:r>
-            <a:r>
-              <a:rPr lang="de-DE" sz="4800" b="1" dirty="0">
-                <a:ln w="6600">
-                  <a:solidFill>
-                    <a:schemeClr val="accent2"/>
-                  </a:solidFill>
-                  <a:prstDash val="solid"/>
-                </a:ln>
-                <a:solidFill>
-                  <a:srgbClr val="FFFFFF"/>
-                </a:solidFill>
-                <a:effectLst>
-                  <a:outerShdw dist="38100" dir="2700000" algn="tl" rotWithShape="0">
-                    <a:schemeClr val="accent2"/>
-                  </a:outerShdw>
-                </a:effectLst>
-                <a:latin typeface="Source Sans Pro Light" panose="020B0403030403020204" pitchFamily="34" charset="0"/>
-              </a:rPr>
-              <a:t>?</a:t>
-            </a:r>
-          </a:p>
-          <a:p>
-            <a:pPr algn="ctr"/>
-            <a:r>
-              <a:rPr lang="de-DE" sz="4800" b="1" dirty="0">
-                <a:ln w="6600">
-                  <a:solidFill>
-                    <a:schemeClr val="accent2"/>
-                  </a:solidFill>
-                  <a:prstDash val="solid"/>
-                </a:ln>
-                <a:solidFill>
-                  <a:srgbClr val="FFFFFF"/>
-                </a:solidFill>
-                <a:effectLst>
-                  <a:outerShdw dist="38100" dir="2700000" algn="tl" rotWithShape="0">
-                    <a:schemeClr val="accent2"/>
-                  </a:outerShdw>
-                </a:effectLst>
-                <a:latin typeface="Source Sans Pro Light" panose="020B0403030403020204" pitchFamily="34" charset="0"/>
+            <a:pPr algn="ctr" defTabSz="360000"/>
+            <a:r>
+              <a:rPr lang="de-DE" sz="6600" b="1" dirty="0">
+                <a:solidFill>
+                  <a:srgbClr val="2198F6"/>
+                </a:solidFill>
+                <a:latin typeface="Source Sans Pro" panose="020B0503030403020204" pitchFamily="34" charset="0"/>
+                <a:ea typeface="Source Sans Pro" panose="020B0503030403020204" pitchFamily="34" charset="0"/>
+              </a:rPr>
+              <a:t>Want to join us?</a:t>
+            </a:r>
+          </a:p>
+          <a:p>
+            <a:pPr marL="685800" indent="-685800" algn="ctr" defTabSz="360000">
+              <a:buFont typeface="Wingdings" panose="05000000000000000000" pitchFamily="2" charset="2"/>
+              <a:buChar char="Ø"/>
+            </a:pPr>
+            <a:endParaRPr lang="de-DE" sz="2400" dirty="0">
+              <a:latin typeface="Source Sans Pro" panose="020B0503030403020204" pitchFamily="34" charset="0"/>
+              <a:ea typeface="Source Sans Pro" panose="020B0503030403020204" pitchFamily="34" charset="0"/>
+            </a:endParaRPr>
+          </a:p>
+          <a:p>
+            <a:pPr marL="285750" indent="-285750" defTabSz="360000">
+              <a:buFont typeface="Wingdings" panose="05000000000000000000" pitchFamily="2" charset="2"/>
+              <a:buChar char="Ø"/>
+            </a:pPr>
+            <a:r>
+              <a:rPr lang="de-DE" sz="2400" b="1" dirty="0">
+                <a:latin typeface="Source Sans Pro" panose="020B0503030403020204" pitchFamily="34" charset="0"/>
+                <a:ea typeface="Source Sans Pro" panose="020B0503030403020204" pitchFamily="34" charset="0"/>
+                <a:hlinkClick r:id="rId4"/>
               </a:rPr>
               <a:t>https://github.com/easystats</a:t>
             </a:r>
+            <a:endParaRPr lang="de-DE" sz="2400" b="1" dirty="0">
+              <a:latin typeface="Source Sans Pro" panose="020B0503030403020204" pitchFamily="34" charset="0"/>
+              <a:ea typeface="Source Sans Pro" panose="020B0503030403020204" pitchFamily="34" charset="0"/>
+            </a:endParaRPr>
+          </a:p>
+          <a:p>
+            <a:pPr defTabSz="360000"/>
+            <a:endParaRPr lang="de-DE" sz="2400" dirty="0">
+              <a:latin typeface="Source Sans Pro" panose="020B0503030403020204" pitchFamily="34" charset="0"/>
+              <a:ea typeface="Source Sans Pro" panose="020B0503030403020204" pitchFamily="34" charset="0"/>
+            </a:endParaRPr>
+          </a:p>
+          <a:p>
+            <a:pPr defTabSz="360000"/>
+            <a:r>
+              <a:rPr lang="de-DE" sz="2400" dirty="0">
+                <a:latin typeface="Source Sans Pro" panose="020B0503030403020204" pitchFamily="34" charset="0"/>
+                <a:ea typeface="Source Sans Pro" panose="020B0503030403020204" pitchFamily="34" charset="0"/>
+              </a:rPr>
+              <a:t>We are...</a:t>
+            </a:r>
+          </a:p>
+          <a:p>
+            <a:pPr marL="285750" indent="-285750" defTabSz="360000">
+              <a:buFont typeface="Wingdings" panose="05000000000000000000" pitchFamily="2" charset="2"/>
+              <a:buChar char="ü"/>
+            </a:pPr>
+            <a:r>
+              <a:rPr lang="de-DE" sz="2400" dirty="0">
+                <a:latin typeface="Source Sans Pro" panose="020B0503030403020204" pitchFamily="34" charset="0"/>
+                <a:ea typeface="Source Sans Pro" panose="020B0503030403020204" pitchFamily="34" charset="0"/>
+              </a:rPr>
+              <a:t>Waiting for your feedback</a:t>
+            </a:r>
+          </a:p>
+          <a:p>
+            <a:pPr marL="285750" indent="-285750" defTabSz="360000">
+              <a:buFont typeface="Wingdings" panose="05000000000000000000" pitchFamily="2" charset="2"/>
+              <a:buChar char="ü"/>
+            </a:pPr>
+            <a:r>
+              <a:rPr lang="de-DE" sz="2400" dirty="0">
+                <a:latin typeface="Source Sans Pro" panose="020B0503030403020204" pitchFamily="34" charset="0"/>
+                <a:ea typeface="Source Sans Pro" panose="020B0503030403020204" pitchFamily="34" charset="0"/>
+              </a:rPr>
+              <a:t>Open to opinions and ideas</a:t>
+            </a:r>
+          </a:p>
+          <a:p>
+            <a:pPr marL="285750" indent="-285750" defTabSz="360000">
+              <a:buFont typeface="Wingdings" panose="05000000000000000000" pitchFamily="2" charset="2"/>
+              <a:buChar char="ü"/>
+            </a:pPr>
+            <a:r>
+              <a:rPr lang="de-DE" sz="2400" dirty="0">
+                <a:latin typeface="Source Sans Pro" panose="020B0503030403020204" pitchFamily="34" charset="0"/>
+                <a:ea typeface="Source Sans Pro" panose="020B0503030403020204" pitchFamily="34" charset="0"/>
+              </a:rPr>
+              <a:t>Beginning-developpers friendly</a:t>
+            </a:r>
+          </a:p>
+          <a:p>
+            <a:pPr marL="685800" indent="-685800" defTabSz="360000">
+              <a:buFont typeface="Wingdings" panose="05000000000000000000" pitchFamily="2" charset="2"/>
+              <a:buChar char="ü"/>
+            </a:pPr>
+            <a:endParaRPr lang="de-DE" sz="2400" dirty="0">
+              <a:latin typeface="Source Sans Pro" panose="020B0503030403020204" pitchFamily="34" charset="0"/>
+              <a:ea typeface="Source Sans Pro" panose="020B0503030403020204" pitchFamily="34" charset="0"/>
+            </a:endParaRPr>
           </a:p>
         </p:txBody>
       </p:sp>
@@ -9786,7 +9771,7 @@
           <p:cNvPr id="10" name="Grafik 9">
             <a:extLst>
               <a:ext uri="{FF2B5EF4-FFF2-40B4-BE49-F238E27FC236}">
-                <a16:creationId xmlns:a16="http://schemas.microsoft.com/office/drawing/2014/main" xmlns="" id="{177ADE5C-6E0C-41DF-B77F-3FAF6918653E}"/>
+                <a16:creationId xmlns:a16="http://schemas.microsoft.com/office/drawing/2014/main" id="{177ADE5C-6E0C-41DF-B77F-3FAF6918653E}"/>
               </a:ext>
             </a:extLst>
           </p:cNvPr>
@@ -9796,7 +9781,7 @@
           <p:nvPr/>
         </p:nvPicPr>
         <p:blipFill>
-          <a:blip r:embed="rId4" cstate="print">
+          <a:blip r:embed="rId5" cstate="print">
             <a:extLst>
               <a:ext uri="{28A0092B-C50C-407E-A947-70E740481C1C}">
                 <a14:useLocalDpi xmlns:a14="http://schemas.microsoft.com/office/drawing/2010/main" val="0"/>
@@ -9809,12 +9794,59 @@
         </p:blipFill>
         <p:spPr>
           <a:xfrm>
-            <a:off x="5004048" y="146417"/>
-            <a:ext cx="3673778" cy="3652384"/>
+            <a:off x="7123585" y="146418"/>
+            <a:ext cx="1554240" cy="1545189"/>
           </a:xfrm>
           <a:prstGeom prst="rect">
             <a:avLst/>
           </a:prstGeom>
+        </p:spPr>
+      </p:pic>
+      <p:pic>
+        <p:nvPicPr>
+          <p:cNvPr id="1026" name="Picture 2" descr="RÃ©sultat de recherche d'images pour &quot;we need you&quot;">
+            <a:extLst>
+              <a:ext uri="{FF2B5EF4-FFF2-40B4-BE49-F238E27FC236}">
+                <a16:creationId xmlns:a16="http://schemas.microsoft.com/office/drawing/2014/main" id="{2D65F3E9-5E3A-407E-969C-984A63ABD069}"/>
+              </a:ext>
+            </a:extLst>
+          </p:cNvPr>
+          <p:cNvPicPr>
+            <a:picLocks noChangeAspect="1" noChangeArrowheads="1"/>
+          </p:cNvPicPr>
+          <p:nvPr/>
+        </p:nvPicPr>
+        <p:blipFill>
+          <a:blip r:embed="rId6" cstate="print">
+            <a:extLst>
+              <a:ext uri="{28A0092B-C50C-407E-A947-70E740481C1C}">
+                <a14:useLocalDpi xmlns:a14="http://schemas.microsoft.com/office/drawing/2010/main" val="0"/>
+              </a:ext>
+            </a:extLst>
+          </a:blip>
+          <a:srcRect/>
+          <a:stretch>
+            <a:fillRect/>
+          </a:stretch>
+        </p:blipFill>
+        <p:spPr bwMode="auto">
+          <a:xfrm>
+            <a:off x="323529" y="260649"/>
+            <a:ext cx="1872207" cy="1162654"/>
+          </a:xfrm>
+          <a:prstGeom prst="rect">
+            <a:avLst/>
+          </a:prstGeom>
+          <a:noFill/>
+          <a:extLst>
+            <a:ext uri="{909E8E84-426E-40DD-AFC4-6F175D3DCCD1}">
+              <a14:hiddenFill xmlns:a14="http://schemas.microsoft.com/office/drawing/2010/main">
+                <a:solidFill>
+                  <a:srgbClr val="FFFFFF"/>
+                </a:solidFill>
+              </a14:hiddenFill>
+            </a:ext>
+          </a:extLst>
         </p:spPr>
       </p:pic>
     </p:spTree>
@@ -9871,7 +9903,7 @@
           <p:cNvPr id="5" name="Textplatzhalter 4">
             <a:extLst>
               <a:ext uri="{FF2B5EF4-FFF2-40B4-BE49-F238E27FC236}">
-                <a16:creationId xmlns:a16="http://schemas.microsoft.com/office/drawing/2014/main" xmlns="" id="{67DE0ECA-5E5C-43D9-A4C4-B3A31EB20E63}"/>
+                <a16:creationId xmlns:a16="http://schemas.microsoft.com/office/drawing/2014/main" id="{67DE0ECA-5E5C-43D9-A4C4-B3A31EB20E63}"/>
               </a:ext>
             </a:extLst>
           </p:cNvPr>
@@ -9901,7 +9933,7 @@
           <p:cNvPr id="7" name="Grafik 6">
             <a:extLst>
               <a:ext uri="{FF2B5EF4-FFF2-40B4-BE49-F238E27FC236}">
-                <a16:creationId xmlns:a16="http://schemas.microsoft.com/office/drawing/2014/main" xmlns="" id="{9662A82F-40D1-46D3-B342-3A7B12F5AF35}"/>
+                <a16:creationId xmlns:a16="http://schemas.microsoft.com/office/drawing/2014/main" id="{9662A82F-40D1-46D3-B342-3A7B12F5AF35}"/>
               </a:ext>
             </a:extLst>
           </p:cNvPr>
@@ -9937,7 +9969,7 @@
           <p:cNvPr id="6" name="Inhaltsplatzhalter 1">
             <a:extLst>
               <a:ext uri="{FF2B5EF4-FFF2-40B4-BE49-F238E27FC236}">
-                <a16:creationId xmlns:a16="http://schemas.microsoft.com/office/drawing/2014/main" xmlns="" id="{17A46D4D-0551-4407-9BCE-588AD39BB403}"/>
+                <a16:creationId xmlns:a16="http://schemas.microsoft.com/office/drawing/2014/main" id="{17A46D4D-0551-4407-9BCE-588AD39BB403}"/>
               </a:ext>
             </a:extLst>
           </p:cNvPr>
@@ -10150,7 +10182,7 @@
           <p:cNvPr id="8" name="Grafik 7">
             <a:extLst>
               <a:ext uri="{FF2B5EF4-FFF2-40B4-BE49-F238E27FC236}">
-                <a16:creationId xmlns:a16="http://schemas.microsoft.com/office/drawing/2014/main" xmlns="" id="{EEDE1A4C-E038-4AF3-8084-AD08BCBB8B40}"/>
+                <a16:creationId xmlns:a16="http://schemas.microsoft.com/office/drawing/2014/main" id="{EEDE1A4C-E038-4AF3-8084-AD08BCBB8B40}"/>
               </a:ext>
             </a:extLst>
           </p:cNvPr>
@@ -10186,7 +10218,7 @@
           <p:cNvPr id="3" name="Textfeld 2">
             <a:extLst>
               <a:ext uri="{FF2B5EF4-FFF2-40B4-BE49-F238E27FC236}">
-                <a16:creationId xmlns:a16="http://schemas.microsoft.com/office/drawing/2014/main" xmlns="" id="{06CD9A7E-4DFA-4BD7-BE9D-E73F98761ABC}"/>
+                <a16:creationId xmlns:a16="http://schemas.microsoft.com/office/drawing/2014/main" id="{06CD9A7E-4DFA-4BD7-BE9D-E73F98761ABC}"/>
               </a:ext>
             </a:extLst>
           </p:cNvPr>
@@ -10468,13 +10500,6 @@
   <p:clrMapOvr>
     <a:masterClrMapping/>
   </p:clrMapOvr>
-  <p:timing>
-    <p:tnLst>
-      <p:par>
-        <p:cTn id="1" dur="indefinite" restart="never" nodeType="tmRoot"/>
-      </p:par>
-    </p:tnLst>
-  </p:timing>
 </p:sld>
 </file>
 
@@ -10519,7 +10544,7 @@
           <p:cNvPr id="5" name="Textplatzhalter 4">
             <a:extLst>
               <a:ext uri="{FF2B5EF4-FFF2-40B4-BE49-F238E27FC236}">
-                <a16:creationId xmlns:a16="http://schemas.microsoft.com/office/drawing/2014/main" xmlns="" id="{67DE0ECA-5E5C-43D9-A4C4-B3A31EB20E63}"/>
+                <a16:creationId xmlns:a16="http://schemas.microsoft.com/office/drawing/2014/main" id="{67DE0ECA-5E5C-43D9-A4C4-B3A31EB20E63}"/>
               </a:ext>
             </a:extLst>
           </p:cNvPr>
@@ -10549,7 +10574,7 @@
           <p:cNvPr id="7" name="Grafik 6">
             <a:extLst>
               <a:ext uri="{FF2B5EF4-FFF2-40B4-BE49-F238E27FC236}">
-                <a16:creationId xmlns:a16="http://schemas.microsoft.com/office/drawing/2014/main" xmlns="" id="{9662A82F-40D1-46D3-B342-3A7B12F5AF35}"/>
+                <a16:creationId xmlns:a16="http://schemas.microsoft.com/office/drawing/2014/main" id="{9662A82F-40D1-46D3-B342-3A7B12F5AF35}"/>
               </a:ext>
             </a:extLst>
           </p:cNvPr>
@@ -10585,7 +10610,7 @@
           <p:cNvPr id="6" name="Inhaltsplatzhalter 1">
             <a:extLst>
               <a:ext uri="{FF2B5EF4-FFF2-40B4-BE49-F238E27FC236}">
-                <a16:creationId xmlns:a16="http://schemas.microsoft.com/office/drawing/2014/main" xmlns="" id="{17A46D4D-0551-4407-9BCE-588AD39BB403}"/>
+                <a16:creationId xmlns:a16="http://schemas.microsoft.com/office/drawing/2014/main" id="{17A46D4D-0551-4407-9BCE-588AD39BB403}"/>
               </a:ext>
             </a:extLst>
           </p:cNvPr>
@@ -10798,7 +10823,7 @@
           <p:cNvPr id="8" name="Grafik 7">
             <a:extLst>
               <a:ext uri="{FF2B5EF4-FFF2-40B4-BE49-F238E27FC236}">
-                <a16:creationId xmlns:a16="http://schemas.microsoft.com/office/drawing/2014/main" xmlns="" id="{EEDE1A4C-E038-4AF3-8084-AD08BCBB8B40}"/>
+                <a16:creationId xmlns:a16="http://schemas.microsoft.com/office/drawing/2014/main" id="{EEDE1A4C-E038-4AF3-8084-AD08BCBB8B40}"/>
               </a:ext>
             </a:extLst>
           </p:cNvPr>
@@ -10834,7 +10859,7 @@
           <p:cNvPr id="3" name="Textfeld 2">
             <a:extLst>
               <a:ext uri="{FF2B5EF4-FFF2-40B4-BE49-F238E27FC236}">
-                <a16:creationId xmlns:a16="http://schemas.microsoft.com/office/drawing/2014/main" xmlns="" id="{06CD9A7E-4DFA-4BD7-BE9D-E73F98761ABC}"/>
+                <a16:creationId xmlns:a16="http://schemas.microsoft.com/office/drawing/2014/main" id="{06CD9A7E-4DFA-4BD7-BE9D-E73F98761ABC}"/>
               </a:ext>
             </a:extLst>
           </p:cNvPr>
@@ -11111,7 +11136,7 @@
           <p:cNvPr id="9" name="Grafik 8">
             <a:extLst>
               <a:ext uri="{FF2B5EF4-FFF2-40B4-BE49-F238E27FC236}">
-                <a16:creationId xmlns:a16="http://schemas.microsoft.com/office/drawing/2014/main" xmlns="" id="{EEFAF765-CB8E-4CDA-A2B5-AB8E890E785B}"/>
+                <a16:creationId xmlns:a16="http://schemas.microsoft.com/office/drawing/2014/main" id="{EEFAF765-CB8E-4CDA-A2B5-AB8E890E785B}"/>
               </a:ext>
             </a:extLst>
           </p:cNvPr>
@@ -11147,7 +11172,7 @@
           <p:cNvPr id="10" name="Inhaltsplatzhalter 1">
             <a:extLst>
               <a:ext uri="{FF2B5EF4-FFF2-40B4-BE49-F238E27FC236}">
-                <a16:creationId xmlns:a16="http://schemas.microsoft.com/office/drawing/2014/main" xmlns="" id="{1F4106B7-0C47-4BD5-AF44-2646E3AD2260}"/>
+                <a16:creationId xmlns:a16="http://schemas.microsoft.com/office/drawing/2014/main" id="{1F4106B7-0C47-4BD5-AF44-2646E3AD2260}"/>
               </a:ext>
             </a:extLst>
           </p:cNvPr>
@@ -11360,7 +11385,7 @@
           <p:cNvPr id="11" name="Textfeld 10">
             <a:extLst>
               <a:ext uri="{FF2B5EF4-FFF2-40B4-BE49-F238E27FC236}">
-                <a16:creationId xmlns:a16="http://schemas.microsoft.com/office/drawing/2014/main" xmlns="" id="{1CA3948B-B37D-4A05-8FF4-667A4E4174D7}"/>
+                <a16:creationId xmlns:a16="http://schemas.microsoft.com/office/drawing/2014/main" id="{1CA3948B-B37D-4A05-8FF4-667A4E4174D7}"/>
               </a:ext>
             </a:extLst>
           </p:cNvPr>
@@ -11508,7 +11533,7 @@
           <p:cNvPr id="12" name="Grafik 11">
             <a:extLst>
               <a:ext uri="{FF2B5EF4-FFF2-40B4-BE49-F238E27FC236}">
-                <a16:creationId xmlns:a16="http://schemas.microsoft.com/office/drawing/2014/main" xmlns="" id="{C6C09D98-7011-4A4C-AE66-132708929A66}"/>
+                <a16:creationId xmlns:a16="http://schemas.microsoft.com/office/drawing/2014/main" id="{C6C09D98-7011-4A4C-AE66-132708929A66}"/>
               </a:ext>
             </a:extLst>
           </p:cNvPr>
@@ -11549,13 +11574,6 @@
   <p:clrMapOvr>
     <a:masterClrMapping/>
   </p:clrMapOvr>
-  <p:timing>
-    <p:tnLst>
-      <p:par>
-        <p:cTn id="1" dur="indefinite" restart="never" nodeType="tmRoot"/>
-      </p:par>
-    </p:tnLst>
-  </p:timing>
 </p:sld>
 </file>
 
@@ -11581,7 +11599,7 @@
           <p:cNvPr id="2" name="Inhaltsplatzhalter 1">
             <a:extLst>
               <a:ext uri="{FF2B5EF4-FFF2-40B4-BE49-F238E27FC236}">
-                <a16:creationId xmlns:a16="http://schemas.microsoft.com/office/drawing/2014/main" xmlns="" id="{6AC63146-A60C-4C71-BB7B-58E7BF03580D}"/>
+                <a16:creationId xmlns:a16="http://schemas.microsoft.com/office/drawing/2014/main" id="{6AC63146-A60C-4C71-BB7B-58E7BF03580D}"/>
               </a:ext>
             </a:extLst>
           </p:cNvPr>
@@ -11785,7 +11803,7 @@
           <p:cNvPr id="4" name="Fußzeilenplatzhalter 3">
             <a:extLst>
               <a:ext uri="{FF2B5EF4-FFF2-40B4-BE49-F238E27FC236}">
-                <a16:creationId xmlns:a16="http://schemas.microsoft.com/office/drawing/2014/main" xmlns="" id="{C7528ED8-3537-4F05-A5B9-3E8A165FB2B5}"/>
+                <a16:creationId xmlns:a16="http://schemas.microsoft.com/office/drawing/2014/main" id="{C7528ED8-3537-4F05-A5B9-3E8A165FB2B5}"/>
               </a:ext>
             </a:extLst>
           </p:cNvPr>
@@ -11819,7 +11837,7 @@
           <p:cNvPr id="6" name="Titel 5">
             <a:extLst>
               <a:ext uri="{FF2B5EF4-FFF2-40B4-BE49-F238E27FC236}">
-                <a16:creationId xmlns:a16="http://schemas.microsoft.com/office/drawing/2014/main" xmlns="" id="{DA17230E-0997-4023-A8F0-BFEB027317EB}"/>
+                <a16:creationId xmlns:a16="http://schemas.microsoft.com/office/drawing/2014/main" id="{DA17230E-0997-4023-A8F0-BFEB027317EB}"/>
               </a:ext>
             </a:extLst>
           </p:cNvPr>
@@ -11848,7 +11866,7 @@
           <p:cNvPr id="7" name="Inhaltsplatzhalter 6">
             <a:extLst>
               <a:ext uri="{FF2B5EF4-FFF2-40B4-BE49-F238E27FC236}">
-                <a16:creationId xmlns:a16="http://schemas.microsoft.com/office/drawing/2014/main" xmlns="" id="{F2E59518-6179-4745-A40E-2EE49C758ADA}"/>
+                <a16:creationId xmlns:a16="http://schemas.microsoft.com/office/drawing/2014/main" id="{F2E59518-6179-4745-A40E-2EE49C758ADA}"/>
               </a:ext>
             </a:extLst>
           </p:cNvPr>
@@ -11873,7 +11891,7 @@
           <p:cNvPr id="8" name="Grafik 7">
             <a:extLst>
               <a:ext uri="{FF2B5EF4-FFF2-40B4-BE49-F238E27FC236}">
-                <a16:creationId xmlns:a16="http://schemas.microsoft.com/office/drawing/2014/main" xmlns="" id="{2C8B6296-E5C8-4A92-BD87-8984783DA579}"/>
+                <a16:creationId xmlns:a16="http://schemas.microsoft.com/office/drawing/2014/main" id="{2C8B6296-E5C8-4A92-BD87-8984783DA579}"/>
               </a:ext>
             </a:extLst>
           </p:cNvPr>
@@ -11914,13 +11932,6 @@
   <p:clrMapOvr>
     <a:masterClrMapping/>
   </p:clrMapOvr>
-  <p:timing>
-    <p:tnLst>
-      <p:par>
-        <p:cTn id="1" dur="indefinite" restart="never" nodeType="tmRoot"/>
-      </p:par>
-    </p:tnLst>
-  </p:timing>
 </p:sld>
 </file>
 
@@ -11946,7 +11957,7 @@
           <p:cNvPr id="2" name="Inhaltsplatzhalter 1">
             <a:extLst>
               <a:ext uri="{FF2B5EF4-FFF2-40B4-BE49-F238E27FC236}">
-                <a16:creationId xmlns:a16="http://schemas.microsoft.com/office/drawing/2014/main" xmlns="" id="{6AC63146-A60C-4C71-BB7B-58E7BF03580D}"/>
+                <a16:creationId xmlns:a16="http://schemas.microsoft.com/office/drawing/2014/main" id="{6AC63146-A60C-4C71-BB7B-58E7BF03580D}"/>
               </a:ext>
             </a:extLst>
           </p:cNvPr>
@@ -12124,7 +12135,7 @@
           <p:cNvPr id="4" name="Fußzeilenplatzhalter 3">
             <a:extLst>
               <a:ext uri="{FF2B5EF4-FFF2-40B4-BE49-F238E27FC236}">
-                <a16:creationId xmlns:a16="http://schemas.microsoft.com/office/drawing/2014/main" xmlns="" id="{C7528ED8-3537-4F05-A5B9-3E8A165FB2B5}"/>
+                <a16:creationId xmlns:a16="http://schemas.microsoft.com/office/drawing/2014/main" id="{C7528ED8-3537-4F05-A5B9-3E8A165FB2B5}"/>
               </a:ext>
             </a:extLst>
           </p:cNvPr>
@@ -12158,7 +12169,7 @@
           <p:cNvPr id="6" name="Titel 5">
             <a:extLst>
               <a:ext uri="{FF2B5EF4-FFF2-40B4-BE49-F238E27FC236}">
-                <a16:creationId xmlns:a16="http://schemas.microsoft.com/office/drawing/2014/main" xmlns="" id="{DA17230E-0997-4023-A8F0-BFEB027317EB}"/>
+                <a16:creationId xmlns:a16="http://schemas.microsoft.com/office/drawing/2014/main" id="{DA17230E-0997-4023-A8F0-BFEB027317EB}"/>
               </a:ext>
             </a:extLst>
           </p:cNvPr>
@@ -12187,7 +12198,7 @@
           <p:cNvPr id="7" name="Inhaltsplatzhalter 6">
             <a:extLst>
               <a:ext uri="{FF2B5EF4-FFF2-40B4-BE49-F238E27FC236}">
-                <a16:creationId xmlns:a16="http://schemas.microsoft.com/office/drawing/2014/main" xmlns="" id="{F2E59518-6179-4745-A40E-2EE49C758ADA}"/>
+                <a16:creationId xmlns:a16="http://schemas.microsoft.com/office/drawing/2014/main" id="{F2E59518-6179-4745-A40E-2EE49C758ADA}"/>
               </a:ext>
             </a:extLst>
           </p:cNvPr>
@@ -12212,7 +12223,7 @@
           <p:cNvPr id="8" name="Grafik 7">
             <a:extLst>
               <a:ext uri="{FF2B5EF4-FFF2-40B4-BE49-F238E27FC236}">
-                <a16:creationId xmlns:a16="http://schemas.microsoft.com/office/drawing/2014/main" xmlns="" id="{C488D801-7394-416F-906A-383A95B22EF1}"/>
+                <a16:creationId xmlns:a16="http://schemas.microsoft.com/office/drawing/2014/main" id="{C488D801-7394-416F-906A-383A95B22EF1}"/>
               </a:ext>
             </a:extLst>
           </p:cNvPr>
@@ -12253,13 +12264,6 @@
   <p:clrMapOvr>
     <a:masterClrMapping/>
   </p:clrMapOvr>
-  <p:timing>
-    <p:tnLst>
-      <p:par>
-        <p:cTn id="1" dur="indefinite" restart="never" nodeType="tmRoot"/>
-      </p:par>
-    </p:tnLst>
-  </p:timing>
 </p:sld>
 </file>
 
@@ -12285,7 +12289,7 @@
           <p:cNvPr id="2" name="Inhaltsplatzhalter 1">
             <a:extLst>
               <a:ext uri="{FF2B5EF4-FFF2-40B4-BE49-F238E27FC236}">
-                <a16:creationId xmlns:a16="http://schemas.microsoft.com/office/drawing/2014/main" xmlns="" id="{6AC63146-A60C-4C71-BB7B-58E7BF03580D}"/>
+                <a16:creationId xmlns:a16="http://schemas.microsoft.com/office/drawing/2014/main" id="{6AC63146-A60C-4C71-BB7B-58E7BF03580D}"/>
               </a:ext>
             </a:extLst>
           </p:cNvPr>
@@ -12414,32 +12418,19 @@
           <a:p>
             <a:pPr lvl="1"/>
             <a:r>
-              <a:rPr lang="en-US" dirty="0" smtClean="0"/>
+              <a:rPr lang="en-US" dirty="0"/>
               <a:t>High-level packages</a:t>
             </a:r>
-            <a:endParaRPr lang="en-US" dirty="0"/>
           </a:p>
           <a:p>
             <a:pPr lvl="2"/>
             <a:r>
               <a:rPr lang="en-US" dirty="0"/>
-              <a:t>Target groups: non-experts/beginners </a:t>
-            </a:r>
-            <a:r>
-              <a:rPr lang="en-US" dirty="0" smtClean="0"/>
-              <a:t>who want </a:t>
-            </a:r>
-            <a:r>
-              <a:rPr lang="en-US" dirty="0"/>
-              <a:t>fully-baked solutions to solve their problems </a:t>
+              <a:t>Target groups: non-experts/beginners who want fully-baked solutions to solve their problems </a:t>
             </a:r>
             <a:r>
               <a:rPr lang="en-US"/>
-              <a:t>and </a:t>
-            </a:r>
-            <a:r>
-              <a:rPr lang="en-US" smtClean="0"/>
-              <a:t>to </a:t>
+              <a:t>and to </a:t>
             </a:r>
             <a:r>
               <a:rPr lang="en-US" dirty="0"/>
@@ -12461,7 +12452,7 @@
           <p:cNvPr id="4" name="Fußzeilenplatzhalter 3">
             <a:extLst>
               <a:ext uri="{FF2B5EF4-FFF2-40B4-BE49-F238E27FC236}">
-                <a16:creationId xmlns:a16="http://schemas.microsoft.com/office/drawing/2014/main" xmlns="" id="{C7528ED8-3537-4F05-A5B9-3E8A165FB2B5}"/>
+                <a16:creationId xmlns:a16="http://schemas.microsoft.com/office/drawing/2014/main" id="{C7528ED8-3537-4F05-A5B9-3E8A165FB2B5}"/>
               </a:ext>
             </a:extLst>
           </p:cNvPr>
@@ -12495,7 +12486,7 @@
           <p:cNvPr id="6" name="Titel 5">
             <a:extLst>
               <a:ext uri="{FF2B5EF4-FFF2-40B4-BE49-F238E27FC236}">
-                <a16:creationId xmlns:a16="http://schemas.microsoft.com/office/drawing/2014/main" xmlns="" id="{DA17230E-0997-4023-A8F0-BFEB027317EB}"/>
+                <a16:creationId xmlns:a16="http://schemas.microsoft.com/office/drawing/2014/main" id="{DA17230E-0997-4023-A8F0-BFEB027317EB}"/>
               </a:ext>
             </a:extLst>
           </p:cNvPr>
@@ -12524,7 +12515,7 @@
           <p:cNvPr id="7" name="Inhaltsplatzhalter 6">
             <a:extLst>
               <a:ext uri="{FF2B5EF4-FFF2-40B4-BE49-F238E27FC236}">
-                <a16:creationId xmlns:a16="http://schemas.microsoft.com/office/drawing/2014/main" xmlns="" id="{F2E59518-6179-4745-A40E-2EE49C758ADA}"/>
+                <a16:creationId xmlns:a16="http://schemas.microsoft.com/office/drawing/2014/main" id="{F2E59518-6179-4745-A40E-2EE49C758ADA}"/>
               </a:ext>
             </a:extLst>
           </p:cNvPr>
@@ -12549,7 +12540,7 @@
           <p:cNvPr id="8" name="Grafik 7">
             <a:extLst>
               <a:ext uri="{FF2B5EF4-FFF2-40B4-BE49-F238E27FC236}">
-                <a16:creationId xmlns:a16="http://schemas.microsoft.com/office/drawing/2014/main" xmlns="" id="{7D2C7851-769C-4DF5-B4EB-92C9F8721AA8}"/>
+                <a16:creationId xmlns:a16="http://schemas.microsoft.com/office/drawing/2014/main" id="{7D2C7851-769C-4DF5-B4EB-92C9F8721AA8}"/>
               </a:ext>
             </a:extLst>
           </p:cNvPr>
@@ -12590,13 +12581,6 @@
   <p:clrMapOvr>
     <a:masterClrMapping/>
   </p:clrMapOvr>
-  <p:timing>
-    <p:tnLst>
-      <p:par>
-        <p:cTn id="1" dur="indefinite" restart="never" nodeType="tmRoot"/>
-      </p:par>
-    </p:tnLst>
-  </p:timing>
 </p:sld>
 </file>
 
@@ -12645,7 +12629,7 @@
           <p:cNvPr id="2" name="Inhaltsplatzhalter 1">
             <a:extLst>
               <a:ext uri="{FF2B5EF4-FFF2-40B4-BE49-F238E27FC236}">
-                <a16:creationId xmlns:a16="http://schemas.microsoft.com/office/drawing/2014/main" xmlns="" id="{6AC63146-A60C-4C71-BB7B-58E7BF03580D}"/>
+                <a16:creationId xmlns:a16="http://schemas.microsoft.com/office/drawing/2014/main" id="{6AC63146-A60C-4C71-BB7B-58E7BF03580D}"/>
               </a:ext>
             </a:extLst>
           </p:cNvPr>
@@ -12801,7 +12785,7 @@
           <p:cNvPr id="4" name="Fußzeilenplatzhalter 3">
             <a:extLst>
               <a:ext uri="{FF2B5EF4-FFF2-40B4-BE49-F238E27FC236}">
-                <a16:creationId xmlns:a16="http://schemas.microsoft.com/office/drawing/2014/main" xmlns="" id="{C7528ED8-3537-4F05-A5B9-3E8A165FB2B5}"/>
+                <a16:creationId xmlns:a16="http://schemas.microsoft.com/office/drawing/2014/main" id="{C7528ED8-3537-4F05-A5B9-3E8A165FB2B5}"/>
               </a:ext>
             </a:extLst>
           </p:cNvPr>
@@ -12835,7 +12819,7 @@
           <p:cNvPr id="6" name="Titel 5">
             <a:extLst>
               <a:ext uri="{FF2B5EF4-FFF2-40B4-BE49-F238E27FC236}">
-                <a16:creationId xmlns:a16="http://schemas.microsoft.com/office/drawing/2014/main" xmlns="" id="{DA17230E-0997-4023-A8F0-BFEB027317EB}"/>
+                <a16:creationId xmlns:a16="http://schemas.microsoft.com/office/drawing/2014/main" id="{DA17230E-0997-4023-A8F0-BFEB027317EB}"/>
               </a:ext>
             </a:extLst>
           </p:cNvPr>
@@ -12864,7 +12848,7 @@
           <p:cNvPr id="8" name="Grafik 7">
             <a:extLst>
               <a:ext uri="{FF2B5EF4-FFF2-40B4-BE49-F238E27FC236}">
-                <a16:creationId xmlns:a16="http://schemas.microsoft.com/office/drawing/2014/main" xmlns="" id="{7D2C7851-769C-4DF5-B4EB-92C9F8721AA8}"/>
+                <a16:creationId xmlns:a16="http://schemas.microsoft.com/office/drawing/2014/main" id="{7D2C7851-769C-4DF5-B4EB-92C9F8721AA8}"/>
               </a:ext>
             </a:extLst>
           </p:cNvPr>
@@ -12900,7 +12884,7 @@
           <p:cNvPr id="14" name="Inhaltsplatzhalter 13">
             <a:extLst>
               <a:ext uri="{FF2B5EF4-FFF2-40B4-BE49-F238E27FC236}">
-                <a16:creationId xmlns:a16="http://schemas.microsoft.com/office/drawing/2014/main" xmlns="" id="{57389447-F8E0-45D3-85F4-09347BA8682E}"/>
+                <a16:creationId xmlns:a16="http://schemas.microsoft.com/office/drawing/2014/main" id="{57389447-F8E0-45D3-85F4-09347BA8682E}"/>
               </a:ext>
             </a:extLst>
           </p:cNvPr>
@@ -12935,7 +12919,7 @@
           <p:cNvPr id="16" name="Rechteck 15">
             <a:extLst>
               <a:ext uri="{FF2B5EF4-FFF2-40B4-BE49-F238E27FC236}">
-                <a16:creationId xmlns:a16="http://schemas.microsoft.com/office/drawing/2014/main" xmlns="" id="{30778362-FFF2-4673-8311-57C88A8E8903}"/>
+                <a16:creationId xmlns:a16="http://schemas.microsoft.com/office/drawing/2014/main" id="{30778362-FFF2-4673-8311-57C88A8E8903}"/>
               </a:ext>
             </a:extLst>
           </p:cNvPr>
@@ -12991,7 +12975,7 @@
           <p:cNvPr id="17" name="Rechteck 16">
             <a:extLst>
               <a:ext uri="{FF2B5EF4-FFF2-40B4-BE49-F238E27FC236}">
-                <a16:creationId xmlns:a16="http://schemas.microsoft.com/office/drawing/2014/main" xmlns="" id="{4FC1C6AC-31F0-4795-89FF-0F2C89DB93C5}"/>
+                <a16:creationId xmlns:a16="http://schemas.microsoft.com/office/drawing/2014/main" id="{4FC1C6AC-31F0-4795-89FF-0F2C89DB93C5}"/>
               </a:ext>
             </a:extLst>
           </p:cNvPr>
@@ -13089,13 +13073,6 @@
   <p:clrMapOvr>
     <a:masterClrMapping/>
   </p:clrMapOvr>
-  <p:timing>
-    <p:tnLst>
-      <p:par>
-        <p:cTn id="1" dur="indefinite" restart="never" nodeType="tmRoot"/>
-      </p:par>
-    </p:tnLst>
-  </p:timing>
 </p:sld>
 </file>
 
@@ -13121,7 +13098,7 @@
           <p:cNvPr id="2" name="Titel 1">
             <a:extLst>
               <a:ext uri="{FF2B5EF4-FFF2-40B4-BE49-F238E27FC236}">
-                <a16:creationId xmlns:a16="http://schemas.microsoft.com/office/drawing/2014/main" xmlns="" id="{4E61557C-C1C7-4C45-B68A-C6BA2951B46F}"/>
+                <a16:creationId xmlns:a16="http://schemas.microsoft.com/office/drawing/2014/main" id="{4E61557C-C1C7-4C45-B68A-C6BA2951B46F}"/>
               </a:ext>
             </a:extLst>
           </p:cNvPr>
@@ -13150,7 +13127,7 @@
           <p:cNvPr id="3" name="Textplatzhalter 2">
             <a:extLst>
               <a:ext uri="{FF2B5EF4-FFF2-40B4-BE49-F238E27FC236}">
-                <a16:creationId xmlns:a16="http://schemas.microsoft.com/office/drawing/2014/main" xmlns="" id="{5103F8D7-88BD-4586-A2F8-EF2D8B1A656A}"/>
+                <a16:creationId xmlns:a16="http://schemas.microsoft.com/office/drawing/2014/main" id="{5103F8D7-88BD-4586-A2F8-EF2D8B1A656A}"/>
               </a:ext>
             </a:extLst>
           </p:cNvPr>
@@ -13207,13 +13184,6 @@
   <p:clrMapOvr>
     <a:masterClrMapping/>
   </p:clrMapOvr>
-  <p:timing>
-    <p:tnLst>
-      <p:par>
-        <p:cTn id="1" dur="indefinite" restart="never" nodeType="tmRoot"/>
-      </p:par>
-    </p:tnLst>
-  </p:timing>
 </p:sld>
 </file>
 

</xml_diff>

<commit_message>
update slides (add report)
</commit_message>
<xml_diff>
--- a/presentations/2019-02_Hamburg_RUG/1902 Hamburg RUG easystats.pptx
+++ b/presentations/2019-02_Hamburg_RUG/1902 Hamburg RUG easystats.pptx
@@ -5,10 +5,10 @@
     <p:sldMasterId id="2147483663" r:id="rId1"/>
   </p:sldMasterIdLst>
   <p:notesMasterIdLst>
-    <p:notesMasterId r:id="rId22"/>
+    <p:notesMasterId r:id="rId26"/>
   </p:notesMasterIdLst>
   <p:handoutMasterIdLst>
-    <p:handoutMasterId r:id="rId23"/>
+    <p:handoutMasterId r:id="rId27"/>
   </p:handoutMasterIdLst>
   <p:sldIdLst>
     <p:sldId id="622" r:id="rId2"/>
@@ -30,7 +30,11 @@
     <p:sldId id="642" r:id="rId18"/>
     <p:sldId id="643" r:id="rId19"/>
     <p:sldId id="646" r:id="rId20"/>
-    <p:sldId id="635" r:id="rId21"/>
+    <p:sldId id="647" r:id="rId21"/>
+    <p:sldId id="648" r:id="rId22"/>
+    <p:sldId id="649" r:id="rId23"/>
+    <p:sldId id="651" r:id="rId24"/>
+    <p:sldId id="635" r:id="rId25"/>
   </p:sldIdLst>
   <p:sldSz cx="9144000" cy="6858000" type="screen4x3"/>
   <p:notesSz cx="6858000" cy="9144000"/>
@@ -225,7 +229,7 @@
           <a:p>
             <a:fld id="{64CA4326-4DC0-4DE5-99BF-3FA9D988CBE6}" type="datetimeFigureOut">
               <a:rPr lang="de-DE" smtClean="0"/>
-              <a:t>05.02.2019</a:t>
+              <a:t>06.02.2019</a:t>
             </a:fld>
             <a:endParaRPr lang="de-DE"/>
           </a:p>
@@ -358,7 +362,7 @@
           <a:p>
             <a:fld id="{0E08E2FD-2E15-419A-B356-6759EA05D2AD}" type="datetimeFigureOut">
               <a:rPr lang="de-DE" smtClean="0"/>
-              <a:t>05.02.2019</a:t>
+              <a:t>06.02.2019</a:t>
             </a:fld>
             <a:endParaRPr lang="de-DE"/>
           </a:p>
@@ -1087,7 +1091,7 @@
           <a:noFill/>
           <a:extLst>
             <a:ext uri="{909E8E84-426E-40dd-AFC4-6F175D3DCCD1}">
-              <a14:hiddenFill xmlns="" xmlns:a14="http://schemas.microsoft.com/office/drawing/2010/main">
+              <a14:hiddenFill xmlns:a14="http://schemas.microsoft.com/office/drawing/2010/main" xmlns="">
                 <a:solidFill>
                   <a:srgbClr val="FFFFFF"/>
                 </a:solidFill>
@@ -1128,7 +1132,7 @@
           <a:noFill/>
           <a:extLst>
             <a:ext uri="{909E8E84-426E-40dd-AFC4-6F175D3DCCD1}">
-              <a14:hiddenFill xmlns="" xmlns:a14="http://schemas.microsoft.com/office/drawing/2010/main">
+              <a14:hiddenFill xmlns:a14="http://schemas.microsoft.com/office/drawing/2010/main" xmlns="">
                 <a:solidFill>
                   <a:srgbClr val="FFFFFF"/>
                 </a:solidFill>
@@ -1777,7 +1781,7 @@
           <a:noFill/>
           <a:extLst>
             <a:ext uri="{909E8E84-426E-40dd-AFC4-6F175D3DCCD1}">
-              <a14:hiddenFill xmlns="" xmlns:a14="http://schemas.microsoft.com/office/drawing/2010/main">
+              <a14:hiddenFill xmlns:a14="http://schemas.microsoft.com/office/drawing/2010/main" xmlns="">
                 <a:solidFill>
                   <a:srgbClr val="FFFFFF"/>
                 </a:solidFill>
@@ -1818,7 +1822,7 @@
           <a:noFill/>
           <a:extLst>
             <a:ext uri="{909E8E84-426E-40dd-AFC4-6F175D3DCCD1}">
-              <a14:hiddenFill xmlns="" xmlns:a14="http://schemas.microsoft.com/office/drawing/2010/main">
+              <a14:hiddenFill xmlns:a14="http://schemas.microsoft.com/office/drawing/2010/main" xmlns="">
                 <a:solidFill>
                   <a:srgbClr val="FFFFFF"/>
                 </a:solidFill>
@@ -5048,16 +5052,10 @@
               <a:t>easystats</a:t>
             </a:r>
             <a:r>
-              <a:rPr lang="de-DE" smtClean="0">
+              <a:rPr lang="de-DE">
                 <a:latin typeface="Source Sans Pro" panose="020B0503030403020204" pitchFamily="34" charset="0"/>
               </a:rPr>
               <a:t>“</a:t>
-            </a:r>
-            <a:r>
-              <a:rPr lang="de-DE" dirty="0">
-                <a:latin typeface="Source Sans Pro" panose="020B0503030403020204" pitchFamily="34" charset="0"/>
-              </a:rPr>
-              <a:t/>
             </a:r>
             <a:br>
               <a:rPr lang="de-DE" dirty="0">
@@ -5214,13 +5212,6 @@
   <p:clrMapOvr>
     <a:masterClrMapping/>
   </p:clrMapOvr>
-  <p:timing>
-    <p:tnLst>
-      <p:par>
-        <p:cTn id="1" dur="indefinite" restart="never" nodeType="tmRoot"/>
-      </p:par>
-    </p:tnLst>
-  </p:timing>
 </p:sld>
 </file>
 
@@ -5246,7 +5237,7 @@
           <p:cNvPr id="4" name="Fußzeilenplatzhalter 3">
             <a:extLst>
               <a:ext uri="{FF2B5EF4-FFF2-40B4-BE49-F238E27FC236}">
-                <a16:creationId xmlns="" xmlns:a16="http://schemas.microsoft.com/office/drawing/2014/main" id="{0FC0C19D-1682-4679-8E1E-D2E399E12164}"/>
+                <a16:creationId xmlns:a16="http://schemas.microsoft.com/office/drawing/2014/main" id="{0FC0C19D-1682-4679-8E1E-D2E399E12164}"/>
               </a:ext>
             </a:extLst>
           </p:cNvPr>
@@ -5287,7 +5278,7 @@
           <p:cNvPr id="6" name="Titel 5">
             <a:extLst>
               <a:ext uri="{FF2B5EF4-FFF2-40B4-BE49-F238E27FC236}">
-                <a16:creationId xmlns="" xmlns:a16="http://schemas.microsoft.com/office/drawing/2014/main" id="{F945D4CE-7FAD-45BF-A641-06AE09C0EF93}"/>
+                <a16:creationId xmlns:a16="http://schemas.microsoft.com/office/drawing/2014/main" id="{F945D4CE-7FAD-45BF-A641-06AE09C0EF93}"/>
               </a:ext>
             </a:extLst>
           </p:cNvPr>
@@ -5336,7 +5327,7 @@
           <p:cNvPr id="9" name="Textfeld 8">
             <a:extLst>
               <a:ext uri="{FF2B5EF4-FFF2-40B4-BE49-F238E27FC236}">
-                <a16:creationId xmlns="" xmlns:a16="http://schemas.microsoft.com/office/drawing/2014/main" id="{5BB6C03E-B970-4FA5-83BD-DA2E462C35A1}"/>
+                <a16:creationId xmlns:a16="http://schemas.microsoft.com/office/drawing/2014/main" id="{5BB6C03E-B970-4FA5-83BD-DA2E462C35A1}"/>
               </a:ext>
             </a:extLst>
           </p:cNvPr>
@@ -5522,7 +5513,7 @@
           <p:cNvPr id="3" name="Inhaltsplatzhalter 2">
             <a:extLst>
               <a:ext uri="{FF2B5EF4-FFF2-40B4-BE49-F238E27FC236}">
-                <a16:creationId xmlns="" xmlns:a16="http://schemas.microsoft.com/office/drawing/2014/main" id="{8AFA4034-B74C-496E-BC01-CDF31F1FC067}"/>
+                <a16:creationId xmlns:a16="http://schemas.microsoft.com/office/drawing/2014/main" id="{8AFA4034-B74C-496E-BC01-CDF31F1FC067}"/>
               </a:ext>
             </a:extLst>
           </p:cNvPr>
@@ -5562,13 +5553,6 @@
   <p:clrMapOvr>
     <a:masterClrMapping/>
   </p:clrMapOvr>
-  <p:timing>
-    <p:tnLst>
-      <p:par>
-        <p:cTn id="1" dur="indefinite" restart="never" nodeType="tmRoot"/>
-      </p:par>
-    </p:tnLst>
-  </p:timing>
 </p:sld>
 </file>
 
@@ -5594,7 +5578,7 @@
           <p:cNvPr id="4" name="Fußzeilenplatzhalter 3">
             <a:extLst>
               <a:ext uri="{FF2B5EF4-FFF2-40B4-BE49-F238E27FC236}">
-                <a16:creationId xmlns="" xmlns:a16="http://schemas.microsoft.com/office/drawing/2014/main" id="{0FC0C19D-1682-4679-8E1E-D2E399E12164}"/>
+                <a16:creationId xmlns:a16="http://schemas.microsoft.com/office/drawing/2014/main" id="{0FC0C19D-1682-4679-8E1E-D2E399E12164}"/>
               </a:ext>
             </a:extLst>
           </p:cNvPr>
@@ -5635,7 +5619,7 @@
           <p:cNvPr id="6" name="Titel 5">
             <a:extLst>
               <a:ext uri="{FF2B5EF4-FFF2-40B4-BE49-F238E27FC236}">
-                <a16:creationId xmlns="" xmlns:a16="http://schemas.microsoft.com/office/drawing/2014/main" id="{F945D4CE-7FAD-45BF-A641-06AE09C0EF93}"/>
+                <a16:creationId xmlns:a16="http://schemas.microsoft.com/office/drawing/2014/main" id="{F945D4CE-7FAD-45BF-A641-06AE09C0EF93}"/>
               </a:ext>
             </a:extLst>
           </p:cNvPr>
@@ -5684,7 +5668,7 @@
           <p:cNvPr id="9" name="Textfeld 8">
             <a:extLst>
               <a:ext uri="{FF2B5EF4-FFF2-40B4-BE49-F238E27FC236}">
-                <a16:creationId xmlns="" xmlns:a16="http://schemas.microsoft.com/office/drawing/2014/main" id="{5BB6C03E-B970-4FA5-83BD-DA2E462C35A1}"/>
+                <a16:creationId xmlns:a16="http://schemas.microsoft.com/office/drawing/2014/main" id="{5BB6C03E-B970-4FA5-83BD-DA2E462C35A1}"/>
               </a:ext>
             </a:extLst>
           </p:cNvPr>
@@ -5933,7 +5917,7 @@
           <p:cNvPr id="7" name="Inhaltsplatzhalter 6">
             <a:extLst>
               <a:ext uri="{FF2B5EF4-FFF2-40B4-BE49-F238E27FC236}">
-                <a16:creationId xmlns="" xmlns:a16="http://schemas.microsoft.com/office/drawing/2014/main" id="{ACC88CA9-43D9-4EC7-8353-01A2FA0A05D7}"/>
+                <a16:creationId xmlns:a16="http://schemas.microsoft.com/office/drawing/2014/main" id="{ACC88CA9-43D9-4EC7-8353-01A2FA0A05D7}"/>
               </a:ext>
             </a:extLst>
           </p:cNvPr>
@@ -5958,7 +5942,7 @@
           <p:cNvPr id="10" name="Inhaltsplatzhalter 2">
             <a:extLst>
               <a:ext uri="{FF2B5EF4-FFF2-40B4-BE49-F238E27FC236}">
-                <a16:creationId xmlns="" xmlns:a16="http://schemas.microsoft.com/office/drawing/2014/main" id="{7642EB22-60DE-4FC9-8D6E-8C945326D4BC}"/>
+                <a16:creationId xmlns:a16="http://schemas.microsoft.com/office/drawing/2014/main" id="{7642EB22-60DE-4FC9-8D6E-8C945326D4BC}"/>
               </a:ext>
             </a:extLst>
           </p:cNvPr>
@@ -5999,13 +5983,6 @@
   <p:clrMapOvr>
     <a:masterClrMapping/>
   </p:clrMapOvr>
-  <p:timing>
-    <p:tnLst>
-      <p:par>
-        <p:cTn id="1" dur="indefinite" restart="never" nodeType="tmRoot"/>
-      </p:par>
-    </p:tnLst>
-  </p:timing>
 </p:sld>
 </file>
 
@@ -6031,7 +6008,7 @@
           <p:cNvPr id="4" name="Fußzeilenplatzhalter 3">
             <a:extLst>
               <a:ext uri="{FF2B5EF4-FFF2-40B4-BE49-F238E27FC236}">
-                <a16:creationId xmlns="" xmlns:a16="http://schemas.microsoft.com/office/drawing/2014/main" id="{0FC0C19D-1682-4679-8E1E-D2E399E12164}"/>
+                <a16:creationId xmlns:a16="http://schemas.microsoft.com/office/drawing/2014/main" id="{0FC0C19D-1682-4679-8E1E-D2E399E12164}"/>
               </a:ext>
             </a:extLst>
           </p:cNvPr>
@@ -6065,7 +6042,7 @@
           <p:cNvPr id="6" name="Titel 5">
             <a:extLst>
               <a:ext uri="{FF2B5EF4-FFF2-40B4-BE49-F238E27FC236}">
-                <a16:creationId xmlns="" xmlns:a16="http://schemas.microsoft.com/office/drawing/2014/main" id="{F945D4CE-7FAD-45BF-A641-06AE09C0EF93}"/>
+                <a16:creationId xmlns:a16="http://schemas.microsoft.com/office/drawing/2014/main" id="{F945D4CE-7FAD-45BF-A641-06AE09C0EF93}"/>
               </a:ext>
             </a:extLst>
           </p:cNvPr>
@@ -6114,7 +6091,7 @@
           <p:cNvPr id="9" name="Textfeld 8">
             <a:extLst>
               <a:ext uri="{FF2B5EF4-FFF2-40B4-BE49-F238E27FC236}">
-                <a16:creationId xmlns="" xmlns:a16="http://schemas.microsoft.com/office/drawing/2014/main" id="{5BB6C03E-B970-4FA5-83BD-DA2E462C35A1}"/>
+                <a16:creationId xmlns:a16="http://schemas.microsoft.com/office/drawing/2014/main" id="{5BB6C03E-B970-4FA5-83BD-DA2E462C35A1}"/>
               </a:ext>
             </a:extLst>
           </p:cNvPr>
@@ -6486,7 +6463,7 @@
           <p:cNvPr id="7" name="Inhaltsplatzhalter 6">
             <a:extLst>
               <a:ext uri="{FF2B5EF4-FFF2-40B4-BE49-F238E27FC236}">
-                <a16:creationId xmlns="" xmlns:a16="http://schemas.microsoft.com/office/drawing/2014/main" id="{8A35C46B-6FA1-4FA7-8603-FE979BA7FE3E}"/>
+                <a16:creationId xmlns:a16="http://schemas.microsoft.com/office/drawing/2014/main" id="{8A35C46B-6FA1-4FA7-8603-FE979BA7FE3E}"/>
               </a:ext>
             </a:extLst>
           </p:cNvPr>
@@ -6511,7 +6488,7 @@
           <p:cNvPr id="10" name="Inhaltsplatzhalter 2">
             <a:extLst>
               <a:ext uri="{FF2B5EF4-FFF2-40B4-BE49-F238E27FC236}">
-                <a16:creationId xmlns="" xmlns:a16="http://schemas.microsoft.com/office/drawing/2014/main" id="{2AAA0C88-246A-47B1-8154-75B0D77D2311}"/>
+                <a16:creationId xmlns:a16="http://schemas.microsoft.com/office/drawing/2014/main" id="{2AAA0C88-246A-47B1-8154-75B0D77D2311}"/>
               </a:ext>
             </a:extLst>
           </p:cNvPr>
@@ -6552,13 +6529,6 @@
   <p:clrMapOvr>
     <a:masterClrMapping/>
   </p:clrMapOvr>
-  <p:timing>
-    <p:tnLst>
-      <p:par>
-        <p:cTn id="1" dur="indefinite" restart="never" nodeType="tmRoot"/>
-      </p:par>
-    </p:tnLst>
-  </p:timing>
 </p:sld>
 </file>
 
@@ -6584,7 +6554,7 @@
           <p:cNvPr id="5" name="Textplatzhalter 4">
             <a:extLst>
               <a:ext uri="{FF2B5EF4-FFF2-40B4-BE49-F238E27FC236}">
-                <a16:creationId xmlns="" xmlns:a16="http://schemas.microsoft.com/office/drawing/2014/main" id="{67DE0ECA-5E5C-43D9-A4C4-B3A31EB20E63}"/>
+                <a16:creationId xmlns:a16="http://schemas.microsoft.com/office/drawing/2014/main" id="{67DE0ECA-5E5C-43D9-A4C4-B3A31EB20E63}"/>
               </a:ext>
             </a:extLst>
           </p:cNvPr>
@@ -6619,7 +6589,7 @@
           <p:cNvPr id="3" name="Grafik 2">
             <a:extLst>
               <a:ext uri="{FF2B5EF4-FFF2-40B4-BE49-F238E27FC236}">
-                <a16:creationId xmlns="" xmlns:a16="http://schemas.microsoft.com/office/drawing/2014/main" id="{99510B2A-C3A7-4CD7-A56D-FB23433FFE9C}"/>
+                <a16:creationId xmlns:a16="http://schemas.microsoft.com/office/drawing/2014/main" id="{99510B2A-C3A7-4CD7-A56D-FB23433FFE9C}"/>
               </a:ext>
             </a:extLst>
           </p:cNvPr>
@@ -6660,13 +6630,6 @@
   <p:clrMapOvr>
     <a:masterClrMapping/>
   </p:clrMapOvr>
-  <p:timing>
-    <p:tnLst>
-      <p:par>
-        <p:cTn id="1" dur="indefinite" restart="never" nodeType="tmRoot"/>
-      </p:par>
-    </p:tnLst>
-  </p:timing>
 </p:sld>
 </file>
 
@@ -6692,7 +6655,7 @@
           <p:cNvPr id="13" name="Grafik 12">
             <a:extLst>
               <a:ext uri="{FF2B5EF4-FFF2-40B4-BE49-F238E27FC236}">
-                <a16:creationId xmlns="" xmlns:a16="http://schemas.microsoft.com/office/drawing/2014/main" id="{FF895708-38EE-4371-8B22-E82F604061DE}"/>
+                <a16:creationId xmlns:a16="http://schemas.microsoft.com/office/drawing/2014/main" id="{FF895708-38EE-4371-8B22-E82F604061DE}"/>
               </a:ext>
             </a:extLst>
           </p:cNvPr>
@@ -6728,7 +6691,7 @@
           <p:cNvPr id="2" name="Inhaltsplatzhalter 1">
             <a:extLst>
               <a:ext uri="{FF2B5EF4-FFF2-40B4-BE49-F238E27FC236}">
-                <a16:creationId xmlns="" xmlns:a16="http://schemas.microsoft.com/office/drawing/2014/main" id="{917F168F-F8CE-4DD4-BCEA-59877FE06ABD}"/>
+                <a16:creationId xmlns:a16="http://schemas.microsoft.com/office/drawing/2014/main" id="{917F168F-F8CE-4DD4-BCEA-59877FE06ABD}"/>
               </a:ext>
             </a:extLst>
           </p:cNvPr>
@@ -6780,7 +6743,7 @@
           <p:cNvPr id="4" name="Fußzeilenplatzhalter 3">
             <a:extLst>
               <a:ext uri="{FF2B5EF4-FFF2-40B4-BE49-F238E27FC236}">
-                <a16:creationId xmlns="" xmlns:a16="http://schemas.microsoft.com/office/drawing/2014/main" id="{252315B1-7337-4C45-8A5C-CBD6F1F21BA3}"/>
+                <a16:creationId xmlns:a16="http://schemas.microsoft.com/office/drawing/2014/main" id="{252315B1-7337-4C45-8A5C-CBD6F1F21BA3}"/>
               </a:ext>
             </a:extLst>
           </p:cNvPr>
@@ -6814,7 +6777,7 @@
           <p:cNvPr id="6" name="Titel 5">
             <a:extLst>
               <a:ext uri="{FF2B5EF4-FFF2-40B4-BE49-F238E27FC236}">
-                <a16:creationId xmlns="" xmlns:a16="http://schemas.microsoft.com/office/drawing/2014/main" id="{E88D0AAF-755E-438D-A419-21BAF2BB4EB7}"/>
+                <a16:creationId xmlns:a16="http://schemas.microsoft.com/office/drawing/2014/main" id="{E88D0AAF-755E-438D-A419-21BAF2BB4EB7}"/>
               </a:ext>
             </a:extLst>
           </p:cNvPr>
@@ -6845,7 +6808,7 @@
           <p:cNvPr id="5" name="Inhaltsplatzhalter 4">
             <a:extLst>
               <a:ext uri="{FF2B5EF4-FFF2-40B4-BE49-F238E27FC236}">
-                <a16:creationId xmlns="" xmlns:a16="http://schemas.microsoft.com/office/drawing/2014/main" id="{0D920E20-9C3B-45F7-B7DF-E0C531E13B05}"/>
+                <a16:creationId xmlns:a16="http://schemas.microsoft.com/office/drawing/2014/main" id="{0D920E20-9C3B-45F7-B7DF-E0C531E13B05}"/>
               </a:ext>
             </a:extLst>
           </p:cNvPr>
@@ -6880,7 +6843,7 @@
           <p:cNvPr id="10" name="Rechteck 9">
             <a:extLst>
               <a:ext uri="{FF2B5EF4-FFF2-40B4-BE49-F238E27FC236}">
-                <a16:creationId xmlns="" xmlns:a16="http://schemas.microsoft.com/office/drawing/2014/main" id="{EB7FEFC9-05FF-4A8D-B810-D4F75C09ADAD}"/>
+                <a16:creationId xmlns:a16="http://schemas.microsoft.com/office/drawing/2014/main" id="{EB7FEFC9-05FF-4A8D-B810-D4F75C09ADAD}"/>
               </a:ext>
             </a:extLst>
           </p:cNvPr>
@@ -7000,7 +6963,7 @@
           <p:cNvPr id="11" name="Rechteck 10">
             <a:extLst>
               <a:ext uri="{FF2B5EF4-FFF2-40B4-BE49-F238E27FC236}">
-                <a16:creationId xmlns="" xmlns:a16="http://schemas.microsoft.com/office/drawing/2014/main" id="{2AEA2081-5C64-4D74-A8A5-C8EE9250A2BE}"/>
+                <a16:creationId xmlns:a16="http://schemas.microsoft.com/office/drawing/2014/main" id="{2AEA2081-5C64-4D74-A8A5-C8EE9250A2BE}"/>
               </a:ext>
             </a:extLst>
           </p:cNvPr>
@@ -7125,13 +7088,6 @@
   <p:clrMapOvr>
     <a:masterClrMapping/>
   </p:clrMapOvr>
-  <p:timing>
-    <p:tnLst>
-      <p:par>
-        <p:cTn id="1" dur="indefinite" restart="never" nodeType="tmRoot"/>
-      </p:par>
-    </p:tnLst>
-  </p:timing>
 </p:sld>
 </file>
 
@@ -7157,7 +7113,7 @@
           <p:cNvPr id="13" name="Grafik 12">
             <a:extLst>
               <a:ext uri="{FF2B5EF4-FFF2-40B4-BE49-F238E27FC236}">
-                <a16:creationId xmlns="" xmlns:a16="http://schemas.microsoft.com/office/drawing/2014/main" id="{FF895708-38EE-4371-8B22-E82F604061DE}"/>
+                <a16:creationId xmlns:a16="http://schemas.microsoft.com/office/drawing/2014/main" id="{FF895708-38EE-4371-8B22-E82F604061DE}"/>
               </a:ext>
             </a:extLst>
           </p:cNvPr>
@@ -7193,7 +7149,7 @@
           <p:cNvPr id="2" name="Inhaltsplatzhalter 1">
             <a:extLst>
               <a:ext uri="{FF2B5EF4-FFF2-40B4-BE49-F238E27FC236}">
-                <a16:creationId xmlns="" xmlns:a16="http://schemas.microsoft.com/office/drawing/2014/main" id="{917F168F-F8CE-4DD4-BCEA-59877FE06ABD}"/>
+                <a16:creationId xmlns:a16="http://schemas.microsoft.com/office/drawing/2014/main" id="{917F168F-F8CE-4DD4-BCEA-59877FE06ABD}"/>
               </a:ext>
             </a:extLst>
           </p:cNvPr>
@@ -7250,7 +7206,7 @@
           <p:cNvPr id="4" name="Fußzeilenplatzhalter 3">
             <a:extLst>
               <a:ext uri="{FF2B5EF4-FFF2-40B4-BE49-F238E27FC236}">
-                <a16:creationId xmlns="" xmlns:a16="http://schemas.microsoft.com/office/drawing/2014/main" id="{252315B1-7337-4C45-8A5C-CBD6F1F21BA3}"/>
+                <a16:creationId xmlns:a16="http://schemas.microsoft.com/office/drawing/2014/main" id="{252315B1-7337-4C45-8A5C-CBD6F1F21BA3}"/>
               </a:ext>
             </a:extLst>
           </p:cNvPr>
@@ -7284,7 +7240,7 @@
           <p:cNvPr id="6" name="Titel 5">
             <a:extLst>
               <a:ext uri="{FF2B5EF4-FFF2-40B4-BE49-F238E27FC236}">
-                <a16:creationId xmlns="" xmlns:a16="http://schemas.microsoft.com/office/drawing/2014/main" id="{E88D0AAF-755E-438D-A419-21BAF2BB4EB7}"/>
+                <a16:creationId xmlns:a16="http://schemas.microsoft.com/office/drawing/2014/main" id="{E88D0AAF-755E-438D-A419-21BAF2BB4EB7}"/>
               </a:ext>
             </a:extLst>
           </p:cNvPr>
@@ -7315,7 +7271,7 @@
           <p:cNvPr id="5" name="Inhaltsplatzhalter 4">
             <a:extLst>
               <a:ext uri="{FF2B5EF4-FFF2-40B4-BE49-F238E27FC236}">
-                <a16:creationId xmlns="" xmlns:a16="http://schemas.microsoft.com/office/drawing/2014/main" id="{0D920E20-9C3B-45F7-B7DF-E0C531E13B05}"/>
+                <a16:creationId xmlns:a16="http://schemas.microsoft.com/office/drawing/2014/main" id="{0D920E20-9C3B-45F7-B7DF-E0C531E13B05}"/>
               </a:ext>
             </a:extLst>
           </p:cNvPr>
@@ -7350,7 +7306,7 @@
           <p:cNvPr id="10" name="Rechteck 9">
             <a:extLst>
               <a:ext uri="{FF2B5EF4-FFF2-40B4-BE49-F238E27FC236}">
-                <a16:creationId xmlns="" xmlns:a16="http://schemas.microsoft.com/office/drawing/2014/main" id="{EB7FEFC9-05FF-4A8D-B810-D4F75C09ADAD}"/>
+                <a16:creationId xmlns:a16="http://schemas.microsoft.com/office/drawing/2014/main" id="{EB7FEFC9-05FF-4A8D-B810-D4F75C09ADAD}"/>
               </a:ext>
             </a:extLst>
           </p:cNvPr>
@@ -7470,7 +7426,7 @@
           <p:cNvPr id="11" name="Rechteck 10">
             <a:extLst>
               <a:ext uri="{FF2B5EF4-FFF2-40B4-BE49-F238E27FC236}">
-                <a16:creationId xmlns="" xmlns:a16="http://schemas.microsoft.com/office/drawing/2014/main" id="{2AEA2081-5C64-4D74-A8A5-C8EE9250A2BE}"/>
+                <a16:creationId xmlns:a16="http://schemas.microsoft.com/office/drawing/2014/main" id="{2AEA2081-5C64-4D74-A8A5-C8EE9250A2BE}"/>
               </a:ext>
             </a:extLst>
           </p:cNvPr>
@@ -7595,13 +7551,6 @@
   <p:clrMapOvr>
     <a:masterClrMapping/>
   </p:clrMapOvr>
-  <p:timing>
-    <p:tnLst>
-      <p:par>
-        <p:cTn id="1" dur="indefinite" restart="never" nodeType="tmRoot"/>
-      </p:par>
-    </p:tnLst>
-  </p:timing>
 </p:sld>
 </file>
 
@@ -7627,7 +7576,7 @@
           <p:cNvPr id="2" name="Inhaltsplatzhalter 1">
             <a:extLst>
               <a:ext uri="{FF2B5EF4-FFF2-40B4-BE49-F238E27FC236}">
-                <a16:creationId xmlns="" xmlns:a16="http://schemas.microsoft.com/office/drawing/2014/main" id="{9EEF70E0-DC88-48AD-8EF7-031F96353D1D}"/>
+                <a16:creationId xmlns:a16="http://schemas.microsoft.com/office/drawing/2014/main" id="{9EEF70E0-DC88-48AD-8EF7-031F96353D1D}"/>
               </a:ext>
             </a:extLst>
           </p:cNvPr>
@@ -7720,7 +7669,7 @@
           <p:cNvPr id="4" name="Fußzeilenplatzhalter 3">
             <a:extLst>
               <a:ext uri="{FF2B5EF4-FFF2-40B4-BE49-F238E27FC236}">
-                <a16:creationId xmlns="" xmlns:a16="http://schemas.microsoft.com/office/drawing/2014/main" id="{51B427D6-C78C-4800-A708-8DE04DA34FAA}"/>
+                <a16:creationId xmlns:a16="http://schemas.microsoft.com/office/drawing/2014/main" id="{51B427D6-C78C-4800-A708-8DE04DA34FAA}"/>
               </a:ext>
             </a:extLst>
           </p:cNvPr>
@@ -7761,7 +7710,7 @@
           <p:cNvPr id="6" name="Titel 5">
             <a:extLst>
               <a:ext uri="{FF2B5EF4-FFF2-40B4-BE49-F238E27FC236}">
-                <a16:creationId xmlns="" xmlns:a16="http://schemas.microsoft.com/office/drawing/2014/main" id="{4ACCE5D5-075E-481D-B9C5-A3074B841447}"/>
+                <a16:creationId xmlns:a16="http://schemas.microsoft.com/office/drawing/2014/main" id="{4ACCE5D5-075E-481D-B9C5-A3074B841447}"/>
               </a:ext>
             </a:extLst>
           </p:cNvPr>
@@ -7790,7 +7739,7 @@
           <p:cNvPr id="7" name="Inhaltsplatzhalter 6">
             <a:extLst>
               <a:ext uri="{FF2B5EF4-FFF2-40B4-BE49-F238E27FC236}">
-                <a16:creationId xmlns="" xmlns:a16="http://schemas.microsoft.com/office/drawing/2014/main" id="{91EE5F19-F06C-41B0-A917-E9959AFBDF9F}"/>
+                <a16:creationId xmlns:a16="http://schemas.microsoft.com/office/drawing/2014/main" id="{91EE5F19-F06C-41B0-A917-E9959AFBDF9F}"/>
               </a:ext>
             </a:extLst>
           </p:cNvPr>
@@ -7820,13 +7769,6 @@
   <p:clrMapOvr>
     <a:masterClrMapping/>
   </p:clrMapOvr>
-  <p:timing>
-    <p:tnLst>
-      <p:par>
-        <p:cTn id="1" dur="indefinite" restart="never" nodeType="tmRoot"/>
-      </p:par>
-    </p:tnLst>
-  </p:timing>
 </p:sld>
 </file>
 
@@ -7852,7 +7794,7 @@
           <p:cNvPr id="4" name="Fußzeilenplatzhalter 3">
             <a:extLst>
               <a:ext uri="{FF2B5EF4-FFF2-40B4-BE49-F238E27FC236}">
-                <a16:creationId xmlns="" xmlns:a16="http://schemas.microsoft.com/office/drawing/2014/main" id="{0FC0C19D-1682-4679-8E1E-D2E399E12164}"/>
+                <a16:creationId xmlns:a16="http://schemas.microsoft.com/office/drawing/2014/main" id="{0FC0C19D-1682-4679-8E1E-D2E399E12164}"/>
               </a:ext>
             </a:extLst>
           </p:cNvPr>
@@ -7886,7 +7828,7 @@
           <p:cNvPr id="6" name="Titel 5">
             <a:extLst>
               <a:ext uri="{FF2B5EF4-FFF2-40B4-BE49-F238E27FC236}">
-                <a16:creationId xmlns="" xmlns:a16="http://schemas.microsoft.com/office/drawing/2014/main" id="{F945D4CE-7FAD-45BF-A641-06AE09C0EF93}"/>
+                <a16:creationId xmlns:a16="http://schemas.microsoft.com/office/drawing/2014/main" id="{F945D4CE-7FAD-45BF-A641-06AE09C0EF93}"/>
               </a:ext>
             </a:extLst>
           </p:cNvPr>
@@ -7947,7 +7889,7 @@
           <p:cNvPr id="9" name="Textfeld 8">
             <a:extLst>
               <a:ext uri="{FF2B5EF4-FFF2-40B4-BE49-F238E27FC236}">
-                <a16:creationId xmlns="" xmlns:a16="http://schemas.microsoft.com/office/drawing/2014/main" id="{5BB6C03E-B970-4FA5-83BD-DA2E462C35A1}"/>
+                <a16:creationId xmlns:a16="http://schemas.microsoft.com/office/drawing/2014/main" id="{5BB6C03E-B970-4FA5-83BD-DA2E462C35A1}"/>
               </a:ext>
             </a:extLst>
           </p:cNvPr>
@@ -8185,7 +8127,7 @@
           <p:cNvPr id="3" name="Inhaltsplatzhalter 2">
             <a:extLst>
               <a:ext uri="{FF2B5EF4-FFF2-40B4-BE49-F238E27FC236}">
-                <a16:creationId xmlns="" xmlns:a16="http://schemas.microsoft.com/office/drawing/2014/main" id="{CEF85EFD-AB38-43A6-87C8-FCB2B77AE55F}"/>
+                <a16:creationId xmlns:a16="http://schemas.microsoft.com/office/drawing/2014/main" id="{CEF85EFD-AB38-43A6-87C8-FCB2B77AE55F}"/>
               </a:ext>
             </a:extLst>
           </p:cNvPr>
@@ -8225,13 +8167,6 @@
   <p:clrMapOvr>
     <a:masterClrMapping/>
   </p:clrMapOvr>
-  <p:timing>
-    <p:tnLst>
-      <p:par>
-        <p:cTn id="1" dur="indefinite" restart="never" nodeType="tmRoot"/>
-      </p:par>
-    </p:tnLst>
-  </p:timing>
 </p:sld>
 </file>
 
@@ -8257,7 +8192,7 @@
           <p:cNvPr id="4" name="Fußzeilenplatzhalter 3">
             <a:extLst>
               <a:ext uri="{FF2B5EF4-FFF2-40B4-BE49-F238E27FC236}">
-                <a16:creationId xmlns="" xmlns:a16="http://schemas.microsoft.com/office/drawing/2014/main" id="{0FC0C19D-1682-4679-8E1E-D2E399E12164}"/>
+                <a16:creationId xmlns:a16="http://schemas.microsoft.com/office/drawing/2014/main" id="{0FC0C19D-1682-4679-8E1E-D2E399E12164}"/>
               </a:ext>
             </a:extLst>
           </p:cNvPr>
@@ -8291,7 +8226,7 @@
           <p:cNvPr id="6" name="Titel 5">
             <a:extLst>
               <a:ext uri="{FF2B5EF4-FFF2-40B4-BE49-F238E27FC236}">
-                <a16:creationId xmlns="" xmlns:a16="http://schemas.microsoft.com/office/drawing/2014/main" id="{F945D4CE-7FAD-45BF-A641-06AE09C0EF93}"/>
+                <a16:creationId xmlns:a16="http://schemas.microsoft.com/office/drawing/2014/main" id="{F945D4CE-7FAD-45BF-A641-06AE09C0EF93}"/>
               </a:ext>
             </a:extLst>
           </p:cNvPr>
@@ -8352,7 +8287,7 @@
           <p:cNvPr id="9" name="Textfeld 8">
             <a:extLst>
               <a:ext uri="{FF2B5EF4-FFF2-40B4-BE49-F238E27FC236}">
-                <a16:creationId xmlns="" xmlns:a16="http://schemas.microsoft.com/office/drawing/2014/main" id="{5BB6C03E-B970-4FA5-83BD-DA2E462C35A1}"/>
+                <a16:creationId xmlns:a16="http://schemas.microsoft.com/office/drawing/2014/main" id="{5BB6C03E-B970-4FA5-83BD-DA2E462C35A1}"/>
               </a:ext>
             </a:extLst>
           </p:cNvPr>
@@ -8770,7 +8705,7 @@
           <p:cNvPr id="7" name="Inhaltsplatzhalter 6">
             <a:extLst>
               <a:ext uri="{FF2B5EF4-FFF2-40B4-BE49-F238E27FC236}">
-                <a16:creationId xmlns="" xmlns:a16="http://schemas.microsoft.com/office/drawing/2014/main" id="{02E73D04-5C87-4990-9FD5-28E200352959}"/>
+                <a16:creationId xmlns:a16="http://schemas.microsoft.com/office/drawing/2014/main" id="{02E73D04-5C87-4990-9FD5-28E200352959}"/>
               </a:ext>
             </a:extLst>
           </p:cNvPr>
@@ -8795,7 +8730,7 @@
           <p:cNvPr id="10" name="Inhaltsplatzhalter 2">
             <a:extLst>
               <a:ext uri="{FF2B5EF4-FFF2-40B4-BE49-F238E27FC236}">
-                <a16:creationId xmlns="" xmlns:a16="http://schemas.microsoft.com/office/drawing/2014/main" id="{3D50B8CB-49CB-480F-8369-501E071177D8}"/>
+                <a16:creationId xmlns:a16="http://schemas.microsoft.com/office/drawing/2014/main" id="{3D50B8CB-49CB-480F-8369-501E071177D8}"/>
               </a:ext>
             </a:extLst>
           </p:cNvPr>
@@ -8836,13 +8771,6 @@
   <p:clrMapOvr>
     <a:masterClrMapping/>
   </p:clrMapOvr>
-  <p:timing>
-    <p:tnLst>
-      <p:par>
-        <p:cTn id="1" dur="indefinite" restart="never" nodeType="tmRoot"/>
-      </p:par>
-    </p:tnLst>
-  </p:timing>
 </p:sld>
 </file>
 
@@ -8868,7 +8796,7 @@
           <p:cNvPr id="4" name="Fußzeilenplatzhalter 3">
             <a:extLst>
               <a:ext uri="{FF2B5EF4-FFF2-40B4-BE49-F238E27FC236}">
-                <a16:creationId xmlns="" xmlns:a16="http://schemas.microsoft.com/office/drawing/2014/main" id="{0FC0C19D-1682-4679-8E1E-D2E399E12164}"/>
+                <a16:creationId xmlns:a16="http://schemas.microsoft.com/office/drawing/2014/main" id="{0FC0C19D-1682-4679-8E1E-D2E399E12164}"/>
               </a:ext>
             </a:extLst>
           </p:cNvPr>
@@ -8902,7 +8830,7 @@
           <p:cNvPr id="6" name="Titel 5">
             <a:extLst>
               <a:ext uri="{FF2B5EF4-FFF2-40B4-BE49-F238E27FC236}">
-                <a16:creationId xmlns="" xmlns:a16="http://schemas.microsoft.com/office/drawing/2014/main" id="{F945D4CE-7FAD-45BF-A641-06AE09C0EF93}"/>
+                <a16:creationId xmlns:a16="http://schemas.microsoft.com/office/drawing/2014/main" id="{F945D4CE-7FAD-45BF-A641-06AE09C0EF93}"/>
               </a:ext>
             </a:extLst>
           </p:cNvPr>
@@ -8963,7 +8891,7 @@
           <p:cNvPr id="9" name="Textfeld 8">
             <a:extLst>
               <a:ext uri="{FF2B5EF4-FFF2-40B4-BE49-F238E27FC236}">
-                <a16:creationId xmlns="" xmlns:a16="http://schemas.microsoft.com/office/drawing/2014/main" id="{5BB6C03E-B970-4FA5-83BD-DA2E462C35A1}"/>
+                <a16:creationId xmlns:a16="http://schemas.microsoft.com/office/drawing/2014/main" id="{5BB6C03E-B970-4FA5-83BD-DA2E462C35A1}"/>
               </a:ext>
             </a:extLst>
           </p:cNvPr>
@@ -9357,7 +9285,7 @@
           <p:cNvPr id="7" name="Inhaltsplatzhalter 6">
             <a:extLst>
               <a:ext uri="{FF2B5EF4-FFF2-40B4-BE49-F238E27FC236}">
-                <a16:creationId xmlns="" xmlns:a16="http://schemas.microsoft.com/office/drawing/2014/main" id="{02E73D04-5C87-4990-9FD5-28E200352959}"/>
+                <a16:creationId xmlns:a16="http://schemas.microsoft.com/office/drawing/2014/main" id="{02E73D04-5C87-4990-9FD5-28E200352959}"/>
               </a:ext>
             </a:extLst>
           </p:cNvPr>
@@ -9382,7 +9310,7 @@
           <p:cNvPr id="10" name="Inhaltsplatzhalter 2">
             <a:extLst>
               <a:ext uri="{FF2B5EF4-FFF2-40B4-BE49-F238E27FC236}">
-                <a16:creationId xmlns="" xmlns:a16="http://schemas.microsoft.com/office/drawing/2014/main" id="{3D50B8CB-49CB-480F-8369-501E071177D8}"/>
+                <a16:creationId xmlns:a16="http://schemas.microsoft.com/office/drawing/2014/main" id="{3D50B8CB-49CB-480F-8369-501E071177D8}"/>
               </a:ext>
             </a:extLst>
           </p:cNvPr>
@@ -9423,13 +9351,6 @@
   <p:clrMapOvr>
     <a:masterClrMapping/>
   </p:clrMapOvr>
-  <p:timing>
-    <p:tnLst>
-      <p:par>
-        <p:cTn id="1" dur="indefinite" restart="never" nodeType="tmRoot"/>
-      </p:par>
-    </p:tnLst>
-  </p:timing>
 </p:sld>
 </file>
 
@@ -9474,7 +9395,7 @@
           <p:cNvPr id="5" name="Textplatzhalter 4">
             <a:extLst>
               <a:ext uri="{FF2B5EF4-FFF2-40B4-BE49-F238E27FC236}">
-                <a16:creationId xmlns="" xmlns:a16="http://schemas.microsoft.com/office/drawing/2014/main" id="{67DE0ECA-5E5C-43D9-A4C4-B3A31EB20E63}"/>
+                <a16:creationId xmlns:a16="http://schemas.microsoft.com/office/drawing/2014/main" id="{67DE0ECA-5E5C-43D9-A4C4-B3A31EB20E63}"/>
               </a:ext>
             </a:extLst>
           </p:cNvPr>
@@ -9504,7 +9425,7 @@
           <p:cNvPr id="7" name="Grafik 6">
             <a:extLst>
               <a:ext uri="{FF2B5EF4-FFF2-40B4-BE49-F238E27FC236}">
-                <a16:creationId xmlns="" xmlns:a16="http://schemas.microsoft.com/office/drawing/2014/main" id="{9662A82F-40D1-46D3-B342-3A7B12F5AF35}"/>
+                <a16:creationId xmlns:a16="http://schemas.microsoft.com/office/drawing/2014/main" id="{9662A82F-40D1-46D3-B342-3A7B12F5AF35}"/>
               </a:ext>
             </a:extLst>
           </p:cNvPr>
@@ -9545,13 +9466,6 @@
   <p:clrMapOvr>
     <a:masterClrMapping/>
   </p:clrMapOvr>
-  <p:timing>
-    <p:tnLst>
-      <p:par>
-        <p:cTn id="1" dur="indefinite" restart="never" nodeType="tmRoot"/>
-      </p:par>
-    </p:tnLst>
-  </p:timing>
 </p:sld>
 </file>
 
@@ -9574,10 +9488,756 @@
       </p:grpSpPr>
       <p:sp>
         <p:nvSpPr>
+          <p:cNvPr id="5" name="Textplatzhalter 4">
+            <a:extLst>
+              <a:ext uri="{FF2B5EF4-FFF2-40B4-BE49-F238E27FC236}">
+                <a16:creationId xmlns:a16="http://schemas.microsoft.com/office/drawing/2014/main" id="{67DE0ECA-5E5C-43D9-A4C4-B3A31EB20E63}"/>
+              </a:ext>
+            </a:extLst>
+          </p:cNvPr>
+          <p:cNvSpPr>
+            <a:spLocks noGrp="1"/>
+          </p:cNvSpPr>
+          <p:nvPr>
+            <p:ph type="body" idx="1"/>
+          </p:nvPr>
+        </p:nvSpPr>
+        <p:spPr>
+          <a:xfrm>
+            <a:off x="722313" y="4193606"/>
+            <a:ext cx="7772400" cy="1500187"/>
+          </a:xfrm>
+        </p:spPr>
+        <p:txBody>
+          <a:bodyPr>
+            <a:normAutofit/>
+          </a:bodyPr>
+          <a:lstStyle/>
+          <a:p>
+            <a:r>
+              <a:rPr lang="en-US" sz="1800" dirty="0"/>
+              <a:t>Tell others about your research!</a:t>
+            </a:r>
+          </a:p>
+        </p:txBody>
+      </p:sp>
+      <p:pic>
+        <p:nvPicPr>
+          <p:cNvPr id="4" name="Grafik 3">
+            <a:extLst>
+              <a:ext uri="{FF2B5EF4-FFF2-40B4-BE49-F238E27FC236}">
+                <a16:creationId xmlns:a16="http://schemas.microsoft.com/office/drawing/2014/main" id="{5C978442-D162-4FCA-BE28-D926E2EB979A}"/>
+              </a:ext>
+            </a:extLst>
+          </p:cNvPr>
+          <p:cNvPicPr>
+            <a:picLocks noChangeAspect="1"/>
+          </p:cNvPicPr>
+          <p:nvPr/>
+        </p:nvPicPr>
+        <p:blipFill>
+          <a:blip r:embed="rId2" cstate="print">
+            <a:extLst>
+              <a:ext uri="{28A0092B-C50C-407E-A947-70E740481C1C}">
+                <a14:useLocalDpi xmlns:a14="http://schemas.microsoft.com/office/drawing/2010/main" val="0"/>
+              </a:ext>
+            </a:extLst>
+          </a:blip>
+          <a:stretch>
+            <a:fillRect/>
+          </a:stretch>
+        </p:blipFill>
+        <p:spPr>
+          <a:xfrm>
+            <a:off x="2772513" y="1164207"/>
+            <a:ext cx="3672000" cy="4249665"/>
+          </a:xfrm>
+          <a:prstGeom prst="rect">
+            <a:avLst/>
+          </a:prstGeom>
+        </p:spPr>
+      </p:pic>
+    </p:spTree>
+    <p:extLst>
+      <p:ext uri="{BB962C8B-B14F-4D97-AF65-F5344CB8AC3E}">
+        <p14:creationId xmlns:p14="http://schemas.microsoft.com/office/powerpoint/2010/main" val="13185901"/>
+      </p:ext>
+    </p:extLst>
+  </p:cSld>
+  <p:clrMapOvr>
+    <a:masterClrMapping/>
+  </p:clrMapOvr>
+</p:sld>
+</file>
+
+<file path=ppt/slides/slide21.xml><?xml version="1.0" encoding="utf-8"?>
+<p:sld xmlns:a="http://schemas.openxmlformats.org/drawingml/2006/main" xmlns:r="http://schemas.openxmlformats.org/officeDocument/2006/relationships" xmlns:p="http://schemas.openxmlformats.org/presentationml/2006/main">
+  <p:cSld>
+    <p:spTree>
+      <p:nvGrpSpPr>
+        <p:cNvPr id="1" name=""/>
+        <p:cNvGrpSpPr/>
+        <p:nvPr/>
+      </p:nvGrpSpPr>
+      <p:grpSpPr>
+        <a:xfrm>
+          <a:off x="0" y="0"/>
+          <a:ext cx="0" cy="0"/>
+          <a:chOff x="0" y="0"/>
+          <a:chExt cx="0" cy="0"/>
+        </a:xfrm>
+      </p:grpSpPr>
+      <p:sp>
+        <p:nvSpPr>
           <p:cNvPr id="2" name="Inhaltsplatzhalter 1">
             <a:extLst>
               <a:ext uri="{FF2B5EF4-FFF2-40B4-BE49-F238E27FC236}">
-                <a16:creationId xmlns="" xmlns:a16="http://schemas.microsoft.com/office/drawing/2014/main" id="{FA35B9DB-F60D-4066-B8D9-2AEEC4F64DCC}"/>
+                <a16:creationId xmlns:a16="http://schemas.microsoft.com/office/drawing/2014/main" id="{9EEF70E0-DC88-48AD-8EF7-031F96353D1D}"/>
+              </a:ext>
+            </a:extLst>
+          </p:cNvPr>
+          <p:cNvSpPr>
+            <a:spLocks noGrp="1"/>
+          </p:cNvSpPr>
+          <p:nvPr>
+            <p:ph idx="1"/>
+          </p:nvPr>
+        </p:nvSpPr>
+        <p:spPr/>
+        <p:txBody>
+          <a:bodyPr/>
+          <a:lstStyle/>
+          <a:p>
+            <a:r>
+              <a:rPr lang="en-US" dirty="0"/>
+              <a:t>Higher-level package.</a:t>
+            </a:r>
+          </a:p>
+          <a:p>
+            <a:endParaRPr lang="en-US" i="1" dirty="0">
+              <a:solidFill>
+                <a:srgbClr val="004794"/>
+              </a:solidFill>
+            </a:endParaRPr>
+          </a:p>
+          <a:p>
+            <a:r>
+              <a:rPr lang="en-US" i="1" dirty="0">
+                <a:solidFill>
+                  <a:srgbClr val="004794"/>
+                </a:solidFill>
+              </a:rPr>
+              <a:t>report</a:t>
+            </a:r>
+            <a:r>
+              <a:rPr lang="en-US" dirty="0"/>
+              <a:t>’s primary goal is to fill the gap between R’s output and the formatted result description of your manuscript, with the automated use of best practices guidelines.</a:t>
+            </a:r>
+          </a:p>
+          <a:p>
+            <a:endParaRPr lang="en-US" dirty="0"/>
+          </a:p>
+          <a:p>
+            <a:r>
+              <a:rPr lang="en-US" dirty="0"/>
+              <a:t>This ensures standardization and quality of reporting research results.</a:t>
+            </a:r>
+            <a:endParaRPr lang="de-DE" dirty="0"/>
+          </a:p>
+        </p:txBody>
+      </p:sp>
+      <p:sp>
+        <p:nvSpPr>
+          <p:cNvPr id="4" name="Fußzeilenplatzhalter 3">
+            <a:extLst>
+              <a:ext uri="{FF2B5EF4-FFF2-40B4-BE49-F238E27FC236}">
+                <a16:creationId xmlns:a16="http://schemas.microsoft.com/office/drawing/2014/main" id="{51B427D6-C78C-4800-A708-8DE04DA34FAA}"/>
+              </a:ext>
+            </a:extLst>
+          </p:cNvPr>
+          <p:cNvSpPr>
+            <a:spLocks noGrp="1"/>
+          </p:cNvSpPr>
+          <p:nvPr>
+            <p:ph type="ftr" sz="quarter" idx="11"/>
+          </p:nvPr>
+        </p:nvSpPr>
+        <p:spPr/>
+        <p:txBody>
+          <a:bodyPr/>
+          <a:lstStyle/>
+          <a:p>
+            <a:pPr>
+              <a:spcBef>
+                <a:spcPct val="0"/>
+              </a:spcBef>
+            </a:pPr>
+            <a:r>
+              <a:rPr lang="en-US" dirty="0"/>
+              <a:t>Project "</a:t>
+            </a:r>
+            <a:r>
+              <a:rPr lang="en-US" dirty="0" err="1"/>
+              <a:t>easystats</a:t>
+            </a:r>
+            <a:r>
+              <a:rPr lang="en-US" dirty="0"/>
+              <a:t>"</a:t>
+            </a:r>
+          </a:p>
+        </p:txBody>
+      </p:sp>
+      <p:sp>
+        <p:nvSpPr>
+          <p:cNvPr id="6" name="Titel 5">
+            <a:extLst>
+              <a:ext uri="{FF2B5EF4-FFF2-40B4-BE49-F238E27FC236}">
+                <a16:creationId xmlns:a16="http://schemas.microsoft.com/office/drawing/2014/main" id="{4ACCE5D5-075E-481D-B9C5-A3074B841447}"/>
+              </a:ext>
+            </a:extLst>
+          </p:cNvPr>
+          <p:cNvSpPr>
+            <a:spLocks noGrp="1"/>
+          </p:cNvSpPr>
+          <p:nvPr>
+            <p:ph type="title"/>
+          </p:nvPr>
+        </p:nvSpPr>
+        <p:spPr/>
+        <p:txBody>
+          <a:bodyPr/>
+          <a:lstStyle/>
+          <a:p>
+            <a:r>
+              <a:rPr lang="de-DE" dirty="0" err="1"/>
+              <a:t>Objectives</a:t>
+            </a:r>
+            <a:endParaRPr lang="de-DE" dirty="0"/>
+          </a:p>
+        </p:txBody>
+      </p:sp>
+      <p:sp>
+        <p:nvSpPr>
+          <p:cNvPr id="7" name="Inhaltsplatzhalter 6">
+            <a:extLst>
+              <a:ext uri="{FF2B5EF4-FFF2-40B4-BE49-F238E27FC236}">
+                <a16:creationId xmlns:a16="http://schemas.microsoft.com/office/drawing/2014/main" id="{91EE5F19-F06C-41B0-A917-E9959AFBDF9F}"/>
+              </a:ext>
+            </a:extLst>
+          </p:cNvPr>
+          <p:cNvSpPr>
+            <a:spLocks noGrp="1"/>
+          </p:cNvSpPr>
+          <p:nvPr>
+            <p:ph sz="quarter" idx="13"/>
+          </p:nvPr>
+        </p:nvSpPr>
+        <p:spPr/>
+        <p:txBody>
+          <a:bodyPr/>
+          <a:lstStyle/>
+          <a:p>
+            <a:endParaRPr lang="de-DE"/>
+          </a:p>
+        </p:txBody>
+      </p:sp>
+    </p:spTree>
+    <p:extLst>
+      <p:ext uri="{BB962C8B-B14F-4D97-AF65-F5344CB8AC3E}">
+        <p14:creationId xmlns:p14="http://schemas.microsoft.com/office/powerpoint/2010/main" val="3944424343"/>
+      </p:ext>
+    </p:extLst>
+  </p:cSld>
+  <p:clrMapOvr>
+    <a:masterClrMapping/>
+  </p:clrMapOvr>
+</p:sld>
+</file>
+
+<file path=ppt/slides/slide22.xml><?xml version="1.0" encoding="utf-8"?>
+<p:sld xmlns:a="http://schemas.openxmlformats.org/drawingml/2006/main" xmlns:r="http://schemas.openxmlformats.org/officeDocument/2006/relationships" xmlns:p="http://schemas.openxmlformats.org/presentationml/2006/main">
+  <p:cSld>
+    <p:spTree>
+      <p:nvGrpSpPr>
+        <p:cNvPr id="1" name=""/>
+        <p:cNvGrpSpPr/>
+        <p:nvPr/>
+      </p:nvGrpSpPr>
+      <p:grpSpPr>
+        <a:xfrm>
+          <a:off x="0" y="0"/>
+          <a:ext cx="0" cy="0"/>
+          <a:chOff x="0" y="0"/>
+          <a:chExt cx="0" cy="0"/>
+        </a:xfrm>
+      </p:grpSpPr>
+      <p:sp>
+        <p:nvSpPr>
+          <p:cNvPr id="2" name="Inhaltsplatzhalter 1">
+            <a:extLst>
+              <a:ext uri="{FF2B5EF4-FFF2-40B4-BE49-F238E27FC236}">
+                <a16:creationId xmlns:a16="http://schemas.microsoft.com/office/drawing/2014/main" id="{5B5EE2F8-5215-42BC-A24D-CB4BD34CDC94}"/>
+              </a:ext>
+            </a:extLst>
+          </p:cNvPr>
+          <p:cNvSpPr>
+            <a:spLocks noGrp="1"/>
+          </p:cNvSpPr>
+          <p:nvPr>
+            <p:ph idx="1"/>
+          </p:nvPr>
+        </p:nvSpPr>
+        <p:spPr/>
+        <p:txBody>
+          <a:bodyPr/>
+          <a:lstStyle/>
+          <a:p>
+            <a:r>
+              <a:rPr lang="de-DE" dirty="0"/>
+              <a:t>Short form </a:t>
+            </a:r>
+            <a:r>
+              <a:rPr lang="de-DE" dirty="0" err="1"/>
+              <a:t>summary</a:t>
+            </a:r>
+            <a:r>
+              <a:rPr lang="de-DE" dirty="0"/>
+              <a:t>:</a:t>
+            </a:r>
+          </a:p>
+        </p:txBody>
+      </p:sp>
+      <p:sp>
+        <p:nvSpPr>
+          <p:cNvPr id="4" name="Fußzeilenplatzhalter 3">
+            <a:extLst>
+              <a:ext uri="{FF2B5EF4-FFF2-40B4-BE49-F238E27FC236}">
+                <a16:creationId xmlns:a16="http://schemas.microsoft.com/office/drawing/2014/main" id="{0FC0C19D-1682-4679-8E1E-D2E399E12164}"/>
+              </a:ext>
+            </a:extLst>
+          </p:cNvPr>
+          <p:cNvSpPr>
+            <a:spLocks noGrp="1"/>
+          </p:cNvSpPr>
+          <p:nvPr>
+            <p:ph type="ftr" sz="quarter" idx="11"/>
+          </p:nvPr>
+        </p:nvSpPr>
+        <p:spPr/>
+        <p:txBody>
+          <a:bodyPr/>
+          <a:lstStyle/>
+          <a:p>
+            <a:pPr>
+              <a:spcBef>
+                <a:spcPct val="0"/>
+              </a:spcBef>
+            </a:pPr>
+            <a:r>
+              <a:rPr lang="en-US"/>
+              <a:t>Project "easystats"</a:t>
+            </a:r>
+            <a:endParaRPr lang="en-US" dirty="0"/>
+          </a:p>
+        </p:txBody>
+      </p:sp>
+      <p:sp>
+        <p:nvSpPr>
+          <p:cNvPr id="6" name="Titel 5">
+            <a:extLst>
+              <a:ext uri="{FF2B5EF4-FFF2-40B4-BE49-F238E27FC236}">
+                <a16:creationId xmlns:a16="http://schemas.microsoft.com/office/drawing/2014/main" id="{F945D4CE-7FAD-45BF-A641-06AE09C0EF93}"/>
+              </a:ext>
+            </a:extLst>
+          </p:cNvPr>
+          <p:cNvSpPr>
+            <a:spLocks noGrp="1"/>
+          </p:cNvSpPr>
+          <p:nvPr>
+            <p:ph type="title"/>
+          </p:nvPr>
+        </p:nvSpPr>
+        <p:spPr/>
+        <p:txBody>
+          <a:bodyPr/>
+          <a:lstStyle/>
+          <a:p>
+            <a:r>
+              <a:rPr lang="de-DE" dirty="0" err="1"/>
+              <a:t>From</a:t>
+            </a:r>
+            <a:r>
+              <a:rPr lang="de-DE" dirty="0"/>
+              <a:t> R </a:t>
+            </a:r>
+            <a:r>
+              <a:rPr lang="de-DE" dirty="0" err="1"/>
+              <a:t>to</a:t>
+            </a:r>
+            <a:r>
+              <a:rPr lang="de-DE" dirty="0"/>
+              <a:t> </a:t>
+            </a:r>
+            <a:r>
+              <a:rPr lang="de-DE" dirty="0" err="1"/>
+              <a:t>Manuscript</a:t>
+            </a:r>
+            <a:endParaRPr lang="de-DE" dirty="0"/>
+          </a:p>
+        </p:txBody>
+      </p:sp>
+      <p:sp>
+        <p:nvSpPr>
+          <p:cNvPr id="3" name="Inhaltsplatzhalter 2">
+            <a:extLst>
+              <a:ext uri="{FF2B5EF4-FFF2-40B4-BE49-F238E27FC236}">
+                <a16:creationId xmlns:a16="http://schemas.microsoft.com/office/drawing/2014/main" id="{B7F3B1AA-05C4-4BAD-AB7F-BCD28B13ADD2}"/>
+              </a:ext>
+            </a:extLst>
+          </p:cNvPr>
+          <p:cNvSpPr>
+            <a:spLocks noGrp="1"/>
+          </p:cNvSpPr>
+          <p:nvPr>
+            <p:ph sz="quarter" idx="13"/>
+          </p:nvPr>
+        </p:nvSpPr>
+        <p:spPr/>
+        <p:txBody>
+          <a:bodyPr/>
+          <a:lstStyle/>
+          <a:p>
+            <a:endParaRPr lang="de-DE"/>
+          </a:p>
+        </p:txBody>
+      </p:sp>
+      <p:sp>
+        <p:nvSpPr>
+          <p:cNvPr id="9" name="Textfeld 8">
+            <a:extLst>
+              <a:ext uri="{FF2B5EF4-FFF2-40B4-BE49-F238E27FC236}">
+                <a16:creationId xmlns:a16="http://schemas.microsoft.com/office/drawing/2014/main" id="{5BB6C03E-B970-4FA5-83BD-DA2E462C35A1}"/>
+              </a:ext>
+            </a:extLst>
+          </p:cNvPr>
+          <p:cNvSpPr txBox="1"/>
+          <p:nvPr/>
+        </p:nvSpPr>
+        <p:spPr>
+          <a:xfrm>
+            <a:off x="0" y="2924944"/>
+            <a:ext cx="9144000" cy="3172764"/>
+          </a:xfrm>
+          <a:prstGeom prst="rect">
+            <a:avLst/>
+          </a:prstGeom>
+          <a:solidFill>
+            <a:schemeClr val="bg1">
+              <a:lumMod val="95000"/>
+            </a:schemeClr>
+          </a:solidFill>
+        </p:spPr>
+        <p:txBody>
+          <a:bodyPr wrap="square" lIns="180000" tIns="108000" rIns="180000" bIns="108000" rtlCol="0">
+            <a:spAutoFit/>
+          </a:bodyPr>
+          <a:lstStyle/>
+          <a:p>
+            <a:r>
+              <a:rPr lang="en-US" sz="1600" dirty="0" err="1">
+                <a:solidFill>
+                  <a:schemeClr val="tx2"/>
+                </a:solidFill>
+                <a:latin typeface="Liberation Mono" panose="02070409020205020404" pitchFamily="49" charset="0"/>
+                <a:cs typeface="Liberation Mono" panose="02070409020205020404" pitchFamily="49" charset="0"/>
+              </a:rPr>
+              <a:t>lm</a:t>
+            </a:r>
+            <a:r>
+              <a:rPr lang="en-US" sz="1600" dirty="0">
+                <a:solidFill>
+                  <a:schemeClr val="tx2"/>
+                </a:solidFill>
+                <a:latin typeface="Liberation Mono" panose="02070409020205020404" pitchFamily="49" charset="0"/>
+                <a:cs typeface="Liberation Mono" panose="02070409020205020404" pitchFamily="49" charset="0"/>
+              </a:rPr>
+              <a:t>(</a:t>
+            </a:r>
+            <a:r>
+              <a:rPr lang="en-US" sz="1600" dirty="0" err="1">
+                <a:solidFill>
+                  <a:schemeClr val="tx2"/>
+                </a:solidFill>
+                <a:latin typeface="Liberation Mono" panose="02070409020205020404" pitchFamily="49" charset="0"/>
+                <a:cs typeface="Liberation Mono" panose="02070409020205020404" pitchFamily="49" charset="0"/>
+              </a:rPr>
+              <a:t>Sepal.Length</a:t>
+            </a:r>
+            <a:r>
+              <a:rPr lang="en-US" sz="1600" dirty="0">
+                <a:solidFill>
+                  <a:schemeClr val="tx2"/>
+                </a:solidFill>
+                <a:latin typeface="Liberation Mono" panose="02070409020205020404" pitchFamily="49" charset="0"/>
+                <a:cs typeface="Liberation Mono" panose="02070409020205020404" pitchFamily="49" charset="0"/>
+              </a:rPr>
+              <a:t> ~ Species, data=iris) %&gt;%</a:t>
+            </a:r>
+          </a:p>
+          <a:p>
+            <a:r>
+              <a:rPr lang="en-US" sz="1600" dirty="0">
+                <a:solidFill>
+                  <a:schemeClr val="tx2"/>
+                </a:solidFill>
+                <a:latin typeface="Liberation Mono" panose="02070409020205020404" pitchFamily="49" charset="0"/>
+                <a:cs typeface="Liberation Mono" panose="02070409020205020404" pitchFamily="49" charset="0"/>
+              </a:rPr>
+              <a:t>  report() </a:t>
+            </a:r>
+          </a:p>
+          <a:p>
+            <a:endParaRPr lang="en-US" sz="1600" dirty="0">
+              <a:solidFill>
+                <a:schemeClr val="tx2"/>
+              </a:solidFill>
+              <a:latin typeface="Liberation Mono" panose="02070409020205020404" pitchFamily="49" charset="0"/>
+              <a:cs typeface="Liberation Mono" panose="02070409020205020404" pitchFamily="49" charset="0"/>
+            </a:endParaRPr>
+          </a:p>
+          <a:p>
+            <a:r>
+              <a:rPr lang="en-US" sz="1600" dirty="0">
+                <a:solidFill>
+                  <a:schemeClr val="bg1">
+                    <a:lumMod val="50000"/>
+                  </a:schemeClr>
+                </a:solidFill>
+                <a:latin typeface="Liberation Mono" panose="02070409020205020404" pitchFamily="49" charset="0"/>
+                <a:cs typeface="Liberation Mono" panose="02070409020205020404" pitchFamily="49" charset="0"/>
+              </a:rPr>
+              <a:t>##  We fitted a linear model to predict </a:t>
+            </a:r>
+            <a:r>
+              <a:rPr lang="en-US" sz="1600" dirty="0" err="1">
+                <a:solidFill>
+                  <a:schemeClr val="bg1">
+                    <a:lumMod val="50000"/>
+                  </a:schemeClr>
+                </a:solidFill>
+                <a:latin typeface="Liberation Mono" panose="02070409020205020404" pitchFamily="49" charset="0"/>
+                <a:cs typeface="Liberation Mono" panose="02070409020205020404" pitchFamily="49" charset="0"/>
+              </a:rPr>
+              <a:t>Sepal.Length</a:t>
+            </a:r>
+            <a:r>
+              <a:rPr lang="en-US" sz="1600" dirty="0">
+                <a:solidFill>
+                  <a:schemeClr val="bg1">
+                    <a:lumMod val="50000"/>
+                  </a:schemeClr>
+                </a:solidFill>
+                <a:latin typeface="Liberation Mono" panose="02070409020205020404" pitchFamily="49" charset="0"/>
+                <a:cs typeface="Liberation Mono" panose="02070409020205020404" pitchFamily="49" charset="0"/>
+              </a:rPr>
+              <a:t> with Species.</a:t>
+            </a:r>
+          </a:p>
+          <a:p>
+            <a:r>
+              <a:rPr lang="en-US" sz="1600" dirty="0">
+                <a:solidFill>
+                  <a:schemeClr val="bg1">
+                    <a:lumMod val="50000"/>
+                  </a:schemeClr>
+                </a:solidFill>
+                <a:latin typeface="Liberation Mono" panose="02070409020205020404" pitchFamily="49" charset="0"/>
+                <a:cs typeface="Liberation Mono" panose="02070409020205020404" pitchFamily="49" charset="0"/>
+              </a:rPr>
+              <a:t>##  The model's explanatory power (R2) is of 0.62 (adj. R2 = 0.61).</a:t>
+            </a:r>
+          </a:p>
+          <a:p>
+            <a:r>
+              <a:rPr lang="en-US" sz="1600" dirty="0">
+                <a:solidFill>
+                  <a:schemeClr val="bg1">
+                    <a:lumMod val="50000"/>
+                  </a:schemeClr>
+                </a:solidFill>
+                <a:latin typeface="Liberation Mono" panose="02070409020205020404" pitchFamily="49" charset="0"/>
+                <a:cs typeface="Liberation Mono" panose="02070409020205020404" pitchFamily="49" charset="0"/>
+              </a:rPr>
+              <a:t>##  The model's intercept is at 5.01.</a:t>
+            </a:r>
+          </a:p>
+          <a:p>
+            <a:endParaRPr lang="en-US" sz="1600" dirty="0">
+              <a:solidFill>
+                <a:schemeClr val="bg1">
+                  <a:lumMod val="50000"/>
+                </a:schemeClr>
+              </a:solidFill>
+              <a:latin typeface="Liberation Mono" panose="02070409020205020404" pitchFamily="49" charset="0"/>
+              <a:cs typeface="Liberation Mono" panose="02070409020205020404" pitchFamily="49" charset="0"/>
+            </a:endParaRPr>
+          </a:p>
+          <a:p>
+            <a:r>
+              <a:rPr lang="en-US" sz="1600" dirty="0">
+                <a:solidFill>
+                  <a:schemeClr val="bg1">
+                    <a:lumMod val="50000"/>
+                  </a:schemeClr>
+                </a:solidFill>
+                <a:latin typeface="Liberation Mono" panose="02070409020205020404" pitchFamily="49" charset="0"/>
+                <a:cs typeface="Liberation Mono" panose="02070409020205020404" pitchFamily="49" charset="0"/>
+              </a:rPr>
+              <a:t>## Within this model:</a:t>
+            </a:r>
+          </a:p>
+          <a:p>
+            <a:r>
+              <a:rPr lang="en-US" sz="1600" dirty="0">
+                <a:solidFill>
+                  <a:schemeClr val="bg1">
+                    <a:lumMod val="50000"/>
+                  </a:schemeClr>
+                </a:solidFill>
+                <a:latin typeface="Liberation Mono" panose="02070409020205020404" pitchFamily="49" charset="0"/>
+                <a:cs typeface="Liberation Mono" panose="02070409020205020404" pitchFamily="49" charset="0"/>
+              </a:rPr>
+              <a:t>##   - </a:t>
+            </a:r>
+            <a:r>
+              <a:rPr lang="en-US" sz="1600" dirty="0" err="1">
+                <a:solidFill>
+                  <a:schemeClr val="bg1">
+                    <a:lumMod val="50000"/>
+                  </a:schemeClr>
+                </a:solidFill>
+                <a:latin typeface="Liberation Mono" panose="02070409020205020404" pitchFamily="49" charset="0"/>
+                <a:cs typeface="Liberation Mono" panose="02070409020205020404" pitchFamily="49" charset="0"/>
+              </a:rPr>
+              <a:t>Speciesversicolor</a:t>
+            </a:r>
+            <a:r>
+              <a:rPr lang="en-US" sz="1600" dirty="0">
+                <a:solidFill>
+                  <a:schemeClr val="bg1">
+                    <a:lumMod val="50000"/>
+                  </a:schemeClr>
+                </a:solidFill>
+                <a:latin typeface="Liberation Mono" panose="02070409020205020404" pitchFamily="49" charset="0"/>
+                <a:cs typeface="Liberation Mono" panose="02070409020205020404" pitchFamily="49" charset="0"/>
+              </a:rPr>
+              <a:t> is significant (beta = 0.93, </a:t>
+            </a:r>
+          </a:p>
+          <a:p>
+            <a:r>
+              <a:rPr lang="en-US" sz="1600" dirty="0">
+                <a:solidFill>
+                  <a:schemeClr val="bg1">
+                    <a:lumMod val="50000"/>
+                  </a:schemeClr>
+                </a:solidFill>
+                <a:latin typeface="Liberation Mono" panose="02070409020205020404" pitchFamily="49" charset="0"/>
+                <a:cs typeface="Liberation Mono" panose="02070409020205020404" pitchFamily="49" charset="0"/>
+              </a:rPr>
+              <a:t>##     95% CI [0.73, 1.13], p &lt; .001) and large (Std. beta = 1.12).</a:t>
+            </a:r>
+          </a:p>
+          <a:p>
+            <a:r>
+              <a:rPr lang="en-US" sz="1600" dirty="0">
+                <a:solidFill>
+                  <a:schemeClr val="bg1">
+                    <a:lumMod val="50000"/>
+                  </a:schemeClr>
+                </a:solidFill>
+                <a:latin typeface="Liberation Mono" panose="02070409020205020404" pitchFamily="49" charset="0"/>
+                <a:cs typeface="Liberation Mono" panose="02070409020205020404" pitchFamily="49" charset="0"/>
+              </a:rPr>
+              <a:t>##   - </a:t>
+            </a:r>
+            <a:r>
+              <a:rPr lang="en-US" sz="1600" dirty="0" err="1">
+                <a:solidFill>
+                  <a:schemeClr val="bg1">
+                    <a:lumMod val="50000"/>
+                  </a:schemeClr>
+                </a:solidFill>
+                <a:latin typeface="Liberation Mono" panose="02070409020205020404" pitchFamily="49" charset="0"/>
+                <a:cs typeface="Liberation Mono" panose="02070409020205020404" pitchFamily="49" charset="0"/>
+              </a:rPr>
+              <a:t>Speciesvirginica</a:t>
+            </a:r>
+            <a:r>
+              <a:rPr lang="en-US" sz="1600" dirty="0">
+                <a:solidFill>
+                  <a:schemeClr val="bg1">
+                    <a:lumMod val="50000"/>
+                  </a:schemeClr>
+                </a:solidFill>
+                <a:latin typeface="Liberation Mono" panose="02070409020205020404" pitchFamily="49" charset="0"/>
+                <a:cs typeface="Liberation Mono" panose="02070409020205020404" pitchFamily="49" charset="0"/>
+              </a:rPr>
+              <a:t> is significant (beta = 1.58, </a:t>
+            </a:r>
+          </a:p>
+          <a:p>
+            <a:r>
+              <a:rPr lang="en-US" sz="1600" dirty="0">
+                <a:solidFill>
+                  <a:schemeClr val="bg1">
+                    <a:lumMod val="50000"/>
+                  </a:schemeClr>
+                </a:solidFill>
+                <a:latin typeface="Liberation Mono" panose="02070409020205020404" pitchFamily="49" charset="0"/>
+                <a:cs typeface="Liberation Mono" panose="02070409020205020404" pitchFamily="49" charset="0"/>
+              </a:rPr>
+              <a:t>##     95% CI [1.38, 1.79], p &lt; .001) and large (Std. beta = 1.91).</a:t>
+            </a:r>
+          </a:p>
+        </p:txBody>
+      </p:sp>
+    </p:spTree>
+    <p:extLst>
+      <p:ext uri="{BB962C8B-B14F-4D97-AF65-F5344CB8AC3E}">
+        <p14:creationId xmlns:p14="http://schemas.microsoft.com/office/powerpoint/2010/main" val="2969962830"/>
+      </p:ext>
+    </p:extLst>
+  </p:cSld>
+  <p:clrMapOvr>
+    <a:masterClrMapping/>
+  </p:clrMapOvr>
+</p:sld>
+</file>
+
+<file path=ppt/slides/slide23.xml><?xml version="1.0" encoding="utf-8"?>
+<p:sld xmlns:a="http://schemas.openxmlformats.org/drawingml/2006/main" xmlns:r="http://schemas.openxmlformats.org/officeDocument/2006/relationships" xmlns:p="http://schemas.openxmlformats.org/presentationml/2006/main">
+  <p:cSld>
+    <p:spTree>
+      <p:nvGrpSpPr>
+        <p:cNvPr id="1" name=""/>
+        <p:cNvGrpSpPr/>
+        <p:nvPr/>
+      </p:nvGrpSpPr>
+      <p:grpSpPr>
+        <a:xfrm>
+          <a:off x="0" y="0"/>
+          <a:ext cx="0" cy="0"/>
+          <a:chOff x="0" y="0"/>
+          <a:chExt cx="0" cy="0"/>
+        </a:xfrm>
+      </p:grpSpPr>
+      <p:sp>
+        <p:nvSpPr>
+          <p:cNvPr id="2" name="Inhaltsplatzhalter 1">
+            <a:extLst>
+              <a:ext uri="{FF2B5EF4-FFF2-40B4-BE49-F238E27FC236}">
+                <a16:creationId xmlns:a16="http://schemas.microsoft.com/office/drawing/2014/main" id="{FA35B9DB-F60D-4066-B8D9-2AEEC4F64DCC}"/>
               </a:ext>
             </a:extLst>
           </p:cNvPr>
@@ -9639,7 +10299,7 @@
           <p:cNvPr id="6" name="Grafik 5">
             <a:extLst>
               <a:ext uri="{FF2B5EF4-FFF2-40B4-BE49-F238E27FC236}">
-                <a16:creationId xmlns="" xmlns:a16="http://schemas.microsoft.com/office/drawing/2014/main" id="{66E4B86A-06DF-42B6-8ACA-4C8C1D113A65}"/>
+                <a16:creationId xmlns:a16="http://schemas.microsoft.com/office/drawing/2014/main" id="{66E4B86A-06DF-42B6-8ACA-4C8C1D113A65}"/>
               </a:ext>
             </a:extLst>
           </p:cNvPr>
@@ -9675,7 +10335,7 @@
           <p:cNvPr id="8" name="Grafik 7">
             <a:extLst>
               <a:ext uri="{FF2B5EF4-FFF2-40B4-BE49-F238E27FC236}">
-                <a16:creationId xmlns="" xmlns:a16="http://schemas.microsoft.com/office/drawing/2014/main" id="{E1EEF370-18C6-4E24-9585-5202B4DC6481}"/>
+                <a16:creationId xmlns:a16="http://schemas.microsoft.com/office/drawing/2014/main" id="{E1EEF370-18C6-4E24-9585-5202B4DC6481}"/>
               </a:ext>
             </a:extLst>
           </p:cNvPr>
@@ -9711,7 +10371,7 @@
           <p:cNvPr id="9" name="Rechteck 8">
             <a:extLst>
               <a:ext uri="{FF2B5EF4-FFF2-40B4-BE49-F238E27FC236}">
-                <a16:creationId xmlns="" xmlns:a16="http://schemas.microsoft.com/office/drawing/2014/main" id="{3870196D-44D4-4AA2-83CC-F16BFBF045C8}"/>
+                <a16:creationId xmlns:a16="http://schemas.microsoft.com/office/drawing/2014/main" id="{3870196D-44D4-4AA2-83CC-F16BFBF045C8}"/>
               </a:ext>
             </a:extLst>
           </p:cNvPr>
@@ -9720,8 +10380,8 @@
         </p:nvSpPr>
         <p:spPr>
           <a:xfrm>
-            <a:off x="976913" y="1738215"/>
-            <a:ext cx="5817105" cy="4062651"/>
+            <a:off x="1018719" y="1738215"/>
+            <a:ext cx="5403852" cy="1846659"/>
           </a:xfrm>
           <a:prstGeom prst="rect">
             <a:avLst/>
@@ -9729,18 +10389,18 @@
           <a:noFill/>
         </p:spPr>
         <p:txBody>
-          <a:bodyPr wrap="none" lIns="91440" tIns="45720" rIns="91440" bIns="45720">
+          <a:bodyPr wrap="none" lIns="0" tIns="45720" rIns="0" bIns="45720">
             <a:spAutoFit/>
           </a:bodyPr>
           <a:lstStyle/>
           <a:p>
-            <a:pPr algn="ctr" defTabSz="360000"/>
+            <a:pPr defTabSz="360000"/>
             <a:r>
               <a:rPr lang="de-DE" sz="6600" dirty="0">
                 <a:solidFill>
                   <a:srgbClr val="2198F6"/>
                 </a:solidFill>
-                <a:latin typeface="Source Sans Pro" panose="020B0503030403020204" pitchFamily="34" charset="0"/>
+                <a:latin typeface="Source Sans Pro Light" panose="020B0403030403020204" pitchFamily="34" charset="0"/>
                 <a:ea typeface="Source Sans Pro" panose="020B0503030403020204" pitchFamily="34" charset="0"/>
               </a:rPr>
               <a:t>Want to join us?</a:t>
@@ -9751,130 +10411,15 @@
               <a:buFont typeface="Wingdings" panose="05000000000000000000" pitchFamily="2" charset="2"/>
               <a:buChar char="Ø"/>
             </a:pPr>
-            <a:endParaRPr lang="de-DE" sz="2400" dirty="0" smtClean="0">
-              <a:latin typeface="Source Sans Pro" panose="020B0503030403020204" pitchFamily="34" charset="0"/>
+            <a:endParaRPr lang="de-DE" sz="2400" dirty="0">
+              <a:latin typeface="Source Sans Pro Light" panose="020B0403030403020204" pitchFamily="34" charset="0"/>
               <a:ea typeface="Source Sans Pro" panose="020B0503030403020204" pitchFamily="34" charset="0"/>
             </a:endParaRPr>
           </a:p>
           <a:p>
             <a:pPr defTabSz="360000"/>
-            <a:endParaRPr lang="de-DE" sz="2400" dirty="0" smtClean="0">
-              <a:latin typeface="Source Sans Pro" panose="020B0503030403020204" pitchFamily="34" charset="0"/>
-              <a:ea typeface="Source Sans Pro" panose="020B0503030403020204" pitchFamily="34" charset="0"/>
-            </a:endParaRPr>
-          </a:p>
-          <a:p>
-            <a:pPr defTabSz="360000"/>
             <a:endParaRPr lang="de-DE" sz="2400" dirty="0">
-              <a:latin typeface="Source Sans Pro" panose="020B0503030403020204" pitchFamily="34" charset="0"/>
-              <a:ea typeface="Source Sans Pro" panose="020B0503030403020204" pitchFamily="34" charset="0"/>
-            </a:endParaRPr>
-          </a:p>
-          <a:p>
-            <a:pPr defTabSz="360000"/>
-            <a:r>
-              <a:rPr lang="de-DE" sz="2400" dirty="0" err="1" smtClean="0">
-                <a:latin typeface="Source Sans Pro" panose="020B0503030403020204" pitchFamily="34" charset="0"/>
-                <a:ea typeface="Source Sans Pro" panose="020B0503030403020204" pitchFamily="34" charset="0"/>
-              </a:rPr>
-              <a:t>We</a:t>
-            </a:r>
-            <a:r>
-              <a:rPr lang="de-DE" sz="2400" dirty="0" smtClean="0">
-                <a:latin typeface="Source Sans Pro" panose="020B0503030403020204" pitchFamily="34" charset="0"/>
-                <a:ea typeface="Source Sans Pro" panose="020B0503030403020204" pitchFamily="34" charset="0"/>
-              </a:rPr>
-              <a:t> </a:t>
-            </a:r>
-            <a:r>
-              <a:rPr lang="de-DE" sz="2400" dirty="0">
-                <a:latin typeface="Source Sans Pro" panose="020B0503030403020204" pitchFamily="34" charset="0"/>
-                <a:ea typeface="Source Sans Pro" panose="020B0503030403020204" pitchFamily="34" charset="0"/>
-              </a:rPr>
-              <a:t>are...</a:t>
-            </a:r>
-          </a:p>
-          <a:p>
-            <a:pPr marL="342900" indent="-342900" defTabSz="360000">
-              <a:buFont typeface="Source Sans Pro" panose="020B0503030403020204" pitchFamily="34" charset="0"/>
-              <a:buChar char="✓"/>
-            </a:pPr>
-            <a:r>
-              <a:rPr lang="de-DE" sz="2400" dirty="0" err="1" smtClean="0">
-                <a:latin typeface="Source Sans Pro" panose="020B0503030403020204" pitchFamily="34" charset="0"/>
-                <a:ea typeface="Source Sans Pro" panose="020B0503030403020204" pitchFamily="34" charset="0"/>
-              </a:rPr>
-              <a:t>waiting</a:t>
-            </a:r>
-            <a:r>
-              <a:rPr lang="de-DE" sz="2400" dirty="0" smtClean="0">
-                <a:latin typeface="Source Sans Pro" panose="020B0503030403020204" pitchFamily="34" charset="0"/>
-                <a:ea typeface="Source Sans Pro" panose="020B0503030403020204" pitchFamily="34" charset="0"/>
-              </a:rPr>
-              <a:t> </a:t>
-            </a:r>
-            <a:r>
-              <a:rPr lang="de-DE" sz="2400" dirty="0">
-                <a:latin typeface="Source Sans Pro" panose="020B0503030403020204" pitchFamily="34" charset="0"/>
-                <a:ea typeface="Source Sans Pro" panose="020B0503030403020204" pitchFamily="34" charset="0"/>
-              </a:rPr>
-              <a:t>for your feedback</a:t>
-            </a:r>
-          </a:p>
-          <a:p>
-            <a:pPr marL="342900" indent="-342900" defTabSz="360000">
-              <a:buFont typeface="Source Sans Pro" panose="020B0503030403020204" pitchFamily="34" charset="0"/>
-              <a:buChar char="✓"/>
-            </a:pPr>
-            <a:r>
-              <a:rPr lang="de-DE" sz="2400" dirty="0" smtClean="0">
-                <a:latin typeface="Source Sans Pro" panose="020B0503030403020204" pitchFamily="34" charset="0"/>
-                <a:ea typeface="Source Sans Pro" panose="020B0503030403020204" pitchFamily="34" charset="0"/>
-              </a:rPr>
-              <a:t>open </a:t>
-            </a:r>
-            <a:r>
-              <a:rPr lang="de-DE" sz="2400" dirty="0">
-                <a:latin typeface="Source Sans Pro" panose="020B0503030403020204" pitchFamily="34" charset="0"/>
-                <a:ea typeface="Source Sans Pro" panose="020B0503030403020204" pitchFamily="34" charset="0"/>
-              </a:rPr>
-              <a:t>to opinions and ideas</a:t>
-            </a:r>
-          </a:p>
-          <a:p>
-            <a:pPr marL="342900" indent="-342900" defTabSz="360000">
-              <a:buFont typeface="Source Sans Pro" panose="020B0503030403020204" pitchFamily="34" charset="0"/>
-              <a:buChar char="✓"/>
-            </a:pPr>
-            <a:r>
-              <a:rPr lang="de-DE" sz="2400" dirty="0" err="1" smtClean="0">
-                <a:latin typeface="Source Sans Pro" panose="020B0503030403020204" pitchFamily="34" charset="0"/>
-                <a:ea typeface="Source Sans Pro" panose="020B0503030403020204" pitchFamily="34" charset="0"/>
-              </a:rPr>
-              <a:t>beginning-developers</a:t>
-            </a:r>
-            <a:r>
-              <a:rPr lang="de-DE" sz="2400" dirty="0" smtClean="0">
-                <a:latin typeface="Source Sans Pro" panose="020B0503030403020204" pitchFamily="34" charset="0"/>
-                <a:ea typeface="Source Sans Pro" panose="020B0503030403020204" pitchFamily="34" charset="0"/>
-              </a:rPr>
-              <a:t> </a:t>
-            </a:r>
-            <a:r>
-              <a:rPr lang="de-DE" sz="2400" dirty="0">
-                <a:latin typeface="Source Sans Pro" panose="020B0503030403020204" pitchFamily="34" charset="0"/>
-                <a:ea typeface="Source Sans Pro" panose="020B0503030403020204" pitchFamily="34" charset="0"/>
-              </a:rPr>
-              <a:t>friendly</a:t>
-            </a:r>
-          </a:p>
-          <a:p>
-            <a:pPr marL="685800" indent="-685800" defTabSz="360000">
-              <a:buFont typeface="Wingdings" panose="05000000000000000000" pitchFamily="2" charset="2"/>
-              <a:buChar char="ü"/>
-            </a:pPr>
-            <a:endParaRPr lang="de-DE" sz="2400" dirty="0">
-              <a:latin typeface="Source Sans Pro" panose="020B0503030403020204" pitchFamily="34" charset="0"/>
+              <a:latin typeface="Source Sans Pro Light" panose="020B0403030403020204" pitchFamily="34" charset="0"/>
               <a:ea typeface="Source Sans Pro" panose="020B0503030403020204" pitchFamily="34" charset="0"/>
             </a:endParaRPr>
           </a:p>
@@ -9885,7 +10430,7 @@
           <p:cNvPr id="10" name="Grafik 9">
             <a:extLst>
               <a:ext uri="{FF2B5EF4-FFF2-40B4-BE49-F238E27FC236}">
-                <a16:creationId xmlns="" xmlns:a16="http://schemas.microsoft.com/office/drawing/2014/main" id="{177ADE5C-6E0C-41DF-B77F-3FAF6918653E}"/>
+                <a16:creationId xmlns:a16="http://schemas.microsoft.com/office/drawing/2014/main" id="{177ADE5C-6E0C-41DF-B77F-3FAF6918653E}"/>
               </a:ext>
             </a:extLst>
           </p:cNvPr>
@@ -9921,7 +10466,7 @@
           <p:cNvPr id="1026" name="Picture 2" descr="RÃ©sultat de recherche d'images pour &quot;we need you&quot;">
             <a:extLst>
               <a:ext uri="{FF2B5EF4-FFF2-40B4-BE49-F238E27FC236}">
-                <a16:creationId xmlns="" xmlns:a16="http://schemas.microsoft.com/office/drawing/2014/main" id="{2D65F3E9-5E3A-407E-969C-984A63ABD069}"/>
+                <a16:creationId xmlns:a16="http://schemas.microsoft.com/office/drawing/2014/main" id="{2D65F3E9-5E3A-407E-969C-984A63ABD069}"/>
               </a:ext>
             </a:extLst>
           </p:cNvPr>
@@ -9971,8 +10516,8 @@
         </p:nvSpPr>
         <p:spPr>
           <a:xfrm>
-            <a:off x="1152486" y="2852936"/>
-            <a:ext cx="4503477" cy="523220"/>
+            <a:off x="1018719" y="2905780"/>
+            <a:ext cx="4320473" cy="523220"/>
           </a:xfrm>
           <a:prstGeom prst="rect">
             <a:avLst/>
@@ -9980,7 +10525,7 @@
           <a:noFill/>
         </p:spPr>
         <p:txBody>
-          <a:bodyPr wrap="none" rtlCol="0">
+          <a:bodyPr wrap="none" lIns="0" rtlCol="0">
             <a:spAutoFit/>
           </a:bodyPr>
           <a:lstStyle/>
@@ -9990,28 +10535,677 @@
                 <a:solidFill>
                   <a:srgbClr val="2198F6"/>
                 </a:solidFill>
-                <a:latin typeface="Source Sans Pro" panose="020B0503030403020204" pitchFamily="34" charset="0"/>
+                <a:latin typeface="Source Sans Pro Light" panose="020B0403030403020204" pitchFamily="34" charset="0"/>
                 <a:ea typeface="Source Sans Pro" panose="020B0503030403020204" pitchFamily="34" charset="0"/>
               </a:rPr>
-              <a:t>https://</a:t>
-            </a:r>
-            <a:r>
-              <a:rPr lang="de-DE" sz="2800" dirty="0" smtClean="0">
+              <a:t>https://github.com/easystats</a:t>
+            </a:r>
+          </a:p>
+        </p:txBody>
+      </p:sp>
+      <p:pic>
+        <p:nvPicPr>
+          <p:cNvPr id="11" name="Picture 2" descr="https://github.com/easystats/insight/raw/master/man/figures/logo.png">
+            <a:extLst>
+              <a:ext uri="{FF2B5EF4-FFF2-40B4-BE49-F238E27FC236}">
+                <a16:creationId xmlns:a16="http://schemas.microsoft.com/office/drawing/2014/main" id="{04B86C66-F628-4F12-A1EA-8466036DE187}"/>
+              </a:ext>
+            </a:extLst>
+          </p:cNvPr>
+          <p:cNvPicPr>
+            <a:picLocks noChangeAspect="1" noChangeArrowheads="1"/>
+          </p:cNvPicPr>
+          <p:nvPr/>
+        </p:nvPicPr>
+        <p:blipFill>
+          <a:blip r:embed="rId6" cstate="print">
+            <a:extLst>
+              <a:ext uri="{28A0092B-C50C-407E-A947-70E740481C1C}">
+                <a14:useLocalDpi xmlns:a14="http://schemas.microsoft.com/office/drawing/2010/main" val="0"/>
+              </a:ext>
+            </a:extLst>
+          </a:blip>
+          <a:srcRect/>
+          <a:stretch>
+            <a:fillRect/>
+          </a:stretch>
+        </p:blipFill>
+        <p:spPr bwMode="auto">
+          <a:xfrm>
+            <a:off x="984539" y="3899786"/>
+            <a:ext cx="1143000" cy="1323975"/>
+          </a:xfrm>
+          <a:prstGeom prst="rect">
+            <a:avLst/>
+          </a:prstGeom>
+          <a:noFill/>
+          <a:extLst>
+            <a:ext uri="{909E8E84-426E-40DD-AFC4-6F175D3DCCD1}">
+              <a14:hiddenFill xmlns:a14="http://schemas.microsoft.com/office/drawing/2010/main">
+                <a:solidFill>
+                  <a:srgbClr val="FFFFFF"/>
+                </a:solidFill>
+              </a14:hiddenFill>
+            </a:ext>
+          </a:extLst>
+        </p:spPr>
+      </p:pic>
+      <p:pic>
+        <p:nvPicPr>
+          <p:cNvPr id="12" name="Picture 4" descr="https://github.com/easystats/bayestestR/raw/master/man/figures/logo.png">
+            <a:extLst>
+              <a:ext uri="{FF2B5EF4-FFF2-40B4-BE49-F238E27FC236}">
+                <a16:creationId xmlns:a16="http://schemas.microsoft.com/office/drawing/2014/main" id="{256AFF5F-ECF9-4DF3-9C67-67D3B46F0DB2}"/>
+              </a:ext>
+            </a:extLst>
+          </p:cNvPr>
+          <p:cNvPicPr>
+            <a:picLocks noChangeAspect="1" noChangeArrowheads="1"/>
+          </p:cNvPicPr>
+          <p:nvPr/>
+        </p:nvPicPr>
+        <p:blipFill>
+          <a:blip r:embed="rId7" cstate="print">
+            <a:extLst>
+              <a:ext uri="{28A0092B-C50C-407E-A947-70E740481C1C}">
+                <a14:useLocalDpi xmlns:a14="http://schemas.microsoft.com/office/drawing/2010/main" val="0"/>
+              </a:ext>
+            </a:extLst>
+          </a:blip>
+          <a:srcRect/>
+          <a:stretch>
+            <a:fillRect/>
+          </a:stretch>
+        </p:blipFill>
+        <p:spPr bwMode="auto">
+          <a:xfrm>
+            <a:off x="2351032" y="3899786"/>
+            <a:ext cx="1143000" cy="1323975"/>
+          </a:xfrm>
+          <a:prstGeom prst="rect">
+            <a:avLst/>
+          </a:prstGeom>
+          <a:noFill/>
+          <a:extLst>
+            <a:ext uri="{909E8E84-426E-40DD-AFC4-6F175D3DCCD1}">
+              <a14:hiddenFill xmlns:a14="http://schemas.microsoft.com/office/drawing/2010/main">
+                <a:solidFill>
+                  <a:srgbClr val="FFFFFF"/>
+                </a:solidFill>
+              </a14:hiddenFill>
+            </a:ext>
+          </a:extLst>
+        </p:spPr>
+      </p:pic>
+      <p:pic>
+        <p:nvPicPr>
+          <p:cNvPr id="13" name="Picture 6" descr="https://github.com/easystats/report/raw/master/man/figures/logo.png">
+            <a:extLst>
+              <a:ext uri="{FF2B5EF4-FFF2-40B4-BE49-F238E27FC236}">
+                <a16:creationId xmlns:a16="http://schemas.microsoft.com/office/drawing/2014/main" id="{29C16679-DF7C-47D5-AEF3-6A5231E1B7B0}"/>
+              </a:ext>
+            </a:extLst>
+          </p:cNvPr>
+          <p:cNvPicPr>
+            <a:picLocks noChangeAspect="1" noChangeArrowheads="1"/>
+          </p:cNvPicPr>
+          <p:nvPr/>
+        </p:nvPicPr>
+        <p:blipFill>
+          <a:blip r:embed="rId8" cstate="print">
+            <a:extLst>
+              <a:ext uri="{28A0092B-C50C-407E-A947-70E740481C1C}">
+                <a14:useLocalDpi xmlns:a14="http://schemas.microsoft.com/office/drawing/2010/main" val="0"/>
+              </a:ext>
+            </a:extLst>
+          </a:blip>
+          <a:srcRect/>
+          <a:stretch>
+            <a:fillRect/>
+          </a:stretch>
+        </p:blipFill>
+        <p:spPr bwMode="auto">
+          <a:xfrm>
+            <a:off x="3748754" y="3899785"/>
+            <a:ext cx="1143000" cy="1323975"/>
+          </a:xfrm>
+          <a:prstGeom prst="rect">
+            <a:avLst/>
+          </a:prstGeom>
+          <a:noFill/>
+          <a:extLst>
+            <a:ext uri="{909E8E84-426E-40DD-AFC4-6F175D3DCCD1}">
+              <a14:hiddenFill xmlns:a14="http://schemas.microsoft.com/office/drawing/2010/main">
+                <a:solidFill>
+                  <a:srgbClr val="FFFFFF"/>
+                </a:solidFill>
+              </a14:hiddenFill>
+            </a:ext>
+          </a:extLst>
+        </p:spPr>
+      </p:pic>
+      <p:sp>
+        <p:nvSpPr>
+          <p:cNvPr id="14" name="Textfeld 13">
+            <a:extLst>
+              <a:ext uri="{FF2B5EF4-FFF2-40B4-BE49-F238E27FC236}">
+                <a16:creationId xmlns:a16="http://schemas.microsoft.com/office/drawing/2014/main" id="{FE5472F9-8EBD-40E7-959D-BA9DC0B2C0AB}"/>
+              </a:ext>
+            </a:extLst>
+          </p:cNvPr>
+          <p:cNvSpPr txBox="1"/>
+          <p:nvPr/>
+        </p:nvSpPr>
+        <p:spPr>
+          <a:xfrm>
+            <a:off x="984245" y="5221385"/>
+            <a:ext cx="3432799" cy="422405"/>
+          </a:xfrm>
+          <a:prstGeom prst="rect">
+            <a:avLst/>
+          </a:prstGeom>
+          <a:noFill/>
+        </p:spPr>
+        <p:txBody>
+          <a:bodyPr wrap="none" lIns="0" tIns="72000" rIns="0" bIns="72000" rtlCol="0">
+            <a:spAutoFit/>
+          </a:bodyPr>
+          <a:lstStyle/>
+          <a:p>
+            <a:r>
+              <a:rPr lang="de-DE" dirty="0">
+                <a:latin typeface="Source Sans Pro Light" panose="020B0403030403020204" pitchFamily="34" charset="0"/>
+              </a:rPr>
+              <a:t>And </a:t>
+            </a:r>
+            <a:r>
+              <a:rPr lang="de-DE" dirty="0" err="1">
+                <a:latin typeface="Source Sans Pro Light" panose="020B0403030403020204" pitchFamily="34" charset="0"/>
+              </a:rPr>
+              <a:t>many</a:t>
+            </a:r>
+            <a:r>
+              <a:rPr lang="de-DE" dirty="0">
+                <a:latin typeface="Source Sans Pro Light" panose="020B0403030403020204" pitchFamily="34" charset="0"/>
+              </a:rPr>
+              <a:t> </a:t>
+            </a:r>
+            <a:r>
+              <a:rPr lang="de-DE" dirty="0" err="1">
+                <a:latin typeface="Source Sans Pro Light" panose="020B0403030403020204" pitchFamily="34" charset="0"/>
+              </a:rPr>
+              <a:t>more</a:t>
+            </a:r>
+            <a:r>
+              <a:rPr lang="de-DE" dirty="0">
+                <a:latin typeface="Source Sans Pro Light" panose="020B0403030403020204" pitchFamily="34" charset="0"/>
+              </a:rPr>
+              <a:t> </a:t>
+            </a:r>
+            <a:r>
+              <a:rPr lang="de-DE" dirty="0" err="1">
+                <a:latin typeface="Source Sans Pro Light" panose="020B0403030403020204" pitchFamily="34" charset="0"/>
+              </a:rPr>
+              <a:t>packages</a:t>
+            </a:r>
+            <a:r>
+              <a:rPr lang="de-DE" dirty="0">
+                <a:latin typeface="Source Sans Pro Light" panose="020B0403030403020204" pitchFamily="34" charset="0"/>
+              </a:rPr>
+              <a:t> </a:t>
+            </a:r>
+            <a:r>
+              <a:rPr lang="de-DE" dirty="0" err="1">
+                <a:latin typeface="Source Sans Pro Light" panose="020B0403030403020204" pitchFamily="34" charset="0"/>
+              </a:rPr>
+              <a:t>to</a:t>
+            </a:r>
+            <a:r>
+              <a:rPr lang="de-DE" dirty="0">
+                <a:latin typeface="Source Sans Pro Light" panose="020B0403030403020204" pitchFamily="34" charset="0"/>
+              </a:rPr>
+              <a:t> </a:t>
+            </a:r>
+            <a:r>
+              <a:rPr lang="de-DE" dirty="0" err="1">
+                <a:latin typeface="Source Sans Pro Light" panose="020B0403030403020204" pitchFamily="34" charset="0"/>
+              </a:rPr>
+              <a:t>come</a:t>
+            </a:r>
+            <a:r>
+              <a:rPr lang="de-DE" dirty="0">
+                <a:latin typeface="Source Sans Pro Light" panose="020B0403030403020204" pitchFamily="34" charset="0"/>
+              </a:rPr>
+              <a:t>…</a:t>
+            </a:r>
+          </a:p>
+        </p:txBody>
+      </p:sp>
+    </p:spTree>
+    <p:extLst>
+      <p:ext uri="{BB962C8B-B14F-4D97-AF65-F5344CB8AC3E}">
+        <p14:creationId xmlns:p14="http://schemas.microsoft.com/office/powerpoint/2010/main" val="1941838810"/>
+      </p:ext>
+    </p:extLst>
+  </p:cSld>
+  <p:clrMapOvr>
+    <a:masterClrMapping/>
+  </p:clrMapOvr>
+</p:sld>
+</file>
+
+<file path=ppt/slides/slide24.xml><?xml version="1.0" encoding="utf-8"?>
+<p:sld xmlns:a="http://schemas.openxmlformats.org/drawingml/2006/main" xmlns:r="http://schemas.openxmlformats.org/officeDocument/2006/relationships" xmlns:p="http://schemas.openxmlformats.org/presentationml/2006/main">
+  <p:cSld>
+    <p:spTree>
+      <p:nvGrpSpPr>
+        <p:cNvPr id="1" name=""/>
+        <p:cNvGrpSpPr/>
+        <p:nvPr/>
+      </p:nvGrpSpPr>
+      <p:grpSpPr>
+        <a:xfrm>
+          <a:off x="0" y="0"/>
+          <a:ext cx="0" cy="0"/>
+          <a:chOff x="0" y="0"/>
+          <a:chExt cx="0" cy="0"/>
+        </a:xfrm>
+      </p:grpSpPr>
+      <p:sp>
+        <p:nvSpPr>
+          <p:cNvPr id="2" name="Inhaltsplatzhalter 1">
+            <a:extLst>
+              <a:ext uri="{FF2B5EF4-FFF2-40B4-BE49-F238E27FC236}">
+                <a16:creationId xmlns:a16="http://schemas.microsoft.com/office/drawing/2014/main" id="{FA35B9DB-F60D-4066-B8D9-2AEEC4F64DCC}"/>
+              </a:ext>
+            </a:extLst>
+          </p:cNvPr>
+          <p:cNvSpPr>
+            <a:spLocks noGrp="1"/>
+          </p:cNvSpPr>
+          <p:nvPr>
+            <p:ph idx="1"/>
+          </p:nvPr>
+        </p:nvSpPr>
+        <p:spPr>
+          <a:xfrm>
+            <a:off x="6501688" y="4869160"/>
+            <a:ext cx="3744416" cy="2088232"/>
+          </a:xfrm>
+        </p:spPr>
+        <p:txBody>
+          <a:bodyPr>
+            <a:normAutofit/>
+          </a:bodyPr>
+          <a:lstStyle/>
+          <a:p>
+            <a:r>
+              <a:rPr lang="de-DE" sz="2000" dirty="0">
+                <a:latin typeface="Source Sans Pro "/>
+              </a:rPr>
+              <a:t>Dominique &amp; Daniel</a:t>
+            </a:r>
+          </a:p>
+          <a:p>
+            <a:endParaRPr lang="de-DE" sz="2600" dirty="0">
+              <a:latin typeface="Source Sans Pro Light" panose="020B0403030403020204" pitchFamily="34" charset="0"/>
+            </a:endParaRPr>
+          </a:p>
+          <a:p>
+            <a:endParaRPr lang="de-DE" sz="2600" dirty="0">
+              <a:latin typeface="Source Sans Pro Light" panose="020B0403030403020204" pitchFamily="34" charset="0"/>
+            </a:endParaRPr>
+          </a:p>
+          <a:p>
+            <a:endParaRPr lang="de-DE" sz="2600" dirty="0">
+              <a:latin typeface="Source Sans Pro Light" panose="020B0403030403020204" pitchFamily="34" charset="0"/>
+            </a:endParaRPr>
+          </a:p>
+          <a:p>
+            <a:endParaRPr lang="de-DE" sz="2600" dirty="0">
+              <a:latin typeface="Source Sans Pro Light" panose="020B0403030403020204" pitchFamily="34" charset="0"/>
+            </a:endParaRPr>
+          </a:p>
+          <a:p>
+            <a:endParaRPr lang="de-DE" sz="2600" dirty="0">
+              <a:latin typeface="Source Sans Pro Light" panose="020B0403030403020204" pitchFamily="34" charset="0"/>
+            </a:endParaRPr>
+          </a:p>
+        </p:txBody>
+      </p:sp>
+      <p:pic>
+        <p:nvPicPr>
+          <p:cNvPr id="6" name="Grafik 5">
+            <a:extLst>
+              <a:ext uri="{FF2B5EF4-FFF2-40B4-BE49-F238E27FC236}">
+                <a16:creationId xmlns:a16="http://schemas.microsoft.com/office/drawing/2014/main" id="{66E4B86A-06DF-42B6-8ACA-4C8C1D113A65}"/>
+              </a:ext>
+            </a:extLst>
+          </p:cNvPr>
+          <p:cNvPicPr>
+            <a:picLocks noChangeAspect="1"/>
+          </p:cNvPicPr>
+          <p:nvPr/>
+        </p:nvPicPr>
+        <p:blipFill>
+          <a:blip r:embed="rId2" cstate="print">
+            <a:extLst>
+              <a:ext uri="{28A0092B-C50C-407E-A947-70E740481C1C}">
+                <a14:useLocalDpi xmlns:a14="http://schemas.microsoft.com/office/drawing/2010/main" val="0"/>
+              </a:ext>
+            </a:extLst>
+          </a:blip>
+          <a:stretch>
+            <a:fillRect/>
+          </a:stretch>
+        </p:blipFill>
+        <p:spPr>
+          <a:xfrm>
+            <a:off x="6012160" y="5301208"/>
+            <a:ext cx="1386456" cy="1386456"/>
+          </a:xfrm>
+          <a:prstGeom prst="rect">
+            <a:avLst/>
+          </a:prstGeom>
+        </p:spPr>
+      </p:pic>
+      <p:pic>
+        <p:nvPicPr>
+          <p:cNvPr id="8" name="Grafik 7">
+            <a:extLst>
+              <a:ext uri="{FF2B5EF4-FFF2-40B4-BE49-F238E27FC236}">
+                <a16:creationId xmlns:a16="http://schemas.microsoft.com/office/drawing/2014/main" id="{E1EEF370-18C6-4E24-9585-5202B4DC6481}"/>
+              </a:ext>
+            </a:extLst>
+          </p:cNvPr>
+          <p:cNvPicPr>
+            <a:picLocks noChangeAspect="1"/>
+          </p:cNvPicPr>
+          <p:nvPr/>
+        </p:nvPicPr>
+        <p:blipFill>
+          <a:blip r:embed="rId3" cstate="print">
+            <a:extLst>
+              <a:ext uri="{28A0092B-C50C-407E-A947-70E740481C1C}">
+                <a14:useLocalDpi xmlns:a14="http://schemas.microsoft.com/office/drawing/2010/main" val="0"/>
+              </a:ext>
+            </a:extLst>
+          </a:blip>
+          <a:stretch>
+            <a:fillRect/>
+          </a:stretch>
+        </p:blipFill>
+        <p:spPr>
+          <a:xfrm>
+            <a:off x="7398616" y="5301208"/>
+            <a:ext cx="1386456" cy="1386456"/>
+          </a:xfrm>
+          <a:prstGeom prst="rect">
+            <a:avLst/>
+          </a:prstGeom>
+        </p:spPr>
+      </p:pic>
+      <p:sp>
+        <p:nvSpPr>
+          <p:cNvPr id="9" name="Rechteck 8">
+            <a:extLst>
+              <a:ext uri="{FF2B5EF4-FFF2-40B4-BE49-F238E27FC236}">
+                <a16:creationId xmlns:a16="http://schemas.microsoft.com/office/drawing/2014/main" id="{3870196D-44D4-4AA2-83CC-F16BFBF045C8}"/>
+              </a:ext>
+            </a:extLst>
+          </p:cNvPr>
+          <p:cNvSpPr/>
+          <p:nvPr/>
+        </p:nvSpPr>
+        <p:spPr>
+          <a:xfrm>
+            <a:off x="1018719" y="1738215"/>
+            <a:ext cx="5403852" cy="4062651"/>
+          </a:xfrm>
+          <a:prstGeom prst="rect">
+            <a:avLst/>
+          </a:prstGeom>
+          <a:noFill/>
+        </p:spPr>
+        <p:txBody>
+          <a:bodyPr wrap="none" lIns="0" tIns="45720" rIns="0" bIns="45720">
+            <a:spAutoFit/>
+          </a:bodyPr>
+          <a:lstStyle/>
+          <a:p>
+            <a:pPr defTabSz="360000"/>
+            <a:r>
+              <a:rPr lang="de-DE" sz="6600" dirty="0">
                 <a:solidFill>
                   <a:srgbClr val="2198F6"/>
                 </a:solidFill>
-                <a:latin typeface="Source Sans Pro" panose="020B0503030403020204" pitchFamily="34" charset="0"/>
+                <a:latin typeface="Source Sans Pro Light" panose="020B0403030403020204" pitchFamily="34" charset="0"/>
                 <a:ea typeface="Source Sans Pro" panose="020B0503030403020204" pitchFamily="34" charset="0"/>
               </a:rPr>
-              <a:t>github.com/easystats</a:t>
-            </a:r>
-            <a:endParaRPr lang="de-DE" sz="2800" dirty="0">
-              <a:solidFill>
-                <a:srgbClr val="2198F6"/>
-              </a:solidFill>
+              <a:t>Want to join us?</a:t>
+            </a:r>
+          </a:p>
+          <a:p>
+            <a:pPr marL="685800" indent="-685800" algn="ctr" defTabSz="360000">
+              <a:buFont typeface="Wingdings" panose="05000000000000000000" pitchFamily="2" charset="2"/>
+              <a:buChar char="Ø"/>
+            </a:pPr>
+            <a:endParaRPr lang="de-DE" sz="2400" dirty="0">
+              <a:latin typeface="Source Sans Pro Light" panose="020B0403030403020204" pitchFamily="34" charset="0"/>
+              <a:ea typeface="Source Sans Pro" panose="020B0503030403020204" pitchFamily="34" charset="0"/>
+            </a:endParaRPr>
+          </a:p>
+          <a:p>
+            <a:pPr defTabSz="360000"/>
+            <a:endParaRPr lang="de-DE" sz="2400" dirty="0">
+              <a:latin typeface="Source Sans Pro Light" panose="020B0403030403020204" pitchFamily="34" charset="0"/>
+              <a:ea typeface="Source Sans Pro" panose="020B0503030403020204" pitchFamily="34" charset="0"/>
+            </a:endParaRPr>
+          </a:p>
+          <a:p>
+            <a:pPr defTabSz="360000"/>
+            <a:endParaRPr lang="de-DE" sz="2400" dirty="0">
+              <a:latin typeface="Source Sans Pro Light" panose="020B0403030403020204" pitchFamily="34" charset="0"/>
+              <a:ea typeface="Source Sans Pro" panose="020B0503030403020204" pitchFamily="34" charset="0"/>
+            </a:endParaRPr>
+          </a:p>
+          <a:p>
+            <a:pPr defTabSz="360000"/>
+            <a:r>
+              <a:rPr lang="de-DE" sz="2400" dirty="0" err="1">
+                <a:latin typeface="Source Sans Pro Light" panose="020B0403030403020204" pitchFamily="34" charset="0"/>
+                <a:ea typeface="Source Sans Pro" panose="020B0503030403020204" pitchFamily="34" charset="0"/>
+              </a:rPr>
+              <a:t>We</a:t>
+            </a:r>
+            <a:r>
+              <a:rPr lang="de-DE" sz="2400" dirty="0">
+                <a:latin typeface="Source Sans Pro Light" panose="020B0403030403020204" pitchFamily="34" charset="0"/>
+                <a:ea typeface="Source Sans Pro" panose="020B0503030403020204" pitchFamily="34" charset="0"/>
+              </a:rPr>
+              <a:t> are...</a:t>
+            </a:r>
+          </a:p>
+          <a:p>
+            <a:pPr marL="342900" indent="-342900" defTabSz="360000">
+              <a:buFont typeface="Source Sans Pro" panose="020B0503030403020204" pitchFamily="34" charset="0"/>
+              <a:buChar char="✓"/>
+            </a:pPr>
+            <a:r>
+              <a:rPr lang="de-DE" sz="2400" dirty="0" err="1">
+                <a:latin typeface="Source Sans Pro Light" panose="020B0403030403020204" pitchFamily="34" charset="0"/>
+                <a:ea typeface="Source Sans Pro" panose="020B0503030403020204" pitchFamily="34" charset="0"/>
+              </a:rPr>
+              <a:t>waiting</a:t>
+            </a:r>
+            <a:r>
+              <a:rPr lang="de-DE" sz="2400" dirty="0">
+                <a:latin typeface="Source Sans Pro Light" panose="020B0403030403020204" pitchFamily="34" charset="0"/>
+                <a:ea typeface="Source Sans Pro" panose="020B0503030403020204" pitchFamily="34" charset="0"/>
+              </a:rPr>
+              <a:t> for your feedback</a:t>
+            </a:r>
+          </a:p>
+          <a:p>
+            <a:pPr marL="342900" indent="-342900" defTabSz="360000">
+              <a:buFont typeface="Source Sans Pro" panose="020B0503030403020204" pitchFamily="34" charset="0"/>
+              <a:buChar char="✓"/>
+            </a:pPr>
+            <a:r>
+              <a:rPr lang="de-DE" sz="2400" dirty="0">
+                <a:latin typeface="Source Sans Pro Light" panose="020B0403030403020204" pitchFamily="34" charset="0"/>
+                <a:ea typeface="Source Sans Pro" panose="020B0503030403020204" pitchFamily="34" charset="0"/>
+              </a:rPr>
+              <a:t>open to opinions and ideas</a:t>
+            </a:r>
+          </a:p>
+          <a:p>
+            <a:pPr marL="342900" indent="-342900" defTabSz="360000">
+              <a:buFont typeface="Source Sans Pro" panose="020B0503030403020204" pitchFamily="34" charset="0"/>
+              <a:buChar char="✓"/>
+            </a:pPr>
+            <a:r>
+              <a:rPr lang="de-DE" sz="2400" dirty="0" err="1">
+                <a:latin typeface="Source Sans Pro Light" panose="020B0403030403020204" pitchFamily="34" charset="0"/>
+                <a:ea typeface="Source Sans Pro" panose="020B0503030403020204" pitchFamily="34" charset="0"/>
+              </a:rPr>
+              <a:t>beginning-developers</a:t>
+            </a:r>
+            <a:r>
+              <a:rPr lang="de-DE" sz="2400" dirty="0">
+                <a:latin typeface="Source Sans Pro Light" panose="020B0403030403020204" pitchFamily="34" charset="0"/>
+                <a:ea typeface="Source Sans Pro" panose="020B0503030403020204" pitchFamily="34" charset="0"/>
+              </a:rPr>
+              <a:t> friendly</a:t>
+            </a:r>
+          </a:p>
+          <a:p>
+            <a:pPr marL="685800" indent="-685800" defTabSz="360000">
+              <a:buFont typeface="Wingdings" panose="05000000000000000000" pitchFamily="2" charset="2"/>
+              <a:buChar char="ü"/>
+            </a:pPr>
+            <a:endParaRPr lang="de-DE" sz="2400" dirty="0">
               <a:latin typeface="Source Sans Pro" panose="020B0503030403020204" pitchFamily="34" charset="0"/>
               <a:ea typeface="Source Sans Pro" panose="020B0503030403020204" pitchFamily="34" charset="0"/>
             </a:endParaRPr>
+          </a:p>
+        </p:txBody>
+      </p:sp>
+      <p:pic>
+        <p:nvPicPr>
+          <p:cNvPr id="10" name="Grafik 9">
+            <a:extLst>
+              <a:ext uri="{FF2B5EF4-FFF2-40B4-BE49-F238E27FC236}">
+                <a16:creationId xmlns:a16="http://schemas.microsoft.com/office/drawing/2014/main" id="{177ADE5C-6E0C-41DF-B77F-3FAF6918653E}"/>
+              </a:ext>
+            </a:extLst>
+          </p:cNvPr>
+          <p:cNvPicPr>
+            <a:picLocks noChangeAspect="1"/>
+          </p:cNvPicPr>
+          <p:nvPr/>
+        </p:nvPicPr>
+        <p:blipFill>
+          <a:blip r:embed="rId4" cstate="print">
+            <a:extLst>
+              <a:ext uri="{28A0092B-C50C-407E-A947-70E740481C1C}">
+                <a14:useLocalDpi xmlns:a14="http://schemas.microsoft.com/office/drawing/2010/main" val="0"/>
+              </a:ext>
+            </a:extLst>
+          </a:blip>
+          <a:stretch>
+            <a:fillRect/>
+          </a:stretch>
+        </p:blipFill>
+        <p:spPr>
+          <a:xfrm>
+            <a:off x="7123585" y="146418"/>
+            <a:ext cx="1554240" cy="1545189"/>
+          </a:xfrm>
+          <a:prstGeom prst="rect">
+            <a:avLst/>
+          </a:prstGeom>
+        </p:spPr>
+      </p:pic>
+      <p:pic>
+        <p:nvPicPr>
+          <p:cNvPr id="1026" name="Picture 2" descr="RÃ©sultat de recherche d'images pour &quot;we need you&quot;">
+            <a:extLst>
+              <a:ext uri="{FF2B5EF4-FFF2-40B4-BE49-F238E27FC236}">
+                <a16:creationId xmlns:a16="http://schemas.microsoft.com/office/drawing/2014/main" id="{2D65F3E9-5E3A-407E-969C-984A63ABD069}"/>
+              </a:ext>
+            </a:extLst>
+          </p:cNvPr>
+          <p:cNvPicPr>
+            <a:picLocks noChangeAspect="1" noChangeArrowheads="1"/>
+          </p:cNvPicPr>
+          <p:nvPr/>
+        </p:nvPicPr>
+        <p:blipFill>
+          <a:blip r:embed="rId5" cstate="print">
+            <a:extLst>
+              <a:ext uri="{28A0092B-C50C-407E-A947-70E740481C1C}">
+                <a14:useLocalDpi xmlns:a14="http://schemas.microsoft.com/office/drawing/2010/main" val="0"/>
+              </a:ext>
+            </a:extLst>
+          </a:blip>
+          <a:srcRect/>
+          <a:stretch>
+            <a:fillRect/>
+          </a:stretch>
+        </p:blipFill>
+        <p:spPr bwMode="auto">
+          <a:xfrm>
+            <a:off x="323529" y="260649"/>
+            <a:ext cx="1872207" cy="1162654"/>
+          </a:xfrm>
+          <a:prstGeom prst="rect">
+            <a:avLst/>
+          </a:prstGeom>
+          <a:noFill/>
+          <a:extLst>
+            <a:ext uri="{909E8E84-426E-40DD-AFC4-6F175D3DCCD1}">
+              <a14:hiddenFill xmlns:a14="http://schemas.microsoft.com/office/drawing/2010/main">
+                <a:solidFill>
+                  <a:srgbClr val="FFFFFF"/>
+                </a:solidFill>
+              </a14:hiddenFill>
+            </a:ext>
+          </a:extLst>
+        </p:spPr>
+      </p:pic>
+      <p:sp>
+        <p:nvSpPr>
+          <p:cNvPr id="3" name="Textfeld 2"/>
+          <p:cNvSpPr txBox="1"/>
+          <p:nvPr/>
+        </p:nvSpPr>
+        <p:spPr>
+          <a:xfrm>
+            <a:off x="1018719" y="2905780"/>
+            <a:ext cx="4320473" cy="523220"/>
+          </a:xfrm>
+          <a:prstGeom prst="rect">
+            <a:avLst/>
+          </a:prstGeom>
+          <a:noFill/>
+        </p:spPr>
+        <p:txBody>
+          <a:bodyPr wrap="none" lIns="0" rtlCol="0">
+            <a:spAutoFit/>
+          </a:bodyPr>
+          <a:lstStyle/>
+          <a:p>
+            <a:r>
+              <a:rPr lang="de-DE" sz="2800" dirty="0">
+                <a:solidFill>
+                  <a:srgbClr val="2198F6"/>
+                </a:solidFill>
+                <a:latin typeface="Source Sans Pro Light" panose="020B0403030403020204" pitchFamily="34" charset="0"/>
+                <a:ea typeface="Source Sans Pro" panose="020B0503030403020204" pitchFamily="34" charset="0"/>
+              </a:rPr>
+              <a:t>https://github.com/easystats</a:t>
+            </a:r>
           </a:p>
         </p:txBody>
       </p:sp>
@@ -10025,13 +11219,6 @@
   <p:clrMapOvr>
     <a:masterClrMapping/>
   </p:clrMapOvr>
-  <p:timing>
-    <p:tnLst>
-      <p:par>
-        <p:cTn id="1" dur="indefinite" restart="never" nodeType="tmRoot"/>
-      </p:par>
-    </p:tnLst>
-  </p:timing>
 </p:sld>
 </file>
 
@@ -10076,7 +11263,7 @@
           <p:cNvPr id="5" name="Textplatzhalter 4">
             <a:extLst>
               <a:ext uri="{FF2B5EF4-FFF2-40B4-BE49-F238E27FC236}">
-                <a16:creationId xmlns="" xmlns:a16="http://schemas.microsoft.com/office/drawing/2014/main" id="{67DE0ECA-5E5C-43D9-A4C4-B3A31EB20E63}"/>
+                <a16:creationId xmlns:a16="http://schemas.microsoft.com/office/drawing/2014/main" id="{67DE0ECA-5E5C-43D9-A4C4-B3A31EB20E63}"/>
               </a:ext>
             </a:extLst>
           </p:cNvPr>
@@ -10106,7 +11293,7 @@
           <p:cNvPr id="7" name="Grafik 6">
             <a:extLst>
               <a:ext uri="{FF2B5EF4-FFF2-40B4-BE49-F238E27FC236}">
-                <a16:creationId xmlns="" xmlns:a16="http://schemas.microsoft.com/office/drawing/2014/main" id="{9662A82F-40D1-46D3-B342-3A7B12F5AF35}"/>
+                <a16:creationId xmlns:a16="http://schemas.microsoft.com/office/drawing/2014/main" id="{9662A82F-40D1-46D3-B342-3A7B12F5AF35}"/>
               </a:ext>
             </a:extLst>
           </p:cNvPr>
@@ -10142,7 +11329,7 @@
           <p:cNvPr id="6" name="Inhaltsplatzhalter 1">
             <a:extLst>
               <a:ext uri="{FF2B5EF4-FFF2-40B4-BE49-F238E27FC236}">
-                <a16:creationId xmlns="" xmlns:a16="http://schemas.microsoft.com/office/drawing/2014/main" id="{17A46D4D-0551-4407-9BCE-588AD39BB403}"/>
+                <a16:creationId xmlns:a16="http://schemas.microsoft.com/office/drawing/2014/main" id="{17A46D4D-0551-4407-9BCE-588AD39BB403}"/>
               </a:ext>
             </a:extLst>
           </p:cNvPr>
@@ -10355,7 +11542,7 @@
           <p:cNvPr id="8" name="Grafik 7">
             <a:extLst>
               <a:ext uri="{FF2B5EF4-FFF2-40B4-BE49-F238E27FC236}">
-                <a16:creationId xmlns="" xmlns:a16="http://schemas.microsoft.com/office/drawing/2014/main" id="{EEDE1A4C-E038-4AF3-8084-AD08BCBB8B40}"/>
+                <a16:creationId xmlns:a16="http://schemas.microsoft.com/office/drawing/2014/main" id="{EEDE1A4C-E038-4AF3-8084-AD08BCBB8B40}"/>
               </a:ext>
             </a:extLst>
           </p:cNvPr>
@@ -10391,7 +11578,7 @@
           <p:cNvPr id="3" name="Textfeld 2">
             <a:extLst>
               <a:ext uri="{FF2B5EF4-FFF2-40B4-BE49-F238E27FC236}">
-                <a16:creationId xmlns="" xmlns:a16="http://schemas.microsoft.com/office/drawing/2014/main" id="{06CD9A7E-4DFA-4BD7-BE9D-E73F98761ABC}"/>
+                <a16:creationId xmlns:a16="http://schemas.microsoft.com/office/drawing/2014/main" id="{06CD9A7E-4DFA-4BD7-BE9D-E73F98761ABC}"/>
               </a:ext>
             </a:extLst>
           </p:cNvPr>
@@ -10673,13 +11860,6 @@
   <p:clrMapOvr>
     <a:masterClrMapping/>
   </p:clrMapOvr>
-  <p:timing>
-    <p:tnLst>
-      <p:par>
-        <p:cTn id="1" dur="indefinite" restart="never" nodeType="tmRoot"/>
-      </p:par>
-    </p:tnLst>
-  </p:timing>
 </p:sld>
 </file>
 
@@ -10724,7 +11904,7 @@
           <p:cNvPr id="5" name="Textplatzhalter 4">
             <a:extLst>
               <a:ext uri="{FF2B5EF4-FFF2-40B4-BE49-F238E27FC236}">
-                <a16:creationId xmlns="" xmlns:a16="http://schemas.microsoft.com/office/drawing/2014/main" id="{67DE0ECA-5E5C-43D9-A4C4-B3A31EB20E63}"/>
+                <a16:creationId xmlns:a16="http://schemas.microsoft.com/office/drawing/2014/main" id="{67DE0ECA-5E5C-43D9-A4C4-B3A31EB20E63}"/>
               </a:ext>
             </a:extLst>
           </p:cNvPr>
@@ -10754,7 +11934,7 @@
           <p:cNvPr id="7" name="Grafik 6">
             <a:extLst>
               <a:ext uri="{FF2B5EF4-FFF2-40B4-BE49-F238E27FC236}">
-                <a16:creationId xmlns="" xmlns:a16="http://schemas.microsoft.com/office/drawing/2014/main" id="{9662A82F-40D1-46D3-B342-3A7B12F5AF35}"/>
+                <a16:creationId xmlns:a16="http://schemas.microsoft.com/office/drawing/2014/main" id="{9662A82F-40D1-46D3-B342-3A7B12F5AF35}"/>
               </a:ext>
             </a:extLst>
           </p:cNvPr>
@@ -10790,7 +11970,7 @@
           <p:cNvPr id="6" name="Inhaltsplatzhalter 1">
             <a:extLst>
               <a:ext uri="{FF2B5EF4-FFF2-40B4-BE49-F238E27FC236}">
-                <a16:creationId xmlns="" xmlns:a16="http://schemas.microsoft.com/office/drawing/2014/main" id="{17A46D4D-0551-4407-9BCE-588AD39BB403}"/>
+                <a16:creationId xmlns:a16="http://schemas.microsoft.com/office/drawing/2014/main" id="{17A46D4D-0551-4407-9BCE-588AD39BB403}"/>
               </a:ext>
             </a:extLst>
           </p:cNvPr>
@@ -11003,7 +12183,7 @@
           <p:cNvPr id="8" name="Grafik 7">
             <a:extLst>
               <a:ext uri="{FF2B5EF4-FFF2-40B4-BE49-F238E27FC236}">
-                <a16:creationId xmlns="" xmlns:a16="http://schemas.microsoft.com/office/drawing/2014/main" id="{EEDE1A4C-E038-4AF3-8084-AD08BCBB8B40}"/>
+                <a16:creationId xmlns:a16="http://schemas.microsoft.com/office/drawing/2014/main" id="{EEDE1A4C-E038-4AF3-8084-AD08BCBB8B40}"/>
               </a:ext>
             </a:extLst>
           </p:cNvPr>
@@ -11039,7 +12219,7 @@
           <p:cNvPr id="3" name="Textfeld 2">
             <a:extLst>
               <a:ext uri="{FF2B5EF4-FFF2-40B4-BE49-F238E27FC236}">
-                <a16:creationId xmlns="" xmlns:a16="http://schemas.microsoft.com/office/drawing/2014/main" id="{06CD9A7E-4DFA-4BD7-BE9D-E73F98761ABC}"/>
+                <a16:creationId xmlns:a16="http://schemas.microsoft.com/office/drawing/2014/main" id="{06CD9A7E-4DFA-4BD7-BE9D-E73F98761ABC}"/>
               </a:ext>
             </a:extLst>
           </p:cNvPr>
@@ -11316,7 +12496,7 @@
           <p:cNvPr id="9" name="Grafik 8">
             <a:extLst>
               <a:ext uri="{FF2B5EF4-FFF2-40B4-BE49-F238E27FC236}">
-                <a16:creationId xmlns="" xmlns:a16="http://schemas.microsoft.com/office/drawing/2014/main" id="{EEFAF765-CB8E-4CDA-A2B5-AB8E890E785B}"/>
+                <a16:creationId xmlns:a16="http://schemas.microsoft.com/office/drawing/2014/main" id="{EEFAF765-CB8E-4CDA-A2B5-AB8E890E785B}"/>
               </a:ext>
             </a:extLst>
           </p:cNvPr>
@@ -11352,7 +12532,7 @@
           <p:cNvPr id="10" name="Inhaltsplatzhalter 1">
             <a:extLst>
               <a:ext uri="{FF2B5EF4-FFF2-40B4-BE49-F238E27FC236}">
-                <a16:creationId xmlns="" xmlns:a16="http://schemas.microsoft.com/office/drawing/2014/main" id="{1F4106B7-0C47-4BD5-AF44-2646E3AD2260}"/>
+                <a16:creationId xmlns:a16="http://schemas.microsoft.com/office/drawing/2014/main" id="{1F4106B7-0C47-4BD5-AF44-2646E3AD2260}"/>
               </a:ext>
             </a:extLst>
           </p:cNvPr>
@@ -11565,7 +12745,7 @@
           <p:cNvPr id="11" name="Textfeld 10">
             <a:extLst>
               <a:ext uri="{FF2B5EF4-FFF2-40B4-BE49-F238E27FC236}">
-                <a16:creationId xmlns="" xmlns:a16="http://schemas.microsoft.com/office/drawing/2014/main" id="{1CA3948B-B37D-4A05-8FF4-667A4E4174D7}"/>
+                <a16:creationId xmlns:a16="http://schemas.microsoft.com/office/drawing/2014/main" id="{1CA3948B-B37D-4A05-8FF4-667A4E4174D7}"/>
               </a:ext>
             </a:extLst>
           </p:cNvPr>
@@ -11713,7 +12893,7 @@
           <p:cNvPr id="12" name="Grafik 11">
             <a:extLst>
               <a:ext uri="{FF2B5EF4-FFF2-40B4-BE49-F238E27FC236}">
-                <a16:creationId xmlns="" xmlns:a16="http://schemas.microsoft.com/office/drawing/2014/main" id="{C6C09D98-7011-4A4C-AE66-132708929A66}"/>
+                <a16:creationId xmlns:a16="http://schemas.microsoft.com/office/drawing/2014/main" id="{C6C09D98-7011-4A4C-AE66-132708929A66}"/>
               </a:ext>
             </a:extLst>
           </p:cNvPr>
@@ -11754,13 +12934,6 @@
   <p:clrMapOvr>
     <a:masterClrMapping/>
   </p:clrMapOvr>
-  <p:timing>
-    <p:tnLst>
-      <p:par>
-        <p:cTn id="1" dur="indefinite" restart="never" nodeType="tmRoot"/>
-      </p:par>
-    </p:tnLst>
-  </p:timing>
 </p:sld>
 </file>
 
@@ -11786,7 +12959,7 @@
           <p:cNvPr id="2" name="Inhaltsplatzhalter 1">
             <a:extLst>
               <a:ext uri="{FF2B5EF4-FFF2-40B4-BE49-F238E27FC236}">
-                <a16:creationId xmlns="" xmlns:a16="http://schemas.microsoft.com/office/drawing/2014/main" id="{6AC63146-A60C-4C71-BB7B-58E7BF03580D}"/>
+                <a16:creationId xmlns:a16="http://schemas.microsoft.com/office/drawing/2014/main" id="{6AC63146-A60C-4C71-BB7B-58E7BF03580D}"/>
               </a:ext>
             </a:extLst>
           </p:cNvPr>
@@ -11990,7 +13163,7 @@
           <p:cNvPr id="4" name="Fußzeilenplatzhalter 3">
             <a:extLst>
               <a:ext uri="{FF2B5EF4-FFF2-40B4-BE49-F238E27FC236}">
-                <a16:creationId xmlns="" xmlns:a16="http://schemas.microsoft.com/office/drawing/2014/main" id="{C7528ED8-3537-4F05-A5B9-3E8A165FB2B5}"/>
+                <a16:creationId xmlns:a16="http://schemas.microsoft.com/office/drawing/2014/main" id="{C7528ED8-3537-4F05-A5B9-3E8A165FB2B5}"/>
               </a:ext>
             </a:extLst>
           </p:cNvPr>
@@ -12024,7 +13197,7 @@
           <p:cNvPr id="6" name="Titel 5">
             <a:extLst>
               <a:ext uri="{FF2B5EF4-FFF2-40B4-BE49-F238E27FC236}">
-                <a16:creationId xmlns="" xmlns:a16="http://schemas.microsoft.com/office/drawing/2014/main" id="{DA17230E-0997-4023-A8F0-BFEB027317EB}"/>
+                <a16:creationId xmlns:a16="http://schemas.microsoft.com/office/drawing/2014/main" id="{DA17230E-0997-4023-A8F0-BFEB027317EB}"/>
               </a:ext>
             </a:extLst>
           </p:cNvPr>
@@ -12053,7 +13226,7 @@
           <p:cNvPr id="7" name="Inhaltsplatzhalter 6">
             <a:extLst>
               <a:ext uri="{FF2B5EF4-FFF2-40B4-BE49-F238E27FC236}">
-                <a16:creationId xmlns="" xmlns:a16="http://schemas.microsoft.com/office/drawing/2014/main" id="{F2E59518-6179-4745-A40E-2EE49C758ADA}"/>
+                <a16:creationId xmlns:a16="http://schemas.microsoft.com/office/drawing/2014/main" id="{F2E59518-6179-4745-A40E-2EE49C758ADA}"/>
               </a:ext>
             </a:extLst>
           </p:cNvPr>
@@ -12078,7 +13251,7 @@
           <p:cNvPr id="8" name="Grafik 7">
             <a:extLst>
               <a:ext uri="{FF2B5EF4-FFF2-40B4-BE49-F238E27FC236}">
-                <a16:creationId xmlns="" xmlns:a16="http://schemas.microsoft.com/office/drawing/2014/main" id="{2C8B6296-E5C8-4A92-BD87-8984783DA579}"/>
+                <a16:creationId xmlns:a16="http://schemas.microsoft.com/office/drawing/2014/main" id="{2C8B6296-E5C8-4A92-BD87-8984783DA579}"/>
               </a:ext>
             </a:extLst>
           </p:cNvPr>
@@ -12119,13 +13292,6 @@
   <p:clrMapOvr>
     <a:masterClrMapping/>
   </p:clrMapOvr>
-  <p:timing>
-    <p:tnLst>
-      <p:par>
-        <p:cTn id="1" dur="indefinite" restart="never" nodeType="tmRoot"/>
-      </p:par>
-    </p:tnLst>
-  </p:timing>
 </p:sld>
 </file>
 
@@ -12151,7 +13317,7 @@
           <p:cNvPr id="2" name="Inhaltsplatzhalter 1">
             <a:extLst>
               <a:ext uri="{FF2B5EF4-FFF2-40B4-BE49-F238E27FC236}">
-                <a16:creationId xmlns="" xmlns:a16="http://schemas.microsoft.com/office/drawing/2014/main" id="{6AC63146-A60C-4C71-BB7B-58E7BF03580D}"/>
+                <a16:creationId xmlns:a16="http://schemas.microsoft.com/office/drawing/2014/main" id="{6AC63146-A60C-4C71-BB7B-58E7BF03580D}"/>
               </a:ext>
             </a:extLst>
           </p:cNvPr>
@@ -12329,7 +13495,7 @@
           <p:cNvPr id="4" name="Fußzeilenplatzhalter 3">
             <a:extLst>
               <a:ext uri="{FF2B5EF4-FFF2-40B4-BE49-F238E27FC236}">
-                <a16:creationId xmlns="" xmlns:a16="http://schemas.microsoft.com/office/drawing/2014/main" id="{C7528ED8-3537-4F05-A5B9-3E8A165FB2B5}"/>
+                <a16:creationId xmlns:a16="http://schemas.microsoft.com/office/drawing/2014/main" id="{C7528ED8-3537-4F05-A5B9-3E8A165FB2B5}"/>
               </a:ext>
             </a:extLst>
           </p:cNvPr>
@@ -12363,7 +13529,7 @@
           <p:cNvPr id="6" name="Titel 5">
             <a:extLst>
               <a:ext uri="{FF2B5EF4-FFF2-40B4-BE49-F238E27FC236}">
-                <a16:creationId xmlns="" xmlns:a16="http://schemas.microsoft.com/office/drawing/2014/main" id="{DA17230E-0997-4023-A8F0-BFEB027317EB}"/>
+                <a16:creationId xmlns:a16="http://schemas.microsoft.com/office/drawing/2014/main" id="{DA17230E-0997-4023-A8F0-BFEB027317EB}"/>
               </a:ext>
             </a:extLst>
           </p:cNvPr>
@@ -12392,7 +13558,7 @@
           <p:cNvPr id="7" name="Inhaltsplatzhalter 6">
             <a:extLst>
               <a:ext uri="{FF2B5EF4-FFF2-40B4-BE49-F238E27FC236}">
-                <a16:creationId xmlns="" xmlns:a16="http://schemas.microsoft.com/office/drawing/2014/main" id="{F2E59518-6179-4745-A40E-2EE49C758ADA}"/>
+                <a16:creationId xmlns:a16="http://schemas.microsoft.com/office/drawing/2014/main" id="{F2E59518-6179-4745-A40E-2EE49C758ADA}"/>
               </a:ext>
             </a:extLst>
           </p:cNvPr>
@@ -12417,7 +13583,7 @@
           <p:cNvPr id="8" name="Grafik 7">
             <a:extLst>
               <a:ext uri="{FF2B5EF4-FFF2-40B4-BE49-F238E27FC236}">
-                <a16:creationId xmlns="" xmlns:a16="http://schemas.microsoft.com/office/drawing/2014/main" id="{C488D801-7394-416F-906A-383A95B22EF1}"/>
+                <a16:creationId xmlns:a16="http://schemas.microsoft.com/office/drawing/2014/main" id="{C488D801-7394-416F-906A-383A95B22EF1}"/>
               </a:ext>
             </a:extLst>
           </p:cNvPr>
@@ -12458,13 +13624,6 @@
   <p:clrMapOvr>
     <a:masterClrMapping/>
   </p:clrMapOvr>
-  <p:timing>
-    <p:tnLst>
-      <p:par>
-        <p:cTn id="1" dur="indefinite" restart="never" nodeType="tmRoot"/>
-      </p:par>
-    </p:tnLst>
-  </p:timing>
 </p:sld>
 </file>
 
@@ -12490,7 +13649,7 @@
           <p:cNvPr id="2" name="Inhaltsplatzhalter 1">
             <a:extLst>
               <a:ext uri="{FF2B5EF4-FFF2-40B4-BE49-F238E27FC236}">
-                <a16:creationId xmlns="" xmlns:a16="http://schemas.microsoft.com/office/drawing/2014/main" id="{6AC63146-A60C-4C71-BB7B-58E7BF03580D}"/>
+                <a16:creationId xmlns:a16="http://schemas.microsoft.com/office/drawing/2014/main" id="{6AC63146-A60C-4C71-BB7B-58E7BF03580D}"/>
               </a:ext>
             </a:extLst>
           </p:cNvPr>
@@ -12653,7 +13812,7 @@
           <p:cNvPr id="4" name="Fußzeilenplatzhalter 3">
             <a:extLst>
               <a:ext uri="{FF2B5EF4-FFF2-40B4-BE49-F238E27FC236}">
-                <a16:creationId xmlns="" xmlns:a16="http://schemas.microsoft.com/office/drawing/2014/main" id="{C7528ED8-3537-4F05-A5B9-3E8A165FB2B5}"/>
+                <a16:creationId xmlns:a16="http://schemas.microsoft.com/office/drawing/2014/main" id="{C7528ED8-3537-4F05-A5B9-3E8A165FB2B5}"/>
               </a:ext>
             </a:extLst>
           </p:cNvPr>
@@ -12687,7 +13846,7 @@
           <p:cNvPr id="6" name="Titel 5">
             <a:extLst>
               <a:ext uri="{FF2B5EF4-FFF2-40B4-BE49-F238E27FC236}">
-                <a16:creationId xmlns="" xmlns:a16="http://schemas.microsoft.com/office/drawing/2014/main" id="{DA17230E-0997-4023-A8F0-BFEB027317EB}"/>
+                <a16:creationId xmlns:a16="http://schemas.microsoft.com/office/drawing/2014/main" id="{DA17230E-0997-4023-A8F0-BFEB027317EB}"/>
               </a:ext>
             </a:extLst>
           </p:cNvPr>
@@ -12716,7 +13875,7 @@
           <p:cNvPr id="7" name="Inhaltsplatzhalter 6">
             <a:extLst>
               <a:ext uri="{FF2B5EF4-FFF2-40B4-BE49-F238E27FC236}">
-                <a16:creationId xmlns="" xmlns:a16="http://schemas.microsoft.com/office/drawing/2014/main" id="{F2E59518-6179-4745-A40E-2EE49C758ADA}"/>
+                <a16:creationId xmlns:a16="http://schemas.microsoft.com/office/drawing/2014/main" id="{F2E59518-6179-4745-A40E-2EE49C758ADA}"/>
               </a:ext>
             </a:extLst>
           </p:cNvPr>
@@ -12741,7 +13900,7 @@
           <p:cNvPr id="8" name="Grafik 7">
             <a:extLst>
               <a:ext uri="{FF2B5EF4-FFF2-40B4-BE49-F238E27FC236}">
-                <a16:creationId xmlns="" xmlns:a16="http://schemas.microsoft.com/office/drawing/2014/main" id="{7D2C7851-769C-4DF5-B4EB-92C9F8721AA8}"/>
+                <a16:creationId xmlns:a16="http://schemas.microsoft.com/office/drawing/2014/main" id="{7D2C7851-769C-4DF5-B4EB-92C9F8721AA8}"/>
               </a:ext>
             </a:extLst>
           </p:cNvPr>
@@ -12782,13 +13941,6 @@
   <p:clrMapOvr>
     <a:masterClrMapping/>
   </p:clrMapOvr>
-  <p:timing>
-    <p:tnLst>
-      <p:par>
-        <p:cTn id="1" dur="indefinite" restart="never" nodeType="tmRoot"/>
-      </p:par>
-    </p:tnLst>
-  </p:timing>
 </p:sld>
 </file>
 
@@ -12837,7 +13989,7 @@
           <p:cNvPr id="2" name="Inhaltsplatzhalter 1">
             <a:extLst>
               <a:ext uri="{FF2B5EF4-FFF2-40B4-BE49-F238E27FC236}">
-                <a16:creationId xmlns="" xmlns:a16="http://schemas.microsoft.com/office/drawing/2014/main" id="{6AC63146-A60C-4C71-BB7B-58E7BF03580D}"/>
+                <a16:creationId xmlns:a16="http://schemas.microsoft.com/office/drawing/2014/main" id="{6AC63146-A60C-4C71-BB7B-58E7BF03580D}"/>
               </a:ext>
             </a:extLst>
           </p:cNvPr>
@@ -12993,7 +14145,7 @@
           <p:cNvPr id="4" name="Fußzeilenplatzhalter 3">
             <a:extLst>
               <a:ext uri="{FF2B5EF4-FFF2-40B4-BE49-F238E27FC236}">
-                <a16:creationId xmlns="" xmlns:a16="http://schemas.microsoft.com/office/drawing/2014/main" id="{C7528ED8-3537-4F05-A5B9-3E8A165FB2B5}"/>
+                <a16:creationId xmlns:a16="http://schemas.microsoft.com/office/drawing/2014/main" id="{C7528ED8-3537-4F05-A5B9-3E8A165FB2B5}"/>
               </a:ext>
             </a:extLst>
           </p:cNvPr>
@@ -13027,7 +14179,7 @@
           <p:cNvPr id="6" name="Titel 5">
             <a:extLst>
               <a:ext uri="{FF2B5EF4-FFF2-40B4-BE49-F238E27FC236}">
-                <a16:creationId xmlns="" xmlns:a16="http://schemas.microsoft.com/office/drawing/2014/main" id="{DA17230E-0997-4023-A8F0-BFEB027317EB}"/>
+                <a16:creationId xmlns:a16="http://schemas.microsoft.com/office/drawing/2014/main" id="{DA17230E-0997-4023-A8F0-BFEB027317EB}"/>
               </a:ext>
             </a:extLst>
           </p:cNvPr>
@@ -13056,7 +14208,7 @@
           <p:cNvPr id="8" name="Grafik 7">
             <a:extLst>
               <a:ext uri="{FF2B5EF4-FFF2-40B4-BE49-F238E27FC236}">
-                <a16:creationId xmlns="" xmlns:a16="http://schemas.microsoft.com/office/drawing/2014/main" id="{7D2C7851-769C-4DF5-B4EB-92C9F8721AA8}"/>
+                <a16:creationId xmlns:a16="http://schemas.microsoft.com/office/drawing/2014/main" id="{7D2C7851-769C-4DF5-B4EB-92C9F8721AA8}"/>
               </a:ext>
             </a:extLst>
           </p:cNvPr>
@@ -13092,7 +14244,7 @@
           <p:cNvPr id="14" name="Inhaltsplatzhalter 13">
             <a:extLst>
               <a:ext uri="{FF2B5EF4-FFF2-40B4-BE49-F238E27FC236}">
-                <a16:creationId xmlns="" xmlns:a16="http://schemas.microsoft.com/office/drawing/2014/main" id="{57389447-F8E0-45D3-85F4-09347BA8682E}"/>
+                <a16:creationId xmlns:a16="http://schemas.microsoft.com/office/drawing/2014/main" id="{57389447-F8E0-45D3-85F4-09347BA8682E}"/>
               </a:ext>
             </a:extLst>
           </p:cNvPr>
@@ -13127,7 +14279,7 @@
           <p:cNvPr id="16" name="Rechteck 15">
             <a:extLst>
               <a:ext uri="{FF2B5EF4-FFF2-40B4-BE49-F238E27FC236}">
-                <a16:creationId xmlns="" xmlns:a16="http://schemas.microsoft.com/office/drawing/2014/main" id="{30778362-FFF2-4673-8311-57C88A8E8903}"/>
+                <a16:creationId xmlns:a16="http://schemas.microsoft.com/office/drawing/2014/main" id="{30778362-FFF2-4673-8311-57C88A8E8903}"/>
               </a:ext>
             </a:extLst>
           </p:cNvPr>
@@ -13183,7 +14335,7 @@
           <p:cNvPr id="17" name="Rechteck 16">
             <a:extLst>
               <a:ext uri="{FF2B5EF4-FFF2-40B4-BE49-F238E27FC236}">
-                <a16:creationId xmlns="" xmlns:a16="http://schemas.microsoft.com/office/drawing/2014/main" id="{4FC1C6AC-31F0-4795-89FF-0F2C89DB93C5}"/>
+                <a16:creationId xmlns:a16="http://schemas.microsoft.com/office/drawing/2014/main" id="{4FC1C6AC-31F0-4795-89FF-0F2C89DB93C5}"/>
               </a:ext>
             </a:extLst>
           </p:cNvPr>
@@ -13281,13 +14433,6 @@
   <p:clrMapOvr>
     <a:masterClrMapping/>
   </p:clrMapOvr>
-  <p:timing>
-    <p:tnLst>
-      <p:par>
-        <p:cTn id="1" dur="indefinite" restart="never" nodeType="tmRoot"/>
-      </p:par>
-    </p:tnLst>
-  </p:timing>
 </p:sld>
 </file>
 
@@ -13313,7 +14458,7 @@
           <p:cNvPr id="2" name="Titel 1">
             <a:extLst>
               <a:ext uri="{FF2B5EF4-FFF2-40B4-BE49-F238E27FC236}">
-                <a16:creationId xmlns="" xmlns:a16="http://schemas.microsoft.com/office/drawing/2014/main" id="{4E61557C-C1C7-4C45-B68A-C6BA2951B46F}"/>
+                <a16:creationId xmlns:a16="http://schemas.microsoft.com/office/drawing/2014/main" id="{4E61557C-C1C7-4C45-B68A-C6BA2951B46F}"/>
               </a:ext>
             </a:extLst>
           </p:cNvPr>
@@ -13342,7 +14487,7 @@
           <p:cNvPr id="3" name="Textplatzhalter 2">
             <a:extLst>
               <a:ext uri="{FF2B5EF4-FFF2-40B4-BE49-F238E27FC236}">
-                <a16:creationId xmlns="" xmlns:a16="http://schemas.microsoft.com/office/drawing/2014/main" id="{5103F8D7-88BD-4586-A2F8-EF2D8B1A656A}"/>
+                <a16:creationId xmlns:a16="http://schemas.microsoft.com/office/drawing/2014/main" id="{5103F8D7-88BD-4586-A2F8-EF2D8B1A656A}"/>
               </a:ext>
             </a:extLst>
           </p:cNvPr>
@@ -13399,13 +14544,6 @@
   <p:clrMapOvr>
     <a:masterClrMapping/>
   </p:clrMapOvr>
-  <p:timing>
-    <p:tnLst>
-      <p:par>
-        <p:cTn id="1" dur="indefinite" restart="never" nodeType="tmRoot"/>
-      </p:par>
-    </p:tnLst>
-  </p:timing>
 </p:sld>
 </file>
 

</xml_diff>

<commit_message>
final slides for today
</commit_message>
<xml_diff>
--- a/presentations/2019-02_Hamburg_RUG/1902 Hamburg RUG easystats.pptx
+++ b/presentations/2019-02_Hamburg_RUG/1902 Hamburg RUG easystats.pptx
@@ -229,7 +229,7 @@
           <a:p>
             <a:fld id="{64CA4326-4DC0-4DE5-99BF-3FA9D988CBE6}" type="datetimeFigureOut">
               <a:rPr lang="de-DE" smtClean="0"/>
-              <a:t>06.02.2019</a:t>
+              <a:t>13.02.2019</a:t>
             </a:fld>
             <a:endParaRPr lang="de-DE"/>
           </a:p>
@@ -362,7 +362,7 @@
           <a:p>
             <a:fld id="{0E08E2FD-2E15-419A-B356-6759EA05D2AD}" type="datetimeFigureOut">
               <a:rPr lang="de-DE" smtClean="0"/>
-              <a:t>06.02.2019</a:t>
+              <a:t>13.02.2019</a:t>
             </a:fld>
             <a:endParaRPr lang="de-DE"/>
           </a:p>
@@ -1091,7 +1091,7 @@
           <a:noFill/>
           <a:extLst>
             <a:ext uri="{909E8E84-426E-40dd-AFC4-6F175D3DCCD1}">
-              <a14:hiddenFill xmlns:a14="http://schemas.microsoft.com/office/drawing/2010/main" xmlns="">
+              <a14:hiddenFill xmlns="" xmlns:a14="http://schemas.microsoft.com/office/drawing/2010/main">
                 <a:solidFill>
                   <a:srgbClr val="FFFFFF"/>
                 </a:solidFill>
@@ -1132,7 +1132,7 @@
           <a:noFill/>
           <a:extLst>
             <a:ext uri="{909E8E84-426E-40dd-AFC4-6F175D3DCCD1}">
-              <a14:hiddenFill xmlns:a14="http://schemas.microsoft.com/office/drawing/2010/main" xmlns="">
+              <a14:hiddenFill xmlns="" xmlns:a14="http://schemas.microsoft.com/office/drawing/2010/main">
                 <a:solidFill>
                   <a:srgbClr val="FFFFFF"/>
                 </a:solidFill>
@@ -1781,7 +1781,7 @@
           <a:noFill/>
           <a:extLst>
             <a:ext uri="{909E8E84-426E-40dd-AFC4-6F175D3DCCD1}">
-              <a14:hiddenFill xmlns:a14="http://schemas.microsoft.com/office/drawing/2010/main" xmlns="">
+              <a14:hiddenFill xmlns="" xmlns:a14="http://schemas.microsoft.com/office/drawing/2010/main">
                 <a:solidFill>
                   <a:srgbClr val="FFFFFF"/>
                 </a:solidFill>
@@ -1822,7 +1822,7 @@
           <a:noFill/>
           <a:extLst>
             <a:ext uri="{909E8E84-426E-40dd-AFC4-6F175D3DCCD1}">
-              <a14:hiddenFill xmlns:a14="http://schemas.microsoft.com/office/drawing/2010/main" xmlns="">
+              <a14:hiddenFill xmlns="" xmlns:a14="http://schemas.microsoft.com/office/drawing/2010/main">
                 <a:solidFill>
                   <a:srgbClr val="FFFFFF"/>
                 </a:solidFill>
@@ -5057,6 +5057,12 @@
               </a:rPr>
               <a:t>“</a:t>
             </a:r>
+            <a:r>
+              <a:rPr lang="de-DE" dirty="0">
+                <a:latin typeface="Source Sans Pro" panose="020B0503030403020204" pitchFamily="34" charset="0"/>
+              </a:rPr>
+              <a:t/>
+            </a:r>
             <a:br>
               <a:rPr lang="de-DE" dirty="0">
                 <a:latin typeface="Source Sans Pro" panose="020B0503030403020204" pitchFamily="34" charset="0"/>
@@ -5237,7 +5243,7 @@
           <p:cNvPr id="4" name="Fußzeilenplatzhalter 3">
             <a:extLst>
               <a:ext uri="{FF2B5EF4-FFF2-40B4-BE49-F238E27FC236}">
-                <a16:creationId xmlns:a16="http://schemas.microsoft.com/office/drawing/2014/main" id="{0FC0C19D-1682-4679-8E1E-D2E399E12164}"/>
+                <a16:creationId xmlns:a16="http://schemas.microsoft.com/office/drawing/2014/main" xmlns="" id="{0FC0C19D-1682-4679-8E1E-D2E399E12164}"/>
               </a:ext>
             </a:extLst>
           </p:cNvPr>
@@ -5278,7 +5284,7 @@
           <p:cNvPr id="6" name="Titel 5">
             <a:extLst>
               <a:ext uri="{FF2B5EF4-FFF2-40B4-BE49-F238E27FC236}">
-                <a16:creationId xmlns:a16="http://schemas.microsoft.com/office/drawing/2014/main" id="{F945D4CE-7FAD-45BF-A641-06AE09C0EF93}"/>
+                <a16:creationId xmlns:a16="http://schemas.microsoft.com/office/drawing/2014/main" xmlns="" id="{F945D4CE-7FAD-45BF-A641-06AE09C0EF93}"/>
               </a:ext>
             </a:extLst>
           </p:cNvPr>
@@ -5327,7 +5333,7 @@
           <p:cNvPr id="9" name="Textfeld 8">
             <a:extLst>
               <a:ext uri="{FF2B5EF4-FFF2-40B4-BE49-F238E27FC236}">
-                <a16:creationId xmlns:a16="http://schemas.microsoft.com/office/drawing/2014/main" id="{5BB6C03E-B970-4FA5-83BD-DA2E462C35A1}"/>
+                <a16:creationId xmlns:a16="http://schemas.microsoft.com/office/drawing/2014/main" xmlns="" id="{5BB6C03E-B970-4FA5-83BD-DA2E462C35A1}"/>
               </a:ext>
             </a:extLst>
           </p:cNvPr>
@@ -5513,7 +5519,7 @@
           <p:cNvPr id="3" name="Inhaltsplatzhalter 2">
             <a:extLst>
               <a:ext uri="{FF2B5EF4-FFF2-40B4-BE49-F238E27FC236}">
-                <a16:creationId xmlns:a16="http://schemas.microsoft.com/office/drawing/2014/main" id="{8AFA4034-B74C-496E-BC01-CDF31F1FC067}"/>
+                <a16:creationId xmlns:a16="http://schemas.microsoft.com/office/drawing/2014/main" xmlns="" id="{8AFA4034-B74C-496E-BC01-CDF31F1FC067}"/>
               </a:ext>
             </a:extLst>
           </p:cNvPr>
@@ -5578,7 +5584,7 @@
           <p:cNvPr id="4" name="Fußzeilenplatzhalter 3">
             <a:extLst>
               <a:ext uri="{FF2B5EF4-FFF2-40B4-BE49-F238E27FC236}">
-                <a16:creationId xmlns:a16="http://schemas.microsoft.com/office/drawing/2014/main" id="{0FC0C19D-1682-4679-8E1E-D2E399E12164}"/>
+                <a16:creationId xmlns:a16="http://schemas.microsoft.com/office/drawing/2014/main" xmlns="" id="{0FC0C19D-1682-4679-8E1E-D2E399E12164}"/>
               </a:ext>
             </a:extLst>
           </p:cNvPr>
@@ -5619,7 +5625,7 @@
           <p:cNvPr id="6" name="Titel 5">
             <a:extLst>
               <a:ext uri="{FF2B5EF4-FFF2-40B4-BE49-F238E27FC236}">
-                <a16:creationId xmlns:a16="http://schemas.microsoft.com/office/drawing/2014/main" id="{F945D4CE-7FAD-45BF-A641-06AE09C0EF93}"/>
+                <a16:creationId xmlns:a16="http://schemas.microsoft.com/office/drawing/2014/main" xmlns="" id="{F945D4CE-7FAD-45BF-A641-06AE09C0EF93}"/>
               </a:ext>
             </a:extLst>
           </p:cNvPr>
@@ -5668,7 +5674,7 @@
           <p:cNvPr id="9" name="Textfeld 8">
             <a:extLst>
               <a:ext uri="{FF2B5EF4-FFF2-40B4-BE49-F238E27FC236}">
-                <a16:creationId xmlns:a16="http://schemas.microsoft.com/office/drawing/2014/main" id="{5BB6C03E-B970-4FA5-83BD-DA2E462C35A1}"/>
+                <a16:creationId xmlns:a16="http://schemas.microsoft.com/office/drawing/2014/main" xmlns="" id="{5BB6C03E-B970-4FA5-83BD-DA2E462C35A1}"/>
               </a:ext>
             </a:extLst>
           </p:cNvPr>
@@ -5917,7 +5923,7 @@
           <p:cNvPr id="7" name="Inhaltsplatzhalter 6">
             <a:extLst>
               <a:ext uri="{FF2B5EF4-FFF2-40B4-BE49-F238E27FC236}">
-                <a16:creationId xmlns:a16="http://schemas.microsoft.com/office/drawing/2014/main" id="{ACC88CA9-43D9-4EC7-8353-01A2FA0A05D7}"/>
+                <a16:creationId xmlns:a16="http://schemas.microsoft.com/office/drawing/2014/main" xmlns="" id="{ACC88CA9-43D9-4EC7-8353-01A2FA0A05D7}"/>
               </a:ext>
             </a:extLst>
           </p:cNvPr>
@@ -5942,7 +5948,7 @@
           <p:cNvPr id="10" name="Inhaltsplatzhalter 2">
             <a:extLst>
               <a:ext uri="{FF2B5EF4-FFF2-40B4-BE49-F238E27FC236}">
-                <a16:creationId xmlns:a16="http://schemas.microsoft.com/office/drawing/2014/main" id="{7642EB22-60DE-4FC9-8D6E-8C945326D4BC}"/>
+                <a16:creationId xmlns:a16="http://schemas.microsoft.com/office/drawing/2014/main" xmlns="" id="{7642EB22-60DE-4FC9-8D6E-8C945326D4BC}"/>
               </a:ext>
             </a:extLst>
           </p:cNvPr>
@@ -6008,7 +6014,7 @@
           <p:cNvPr id="4" name="Fußzeilenplatzhalter 3">
             <a:extLst>
               <a:ext uri="{FF2B5EF4-FFF2-40B4-BE49-F238E27FC236}">
-                <a16:creationId xmlns:a16="http://schemas.microsoft.com/office/drawing/2014/main" id="{0FC0C19D-1682-4679-8E1E-D2E399E12164}"/>
+                <a16:creationId xmlns:a16="http://schemas.microsoft.com/office/drawing/2014/main" xmlns="" id="{0FC0C19D-1682-4679-8E1E-D2E399E12164}"/>
               </a:ext>
             </a:extLst>
           </p:cNvPr>
@@ -6042,7 +6048,7 @@
           <p:cNvPr id="6" name="Titel 5">
             <a:extLst>
               <a:ext uri="{FF2B5EF4-FFF2-40B4-BE49-F238E27FC236}">
-                <a16:creationId xmlns:a16="http://schemas.microsoft.com/office/drawing/2014/main" id="{F945D4CE-7FAD-45BF-A641-06AE09C0EF93}"/>
+                <a16:creationId xmlns:a16="http://schemas.microsoft.com/office/drawing/2014/main" xmlns="" id="{F945D4CE-7FAD-45BF-A641-06AE09C0EF93}"/>
               </a:ext>
             </a:extLst>
           </p:cNvPr>
@@ -6091,7 +6097,7 @@
           <p:cNvPr id="9" name="Textfeld 8">
             <a:extLst>
               <a:ext uri="{FF2B5EF4-FFF2-40B4-BE49-F238E27FC236}">
-                <a16:creationId xmlns:a16="http://schemas.microsoft.com/office/drawing/2014/main" id="{5BB6C03E-B970-4FA5-83BD-DA2E462C35A1}"/>
+                <a16:creationId xmlns:a16="http://schemas.microsoft.com/office/drawing/2014/main" xmlns="" id="{5BB6C03E-B970-4FA5-83BD-DA2E462C35A1}"/>
               </a:ext>
             </a:extLst>
           </p:cNvPr>
@@ -6463,7 +6469,7 @@
           <p:cNvPr id="7" name="Inhaltsplatzhalter 6">
             <a:extLst>
               <a:ext uri="{FF2B5EF4-FFF2-40B4-BE49-F238E27FC236}">
-                <a16:creationId xmlns:a16="http://schemas.microsoft.com/office/drawing/2014/main" id="{8A35C46B-6FA1-4FA7-8603-FE979BA7FE3E}"/>
+                <a16:creationId xmlns:a16="http://schemas.microsoft.com/office/drawing/2014/main" xmlns="" id="{8A35C46B-6FA1-4FA7-8603-FE979BA7FE3E}"/>
               </a:ext>
             </a:extLst>
           </p:cNvPr>
@@ -6488,7 +6494,7 @@
           <p:cNvPr id="10" name="Inhaltsplatzhalter 2">
             <a:extLst>
               <a:ext uri="{FF2B5EF4-FFF2-40B4-BE49-F238E27FC236}">
-                <a16:creationId xmlns:a16="http://schemas.microsoft.com/office/drawing/2014/main" id="{2AAA0C88-246A-47B1-8154-75B0D77D2311}"/>
+                <a16:creationId xmlns:a16="http://schemas.microsoft.com/office/drawing/2014/main" xmlns="" id="{2AAA0C88-246A-47B1-8154-75B0D77D2311}"/>
               </a:ext>
             </a:extLst>
           </p:cNvPr>
@@ -6554,7 +6560,7 @@
           <p:cNvPr id="5" name="Textplatzhalter 4">
             <a:extLst>
               <a:ext uri="{FF2B5EF4-FFF2-40B4-BE49-F238E27FC236}">
-                <a16:creationId xmlns:a16="http://schemas.microsoft.com/office/drawing/2014/main" id="{67DE0ECA-5E5C-43D9-A4C4-B3A31EB20E63}"/>
+                <a16:creationId xmlns:a16="http://schemas.microsoft.com/office/drawing/2014/main" xmlns="" id="{67DE0ECA-5E5C-43D9-A4C4-B3A31EB20E63}"/>
               </a:ext>
             </a:extLst>
           </p:cNvPr>
@@ -6589,7 +6595,7 @@
           <p:cNvPr id="3" name="Grafik 2">
             <a:extLst>
               <a:ext uri="{FF2B5EF4-FFF2-40B4-BE49-F238E27FC236}">
-                <a16:creationId xmlns:a16="http://schemas.microsoft.com/office/drawing/2014/main" id="{99510B2A-C3A7-4CD7-A56D-FB23433FFE9C}"/>
+                <a16:creationId xmlns:a16="http://schemas.microsoft.com/office/drawing/2014/main" xmlns="" id="{99510B2A-C3A7-4CD7-A56D-FB23433FFE9C}"/>
               </a:ext>
             </a:extLst>
           </p:cNvPr>
@@ -6655,7 +6661,7 @@
           <p:cNvPr id="13" name="Grafik 12">
             <a:extLst>
               <a:ext uri="{FF2B5EF4-FFF2-40B4-BE49-F238E27FC236}">
-                <a16:creationId xmlns:a16="http://schemas.microsoft.com/office/drawing/2014/main" id="{FF895708-38EE-4371-8B22-E82F604061DE}"/>
+                <a16:creationId xmlns:a16="http://schemas.microsoft.com/office/drawing/2014/main" xmlns="" id="{FF895708-38EE-4371-8B22-E82F604061DE}"/>
               </a:ext>
             </a:extLst>
           </p:cNvPr>
@@ -6691,7 +6697,7 @@
           <p:cNvPr id="2" name="Inhaltsplatzhalter 1">
             <a:extLst>
               <a:ext uri="{FF2B5EF4-FFF2-40B4-BE49-F238E27FC236}">
-                <a16:creationId xmlns:a16="http://schemas.microsoft.com/office/drawing/2014/main" id="{917F168F-F8CE-4DD4-BCEA-59877FE06ABD}"/>
+                <a16:creationId xmlns:a16="http://schemas.microsoft.com/office/drawing/2014/main" xmlns="" id="{917F168F-F8CE-4DD4-BCEA-59877FE06ABD}"/>
               </a:ext>
             </a:extLst>
           </p:cNvPr>
@@ -6743,7 +6749,7 @@
           <p:cNvPr id="4" name="Fußzeilenplatzhalter 3">
             <a:extLst>
               <a:ext uri="{FF2B5EF4-FFF2-40B4-BE49-F238E27FC236}">
-                <a16:creationId xmlns:a16="http://schemas.microsoft.com/office/drawing/2014/main" id="{252315B1-7337-4C45-8A5C-CBD6F1F21BA3}"/>
+                <a16:creationId xmlns:a16="http://schemas.microsoft.com/office/drawing/2014/main" xmlns="" id="{252315B1-7337-4C45-8A5C-CBD6F1F21BA3}"/>
               </a:ext>
             </a:extLst>
           </p:cNvPr>
@@ -6777,7 +6783,7 @@
           <p:cNvPr id="6" name="Titel 5">
             <a:extLst>
               <a:ext uri="{FF2B5EF4-FFF2-40B4-BE49-F238E27FC236}">
-                <a16:creationId xmlns:a16="http://schemas.microsoft.com/office/drawing/2014/main" id="{E88D0AAF-755E-438D-A419-21BAF2BB4EB7}"/>
+                <a16:creationId xmlns:a16="http://schemas.microsoft.com/office/drawing/2014/main" xmlns="" id="{E88D0AAF-755E-438D-A419-21BAF2BB4EB7}"/>
               </a:ext>
             </a:extLst>
           </p:cNvPr>
@@ -6808,7 +6814,7 @@
           <p:cNvPr id="5" name="Inhaltsplatzhalter 4">
             <a:extLst>
               <a:ext uri="{FF2B5EF4-FFF2-40B4-BE49-F238E27FC236}">
-                <a16:creationId xmlns:a16="http://schemas.microsoft.com/office/drawing/2014/main" id="{0D920E20-9C3B-45F7-B7DF-E0C531E13B05}"/>
+                <a16:creationId xmlns:a16="http://schemas.microsoft.com/office/drawing/2014/main" xmlns="" id="{0D920E20-9C3B-45F7-B7DF-E0C531E13B05}"/>
               </a:ext>
             </a:extLst>
           </p:cNvPr>
@@ -6843,7 +6849,7 @@
           <p:cNvPr id="10" name="Rechteck 9">
             <a:extLst>
               <a:ext uri="{FF2B5EF4-FFF2-40B4-BE49-F238E27FC236}">
-                <a16:creationId xmlns:a16="http://schemas.microsoft.com/office/drawing/2014/main" id="{EB7FEFC9-05FF-4A8D-B810-D4F75C09ADAD}"/>
+                <a16:creationId xmlns:a16="http://schemas.microsoft.com/office/drawing/2014/main" xmlns="" id="{EB7FEFC9-05FF-4A8D-B810-D4F75C09ADAD}"/>
               </a:ext>
             </a:extLst>
           </p:cNvPr>
@@ -6963,7 +6969,7 @@
           <p:cNvPr id="11" name="Rechteck 10">
             <a:extLst>
               <a:ext uri="{FF2B5EF4-FFF2-40B4-BE49-F238E27FC236}">
-                <a16:creationId xmlns:a16="http://schemas.microsoft.com/office/drawing/2014/main" id="{2AEA2081-5C64-4D74-A8A5-C8EE9250A2BE}"/>
+                <a16:creationId xmlns:a16="http://schemas.microsoft.com/office/drawing/2014/main" xmlns="" id="{2AEA2081-5C64-4D74-A8A5-C8EE9250A2BE}"/>
               </a:ext>
             </a:extLst>
           </p:cNvPr>
@@ -7113,7 +7119,7 @@
           <p:cNvPr id="13" name="Grafik 12">
             <a:extLst>
               <a:ext uri="{FF2B5EF4-FFF2-40B4-BE49-F238E27FC236}">
-                <a16:creationId xmlns:a16="http://schemas.microsoft.com/office/drawing/2014/main" id="{FF895708-38EE-4371-8B22-E82F604061DE}"/>
+                <a16:creationId xmlns:a16="http://schemas.microsoft.com/office/drawing/2014/main" xmlns="" id="{FF895708-38EE-4371-8B22-E82F604061DE}"/>
               </a:ext>
             </a:extLst>
           </p:cNvPr>
@@ -7149,7 +7155,7 @@
           <p:cNvPr id="2" name="Inhaltsplatzhalter 1">
             <a:extLst>
               <a:ext uri="{FF2B5EF4-FFF2-40B4-BE49-F238E27FC236}">
-                <a16:creationId xmlns:a16="http://schemas.microsoft.com/office/drawing/2014/main" id="{917F168F-F8CE-4DD4-BCEA-59877FE06ABD}"/>
+                <a16:creationId xmlns:a16="http://schemas.microsoft.com/office/drawing/2014/main" xmlns="" id="{917F168F-F8CE-4DD4-BCEA-59877FE06ABD}"/>
               </a:ext>
             </a:extLst>
           </p:cNvPr>
@@ -7206,7 +7212,7 @@
           <p:cNvPr id="4" name="Fußzeilenplatzhalter 3">
             <a:extLst>
               <a:ext uri="{FF2B5EF4-FFF2-40B4-BE49-F238E27FC236}">
-                <a16:creationId xmlns:a16="http://schemas.microsoft.com/office/drawing/2014/main" id="{252315B1-7337-4C45-8A5C-CBD6F1F21BA3}"/>
+                <a16:creationId xmlns:a16="http://schemas.microsoft.com/office/drawing/2014/main" xmlns="" id="{252315B1-7337-4C45-8A5C-CBD6F1F21BA3}"/>
               </a:ext>
             </a:extLst>
           </p:cNvPr>
@@ -7240,7 +7246,7 @@
           <p:cNvPr id="6" name="Titel 5">
             <a:extLst>
               <a:ext uri="{FF2B5EF4-FFF2-40B4-BE49-F238E27FC236}">
-                <a16:creationId xmlns:a16="http://schemas.microsoft.com/office/drawing/2014/main" id="{E88D0AAF-755E-438D-A419-21BAF2BB4EB7}"/>
+                <a16:creationId xmlns:a16="http://schemas.microsoft.com/office/drawing/2014/main" xmlns="" id="{E88D0AAF-755E-438D-A419-21BAF2BB4EB7}"/>
               </a:ext>
             </a:extLst>
           </p:cNvPr>
@@ -7271,7 +7277,7 @@
           <p:cNvPr id="5" name="Inhaltsplatzhalter 4">
             <a:extLst>
               <a:ext uri="{FF2B5EF4-FFF2-40B4-BE49-F238E27FC236}">
-                <a16:creationId xmlns:a16="http://schemas.microsoft.com/office/drawing/2014/main" id="{0D920E20-9C3B-45F7-B7DF-E0C531E13B05}"/>
+                <a16:creationId xmlns:a16="http://schemas.microsoft.com/office/drawing/2014/main" xmlns="" id="{0D920E20-9C3B-45F7-B7DF-E0C531E13B05}"/>
               </a:ext>
             </a:extLst>
           </p:cNvPr>
@@ -7306,7 +7312,7 @@
           <p:cNvPr id="10" name="Rechteck 9">
             <a:extLst>
               <a:ext uri="{FF2B5EF4-FFF2-40B4-BE49-F238E27FC236}">
-                <a16:creationId xmlns:a16="http://schemas.microsoft.com/office/drawing/2014/main" id="{EB7FEFC9-05FF-4A8D-B810-D4F75C09ADAD}"/>
+                <a16:creationId xmlns:a16="http://schemas.microsoft.com/office/drawing/2014/main" xmlns="" id="{EB7FEFC9-05FF-4A8D-B810-D4F75C09ADAD}"/>
               </a:ext>
             </a:extLst>
           </p:cNvPr>
@@ -7426,7 +7432,7 @@
           <p:cNvPr id="11" name="Rechteck 10">
             <a:extLst>
               <a:ext uri="{FF2B5EF4-FFF2-40B4-BE49-F238E27FC236}">
-                <a16:creationId xmlns:a16="http://schemas.microsoft.com/office/drawing/2014/main" id="{2AEA2081-5C64-4D74-A8A5-C8EE9250A2BE}"/>
+                <a16:creationId xmlns:a16="http://schemas.microsoft.com/office/drawing/2014/main" xmlns="" id="{2AEA2081-5C64-4D74-A8A5-C8EE9250A2BE}"/>
               </a:ext>
             </a:extLst>
           </p:cNvPr>
@@ -7576,7 +7582,7 @@
           <p:cNvPr id="2" name="Inhaltsplatzhalter 1">
             <a:extLst>
               <a:ext uri="{FF2B5EF4-FFF2-40B4-BE49-F238E27FC236}">
-                <a16:creationId xmlns:a16="http://schemas.microsoft.com/office/drawing/2014/main" id="{9EEF70E0-DC88-48AD-8EF7-031F96353D1D}"/>
+                <a16:creationId xmlns:a16="http://schemas.microsoft.com/office/drawing/2014/main" xmlns="" id="{9EEF70E0-DC88-48AD-8EF7-031F96353D1D}"/>
               </a:ext>
             </a:extLst>
           </p:cNvPr>
@@ -7669,7 +7675,7 @@
           <p:cNvPr id="4" name="Fußzeilenplatzhalter 3">
             <a:extLst>
               <a:ext uri="{FF2B5EF4-FFF2-40B4-BE49-F238E27FC236}">
-                <a16:creationId xmlns:a16="http://schemas.microsoft.com/office/drawing/2014/main" id="{51B427D6-C78C-4800-A708-8DE04DA34FAA}"/>
+                <a16:creationId xmlns:a16="http://schemas.microsoft.com/office/drawing/2014/main" xmlns="" id="{51B427D6-C78C-4800-A708-8DE04DA34FAA}"/>
               </a:ext>
             </a:extLst>
           </p:cNvPr>
@@ -7710,7 +7716,7 @@
           <p:cNvPr id="6" name="Titel 5">
             <a:extLst>
               <a:ext uri="{FF2B5EF4-FFF2-40B4-BE49-F238E27FC236}">
-                <a16:creationId xmlns:a16="http://schemas.microsoft.com/office/drawing/2014/main" id="{4ACCE5D5-075E-481D-B9C5-A3074B841447}"/>
+                <a16:creationId xmlns:a16="http://schemas.microsoft.com/office/drawing/2014/main" xmlns="" id="{4ACCE5D5-075E-481D-B9C5-A3074B841447}"/>
               </a:ext>
             </a:extLst>
           </p:cNvPr>
@@ -7739,7 +7745,7 @@
           <p:cNvPr id="7" name="Inhaltsplatzhalter 6">
             <a:extLst>
               <a:ext uri="{FF2B5EF4-FFF2-40B4-BE49-F238E27FC236}">
-                <a16:creationId xmlns:a16="http://schemas.microsoft.com/office/drawing/2014/main" id="{91EE5F19-F06C-41B0-A917-E9959AFBDF9F}"/>
+                <a16:creationId xmlns:a16="http://schemas.microsoft.com/office/drawing/2014/main" xmlns="" id="{91EE5F19-F06C-41B0-A917-E9959AFBDF9F}"/>
               </a:ext>
             </a:extLst>
           </p:cNvPr>
@@ -7794,7 +7800,7 @@
           <p:cNvPr id="4" name="Fußzeilenplatzhalter 3">
             <a:extLst>
               <a:ext uri="{FF2B5EF4-FFF2-40B4-BE49-F238E27FC236}">
-                <a16:creationId xmlns:a16="http://schemas.microsoft.com/office/drawing/2014/main" id="{0FC0C19D-1682-4679-8E1E-D2E399E12164}"/>
+                <a16:creationId xmlns:a16="http://schemas.microsoft.com/office/drawing/2014/main" xmlns="" id="{0FC0C19D-1682-4679-8E1E-D2E399E12164}"/>
               </a:ext>
             </a:extLst>
           </p:cNvPr>
@@ -7828,7 +7834,7 @@
           <p:cNvPr id="6" name="Titel 5">
             <a:extLst>
               <a:ext uri="{FF2B5EF4-FFF2-40B4-BE49-F238E27FC236}">
-                <a16:creationId xmlns:a16="http://schemas.microsoft.com/office/drawing/2014/main" id="{F945D4CE-7FAD-45BF-A641-06AE09C0EF93}"/>
+                <a16:creationId xmlns:a16="http://schemas.microsoft.com/office/drawing/2014/main" xmlns="" id="{F945D4CE-7FAD-45BF-A641-06AE09C0EF93}"/>
               </a:ext>
             </a:extLst>
           </p:cNvPr>
@@ -7889,7 +7895,7 @@
           <p:cNvPr id="9" name="Textfeld 8">
             <a:extLst>
               <a:ext uri="{FF2B5EF4-FFF2-40B4-BE49-F238E27FC236}">
-                <a16:creationId xmlns:a16="http://schemas.microsoft.com/office/drawing/2014/main" id="{5BB6C03E-B970-4FA5-83BD-DA2E462C35A1}"/>
+                <a16:creationId xmlns:a16="http://schemas.microsoft.com/office/drawing/2014/main" xmlns="" id="{5BB6C03E-B970-4FA5-83BD-DA2E462C35A1}"/>
               </a:ext>
             </a:extLst>
           </p:cNvPr>
@@ -8127,7 +8133,7 @@
           <p:cNvPr id="3" name="Inhaltsplatzhalter 2">
             <a:extLst>
               <a:ext uri="{FF2B5EF4-FFF2-40B4-BE49-F238E27FC236}">
-                <a16:creationId xmlns:a16="http://schemas.microsoft.com/office/drawing/2014/main" id="{CEF85EFD-AB38-43A6-87C8-FCB2B77AE55F}"/>
+                <a16:creationId xmlns:a16="http://schemas.microsoft.com/office/drawing/2014/main" xmlns="" id="{CEF85EFD-AB38-43A6-87C8-FCB2B77AE55F}"/>
               </a:ext>
             </a:extLst>
           </p:cNvPr>
@@ -8192,7 +8198,7 @@
           <p:cNvPr id="4" name="Fußzeilenplatzhalter 3">
             <a:extLst>
               <a:ext uri="{FF2B5EF4-FFF2-40B4-BE49-F238E27FC236}">
-                <a16:creationId xmlns:a16="http://schemas.microsoft.com/office/drawing/2014/main" id="{0FC0C19D-1682-4679-8E1E-D2E399E12164}"/>
+                <a16:creationId xmlns:a16="http://schemas.microsoft.com/office/drawing/2014/main" xmlns="" id="{0FC0C19D-1682-4679-8E1E-D2E399E12164}"/>
               </a:ext>
             </a:extLst>
           </p:cNvPr>
@@ -8226,7 +8232,7 @@
           <p:cNvPr id="6" name="Titel 5">
             <a:extLst>
               <a:ext uri="{FF2B5EF4-FFF2-40B4-BE49-F238E27FC236}">
-                <a16:creationId xmlns:a16="http://schemas.microsoft.com/office/drawing/2014/main" id="{F945D4CE-7FAD-45BF-A641-06AE09C0EF93}"/>
+                <a16:creationId xmlns:a16="http://schemas.microsoft.com/office/drawing/2014/main" xmlns="" id="{F945D4CE-7FAD-45BF-A641-06AE09C0EF93}"/>
               </a:ext>
             </a:extLst>
           </p:cNvPr>
@@ -8287,7 +8293,7 @@
           <p:cNvPr id="9" name="Textfeld 8">
             <a:extLst>
               <a:ext uri="{FF2B5EF4-FFF2-40B4-BE49-F238E27FC236}">
-                <a16:creationId xmlns:a16="http://schemas.microsoft.com/office/drawing/2014/main" id="{5BB6C03E-B970-4FA5-83BD-DA2E462C35A1}"/>
+                <a16:creationId xmlns:a16="http://schemas.microsoft.com/office/drawing/2014/main" xmlns="" id="{5BB6C03E-B970-4FA5-83BD-DA2E462C35A1}"/>
               </a:ext>
             </a:extLst>
           </p:cNvPr>
@@ -8705,7 +8711,7 @@
           <p:cNvPr id="7" name="Inhaltsplatzhalter 6">
             <a:extLst>
               <a:ext uri="{FF2B5EF4-FFF2-40B4-BE49-F238E27FC236}">
-                <a16:creationId xmlns:a16="http://schemas.microsoft.com/office/drawing/2014/main" id="{02E73D04-5C87-4990-9FD5-28E200352959}"/>
+                <a16:creationId xmlns:a16="http://schemas.microsoft.com/office/drawing/2014/main" xmlns="" id="{02E73D04-5C87-4990-9FD5-28E200352959}"/>
               </a:ext>
             </a:extLst>
           </p:cNvPr>
@@ -8730,7 +8736,7 @@
           <p:cNvPr id="10" name="Inhaltsplatzhalter 2">
             <a:extLst>
               <a:ext uri="{FF2B5EF4-FFF2-40B4-BE49-F238E27FC236}">
-                <a16:creationId xmlns:a16="http://schemas.microsoft.com/office/drawing/2014/main" id="{3D50B8CB-49CB-480F-8369-501E071177D8}"/>
+                <a16:creationId xmlns:a16="http://schemas.microsoft.com/office/drawing/2014/main" xmlns="" id="{3D50B8CB-49CB-480F-8369-501E071177D8}"/>
               </a:ext>
             </a:extLst>
           </p:cNvPr>
@@ -8796,7 +8802,7 @@
           <p:cNvPr id="4" name="Fußzeilenplatzhalter 3">
             <a:extLst>
               <a:ext uri="{FF2B5EF4-FFF2-40B4-BE49-F238E27FC236}">
-                <a16:creationId xmlns:a16="http://schemas.microsoft.com/office/drawing/2014/main" id="{0FC0C19D-1682-4679-8E1E-D2E399E12164}"/>
+                <a16:creationId xmlns:a16="http://schemas.microsoft.com/office/drawing/2014/main" xmlns="" id="{0FC0C19D-1682-4679-8E1E-D2E399E12164}"/>
               </a:ext>
             </a:extLst>
           </p:cNvPr>
@@ -8830,7 +8836,7 @@
           <p:cNvPr id="6" name="Titel 5">
             <a:extLst>
               <a:ext uri="{FF2B5EF4-FFF2-40B4-BE49-F238E27FC236}">
-                <a16:creationId xmlns:a16="http://schemas.microsoft.com/office/drawing/2014/main" id="{F945D4CE-7FAD-45BF-A641-06AE09C0EF93}"/>
+                <a16:creationId xmlns:a16="http://schemas.microsoft.com/office/drawing/2014/main" xmlns="" id="{F945D4CE-7FAD-45BF-A641-06AE09C0EF93}"/>
               </a:ext>
             </a:extLst>
           </p:cNvPr>
@@ -8891,7 +8897,7 @@
           <p:cNvPr id="9" name="Textfeld 8">
             <a:extLst>
               <a:ext uri="{FF2B5EF4-FFF2-40B4-BE49-F238E27FC236}">
-                <a16:creationId xmlns:a16="http://schemas.microsoft.com/office/drawing/2014/main" id="{5BB6C03E-B970-4FA5-83BD-DA2E462C35A1}"/>
+                <a16:creationId xmlns:a16="http://schemas.microsoft.com/office/drawing/2014/main" xmlns="" id="{5BB6C03E-B970-4FA5-83BD-DA2E462C35A1}"/>
               </a:ext>
             </a:extLst>
           </p:cNvPr>
@@ -9285,7 +9291,7 @@
           <p:cNvPr id="7" name="Inhaltsplatzhalter 6">
             <a:extLst>
               <a:ext uri="{FF2B5EF4-FFF2-40B4-BE49-F238E27FC236}">
-                <a16:creationId xmlns:a16="http://schemas.microsoft.com/office/drawing/2014/main" id="{02E73D04-5C87-4990-9FD5-28E200352959}"/>
+                <a16:creationId xmlns:a16="http://schemas.microsoft.com/office/drawing/2014/main" xmlns="" id="{02E73D04-5C87-4990-9FD5-28E200352959}"/>
               </a:ext>
             </a:extLst>
           </p:cNvPr>
@@ -9310,7 +9316,7 @@
           <p:cNvPr id="10" name="Inhaltsplatzhalter 2">
             <a:extLst>
               <a:ext uri="{FF2B5EF4-FFF2-40B4-BE49-F238E27FC236}">
-                <a16:creationId xmlns:a16="http://schemas.microsoft.com/office/drawing/2014/main" id="{3D50B8CB-49CB-480F-8369-501E071177D8}"/>
+                <a16:creationId xmlns:a16="http://schemas.microsoft.com/office/drawing/2014/main" xmlns="" id="{3D50B8CB-49CB-480F-8369-501E071177D8}"/>
               </a:ext>
             </a:extLst>
           </p:cNvPr>
@@ -9395,7 +9401,7 @@
           <p:cNvPr id="5" name="Textplatzhalter 4">
             <a:extLst>
               <a:ext uri="{FF2B5EF4-FFF2-40B4-BE49-F238E27FC236}">
-                <a16:creationId xmlns:a16="http://schemas.microsoft.com/office/drawing/2014/main" id="{67DE0ECA-5E5C-43D9-A4C4-B3A31EB20E63}"/>
+                <a16:creationId xmlns:a16="http://schemas.microsoft.com/office/drawing/2014/main" xmlns="" id="{67DE0ECA-5E5C-43D9-A4C4-B3A31EB20E63}"/>
               </a:ext>
             </a:extLst>
           </p:cNvPr>
@@ -9425,7 +9431,7 @@
           <p:cNvPr id="7" name="Grafik 6">
             <a:extLst>
               <a:ext uri="{FF2B5EF4-FFF2-40B4-BE49-F238E27FC236}">
-                <a16:creationId xmlns:a16="http://schemas.microsoft.com/office/drawing/2014/main" id="{9662A82F-40D1-46D3-B342-3A7B12F5AF35}"/>
+                <a16:creationId xmlns:a16="http://schemas.microsoft.com/office/drawing/2014/main" xmlns="" id="{9662A82F-40D1-46D3-B342-3A7B12F5AF35}"/>
               </a:ext>
             </a:extLst>
           </p:cNvPr>
@@ -9491,7 +9497,7 @@
           <p:cNvPr id="5" name="Textplatzhalter 4">
             <a:extLst>
               <a:ext uri="{FF2B5EF4-FFF2-40B4-BE49-F238E27FC236}">
-                <a16:creationId xmlns:a16="http://schemas.microsoft.com/office/drawing/2014/main" id="{67DE0ECA-5E5C-43D9-A4C4-B3A31EB20E63}"/>
+                <a16:creationId xmlns:a16="http://schemas.microsoft.com/office/drawing/2014/main" xmlns="" id="{67DE0ECA-5E5C-43D9-A4C4-B3A31EB20E63}"/>
               </a:ext>
             </a:extLst>
           </p:cNvPr>
@@ -9526,7 +9532,7 @@
           <p:cNvPr id="4" name="Grafik 3">
             <a:extLst>
               <a:ext uri="{FF2B5EF4-FFF2-40B4-BE49-F238E27FC236}">
-                <a16:creationId xmlns:a16="http://schemas.microsoft.com/office/drawing/2014/main" id="{5C978442-D162-4FCA-BE28-D926E2EB979A}"/>
+                <a16:creationId xmlns:a16="http://schemas.microsoft.com/office/drawing/2014/main" xmlns="" id="{5C978442-D162-4FCA-BE28-D926E2EB979A}"/>
               </a:ext>
             </a:extLst>
           </p:cNvPr>
@@ -9592,7 +9598,7 @@
           <p:cNvPr id="2" name="Inhaltsplatzhalter 1">
             <a:extLst>
               <a:ext uri="{FF2B5EF4-FFF2-40B4-BE49-F238E27FC236}">
-                <a16:creationId xmlns:a16="http://schemas.microsoft.com/office/drawing/2014/main" id="{9EEF70E0-DC88-48AD-8EF7-031F96353D1D}"/>
+                <a16:creationId xmlns:a16="http://schemas.microsoft.com/office/drawing/2014/main" xmlns="" id="{9EEF70E0-DC88-48AD-8EF7-031F96353D1D}"/>
               </a:ext>
             </a:extLst>
           </p:cNvPr>
@@ -9651,7 +9657,7 @@
           <p:cNvPr id="4" name="Fußzeilenplatzhalter 3">
             <a:extLst>
               <a:ext uri="{FF2B5EF4-FFF2-40B4-BE49-F238E27FC236}">
-                <a16:creationId xmlns:a16="http://schemas.microsoft.com/office/drawing/2014/main" id="{51B427D6-C78C-4800-A708-8DE04DA34FAA}"/>
+                <a16:creationId xmlns:a16="http://schemas.microsoft.com/office/drawing/2014/main" xmlns="" id="{51B427D6-C78C-4800-A708-8DE04DA34FAA}"/>
               </a:ext>
             </a:extLst>
           </p:cNvPr>
@@ -9692,7 +9698,7 @@
           <p:cNvPr id="6" name="Titel 5">
             <a:extLst>
               <a:ext uri="{FF2B5EF4-FFF2-40B4-BE49-F238E27FC236}">
-                <a16:creationId xmlns:a16="http://schemas.microsoft.com/office/drawing/2014/main" id="{4ACCE5D5-075E-481D-B9C5-A3074B841447}"/>
+                <a16:creationId xmlns:a16="http://schemas.microsoft.com/office/drawing/2014/main" xmlns="" id="{4ACCE5D5-075E-481D-B9C5-A3074B841447}"/>
               </a:ext>
             </a:extLst>
           </p:cNvPr>
@@ -9721,7 +9727,7 @@
           <p:cNvPr id="7" name="Inhaltsplatzhalter 6">
             <a:extLst>
               <a:ext uri="{FF2B5EF4-FFF2-40B4-BE49-F238E27FC236}">
-                <a16:creationId xmlns:a16="http://schemas.microsoft.com/office/drawing/2014/main" id="{91EE5F19-F06C-41B0-A917-E9959AFBDF9F}"/>
+                <a16:creationId xmlns:a16="http://schemas.microsoft.com/office/drawing/2014/main" xmlns="" id="{91EE5F19-F06C-41B0-A917-E9959AFBDF9F}"/>
               </a:ext>
             </a:extLst>
           </p:cNvPr>
@@ -9776,7 +9782,7 @@
           <p:cNvPr id="2" name="Inhaltsplatzhalter 1">
             <a:extLst>
               <a:ext uri="{FF2B5EF4-FFF2-40B4-BE49-F238E27FC236}">
-                <a16:creationId xmlns:a16="http://schemas.microsoft.com/office/drawing/2014/main" id="{5B5EE2F8-5215-42BC-A24D-CB4BD34CDC94}"/>
+                <a16:creationId xmlns:a16="http://schemas.microsoft.com/office/drawing/2014/main" xmlns="" id="{5B5EE2F8-5215-42BC-A24D-CB4BD34CDC94}"/>
               </a:ext>
             </a:extLst>
           </p:cNvPr>
@@ -9812,7 +9818,7 @@
           <p:cNvPr id="4" name="Fußzeilenplatzhalter 3">
             <a:extLst>
               <a:ext uri="{FF2B5EF4-FFF2-40B4-BE49-F238E27FC236}">
-                <a16:creationId xmlns:a16="http://schemas.microsoft.com/office/drawing/2014/main" id="{0FC0C19D-1682-4679-8E1E-D2E399E12164}"/>
+                <a16:creationId xmlns:a16="http://schemas.microsoft.com/office/drawing/2014/main" xmlns="" id="{0FC0C19D-1682-4679-8E1E-D2E399E12164}"/>
               </a:ext>
             </a:extLst>
           </p:cNvPr>
@@ -9846,7 +9852,7 @@
           <p:cNvPr id="6" name="Titel 5">
             <a:extLst>
               <a:ext uri="{FF2B5EF4-FFF2-40B4-BE49-F238E27FC236}">
-                <a16:creationId xmlns:a16="http://schemas.microsoft.com/office/drawing/2014/main" id="{F945D4CE-7FAD-45BF-A641-06AE09C0EF93}"/>
+                <a16:creationId xmlns:a16="http://schemas.microsoft.com/office/drawing/2014/main" xmlns="" id="{F945D4CE-7FAD-45BF-A641-06AE09C0EF93}"/>
               </a:ext>
             </a:extLst>
           </p:cNvPr>
@@ -9891,7 +9897,7 @@
           <p:cNvPr id="3" name="Inhaltsplatzhalter 2">
             <a:extLst>
               <a:ext uri="{FF2B5EF4-FFF2-40B4-BE49-F238E27FC236}">
-                <a16:creationId xmlns:a16="http://schemas.microsoft.com/office/drawing/2014/main" id="{B7F3B1AA-05C4-4BAD-AB7F-BCD28B13ADD2}"/>
+                <a16:creationId xmlns:a16="http://schemas.microsoft.com/office/drawing/2014/main" xmlns="" id="{B7F3B1AA-05C4-4BAD-AB7F-BCD28B13ADD2}"/>
               </a:ext>
             </a:extLst>
           </p:cNvPr>
@@ -9916,7 +9922,7 @@
           <p:cNvPr id="9" name="Textfeld 8">
             <a:extLst>
               <a:ext uri="{FF2B5EF4-FFF2-40B4-BE49-F238E27FC236}">
-                <a16:creationId xmlns:a16="http://schemas.microsoft.com/office/drawing/2014/main" id="{5BB6C03E-B970-4FA5-83BD-DA2E462C35A1}"/>
+                <a16:creationId xmlns:a16="http://schemas.microsoft.com/office/drawing/2014/main" xmlns="" id="{5BB6C03E-B970-4FA5-83BD-DA2E462C35A1}"/>
               </a:ext>
             </a:extLst>
           </p:cNvPr>
@@ -10237,7 +10243,7 @@
           <p:cNvPr id="2" name="Inhaltsplatzhalter 1">
             <a:extLst>
               <a:ext uri="{FF2B5EF4-FFF2-40B4-BE49-F238E27FC236}">
-                <a16:creationId xmlns:a16="http://schemas.microsoft.com/office/drawing/2014/main" id="{FA35B9DB-F60D-4066-B8D9-2AEEC4F64DCC}"/>
+                <a16:creationId xmlns:a16="http://schemas.microsoft.com/office/drawing/2014/main" xmlns="" id="{FA35B9DB-F60D-4066-B8D9-2AEEC4F64DCC}"/>
               </a:ext>
             </a:extLst>
           </p:cNvPr>
@@ -10299,7 +10305,7 @@
           <p:cNvPr id="6" name="Grafik 5">
             <a:extLst>
               <a:ext uri="{FF2B5EF4-FFF2-40B4-BE49-F238E27FC236}">
-                <a16:creationId xmlns:a16="http://schemas.microsoft.com/office/drawing/2014/main" id="{66E4B86A-06DF-42B6-8ACA-4C8C1D113A65}"/>
+                <a16:creationId xmlns:a16="http://schemas.microsoft.com/office/drawing/2014/main" xmlns="" id="{66E4B86A-06DF-42B6-8ACA-4C8C1D113A65}"/>
               </a:ext>
             </a:extLst>
           </p:cNvPr>
@@ -10335,7 +10341,7 @@
           <p:cNvPr id="8" name="Grafik 7">
             <a:extLst>
               <a:ext uri="{FF2B5EF4-FFF2-40B4-BE49-F238E27FC236}">
-                <a16:creationId xmlns:a16="http://schemas.microsoft.com/office/drawing/2014/main" id="{E1EEF370-18C6-4E24-9585-5202B4DC6481}"/>
+                <a16:creationId xmlns:a16="http://schemas.microsoft.com/office/drawing/2014/main" xmlns="" id="{E1EEF370-18C6-4E24-9585-5202B4DC6481}"/>
               </a:ext>
             </a:extLst>
           </p:cNvPr>
@@ -10371,7 +10377,7 @@
           <p:cNvPr id="9" name="Rechteck 8">
             <a:extLst>
               <a:ext uri="{FF2B5EF4-FFF2-40B4-BE49-F238E27FC236}">
-                <a16:creationId xmlns:a16="http://schemas.microsoft.com/office/drawing/2014/main" id="{3870196D-44D4-4AA2-83CC-F16BFBF045C8}"/>
+                <a16:creationId xmlns:a16="http://schemas.microsoft.com/office/drawing/2014/main" xmlns="" id="{3870196D-44D4-4AA2-83CC-F16BFBF045C8}"/>
               </a:ext>
             </a:extLst>
           </p:cNvPr>
@@ -10430,7 +10436,7 @@
           <p:cNvPr id="10" name="Grafik 9">
             <a:extLst>
               <a:ext uri="{FF2B5EF4-FFF2-40B4-BE49-F238E27FC236}">
-                <a16:creationId xmlns:a16="http://schemas.microsoft.com/office/drawing/2014/main" id="{177ADE5C-6E0C-41DF-B77F-3FAF6918653E}"/>
+                <a16:creationId xmlns:a16="http://schemas.microsoft.com/office/drawing/2014/main" xmlns="" id="{177ADE5C-6E0C-41DF-B77F-3FAF6918653E}"/>
               </a:ext>
             </a:extLst>
           </p:cNvPr>
@@ -10466,7 +10472,7 @@
           <p:cNvPr id="1026" name="Picture 2" descr="RÃ©sultat de recherche d'images pour &quot;we need you&quot;">
             <a:extLst>
               <a:ext uri="{FF2B5EF4-FFF2-40B4-BE49-F238E27FC236}">
-                <a16:creationId xmlns:a16="http://schemas.microsoft.com/office/drawing/2014/main" id="{2D65F3E9-5E3A-407E-969C-984A63ABD069}"/>
+                <a16:creationId xmlns:a16="http://schemas.microsoft.com/office/drawing/2014/main" xmlns="" id="{2D65F3E9-5E3A-407E-969C-984A63ABD069}"/>
               </a:ext>
             </a:extLst>
           </p:cNvPr>
@@ -10548,7 +10554,7 @@
           <p:cNvPr id="11" name="Picture 2" descr="https://github.com/easystats/insight/raw/master/man/figures/logo.png">
             <a:extLst>
               <a:ext uri="{FF2B5EF4-FFF2-40B4-BE49-F238E27FC236}">
-                <a16:creationId xmlns:a16="http://schemas.microsoft.com/office/drawing/2014/main" id="{04B86C66-F628-4F12-A1EA-8466036DE187}"/>
+                <a16:creationId xmlns:a16="http://schemas.microsoft.com/office/drawing/2014/main" xmlns="" id="{04B86C66-F628-4F12-A1EA-8466036DE187}"/>
               </a:ext>
             </a:extLst>
           </p:cNvPr>
@@ -10572,8 +10578,8 @@
         </p:blipFill>
         <p:spPr bwMode="auto">
           <a:xfrm>
-            <a:off x="984539" y="3899786"/>
-            <a:ext cx="1143000" cy="1323975"/>
+            <a:off x="1003413" y="3623006"/>
+            <a:ext cx="1080000" cy="1251000"/>
           </a:xfrm>
           <a:prstGeom prst="rect">
             <a:avLst/>
@@ -10595,7 +10601,7 @@
           <p:cNvPr id="12" name="Picture 4" descr="https://github.com/easystats/bayestestR/raw/master/man/figures/logo.png">
             <a:extLst>
               <a:ext uri="{FF2B5EF4-FFF2-40B4-BE49-F238E27FC236}">
-                <a16:creationId xmlns:a16="http://schemas.microsoft.com/office/drawing/2014/main" id="{256AFF5F-ECF9-4DF3-9C67-67D3B46F0DB2}"/>
+                <a16:creationId xmlns:a16="http://schemas.microsoft.com/office/drawing/2014/main" xmlns="" id="{256AFF5F-ECF9-4DF3-9C67-67D3B46F0DB2}"/>
               </a:ext>
             </a:extLst>
           </p:cNvPr>
@@ -10619,8 +10625,8 @@
         </p:blipFill>
         <p:spPr bwMode="auto">
           <a:xfrm>
-            <a:off x="2351032" y="3899786"/>
-            <a:ext cx="1143000" cy="1323975"/>
+            <a:off x="2182844" y="3623006"/>
+            <a:ext cx="1080000" cy="1251000"/>
           </a:xfrm>
           <a:prstGeom prst="rect">
             <a:avLst/>
@@ -10642,7 +10648,7 @@
           <p:cNvPr id="13" name="Picture 6" descr="https://github.com/easystats/report/raw/master/man/figures/logo.png">
             <a:extLst>
               <a:ext uri="{FF2B5EF4-FFF2-40B4-BE49-F238E27FC236}">
-                <a16:creationId xmlns:a16="http://schemas.microsoft.com/office/drawing/2014/main" id="{29C16679-DF7C-47D5-AEF3-6A5231E1B7B0}"/>
+                <a16:creationId xmlns:a16="http://schemas.microsoft.com/office/drawing/2014/main" xmlns="" id="{29C16679-DF7C-47D5-AEF3-6A5231E1B7B0}"/>
               </a:ext>
             </a:extLst>
           </p:cNvPr>
@@ -10666,8 +10672,8 @@
         </p:blipFill>
         <p:spPr bwMode="auto">
           <a:xfrm>
-            <a:off x="3748754" y="3899785"/>
-            <a:ext cx="1143000" cy="1323975"/>
+            <a:off x="3362275" y="3623006"/>
+            <a:ext cx="1080000" cy="1251000"/>
           </a:xfrm>
           <a:prstGeom prst="rect">
             <a:avLst/>
@@ -10689,7 +10695,7 @@
           <p:cNvPr id="14" name="Textfeld 13">
             <a:extLst>
               <a:ext uri="{FF2B5EF4-FFF2-40B4-BE49-F238E27FC236}">
-                <a16:creationId xmlns:a16="http://schemas.microsoft.com/office/drawing/2014/main" id="{FE5472F9-8EBD-40E7-959D-BA9DC0B2C0AB}"/>
+                <a16:creationId xmlns:a16="http://schemas.microsoft.com/office/drawing/2014/main" xmlns="" id="{FE5472F9-8EBD-40E7-959D-BA9DC0B2C0AB}"/>
               </a:ext>
             </a:extLst>
           </p:cNvPr>
@@ -10698,7 +10704,7 @@
         </p:nvSpPr>
         <p:spPr>
           <a:xfrm>
-            <a:off x="984245" y="5221385"/>
+            <a:off x="1009476" y="5962989"/>
             <a:ext cx="3432799" cy="422405"/>
           </a:xfrm>
           <a:prstGeom prst="rect">
@@ -10781,6 +10787,66 @@
           </a:p>
         </p:txBody>
       </p:sp>
+      <p:pic>
+        <p:nvPicPr>
+          <p:cNvPr id="4" name="Grafik 3"/>
+          <p:cNvPicPr>
+            <a:picLocks noChangeAspect="1"/>
+          </p:cNvPicPr>
+          <p:nvPr/>
+        </p:nvPicPr>
+        <p:blipFill>
+          <a:blip r:embed="rId9" cstate="print">
+            <a:extLst>
+              <a:ext uri="{28A0092B-C50C-407E-A947-70E740481C1C}">
+                <a14:useLocalDpi xmlns:a14="http://schemas.microsoft.com/office/drawing/2010/main" val="0"/>
+              </a:ext>
+            </a:extLst>
+          </a:blip>
+          <a:stretch>
+            <a:fillRect/>
+          </a:stretch>
+        </p:blipFill>
+        <p:spPr>
+          <a:xfrm>
+            <a:off x="1593129" y="4673857"/>
+            <a:ext cx="1080000" cy="1250801"/>
+          </a:xfrm>
+          <a:prstGeom prst="rect">
+            <a:avLst/>
+          </a:prstGeom>
+        </p:spPr>
+      </p:pic>
+      <p:pic>
+        <p:nvPicPr>
+          <p:cNvPr id="5" name="Grafik 4"/>
+          <p:cNvPicPr>
+            <a:picLocks noChangeAspect="1"/>
+          </p:cNvPicPr>
+          <p:nvPr/>
+        </p:nvPicPr>
+        <p:blipFill>
+          <a:blip r:embed="rId10" cstate="print">
+            <a:extLst>
+              <a:ext uri="{28A0092B-C50C-407E-A947-70E740481C1C}">
+                <a14:useLocalDpi xmlns:a14="http://schemas.microsoft.com/office/drawing/2010/main" val="0"/>
+              </a:ext>
+            </a:extLst>
+          </a:blip>
+          <a:stretch>
+            <a:fillRect/>
+          </a:stretch>
+        </p:blipFill>
+        <p:spPr>
+          <a:xfrm>
+            <a:off x="2794549" y="4675062"/>
+            <a:ext cx="1080000" cy="1249596"/>
+          </a:xfrm>
+          <a:prstGeom prst="rect">
+            <a:avLst/>
+          </a:prstGeom>
+        </p:spPr>
+      </p:pic>
     </p:spTree>
     <p:extLst>
       <p:ext uri="{BB962C8B-B14F-4D97-AF65-F5344CB8AC3E}">
@@ -10816,7 +10882,7 @@
           <p:cNvPr id="2" name="Inhaltsplatzhalter 1">
             <a:extLst>
               <a:ext uri="{FF2B5EF4-FFF2-40B4-BE49-F238E27FC236}">
-                <a16:creationId xmlns:a16="http://schemas.microsoft.com/office/drawing/2014/main" id="{FA35B9DB-F60D-4066-B8D9-2AEEC4F64DCC}"/>
+                <a16:creationId xmlns:a16="http://schemas.microsoft.com/office/drawing/2014/main" xmlns="" id="{FA35B9DB-F60D-4066-B8D9-2AEEC4F64DCC}"/>
               </a:ext>
             </a:extLst>
           </p:cNvPr>
@@ -10878,7 +10944,7 @@
           <p:cNvPr id="6" name="Grafik 5">
             <a:extLst>
               <a:ext uri="{FF2B5EF4-FFF2-40B4-BE49-F238E27FC236}">
-                <a16:creationId xmlns:a16="http://schemas.microsoft.com/office/drawing/2014/main" id="{66E4B86A-06DF-42B6-8ACA-4C8C1D113A65}"/>
+                <a16:creationId xmlns:a16="http://schemas.microsoft.com/office/drawing/2014/main" xmlns="" id="{66E4B86A-06DF-42B6-8ACA-4C8C1D113A65}"/>
               </a:ext>
             </a:extLst>
           </p:cNvPr>
@@ -10914,7 +10980,7 @@
           <p:cNvPr id="8" name="Grafik 7">
             <a:extLst>
               <a:ext uri="{FF2B5EF4-FFF2-40B4-BE49-F238E27FC236}">
-                <a16:creationId xmlns:a16="http://schemas.microsoft.com/office/drawing/2014/main" id="{E1EEF370-18C6-4E24-9585-5202B4DC6481}"/>
+                <a16:creationId xmlns:a16="http://schemas.microsoft.com/office/drawing/2014/main" xmlns="" id="{E1EEF370-18C6-4E24-9585-5202B4DC6481}"/>
               </a:ext>
             </a:extLst>
           </p:cNvPr>
@@ -10950,7 +11016,7 @@
           <p:cNvPr id="9" name="Rechteck 8">
             <a:extLst>
               <a:ext uri="{FF2B5EF4-FFF2-40B4-BE49-F238E27FC236}">
-                <a16:creationId xmlns:a16="http://schemas.microsoft.com/office/drawing/2014/main" id="{3870196D-44D4-4AA2-83CC-F16BFBF045C8}"/>
+                <a16:creationId xmlns:a16="http://schemas.microsoft.com/office/drawing/2014/main" xmlns="" id="{3870196D-44D4-4AA2-83CC-F16BFBF045C8}"/>
               </a:ext>
             </a:extLst>
           </p:cNvPr>
@@ -11096,7 +11162,7 @@
           <p:cNvPr id="10" name="Grafik 9">
             <a:extLst>
               <a:ext uri="{FF2B5EF4-FFF2-40B4-BE49-F238E27FC236}">
-                <a16:creationId xmlns:a16="http://schemas.microsoft.com/office/drawing/2014/main" id="{177ADE5C-6E0C-41DF-B77F-3FAF6918653E}"/>
+                <a16:creationId xmlns:a16="http://schemas.microsoft.com/office/drawing/2014/main" xmlns="" id="{177ADE5C-6E0C-41DF-B77F-3FAF6918653E}"/>
               </a:ext>
             </a:extLst>
           </p:cNvPr>
@@ -11132,7 +11198,7 @@
           <p:cNvPr id="1026" name="Picture 2" descr="RÃ©sultat de recherche d'images pour &quot;we need you&quot;">
             <a:extLst>
               <a:ext uri="{FF2B5EF4-FFF2-40B4-BE49-F238E27FC236}">
-                <a16:creationId xmlns:a16="http://schemas.microsoft.com/office/drawing/2014/main" id="{2D65F3E9-5E3A-407E-969C-984A63ABD069}"/>
+                <a16:creationId xmlns:a16="http://schemas.microsoft.com/office/drawing/2014/main" xmlns="" id="{2D65F3E9-5E3A-407E-969C-984A63ABD069}"/>
               </a:ext>
             </a:extLst>
           </p:cNvPr>
@@ -11263,7 +11329,7 @@
           <p:cNvPr id="5" name="Textplatzhalter 4">
             <a:extLst>
               <a:ext uri="{FF2B5EF4-FFF2-40B4-BE49-F238E27FC236}">
-                <a16:creationId xmlns:a16="http://schemas.microsoft.com/office/drawing/2014/main" id="{67DE0ECA-5E5C-43D9-A4C4-B3A31EB20E63}"/>
+                <a16:creationId xmlns:a16="http://schemas.microsoft.com/office/drawing/2014/main" xmlns="" id="{67DE0ECA-5E5C-43D9-A4C4-B3A31EB20E63}"/>
               </a:ext>
             </a:extLst>
           </p:cNvPr>
@@ -11293,7 +11359,7 @@
           <p:cNvPr id="7" name="Grafik 6">
             <a:extLst>
               <a:ext uri="{FF2B5EF4-FFF2-40B4-BE49-F238E27FC236}">
-                <a16:creationId xmlns:a16="http://schemas.microsoft.com/office/drawing/2014/main" id="{9662A82F-40D1-46D3-B342-3A7B12F5AF35}"/>
+                <a16:creationId xmlns:a16="http://schemas.microsoft.com/office/drawing/2014/main" xmlns="" id="{9662A82F-40D1-46D3-B342-3A7B12F5AF35}"/>
               </a:ext>
             </a:extLst>
           </p:cNvPr>
@@ -11329,7 +11395,7 @@
           <p:cNvPr id="6" name="Inhaltsplatzhalter 1">
             <a:extLst>
               <a:ext uri="{FF2B5EF4-FFF2-40B4-BE49-F238E27FC236}">
-                <a16:creationId xmlns:a16="http://schemas.microsoft.com/office/drawing/2014/main" id="{17A46D4D-0551-4407-9BCE-588AD39BB403}"/>
+                <a16:creationId xmlns:a16="http://schemas.microsoft.com/office/drawing/2014/main" xmlns="" id="{17A46D4D-0551-4407-9BCE-588AD39BB403}"/>
               </a:ext>
             </a:extLst>
           </p:cNvPr>
@@ -11542,7 +11608,7 @@
           <p:cNvPr id="8" name="Grafik 7">
             <a:extLst>
               <a:ext uri="{FF2B5EF4-FFF2-40B4-BE49-F238E27FC236}">
-                <a16:creationId xmlns:a16="http://schemas.microsoft.com/office/drawing/2014/main" id="{EEDE1A4C-E038-4AF3-8084-AD08BCBB8B40}"/>
+                <a16:creationId xmlns:a16="http://schemas.microsoft.com/office/drawing/2014/main" xmlns="" id="{EEDE1A4C-E038-4AF3-8084-AD08BCBB8B40}"/>
               </a:ext>
             </a:extLst>
           </p:cNvPr>
@@ -11578,7 +11644,7 @@
           <p:cNvPr id="3" name="Textfeld 2">
             <a:extLst>
               <a:ext uri="{FF2B5EF4-FFF2-40B4-BE49-F238E27FC236}">
-                <a16:creationId xmlns:a16="http://schemas.microsoft.com/office/drawing/2014/main" id="{06CD9A7E-4DFA-4BD7-BE9D-E73F98761ABC}"/>
+                <a16:creationId xmlns:a16="http://schemas.microsoft.com/office/drawing/2014/main" xmlns="" id="{06CD9A7E-4DFA-4BD7-BE9D-E73F98761ABC}"/>
               </a:ext>
             </a:extLst>
           </p:cNvPr>
@@ -11904,7 +11970,7 @@
           <p:cNvPr id="5" name="Textplatzhalter 4">
             <a:extLst>
               <a:ext uri="{FF2B5EF4-FFF2-40B4-BE49-F238E27FC236}">
-                <a16:creationId xmlns:a16="http://schemas.microsoft.com/office/drawing/2014/main" id="{67DE0ECA-5E5C-43D9-A4C4-B3A31EB20E63}"/>
+                <a16:creationId xmlns:a16="http://schemas.microsoft.com/office/drawing/2014/main" xmlns="" id="{67DE0ECA-5E5C-43D9-A4C4-B3A31EB20E63}"/>
               </a:ext>
             </a:extLst>
           </p:cNvPr>
@@ -11934,7 +12000,7 @@
           <p:cNvPr id="7" name="Grafik 6">
             <a:extLst>
               <a:ext uri="{FF2B5EF4-FFF2-40B4-BE49-F238E27FC236}">
-                <a16:creationId xmlns:a16="http://schemas.microsoft.com/office/drawing/2014/main" id="{9662A82F-40D1-46D3-B342-3A7B12F5AF35}"/>
+                <a16:creationId xmlns:a16="http://schemas.microsoft.com/office/drawing/2014/main" xmlns="" id="{9662A82F-40D1-46D3-B342-3A7B12F5AF35}"/>
               </a:ext>
             </a:extLst>
           </p:cNvPr>
@@ -11970,7 +12036,7 @@
           <p:cNvPr id="6" name="Inhaltsplatzhalter 1">
             <a:extLst>
               <a:ext uri="{FF2B5EF4-FFF2-40B4-BE49-F238E27FC236}">
-                <a16:creationId xmlns:a16="http://schemas.microsoft.com/office/drawing/2014/main" id="{17A46D4D-0551-4407-9BCE-588AD39BB403}"/>
+                <a16:creationId xmlns:a16="http://schemas.microsoft.com/office/drawing/2014/main" xmlns="" id="{17A46D4D-0551-4407-9BCE-588AD39BB403}"/>
               </a:ext>
             </a:extLst>
           </p:cNvPr>
@@ -12183,7 +12249,7 @@
           <p:cNvPr id="8" name="Grafik 7">
             <a:extLst>
               <a:ext uri="{FF2B5EF4-FFF2-40B4-BE49-F238E27FC236}">
-                <a16:creationId xmlns:a16="http://schemas.microsoft.com/office/drawing/2014/main" id="{EEDE1A4C-E038-4AF3-8084-AD08BCBB8B40}"/>
+                <a16:creationId xmlns:a16="http://schemas.microsoft.com/office/drawing/2014/main" xmlns="" id="{EEDE1A4C-E038-4AF3-8084-AD08BCBB8B40}"/>
               </a:ext>
             </a:extLst>
           </p:cNvPr>
@@ -12219,7 +12285,7 @@
           <p:cNvPr id="3" name="Textfeld 2">
             <a:extLst>
               <a:ext uri="{FF2B5EF4-FFF2-40B4-BE49-F238E27FC236}">
-                <a16:creationId xmlns:a16="http://schemas.microsoft.com/office/drawing/2014/main" id="{06CD9A7E-4DFA-4BD7-BE9D-E73F98761ABC}"/>
+                <a16:creationId xmlns:a16="http://schemas.microsoft.com/office/drawing/2014/main" xmlns="" id="{06CD9A7E-4DFA-4BD7-BE9D-E73F98761ABC}"/>
               </a:ext>
             </a:extLst>
           </p:cNvPr>
@@ -12496,7 +12562,7 @@
           <p:cNvPr id="9" name="Grafik 8">
             <a:extLst>
               <a:ext uri="{FF2B5EF4-FFF2-40B4-BE49-F238E27FC236}">
-                <a16:creationId xmlns:a16="http://schemas.microsoft.com/office/drawing/2014/main" id="{EEFAF765-CB8E-4CDA-A2B5-AB8E890E785B}"/>
+                <a16:creationId xmlns:a16="http://schemas.microsoft.com/office/drawing/2014/main" xmlns="" id="{EEFAF765-CB8E-4CDA-A2B5-AB8E890E785B}"/>
               </a:ext>
             </a:extLst>
           </p:cNvPr>
@@ -12532,7 +12598,7 @@
           <p:cNvPr id="10" name="Inhaltsplatzhalter 1">
             <a:extLst>
               <a:ext uri="{FF2B5EF4-FFF2-40B4-BE49-F238E27FC236}">
-                <a16:creationId xmlns:a16="http://schemas.microsoft.com/office/drawing/2014/main" id="{1F4106B7-0C47-4BD5-AF44-2646E3AD2260}"/>
+                <a16:creationId xmlns:a16="http://schemas.microsoft.com/office/drawing/2014/main" xmlns="" id="{1F4106B7-0C47-4BD5-AF44-2646E3AD2260}"/>
               </a:ext>
             </a:extLst>
           </p:cNvPr>
@@ -12745,7 +12811,7 @@
           <p:cNvPr id="11" name="Textfeld 10">
             <a:extLst>
               <a:ext uri="{FF2B5EF4-FFF2-40B4-BE49-F238E27FC236}">
-                <a16:creationId xmlns:a16="http://schemas.microsoft.com/office/drawing/2014/main" id="{1CA3948B-B37D-4A05-8FF4-667A4E4174D7}"/>
+                <a16:creationId xmlns:a16="http://schemas.microsoft.com/office/drawing/2014/main" xmlns="" id="{1CA3948B-B37D-4A05-8FF4-667A4E4174D7}"/>
               </a:ext>
             </a:extLst>
           </p:cNvPr>
@@ -12893,7 +12959,7 @@
           <p:cNvPr id="12" name="Grafik 11">
             <a:extLst>
               <a:ext uri="{FF2B5EF4-FFF2-40B4-BE49-F238E27FC236}">
-                <a16:creationId xmlns:a16="http://schemas.microsoft.com/office/drawing/2014/main" id="{C6C09D98-7011-4A4C-AE66-132708929A66}"/>
+                <a16:creationId xmlns:a16="http://schemas.microsoft.com/office/drawing/2014/main" xmlns="" id="{C6C09D98-7011-4A4C-AE66-132708929A66}"/>
               </a:ext>
             </a:extLst>
           </p:cNvPr>
@@ -12959,7 +13025,7 @@
           <p:cNvPr id="2" name="Inhaltsplatzhalter 1">
             <a:extLst>
               <a:ext uri="{FF2B5EF4-FFF2-40B4-BE49-F238E27FC236}">
-                <a16:creationId xmlns:a16="http://schemas.microsoft.com/office/drawing/2014/main" id="{6AC63146-A60C-4C71-BB7B-58E7BF03580D}"/>
+                <a16:creationId xmlns:a16="http://schemas.microsoft.com/office/drawing/2014/main" xmlns="" id="{6AC63146-A60C-4C71-BB7B-58E7BF03580D}"/>
               </a:ext>
             </a:extLst>
           </p:cNvPr>
@@ -13163,7 +13229,7 @@
           <p:cNvPr id="4" name="Fußzeilenplatzhalter 3">
             <a:extLst>
               <a:ext uri="{FF2B5EF4-FFF2-40B4-BE49-F238E27FC236}">
-                <a16:creationId xmlns:a16="http://schemas.microsoft.com/office/drawing/2014/main" id="{C7528ED8-3537-4F05-A5B9-3E8A165FB2B5}"/>
+                <a16:creationId xmlns:a16="http://schemas.microsoft.com/office/drawing/2014/main" xmlns="" id="{C7528ED8-3537-4F05-A5B9-3E8A165FB2B5}"/>
               </a:ext>
             </a:extLst>
           </p:cNvPr>
@@ -13197,7 +13263,7 @@
           <p:cNvPr id="6" name="Titel 5">
             <a:extLst>
               <a:ext uri="{FF2B5EF4-FFF2-40B4-BE49-F238E27FC236}">
-                <a16:creationId xmlns:a16="http://schemas.microsoft.com/office/drawing/2014/main" id="{DA17230E-0997-4023-A8F0-BFEB027317EB}"/>
+                <a16:creationId xmlns:a16="http://schemas.microsoft.com/office/drawing/2014/main" xmlns="" id="{DA17230E-0997-4023-A8F0-BFEB027317EB}"/>
               </a:ext>
             </a:extLst>
           </p:cNvPr>
@@ -13226,7 +13292,7 @@
           <p:cNvPr id="7" name="Inhaltsplatzhalter 6">
             <a:extLst>
               <a:ext uri="{FF2B5EF4-FFF2-40B4-BE49-F238E27FC236}">
-                <a16:creationId xmlns:a16="http://schemas.microsoft.com/office/drawing/2014/main" id="{F2E59518-6179-4745-A40E-2EE49C758ADA}"/>
+                <a16:creationId xmlns:a16="http://schemas.microsoft.com/office/drawing/2014/main" xmlns="" id="{F2E59518-6179-4745-A40E-2EE49C758ADA}"/>
               </a:ext>
             </a:extLst>
           </p:cNvPr>
@@ -13251,7 +13317,7 @@
           <p:cNvPr id="8" name="Grafik 7">
             <a:extLst>
               <a:ext uri="{FF2B5EF4-FFF2-40B4-BE49-F238E27FC236}">
-                <a16:creationId xmlns:a16="http://schemas.microsoft.com/office/drawing/2014/main" id="{2C8B6296-E5C8-4A92-BD87-8984783DA579}"/>
+                <a16:creationId xmlns:a16="http://schemas.microsoft.com/office/drawing/2014/main" xmlns="" id="{2C8B6296-E5C8-4A92-BD87-8984783DA579}"/>
               </a:ext>
             </a:extLst>
           </p:cNvPr>
@@ -13317,7 +13383,7 @@
           <p:cNvPr id="2" name="Inhaltsplatzhalter 1">
             <a:extLst>
               <a:ext uri="{FF2B5EF4-FFF2-40B4-BE49-F238E27FC236}">
-                <a16:creationId xmlns:a16="http://schemas.microsoft.com/office/drawing/2014/main" id="{6AC63146-A60C-4C71-BB7B-58E7BF03580D}"/>
+                <a16:creationId xmlns:a16="http://schemas.microsoft.com/office/drawing/2014/main" xmlns="" id="{6AC63146-A60C-4C71-BB7B-58E7BF03580D}"/>
               </a:ext>
             </a:extLst>
           </p:cNvPr>
@@ -13495,7 +13561,7 @@
           <p:cNvPr id="4" name="Fußzeilenplatzhalter 3">
             <a:extLst>
               <a:ext uri="{FF2B5EF4-FFF2-40B4-BE49-F238E27FC236}">
-                <a16:creationId xmlns:a16="http://schemas.microsoft.com/office/drawing/2014/main" id="{C7528ED8-3537-4F05-A5B9-3E8A165FB2B5}"/>
+                <a16:creationId xmlns:a16="http://schemas.microsoft.com/office/drawing/2014/main" xmlns="" id="{C7528ED8-3537-4F05-A5B9-3E8A165FB2B5}"/>
               </a:ext>
             </a:extLst>
           </p:cNvPr>
@@ -13529,7 +13595,7 @@
           <p:cNvPr id="6" name="Titel 5">
             <a:extLst>
               <a:ext uri="{FF2B5EF4-FFF2-40B4-BE49-F238E27FC236}">
-                <a16:creationId xmlns:a16="http://schemas.microsoft.com/office/drawing/2014/main" id="{DA17230E-0997-4023-A8F0-BFEB027317EB}"/>
+                <a16:creationId xmlns:a16="http://schemas.microsoft.com/office/drawing/2014/main" xmlns="" id="{DA17230E-0997-4023-A8F0-BFEB027317EB}"/>
               </a:ext>
             </a:extLst>
           </p:cNvPr>
@@ -13558,7 +13624,7 @@
           <p:cNvPr id="7" name="Inhaltsplatzhalter 6">
             <a:extLst>
               <a:ext uri="{FF2B5EF4-FFF2-40B4-BE49-F238E27FC236}">
-                <a16:creationId xmlns:a16="http://schemas.microsoft.com/office/drawing/2014/main" id="{F2E59518-6179-4745-A40E-2EE49C758ADA}"/>
+                <a16:creationId xmlns:a16="http://schemas.microsoft.com/office/drawing/2014/main" xmlns="" id="{F2E59518-6179-4745-A40E-2EE49C758ADA}"/>
               </a:ext>
             </a:extLst>
           </p:cNvPr>
@@ -13583,7 +13649,7 @@
           <p:cNvPr id="8" name="Grafik 7">
             <a:extLst>
               <a:ext uri="{FF2B5EF4-FFF2-40B4-BE49-F238E27FC236}">
-                <a16:creationId xmlns:a16="http://schemas.microsoft.com/office/drawing/2014/main" id="{C488D801-7394-416F-906A-383A95B22EF1}"/>
+                <a16:creationId xmlns:a16="http://schemas.microsoft.com/office/drawing/2014/main" xmlns="" id="{C488D801-7394-416F-906A-383A95B22EF1}"/>
               </a:ext>
             </a:extLst>
           </p:cNvPr>
@@ -13649,7 +13715,7 @@
           <p:cNvPr id="2" name="Inhaltsplatzhalter 1">
             <a:extLst>
               <a:ext uri="{FF2B5EF4-FFF2-40B4-BE49-F238E27FC236}">
-                <a16:creationId xmlns:a16="http://schemas.microsoft.com/office/drawing/2014/main" id="{6AC63146-A60C-4C71-BB7B-58E7BF03580D}"/>
+                <a16:creationId xmlns:a16="http://schemas.microsoft.com/office/drawing/2014/main" xmlns="" id="{6AC63146-A60C-4C71-BB7B-58E7BF03580D}"/>
               </a:ext>
             </a:extLst>
           </p:cNvPr>
@@ -13812,7 +13878,7 @@
           <p:cNvPr id="4" name="Fußzeilenplatzhalter 3">
             <a:extLst>
               <a:ext uri="{FF2B5EF4-FFF2-40B4-BE49-F238E27FC236}">
-                <a16:creationId xmlns:a16="http://schemas.microsoft.com/office/drawing/2014/main" id="{C7528ED8-3537-4F05-A5B9-3E8A165FB2B5}"/>
+                <a16:creationId xmlns:a16="http://schemas.microsoft.com/office/drawing/2014/main" xmlns="" id="{C7528ED8-3537-4F05-A5B9-3E8A165FB2B5}"/>
               </a:ext>
             </a:extLst>
           </p:cNvPr>
@@ -13846,7 +13912,7 @@
           <p:cNvPr id="6" name="Titel 5">
             <a:extLst>
               <a:ext uri="{FF2B5EF4-FFF2-40B4-BE49-F238E27FC236}">
-                <a16:creationId xmlns:a16="http://schemas.microsoft.com/office/drawing/2014/main" id="{DA17230E-0997-4023-A8F0-BFEB027317EB}"/>
+                <a16:creationId xmlns:a16="http://schemas.microsoft.com/office/drawing/2014/main" xmlns="" id="{DA17230E-0997-4023-A8F0-BFEB027317EB}"/>
               </a:ext>
             </a:extLst>
           </p:cNvPr>
@@ -13875,7 +13941,7 @@
           <p:cNvPr id="7" name="Inhaltsplatzhalter 6">
             <a:extLst>
               <a:ext uri="{FF2B5EF4-FFF2-40B4-BE49-F238E27FC236}">
-                <a16:creationId xmlns:a16="http://schemas.microsoft.com/office/drawing/2014/main" id="{F2E59518-6179-4745-A40E-2EE49C758ADA}"/>
+                <a16:creationId xmlns:a16="http://schemas.microsoft.com/office/drawing/2014/main" xmlns="" id="{F2E59518-6179-4745-A40E-2EE49C758ADA}"/>
               </a:ext>
             </a:extLst>
           </p:cNvPr>
@@ -13900,7 +13966,7 @@
           <p:cNvPr id="8" name="Grafik 7">
             <a:extLst>
               <a:ext uri="{FF2B5EF4-FFF2-40B4-BE49-F238E27FC236}">
-                <a16:creationId xmlns:a16="http://schemas.microsoft.com/office/drawing/2014/main" id="{7D2C7851-769C-4DF5-B4EB-92C9F8721AA8}"/>
+                <a16:creationId xmlns:a16="http://schemas.microsoft.com/office/drawing/2014/main" xmlns="" id="{7D2C7851-769C-4DF5-B4EB-92C9F8721AA8}"/>
               </a:ext>
             </a:extLst>
           </p:cNvPr>
@@ -13989,7 +14055,7 @@
           <p:cNvPr id="2" name="Inhaltsplatzhalter 1">
             <a:extLst>
               <a:ext uri="{FF2B5EF4-FFF2-40B4-BE49-F238E27FC236}">
-                <a16:creationId xmlns:a16="http://schemas.microsoft.com/office/drawing/2014/main" id="{6AC63146-A60C-4C71-BB7B-58E7BF03580D}"/>
+                <a16:creationId xmlns:a16="http://schemas.microsoft.com/office/drawing/2014/main" xmlns="" id="{6AC63146-A60C-4C71-BB7B-58E7BF03580D}"/>
               </a:ext>
             </a:extLst>
           </p:cNvPr>
@@ -14145,7 +14211,7 @@
           <p:cNvPr id="4" name="Fußzeilenplatzhalter 3">
             <a:extLst>
               <a:ext uri="{FF2B5EF4-FFF2-40B4-BE49-F238E27FC236}">
-                <a16:creationId xmlns:a16="http://schemas.microsoft.com/office/drawing/2014/main" id="{C7528ED8-3537-4F05-A5B9-3E8A165FB2B5}"/>
+                <a16:creationId xmlns:a16="http://schemas.microsoft.com/office/drawing/2014/main" xmlns="" id="{C7528ED8-3537-4F05-A5B9-3E8A165FB2B5}"/>
               </a:ext>
             </a:extLst>
           </p:cNvPr>
@@ -14179,7 +14245,7 @@
           <p:cNvPr id="6" name="Titel 5">
             <a:extLst>
               <a:ext uri="{FF2B5EF4-FFF2-40B4-BE49-F238E27FC236}">
-                <a16:creationId xmlns:a16="http://schemas.microsoft.com/office/drawing/2014/main" id="{DA17230E-0997-4023-A8F0-BFEB027317EB}"/>
+                <a16:creationId xmlns:a16="http://schemas.microsoft.com/office/drawing/2014/main" xmlns="" id="{DA17230E-0997-4023-A8F0-BFEB027317EB}"/>
               </a:ext>
             </a:extLst>
           </p:cNvPr>
@@ -14208,7 +14274,7 @@
           <p:cNvPr id="8" name="Grafik 7">
             <a:extLst>
               <a:ext uri="{FF2B5EF4-FFF2-40B4-BE49-F238E27FC236}">
-                <a16:creationId xmlns:a16="http://schemas.microsoft.com/office/drawing/2014/main" id="{7D2C7851-769C-4DF5-B4EB-92C9F8721AA8}"/>
+                <a16:creationId xmlns:a16="http://schemas.microsoft.com/office/drawing/2014/main" xmlns="" id="{7D2C7851-769C-4DF5-B4EB-92C9F8721AA8}"/>
               </a:ext>
             </a:extLst>
           </p:cNvPr>
@@ -14244,7 +14310,7 @@
           <p:cNvPr id="14" name="Inhaltsplatzhalter 13">
             <a:extLst>
               <a:ext uri="{FF2B5EF4-FFF2-40B4-BE49-F238E27FC236}">
-                <a16:creationId xmlns:a16="http://schemas.microsoft.com/office/drawing/2014/main" id="{57389447-F8E0-45D3-85F4-09347BA8682E}"/>
+                <a16:creationId xmlns:a16="http://schemas.microsoft.com/office/drawing/2014/main" xmlns="" id="{57389447-F8E0-45D3-85F4-09347BA8682E}"/>
               </a:ext>
             </a:extLst>
           </p:cNvPr>
@@ -14279,7 +14345,7 @@
           <p:cNvPr id="16" name="Rechteck 15">
             <a:extLst>
               <a:ext uri="{FF2B5EF4-FFF2-40B4-BE49-F238E27FC236}">
-                <a16:creationId xmlns:a16="http://schemas.microsoft.com/office/drawing/2014/main" id="{30778362-FFF2-4673-8311-57C88A8E8903}"/>
+                <a16:creationId xmlns:a16="http://schemas.microsoft.com/office/drawing/2014/main" xmlns="" id="{30778362-FFF2-4673-8311-57C88A8E8903}"/>
               </a:ext>
             </a:extLst>
           </p:cNvPr>
@@ -14335,7 +14401,7 @@
           <p:cNvPr id="17" name="Rechteck 16">
             <a:extLst>
               <a:ext uri="{FF2B5EF4-FFF2-40B4-BE49-F238E27FC236}">
-                <a16:creationId xmlns:a16="http://schemas.microsoft.com/office/drawing/2014/main" id="{4FC1C6AC-31F0-4795-89FF-0F2C89DB93C5}"/>
+                <a16:creationId xmlns:a16="http://schemas.microsoft.com/office/drawing/2014/main" xmlns="" id="{4FC1C6AC-31F0-4795-89FF-0F2C89DB93C5}"/>
               </a:ext>
             </a:extLst>
           </p:cNvPr>
@@ -14458,7 +14524,7 @@
           <p:cNvPr id="2" name="Titel 1">
             <a:extLst>
               <a:ext uri="{FF2B5EF4-FFF2-40B4-BE49-F238E27FC236}">
-                <a16:creationId xmlns:a16="http://schemas.microsoft.com/office/drawing/2014/main" id="{4E61557C-C1C7-4C45-B68A-C6BA2951B46F}"/>
+                <a16:creationId xmlns:a16="http://schemas.microsoft.com/office/drawing/2014/main" xmlns="" id="{4E61557C-C1C7-4C45-B68A-C6BA2951B46F}"/>
               </a:ext>
             </a:extLst>
           </p:cNvPr>
@@ -14487,7 +14553,7 @@
           <p:cNvPr id="3" name="Textplatzhalter 2">
             <a:extLst>
               <a:ext uri="{FF2B5EF4-FFF2-40B4-BE49-F238E27FC236}">
-                <a16:creationId xmlns:a16="http://schemas.microsoft.com/office/drawing/2014/main" id="{5103F8D7-88BD-4586-A2F8-EF2D8B1A656A}"/>
+                <a16:creationId xmlns:a16="http://schemas.microsoft.com/office/drawing/2014/main" xmlns="" id="{5103F8D7-88BD-4586-A2F8-EF2D8B1A656A}"/>
               </a:ext>
             </a:extLst>
           </p:cNvPr>

</xml_diff>